<commit_message>
Updated the powerpoint with presenters name
</commit_message>
<xml_diff>
--- a/Wicked Adventures.pptx
+++ b/Wicked Adventures.pptx
@@ -203,7 +203,7 @@
           <a:p>
             <a:fld id="{699807B5-D91D-4BD3-A7F9-ADD7559991AC}" type="datetimeFigureOut">
               <a:rPr lang="en-IN" smtClean="0"/>
-              <a:t>30-03-2022</a:t>
+              <a:t>31-03-2022</a:t>
             </a:fld>
             <a:endParaRPr lang="en-IN"/>
           </a:p>
@@ -620,7 +620,7 @@
           <a:p>
             <a:fld id="{639C5C35-4D10-4B81-A2B2-3672B162D0EF}" type="datetimeFigureOut">
               <a:rPr lang="en-IN" smtClean="0"/>
-              <a:t>30-03-2022</a:t>
+              <a:t>31-03-2022</a:t>
             </a:fld>
             <a:endParaRPr lang="en-IN"/>
           </a:p>
@@ -820,7 +820,7 @@
           <a:p>
             <a:fld id="{639C5C35-4D10-4B81-A2B2-3672B162D0EF}" type="datetimeFigureOut">
               <a:rPr lang="en-IN" smtClean="0"/>
-              <a:t>30-03-2022</a:t>
+              <a:t>31-03-2022</a:t>
             </a:fld>
             <a:endParaRPr lang="en-IN"/>
           </a:p>
@@ -1030,7 +1030,7 @@
           <a:p>
             <a:fld id="{639C5C35-4D10-4B81-A2B2-3672B162D0EF}" type="datetimeFigureOut">
               <a:rPr lang="en-IN" smtClean="0"/>
-              <a:t>30-03-2022</a:t>
+              <a:t>31-03-2022</a:t>
             </a:fld>
             <a:endParaRPr lang="en-IN"/>
           </a:p>
@@ -1230,7 +1230,7 @@
           <a:p>
             <a:fld id="{639C5C35-4D10-4B81-A2B2-3672B162D0EF}" type="datetimeFigureOut">
               <a:rPr lang="en-IN" smtClean="0"/>
-              <a:t>30-03-2022</a:t>
+              <a:t>31-03-2022</a:t>
             </a:fld>
             <a:endParaRPr lang="en-IN"/>
           </a:p>
@@ -1506,7 +1506,7 @@
           <a:p>
             <a:fld id="{639C5C35-4D10-4B81-A2B2-3672B162D0EF}" type="datetimeFigureOut">
               <a:rPr lang="en-IN" smtClean="0"/>
-              <a:t>30-03-2022</a:t>
+              <a:t>31-03-2022</a:t>
             </a:fld>
             <a:endParaRPr lang="en-IN"/>
           </a:p>
@@ -1774,7 +1774,7 @@
           <a:p>
             <a:fld id="{639C5C35-4D10-4B81-A2B2-3672B162D0EF}" type="datetimeFigureOut">
               <a:rPr lang="en-IN" smtClean="0"/>
-              <a:t>30-03-2022</a:t>
+              <a:t>31-03-2022</a:t>
             </a:fld>
             <a:endParaRPr lang="en-IN"/>
           </a:p>
@@ -2189,7 +2189,7 @@
           <a:p>
             <a:fld id="{639C5C35-4D10-4B81-A2B2-3672B162D0EF}" type="datetimeFigureOut">
               <a:rPr lang="en-IN" smtClean="0"/>
-              <a:t>30-03-2022</a:t>
+              <a:t>31-03-2022</a:t>
             </a:fld>
             <a:endParaRPr lang="en-IN"/>
           </a:p>
@@ -2331,7 +2331,7 @@
           <a:p>
             <a:fld id="{639C5C35-4D10-4B81-A2B2-3672B162D0EF}" type="datetimeFigureOut">
               <a:rPr lang="en-IN" smtClean="0"/>
-              <a:t>30-03-2022</a:t>
+              <a:t>31-03-2022</a:t>
             </a:fld>
             <a:endParaRPr lang="en-IN"/>
           </a:p>
@@ -2444,7 +2444,7 @@
           <a:p>
             <a:fld id="{639C5C35-4D10-4B81-A2B2-3672B162D0EF}" type="datetimeFigureOut">
               <a:rPr lang="en-IN" smtClean="0"/>
-              <a:t>30-03-2022</a:t>
+              <a:t>31-03-2022</a:t>
             </a:fld>
             <a:endParaRPr lang="en-IN"/>
           </a:p>
@@ -2757,7 +2757,7 @@
           <a:p>
             <a:fld id="{639C5C35-4D10-4B81-A2B2-3672B162D0EF}" type="datetimeFigureOut">
               <a:rPr lang="en-IN" smtClean="0"/>
-              <a:t>30-03-2022</a:t>
+              <a:t>31-03-2022</a:t>
             </a:fld>
             <a:endParaRPr lang="en-IN"/>
           </a:p>
@@ -3046,7 +3046,7 @@
           <a:p>
             <a:fld id="{639C5C35-4D10-4B81-A2B2-3672B162D0EF}" type="datetimeFigureOut">
               <a:rPr lang="en-IN" smtClean="0"/>
-              <a:t>30-03-2022</a:t>
+              <a:t>31-03-2022</a:t>
             </a:fld>
             <a:endParaRPr lang="en-IN"/>
           </a:p>
@@ -3289,7 +3289,7 @@
           <a:p>
             <a:fld id="{639C5C35-4D10-4B81-A2B2-3672B162D0EF}" type="datetimeFigureOut">
               <a:rPr lang="en-IN" smtClean="0"/>
-              <a:t>30-03-2022</a:t>
+              <a:t>31-03-2022</a:t>
             </a:fld>
             <a:endParaRPr lang="en-IN"/>
           </a:p>
@@ -3855,6 +3855,14 @@
             </a:r>
             <a:r>
               <a:rPr lang="en-US" dirty="0" err="1"/>
+              <a:t>Jayasree</a:t>
+            </a:r>
+            <a:r>
+              <a:rPr lang="en-US" dirty="0"/>
+              <a:t> </a:t>
+            </a:r>
+            <a:r>
+              <a:rPr lang="en-US" dirty="0" err="1"/>
               <a:t>Purushothaman</a:t>
             </a:r>
             <a:endParaRPr lang="en-US" dirty="0"/>
@@ -3920,7 +3928,7 @@
                   <a:schemeClr val="tx1"/>
                 </a:solidFill>
               </a:rPr>
-              <a:t>30-03-2022</a:t>
+              <a:t>31-03-2022</a:t>
             </a:fld>
             <a:endParaRPr lang="en-IN" sz="2000" b="1" dirty="0">
               <a:solidFill>

</xml_diff>

<commit_message>
Updated the ppt for presentation with Sphinx and HTML content pages
</commit_message>
<xml_diff>
--- a/Wicked Adventures.pptx
+++ b/Wicked Adventures.pptx
@@ -5,16 +5,18 @@
     <p:sldMasterId id="2147483648" r:id="rId1"/>
   </p:sldMasterIdLst>
   <p:notesMasterIdLst>
-    <p:notesMasterId r:id="rId9"/>
+    <p:notesMasterId r:id="rId11"/>
   </p:notesMasterIdLst>
   <p:sldIdLst>
     <p:sldId id="258" r:id="rId2"/>
     <p:sldId id="259" r:id="rId3"/>
     <p:sldId id="260" r:id="rId4"/>
     <p:sldId id="261" r:id="rId5"/>
-    <p:sldId id="262" r:id="rId6"/>
-    <p:sldId id="264" r:id="rId7"/>
-    <p:sldId id="263" r:id="rId8"/>
+    <p:sldId id="266" r:id="rId6"/>
+    <p:sldId id="265" r:id="rId7"/>
+    <p:sldId id="262" r:id="rId8"/>
+    <p:sldId id="264" r:id="rId9"/>
+    <p:sldId id="263" r:id="rId10"/>
   </p:sldIdLst>
   <p:sldSz cx="12192000" cy="6858000"/>
   <p:notesSz cx="6858000" cy="9144000"/>
@@ -203,7 +205,7 @@
           <a:p>
             <a:fld id="{699807B5-D91D-4BD3-A7F9-ADD7559991AC}" type="datetimeFigureOut">
               <a:rPr lang="en-IN" smtClean="0"/>
-              <a:t>31-03-2022</a:t>
+              <a:t>03-04-2022</a:t>
             </a:fld>
             <a:endParaRPr lang="en-IN"/>
           </a:p>
@@ -620,7 +622,7 @@
           <a:p>
             <a:fld id="{639C5C35-4D10-4B81-A2B2-3672B162D0EF}" type="datetimeFigureOut">
               <a:rPr lang="en-IN" smtClean="0"/>
-              <a:t>31-03-2022</a:t>
+              <a:t>03-04-2022</a:t>
             </a:fld>
             <a:endParaRPr lang="en-IN"/>
           </a:p>
@@ -820,7 +822,7 @@
           <a:p>
             <a:fld id="{639C5C35-4D10-4B81-A2B2-3672B162D0EF}" type="datetimeFigureOut">
               <a:rPr lang="en-IN" smtClean="0"/>
-              <a:t>31-03-2022</a:t>
+              <a:t>03-04-2022</a:t>
             </a:fld>
             <a:endParaRPr lang="en-IN"/>
           </a:p>
@@ -1030,7 +1032,7 @@
           <a:p>
             <a:fld id="{639C5C35-4D10-4B81-A2B2-3672B162D0EF}" type="datetimeFigureOut">
               <a:rPr lang="en-IN" smtClean="0"/>
-              <a:t>31-03-2022</a:t>
+              <a:t>03-04-2022</a:t>
             </a:fld>
             <a:endParaRPr lang="en-IN"/>
           </a:p>
@@ -1230,7 +1232,7 @@
           <a:p>
             <a:fld id="{639C5C35-4D10-4B81-A2B2-3672B162D0EF}" type="datetimeFigureOut">
               <a:rPr lang="en-IN" smtClean="0"/>
-              <a:t>31-03-2022</a:t>
+              <a:t>03-04-2022</a:t>
             </a:fld>
             <a:endParaRPr lang="en-IN"/>
           </a:p>
@@ -1506,7 +1508,7 @@
           <a:p>
             <a:fld id="{639C5C35-4D10-4B81-A2B2-3672B162D0EF}" type="datetimeFigureOut">
               <a:rPr lang="en-IN" smtClean="0"/>
-              <a:t>31-03-2022</a:t>
+              <a:t>03-04-2022</a:t>
             </a:fld>
             <a:endParaRPr lang="en-IN"/>
           </a:p>
@@ -1774,7 +1776,7 @@
           <a:p>
             <a:fld id="{639C5C35-4D10-4B81-A2B2-3672B162D0EF}" type="datetimeFigureOut">
               <a:rPr lang="en-IN" smtClean="0"/>
-              <a:t>31-03-2022</a:t>
+              <a:t>03-04-2022</a:t>
             </a:fld>
             <a:endParaRPr lang="en-IN"/>
           </a:p>
@@ -2189,7 +2191,7 @@
           <a:p>
             <a:fld id="{639C5C35-4D10-4B81-A2B2-3672B162D0EF}" type="datetimeFigureOut">
               <a:rPr lang="en-IN" smtClean="0"/>
-              <a:t>31-03-2022</a:t>
+              <a:t>03-04-2022</a:t>
             </a:fld>
             <a:endParaRPr lang="en-IN"/>
           </a:p>
@@ -2331,7 +2333,7 @@
           <a:p>
             <a:fld id="{639C5C35-4D10-4B81-A2B2-3672B162D0EF}" type="datetimeFigureOut">
               <a:rPr lang="en-IN" smtClean="0"/>
-              <a:t>31-03-2022</a:t>
+              <a:t>03-04-2022</a:t>
             </a:fld>
             <a:endParaRPr lang="en-IN"/>
           </a:p>
@@ -2444,7 +2446,7 @@
           <a:p>
             <a:fld id="{639C5C35-4D10-4B81-A2B2-3672B162D0EF}" type="datetimeFigureOut">
               <a:rPr lang="en-IN" smtClean="0"/>
-              <a:t>31-03-2022</a:t>
+              <a:t>03-04-2022</a:t>
             </a:fld>
             <a:endParaRPr lang="en-IN"/>
           </a:p>
@@ -2757,7 +2759,7 @@
           <a:p>
             <a:fld id="{639C5C35-4D10-4B81-A2B2-3672B162D0EF}" type="datetimeFigureOut">
               <a:rPr lang="en-IN" smtClean="0"/>
-              <a:t>31-03-2022</a:t>
+              <a:t>03-04-2022</a:t>
             </a:fld>
             <a:endParaRPr lang="en-IN"/>
           </a:p>
@@ -3046,7 +3048,7 @@
           <a:p>
             <a:fld id="{639C5C35-4D10-4B81-A2B2-3672B162D0EF}" type="datetimeFigureOut">
               <a:rPr lang="en-IN" smtClean="0"/>
-              <a:t>31-03-2022</a:t>
+              <a:t>03-04-2022</a:t>
             </a:fld>
             <a:endParaRPr lang="en-IN"/>
           </a:p>
@@ -3289,7 +3291,7 @@
           <a:p>
             <a:fld id="{639C5C35-4D10-4B81-A2B2-3672B162D0EF}" type="datetimeFigureOut">
               <a:rPr lang="en-IN" smtClean="0"/>
-              <a:t>31-03-2022</a:t>
+              <a:t>03-04-2022</a:t>
             </a:fld>
             <a:endParaRPr lang="en-IN"/>
           </a:p>
@@ -3928,7 +3930,7 @@
                   <a:schemeClr val="tx1"/>
                 </a:solidFill>
               </a:rPr>
-              <a:t>31-03-2022</a:t>
+              <a:t>03-04-2022</a:t>
             </a:fld>
             <a:endParaRPr lang="en-IN" sz="2000" b="1" dirty="0">
               <a:solidFill>
@@ -5347,14 +5349,46 @@
             <p:ph type="title"/>
           </p:nvPr>
         </p:nvSpPr>
-        <p:spPr/>
-        <p:txBody>
-          <a:bodyPr/>
-          <a:lstStyle/>
-          <a:p>
-            <a:r>
-              <a:rPr lang="en-IN" b="1" dirty="0"/>
-              <a:t>4. CONCLUSION</a:t>
+        <p:spPr>
+          <a:effectLst>
+            <a:outerShdw blurRad="50800" dist="38100" dir="5400000" algn="t" rotWithShape="0">
+              <a:prstClr val="black">
+                <a:alpha val="40000"/>
+              </a:prstClr>
+            </a:outerShdw>
+          </a:effectLst>
+        </p:spPr>
+        <p:style>
+          <a:lnRef idx="3">
+            <a:schemeClr val="lt1"/>
+          </a:lnRef>
+          <a:fillRef idx="1">
+            <a:schemeClr val="accent5"/>
+          </a:fillRef>
+          <a:effectRef idx="1">
+            <a:schemeClr val="accent5"/>
+          </a:effectRef>
+          <a:fontRef idx="minor">
+            <a:schemeClr val="lt1"/>
+          </a:fontRef>
+        </p:style>
+        <p:txBody>
+          <a:bodyPr vert="horz" lIns="91440" tIns="45720" rIns="91440" bIns="45720" rtlCol="0" anchor="ctr">
+            <a:normAutofit/>
+          </a:bodyPr>
+          <a:lstStyle/>
+          <a:p>
+            <a:pPr algn="ctr"/>
+            <a:r>
+              <a:rPr lang="en-IN" b="1" dirty="0">
+                <a:solidFill>
+                  <a:schemeClr val="lt1"/>
+                </a:solidFill>
+                <a:latin typeface="+mn-lt"/>
+                <a:ea typeface="+mn-ea"/>
+                <a:cs typeface="+mn-cs"/>
+              </a:rPr>
+              <a:t>HTML and CSS</a:t>
             </a:r>
           </a:p>
         </p:txBody>
@@ -5375,12 +5409,47 @@
             <p:ph idx="1"/>
           </p:nvPr>
         </p:nvSpPr>
-        <p:spPr/>
-        <p:txBody>
-          <a:bodyPr/>
-          <a:lstStyle/>
-          <a:p>
-            <a:endParaRPr lang="en-IN"/>
+        <p:spPr>
+          <a:xfrm>
+            <a:off x="838200" y="1825625"/>
+            <a:ext cx="10515600" cy="2065240"/>
+          </a:xfrm>
+        </p:spPr>
+        <p:txBody>
+          <a:bodyPr>
+            <a:normAutofit fontScale="92500" lnSpcReduction="10000"/>
+          </a:bodyPr>
+          <a:lstStyle/>
+          <a:p>
+            <a:pPr algn="just"/>
+            <a:r>
+              <a:rPr lang="en-US" dirty="0"/>
+              <a:t>HTML – Standard Mark up Language used for creating web documents.</a:t>
+            </a:r>
+          </a:p>
+          <a:p>
+            <a:pPr algn="just"/>
+            <a:r>
+              <a:rPr lang="en-US" dirty="0"/>
+              <a:t>CSS – Describes the presentation properties of the web document written in HTML format. Includes Layouts, fonts, colors, etc.</a:t>
+            </a:r>
+          </a:p>
+          <a:p>
+            <a:pPr algn="just"/>
+            <a:r>
+              <a:rPr lang="en-US" dirty="0"/>
+              <a:t>Website builder tool partly used for easy webpage creation with better design, looks and functionality - </a:t>
+            </a:r>
+            <a:r>
+              <a:rPr lang="en-US" dirty="0" err="1">
+                <a:hlinkClick r:id="rId2"/>
+              </a:rPr>
+              <a:t>nicepages</a:t>
+            </a:r>
+            <a:r>
+              <a:rPr lang="en-US" dirty="0"/>
+              <a:t>.</a:t>
+            </a:r>
           </a:p>
         </p:txBody>
       </p:sp>
@@ -5591,10 +5660,281 @@
           </a:p>
         </p:txBody>
       </p:sp>
+      <p:sp>
+        <p:nvSpPr>
+          <p:cNvPr id="9" name="Content Placeholder 2">
+            <a:extLst>
+              <a:ext uri="{FF2B5EF4-FFF2-40B4-BE49-F238E27FC236}">
+                <a16:creationId xmlns:a16="http://schemas.microsoft.com/office/drawing/2014/main" id="{686FD6CB-ADEC-4C5F-AA7D-0E7A1ABF8B22}"/>
+              </a:ext>
+            </a:extLst>
+          </p:cNvPr>
+          <p:cNvSpPr txBox="1">
+            <a:spLocks/>
+          </p:cNvSpPr>
+          <p:nvPr/>
+        </p:nvSpPr>
+        <p:spPr>
+          <a:xfrm>
+            <a:off x="838201" y="3778736"/>
+            <a:ext cx="6819900" cy="2065240"/>
+          </a:xfrm>
+          <a:prstGeom prst="rect">
+            <a:avLst/>
+          </a:prstGeom>
+        </p:spPr>
+        <p:txBody>
+          <a:bodyPr vert="horz" lIns="91440" tIns="45720" rIns="91440" bIns="45720" rtlCol="0">
+            <a:normAutofit fontScale="92500" lnSpcReduction="10000"/>
+          </a:bodyPr>
+          <a:lstStyle>
+            <a:lvl1pPr marL="228600" indent="-228600" algn="l" defTabSz="914400" rtl="0" eaLnBrk="1" latinLnBrk="0" hangingPunct="1">
+              <a:lnSpc>
+                <a:spcPct val="90000"/>
+              </a:lnSpc>
+              <a:spcBef>
+                <a:spcPts val="1000"/>
+              </a:spcBef>
+              <a:buFont typeface="Arial" panose="020B0604020202020204" pitchFamily="34" charset="0"/>
+              <a:buChar char="•"/>
+              <a:defRPr sz="2800" kern="1200">
+                <a:solidFill>
+                  <a:schemeClr val="tx1"/>
+                </a:solidFill>
+                <a:latin typeface="+mn-lt"/>
+                <a:ea typeface="+mn-ea"/>
+                <a:cs typeface="+mn-cs"/>
+              </a:defRPr>
+            </a:lvl1pPr>
+            <a:lvl2pPr marL="685800" indent="-228600" algn="l" defTabSz="914400" rtl="0" eaLnBrk="1" latinLnBrk="0" hangingPunct="1">
+              <a:lnSpc>
+                <a:spcPct val="90000"/>
+              </a:lnSpc>
+              <a:spcBef>
+                <a:spcPts val="500"/>
+              </a:spcBef>
+              <a:buFont typeface="Arial" panose="020B0604020202020204" pitchFamily="34" charset="0"/>
+              <a:buChar char="•"/>
+              <a:defRPr sz="2400" kern="1200">
+                <a:solidFill>
+                  <a:schemeClr val="tx1"/>
+                </a:solidFill>
+                <a:latin typeface="+mn-lt"/>
+                <a:ea typeface="+mn-ea"/>
+                <a:cs typeface="+mn-cs"/>
+              </a:defRPr>
+            </a:lvl2pPr>
+            <a:lvl3pPr marL="1143000" indent="-228600" algn="l" defTabSz="914400" rtl="0" eaLnBrk="1" latinLnBrk="0" hangingPunct="1">
+              <a:lnSpc>
+                <a:spcPct val="90000"/>
+              </a:lnSpc>
+              <a:spcBef>
+                <a:spcPts val="500"/>
+              </a:spcBef>
+              <a:buFont typeface="Arial" panose="020B0604020202020204" pitchFamily="34" charset="0"/>
+              <a:buChar char="•"/>
+              <a:defRPr sz="2000" kern="1200">
+                <a:solidFill>
+                  <a:schemeClr val="tx1"/>
+                </a:solidFill>
+                <a:latin typeface="+mn-lt"/>
+                <a:ea typeface="+mn-ea"/>
+                <a:cs typeface="+mn-cs"/>
+              </a:defRPr>
+            </a:lvl3pPr>
+            <a:lvl4pPr marL="1600200" indent="-228600" algn="l" defTabSz="914400" rtl="0" eaLnBrk="1" latinLnBrk="0" hangingPunct="1">
+              <a:lnSpc>
+                <a:spcPct val="90000"/>
+              </a:lnSpc>
+              <a:spcBef>
+                <a:spcPts val="500"/>
+              </a:spcBef>
+              <a:buFont typeface="Arial" panose="020B0604020202020204" pitchFamily="34" charset="0"/>
+              <a:buChar char="•"/>
+              <a:defRPr sz="1800" kern="1200">
+                <a:solidFill>
+                  <a:schemeClr val="tx1"/>
+                </a:solidFill>
+                <a:latin typeface="+mn-lt"/>
+                <a:ea typeface="+mn-ea"/>
+                <a:cs typeface="+mn-cs"/>
+              </a:defRPr>
+            </a:lvl4pPr>
+            <a:lvl5pPr marL="2057400" indent="-228600" algn="l" defTabSz="914400" rtl="0" eaLnBrk="1" latinLnBrk="0" hangingPunct="1">
+              <a:lnSpc>
+                <a:spcPct val="90000"/>
+              </a:lnSpc>
+              <a:spcBef>
+                <a:spcPts val="500"/>
+              </a:spcBef>
+              <a:buFont typeface="Arial" panose="020B0604020202020204" pitchFamily="34" charset="0"/>
+              <a:buChar char="•"/>
+              <a:defRPr sz="1800" kern="1200">
+                <a:solidFill>
+                  <a:schemeClr val="tx1"/>
+                </a:solidFill>
+                <a:latin typeface="+mn-lt"/>
+                <a:ea typeface="+mn-ea"/>
+                <a:cs typeface="+mn-cs"/>
+              </a:defRPr>
+            </a:lvl5pPr>
+            <a:lvl6pPr marL="2514600" indent="-228600" algn="l" defTabSz="914400" rtl="0" eaLnBrk="1" latinLnBrk="0" hangingPunct="1">
+              <a:lnSpc>
+                <a:spcPct val="90000"/>
+              </a:lnSpc>
+              <a:spcBef>
+                <a:spcPts val="500"/>
+              </a:spcBef>
+              <a:buFont typeface="Arial" panose="020B0604020202020204" pitchFamily="34" charset="0"/>
+              <a:buChar char="•"/>
+              <a:defRPr sz="1800" kern="1200">
+                <a:solidFill>
+                  <a:schemeClr val="tx1"/>
+                </a:solidFill>
+                <a:latin typeface="+mn-lt"/>
+                <a:ea typeface="+mn-ea"/>
+                <a:cs typeface="+mn-cs"/>
+              </a:defRPr>
+            </a:lvl6pPr>
+            <a:lvl7pPr marL="2971800" indent="-228600" algn="l" defTabSz="914400" rtl="0" eaLnBrk="1" latinLnBrk="0" hangingPunct="1">
+              <a:lnSpc>
+                <a:spcPct val="90000"/>
+              </a:lnSpc>
+              <a:spcBef>
+                <a:spcPts val="500"/>
+              </a:spcBef>
+              <a:buFont typeface="Arial" panose="020B0604020202020204" pitchFamily="34" charset="0"/>
+              <a:buChar char="•"/>
+              <a:defRPr sz="1800" kern="1200">
+                <a:solidFill>
+                  <a:schemeClr val="tx1"/>
+                </a:solidFill>
+                <a:latin typeface="+mn-lt"/>
+                <a:ea typeface="+mn-ea"/>
+                <a:cs typeface="+mn-cs"/>
+              </a:defRPr>
+            </a:lvl7pPr>
+            <a:lvl8pPr marL="3429000" indent="-228600" algn="l" defTabSz="914400" rtl="0" eaLnBrk="1" latinLnBrk="0" hangingPunct="1">
+              <a:lnSpc>
+                <a:spcPct val="90000"/>
+              </a:lnSpc>
+              <a:spcBef>
+                <a:spcPts val="500"/>
+              </a:spcBef>
+              <a:buFont typeface="Arial" panose="020B0604020202020204" pitchFamily="34" charset="0"/>
+              <a:buChar char="•"/>
+              <a:defRPr sz="1800" kern="1200">
+                <a:solidFill>
+                  <a:schemeClr val="tx1"/>
+                </a:solidFill>
+                <a:latin typeface="+mn-lt"/>
+                <a:ea typeface="+mn-ea"/>
+                <a:cs typeface="+mn-cs"/>
+              </a:defRPr>
+            </a:lvl8pPr>
+            <a:lvl9pPr marL="3886200" indent="-228600" algn="l" defTabSz="914400" rtl="0" eaLnBrk="1" latinLnBrk="0" hangingPunct="1">
+              <a:lnSpc>
+                <a:spcPct val="90000"/>
+              </a:lnSpc>
+              <a:spcBef>
+                <a:spcPts val="500"/>
+              </a:spcBef>
+              <a:buFont typeface="Arial" panose="020B0604020202020204" pitchFamily="34" charset="0"/>
+              <a:buChar char="•"/>
+              <a:defRPr sz="1800" kern="1200">
+                <a:solidFill>
+                  <a:schemeClr val="tx1"/>
+                </a:solidFill>
+                <a:latin typeface="+mn-lt"/>
+                <a:ea typeface="+mn-ea"/>
+                <a:cs typeface="+mn-cs"/>
+              </a:defRPr>
+            </a:lvl9pPr>
+          </a:lstStyle>
+          <a:p>
+            <a:pPr algn="just"/>
+            <a:r>
+              <a:rPr lang="en-US" dirty="0"/>
+              <a:t>Development and testing for each page implemented before integrating with python.</a:t>
+            </a:r>
+          </a:p>
+          <a:p>
+            <a:pPr algn="just"/>
+            <a:r>
+              <a:rPr lang="en-US" dirty="0"/>
+              <a:t>Static IP address used for accessing the HTML webpages run via app</a:t>
+            </a:r>
+            <a:r>
+              <a:rPr lang="en-US"/>
+              <a:t>.py.</a:t>
+            </a:r>
+            <a:endParaRPr lang="en-US" dirty="0"/>
+          </a:p>
+          <a:p>
+            <a:pPr algn="just"/>
+            <a:r>
+              <a:rPr lang="en-US" dirty="0"/>
+              <a:t>Issues found  during testing were added to JIRA.</a:t>
+            </a:r>
+          </a:p>
+        </p:txBody>
+      </p:sp>
+      <p:pic>
+        <p:nvPicPr>
+          <p:cNvPr id="1026" name="Picture 2" descr="See the source image">
+            <a:extLst>
+              <a:ext uri="{FF2B5EF4-FFF2-40B4-BE49-F238E27FC236}">
+                <a16:creationId xmlns:a16="http://schemas.microsoft.com/office/drawing/2014/main" id="{3FA44026-DC0B-4FAA-9050-8326CF4F1FA5}"/>
+              </a:ext>
+            </a:extLst>
+          </p:cNvPr>
+          <p:cNvPicPr>
+            <a:picLocks noChangeAspect="1" noChangeArrowheads="1"/>
+          </p:cNvPicPr>
+          <p:nvPr/>
+        </p:nvPicPr>
+        <p:blipFill>
+          <a:blip r:embed="rId3">
+            <a:extLst>
+              <a:ext uri="{28A0092B-C50C-407E-A947-70E740481C1C}">
+                <a14:useLocalDpi xmlns:a14="http://schemas.microsoft.com/office/drawing/2010/main" val="0"/>
+              </a:ext>
+            </a:extLst>
+          </a:blip>
+          <a:srcRect/>
+          <a:stretch>
+            <a:fillRect/>
+          </a:stretch>
+        </p:blipFill>
+        <p:spPr bwMode="auto">
+          <a:xfrm>
+            <a:off x="7773988" y="3517044"/>
+            <a:ext cx="3579812" cy="2326932"/>
+          </a:xfrm>
+          <a:prstGeom prst="rect">
+            <a:avLst/>
+          </a:prstGeom>
+          <a:noFill/>
+          <a:ln>
+            <a:solidFill>
+              <a:schemeClr val="accent1"/>
+            </a:solidFill>
+          </a:ln>
+          <a:extLst>
+            <a:ext uri="{909E8E84-426E-40DD-AFC4-6F175D3DCCD1}">
+              <a14:hiddenFill xmlns:a14="http://schemas.microsoft.com/office/drawing/2010/main">
+                <a:solidFill>
+                  <a:srgbClr val="FFFFFF"/>
+                </a:solidFill>
+              </a14:hiddenFill>
+            </a:ext>
+          </a:extLst>
+        </p:spPr>
+      </p:pic>
     </p:spTree>
     <p:extLst>
       <p:ext uri="{BB962C8B-B14F-4D97-AF65-F5344CB8AC3E}">
-        <p14:creationId xmlns:p14="http://schemas.microsoft.com/office/powerpoint/2010/main" val="2907635473"/>
+        <p14:creationId xmlns:p14="http://schemas.microsoft.com/office/powerpoint/2010/main" val="385739278"/>
       </p:ext>
     </p:extLst>
   </p:cSld>
@@ -5623,6 +5963,220 @@
       </p:grpSpPr>
       <p:sp>
         <p:nvSpPr>
+          <p:cNvPr id="2" name="Title 1">
+            <a:extLst>
+              <a:ext uri="{FF2B5EF4-FFF2-40B4-BE49-F238E27FC236}">
+                <a16:creationId xmlns:a16="http://schemas.microsoft.com/office/drawing/2014/main" id="{C0666519-3484-48F3-927E-47679DE94711}"/>
+              </a:ext>
+            </a:extLst>
+          </p:cNvPr>
+          <p:cNvSpPr>
+            <a:spLocks noGrp="1"/>
+          </p:cNvSpPr>
+          <p:nvPr>
+            <p:ph type="title"/>
+          </p:nvPr>
+        </p:nvSpPr>
+        <p:spPr>
+          <a:xfrm>
+            <a:off x="838200" y="365125"/>
+            <a:ext cx="10515600" cy="1119961"/>
+          </a:xfrm>
+          <a:effectLst>
+            <a:outerShdw blurRad="50800" dist="38100" dir="5400000" algn="t" rotWithShape="0">
+              <a:prstClr val="black">
+                <a:alpha val="40000"/>
+              </a:prstClr>
+            </a:outerShdw>
+          </a:effectLst>
+        </p:spPr>
+        <p:style>
+          <a:lnRef idx="3">
+            <a:schemeClr val="lt1"/>
+          </a:lnRef>
+          <a:fillRef idx="1">
+            <a:schemeClr val="accent5"/>
+          </a:fillRef>
+          <a:effectRef idx="1">
+            <a:schemeClr val="accent5"/>
+          </a:effectRef>
+          <a:fontRef idx="minor">
+            <a:schemeClr val="lt1"/>
+          </a:fontRef>
+        </p:style>
+        <p:txBody>
+          <a:bodyPr/>
+          <a:lstStyle/>
+          <a:p>
+            <a:pPr algn="ctr"/>
+            <a:r>
+              <a:rPr lang="en-IN" b="1" dirty="0"/>
+              <a:t>3. Sphinx Tool for Auto Documentation</a:t>
+            </a:r>
+          </a:p>
+        </p:txBody>
+      </p:sp>
+      <p:sp>
+        <p:nvSpPr>
+          <p:cNvPr id="3" name="Content Placeholder 2">
+            <a:extLst>
+              <a:ext uri="{FF2B5EF4-FFF2-40B4-BE49-F238E27FC236}">
+                <a16:creationId xmlns:a16="http://schemas.microsoft.com/office/drawing/2014/main" id="{D3F11377-6BB3-4E47-B174-861CD150A86B}"/>
+              </a:ext>
+            </a:extLst>
+          </p:cNvPr>
+          <p:cNvSpPr>
+            <a:spLocks noGrp="1"/>
+          </p:cNvSpPr>
+          <p:nvPr>
+            <p:ph idx="1"/>
+          </p:nvPr>
+        </p:nvSpPr>
+        <p:spPr>
+          <a:xfrm>
+            <a:off x="838200" y="2836599"/>
+            <a:ext cx="10143062" cy="3154279"/>
+          </a:xfrm>
+        </p:spPr>
+        <p:txBody>
+          <a:bodyPr>
+            <a:normAutofit fontScale="92500" lnSpcReduction="20000"/>
+          </a:bodyPr>
+          <a:lstStyle/>
+          <a:p>
+            <a:pPr algn="just"/>
+            <a:r>
+              <a:rPr lang="en-US" dirty="0"/>
+              <a:t>An Open-source third party Tool used for auto documentation.</a:t>
+            </a:r>
+          </a:p>
+          <a:p>
+            <a:pPr algn="just"/>
+            <a:r>
+              <a:rPr lang="en-IN" b="0" i="0" dirty="0">
+                <a:solidFill>
+                  <a:srgbClr val="24292F"/>
+                </a:solidFill>
+                <a:effectLst/>
+                <a:latin typeface="-apple-system"/>
+              </a:rPr>
+              <a:t>Sphinx is a documentation generator written in python language.</a:t>
+            </a:r>
+          </a:p>
+          <a:p>
+            <a:pPr algn="just"/>
+            <a:r>
+              <a:rPr lang="en-IN" dirty="0">
+                <a:solidFill>
+                  <a:srgbClr val="24292F"/>
+                </a:solidFill>
+                <a:latin typeface="-apple-system"/>
+              </a:rPr>
+              <a:t>Implementation of Sphinx tool by creating YAML file executed using “GitHub Actions”.</a:t>
+            </a:r>
+          </a:p>
+          <a:p>
+            <a:pPr algn="just"/>
+            <a:r>
+              <a:rPr lang="en-IN" dirty="0">
+                <a:solidFill>
+                  <a:srgbClr val="24292F"/>
+                </a:solidFill>
+                <a:latin typeface="-apple-system"/>
+              </a:rPr>
+              <a:t>Themes available in the URL below : </a:t>
+            </a:r>
+          </a:p>
+          <a:p>
+            <a:pPr marL="0" indent="0" algn="ctr">
+              <a:buNone/>
+            </a:pPr>
+            <a:r>
+              <a:rPr lang="en-IN" dirty="0">
+                <a:solidFill>
+                  <a:srgbClr val="24292F"/>
+                </a:solidFill>
+                <a:latin typeface="-apple-system"/>
+                <a:hlinkClick r:id="rId2"/>
+              </a:rPr>
+              <a:t>https://www.sphinx-doc.org/en/master/usage/theming.html</a:t>
+            </a:r>
+            <a:endParaRPr lang="en-IN" dirty="0">
+              <a:solidFill>
+                <a:srgbClr val="24292F"/>
+              </a:solidFill>
+              <a:latin typeface="-apple-system"/>
+            </a:endParaRPr>
+          </a:p>
+          <a:p>
+            <a:pPr algn="just"/>
+            <a:r>
+              <a:rPr lang="en-IN" dirty="0">
+                <a:solidFill>
+                  <a:srgbClr val="24292F"/>
+                </a:solidFill>
+                <a:latin typeface="-apple-system"/>
+              </a:rPr>
+              <a:t>Details provided in the Git Wiki link in our repository. Click </a:t>
+            </a:r>
+            <a:r>
+              <a:rPr lang="en-IN" dirty="0">
+                <a:solidFill>
+                  <a:srgbClr val="24292F"/>
+                </a:solidFill>
+                <a:latin typeface="-apple-system"/>
+                <a:hlinkClick r:id="rId3"/>
+              </a:rPr>
+              <a:t>here</a:t>
+            </a:r>
+            <a:r>
+              <a:rPr lang="en-IN" dirty="0">
+                <a:solidFill>
+                  <a:srgbClr val="24292F"/>
+                </a:solidFill>
+                <a:latin typeface="-apple-system"/>
+              </a:rPr>
+              <a:t>.</a:t>
+            </a:r>
+          </a:p>
+          <a:p>
+            <a:pPr algn="just"/>
+            <a:r>
+              <a:rPr lang="en-IN" dirty="0">
+                <a:solidFill>
+                  <a:srgbClr val="24292F"/>
+                </a:solidFill>
+                <a:latin typeface="-apple-system"/>
+              </a:rPr>
+              <a:t>Branch created for auto documentation – ‘</a:t>
+            </a:r>
+            <a:r>
+              <a:rPr lang="en-IN" dirty="0" err="1">
+                <a:solidFill>
+                  <a:srgbClr val="24292F"/>
+                </a:solidFill>
+                <a:latin typeface="-apple-system"/>
+              </a:rPr>
+              <a:t>gh</a:t>
+            </a:r>
+            <a:r>
+              <a:rPr lang="en-IN" dirty="0">
+                <a:solidFill>
+                  <a:srgbClr val="24292F"/>
+                </a:solidFill>
+                <a:latin typeface="-apple-system"/>
+              </a:rPr>
+              <a:t>-pages’ (Default).</a:t>
+            </a:r>
+          </a:p>
+          <a:p>
+            <a:pPr algn="just"/>
+            <a:endParaRPr lang="en-IN" dirty="0"/>
+          </a:p>
+        </p:txBody>
+      </p:sp>
+      <p:sp>
+        <p:nvSpPr>
           <p:cNvPr id="4" name="Rectangle 3">
             <a:extLst>
               <a:ext uri="{FF2B5EF4-FFF2-40B4-BE49-F238E27FC236}">
@@ -5830,55 +6384,38 @@
       </p:sp>
       <p:pic>
         <p:nvPicPr>
-          <p:cNvPr id="2050" name="Picture 2" descr="See the source image">
-            <a:extLst>
-              <a:ext uri="{FF2B5EF4-FFF2-40B4-BE49-F238E27FC236}">
-                <a16:creationId xmlns:a16="http://schemas.microsoft.com/office/drawing/2014/main" id="{B5B67862-A69F-498B-B814-F7947A0A1E0A}"/>
+          <p:cNvPr id="9" name="Picture 8">
+            <a:extLst>
+              <a:ext uri="{FF2B5EF4-FFF2-40B4-BE49-F238E27FC236}">
+                <a16:creationId xmlns:a16="http://schemas.microsoft.com/office/drawing/2014/main" id="{FE2ECC11-E713-46DD-A8C9-F2FE792FD345}"/>
               </a:ext>
             </a:extLst>
           </p:cNvPr>
           <p:cNvPicPr>
-            <a:picLocks noChangeAspect="1" noChangeArrowheads="1"/>
+            <a:picLocks noChangeAspect="1"/>
           </p:cNvPicPr>
           <p:nvPr/>
         </p:nvPicPr>
         <p:blipFill>
-          <a:blip r:embed="rId2">
-            <a:extLst>
-              <a:ext uri="{28A0092B-C50C-407E-A947-70E740481C1C}">
-                <a14:useLocalDpi xmlns:a14="http://schemas.microsoft.com/office/drawing/2010/main" val="0"/>
-              </a:ext>
-            </a:extLst>
-          </a:blip>
-          <a:srcRect/>
+          <a:blip r:embed="rId4"/>
           <a:stretch>
             <a:fillRect/>
           </a:stretch>
         </p:blipFill>
-        <p:spPr bwMode="auto">
-          <a:xfrm>
-            <a:off x="0" y="0"/>
-            <a:ext cx="12192000" cy="6067421"/>
+        <p:spPr>
+          <a:xfrm>
+            <a:off x="3013010" y="1523359"/>
+            <a:ext cx="5793442" cy="1274966"/>
           </a:xfrm>
           <a:prstGeom prst="rect">
             <a:avLst/>
           </a:prstGeom>
-          <a:noFill/>
-          <a:extLst>
-            <a:ext uri="{909E8E84-426E-40DD-AFC4-6F175D3DCCD1}">
-              <a14:hiddenFill xmlns:a14="http://schemas.microsoft.com/office/drawing/2010/main">
-                <a:solidFill>
-                  <a:srgbClr val="FFFFFF"/>
-                </a:solidFill>
-              </a14:hiddenFill>
-            </a:ext>
-          </a:extLst>
         </p:spPr>
       </p:pic>
     </p:spTree>
     <p:extLst>
       <p:ext uri="{BB962C8B-B14F-4D97-AF65-F5344CB8AC3E}">
-        <p14:creationId xmlns:p14="http://schemas.microsoft.com/office/powerpoint/2010/main" val="2087571555"/>
+        <p14:creationId xmlns:p14="http://schemas.microsoft.com/office/powerpoint/2010/main" val="2108658942"/>
       </p:ext>
     </p:extLst>
   </p:cSld>
@@ -5907,6 +6444,59 @@
       </p:grpSpPr>
       <p:sp>
         <p:nvSpPr>
+          <p:cNvPr id="2" name="Title 1">
+            <a:extLst>
+              <a:ext uri="{FF2B5EF4-FFF2-40B4-BE49-F238E27FC236}">
+                <a16:creationId xmlns:a16="http://schemas.microsoft.com/office/drawing/2014/main" id="{C0666519-3484-48F3-927E-47679DE94711}"/>
+              </a:ext>
+            </a:extLst>
+          </p:cNvPr>
+          <p:cNvSpPr>
+            <a:spLocks noGrp="1"/>
+          </p:cNvSpPr>
+          <p:nvPr>
+            <p:ph type="title"/>
+          </p:nvPr>
+        </p:nvSpPr>
+        <p:spPr/>
+        <p:txBody>
+          <a:bodyPr/>
+          <a:lstStyle/>
+          <a:p>
+            <a:r>
+              <a:rPr lang="en-IN" b="1" dirty="0"/>
+              <a:t>4. CONCLUSION</a:t>
+            </a:r>
+          </a:p>
+        </p:txBody>
+      </p:sp>
+      <p:sp>
+        <p:nvSpPr>
+          <p:cNvPr id="3" name="Content Placeholder 2">
+            <a:extLst>
+              <a:ext uri="{FF2B5EF4-FFF2-40B4-BE49-F238E27FC236}">
+                <a16:creationId xmlns:a16="http://schemas.microsoft.com/office/drawing/2014/main" id="{D3F11377-6BB3-4E47-B174-861CD150A86B}"/>
+              </a:ext>
+            </a:extLst>
+          </p:cNvPr>
+          <p:cNvSpPr>
+            <a:spLocks noGrp="1"/>
+          </p:cNvSpPr>
+          <p:nvPr>
+            <p:ph idx="1"/>
+          </p:nvPr>
+        </p:nvSpPr>
+        <p:spPr/>
+        <p:txBody>
+          <a:bodyPr/>
+          <a:lstStyle/>
+          <a:p>
+            <a:endParaRPr lang="en-IN"/>
+          </a:p>
+        </p:txBody>
+      </p:sp>
+      <p:sp>
+        <p:nvSpPr>
           <p:cNvPr id="4" name="Rectangle 3">
             <a:extLst>
               <a:ext uri="{FF2B5EF4-FFF2-40B4-BE49-F238E27FC236}">
@@ -6103,6 +6693,527 @@
                 </a:solidFill>
               </a:rPr>
               <a:t>7</a:t>
+            </a:fld>
+            <a:endParaRPr lang="en-IN" sz="2000" b="1" dirty="0">
+              <a:solidFill>
+                <a:schemeClr val="bg1"/>
+              </a:solidFill>
+            </a:endParaRPr>
+          </a:p>
+        </p:txBody>
+      </p:sp>
+    </p:spTree>
+    <p:extLst>
+      <p:ext uri="{BB962C8B-B14F-4D97-AF65-F5344CB8AC3E}">
+        <p14:creationId xmlns:p14="http://schemas.microsoft.com/office/powerpoint/2010/main" val="2907635473"/>
+      </p:ext>
+    </p:extLst>
+  </p:cSld>
+  <p:clrMapOvr>
+    <a:masterClrMapping/>
+  </p:clrMapOvr>
+</p:sld>
+</file>
+
+<file path=ppt/slides/slide8.xml><?xml version="1.0" encoding="utf-8"?>
+<p:sld xmlns:a="http://schemas.openxmlformats.org/drawingml/2006/main" xmlns:r="http://schemas.openxmlformats.org/officeDocument/2006/relationships" xmlns:p="http://schemas.openxmlformats.org/presentationml/2006/main">
+  <p:cSld>
+    <p:spTree>
+      <p:nvGrpSpPr>
+        <p:cNvPr id="1" name=""/>
+        <p:cNvGrpSpPr/>
+        <p:nvPr/>
+      </p:nvGrpSpPr>
+      <p:grpSpPr>
+        <a:xfrm>
+          <a:off x="0" y="0"/>
+          <a:ext cx="0" cy="0"/>
+          <a:chOff x="0" y="0"/>
+          <a:chExt cx="0" cy="0"/>
+        </a:xfrm>
+      </p:grpSpPr>
+      <p:sp>
+        <p:nvSpPr>
+          <p:cNvPr id="4" name="Rectangle 3">
+            <a:extLst>
+              <a:ext uri="{FF2B5EF4-FFF2-40B4-BE49-F238E27FC236}">
+                <a16:creationId xmlns:a16="http://schemas.microsoft.com/office/drawing/2014/main" id="{8D973F9E-231E-4F4E-BF92-D9C84C7AB5A7}"/>
+              </a:ext>
+            </a:extLst>
+          </p:cNvPr>
+          <p:cNvSpPr/>
+          <p:nvPr/>
+        </p:nvSpPr>
+        <p:spPr>
+          <a:xfrm>
+            <a:off x="0" y="6067425"/>
+            <a:ext cx="9305925" cy="790575"/>
+          </a:xfrm>
+          <a:prstGeom prst="rect">
+            <a:avLst/>
+          </a:prstGeom>
+          <a:scene3d>
+            <a:camera prst="orthographicFront"/>
+            <a:lightRig rig="threePt" dir="t"/>
+          </a:scene3d>
+          <a:sp3d>
+            <a:bevelT w="114300" prst="hardEdge"/>
+          </a:sp3d>
+        </p:spPr>
+        <p:style>
+          <a:lnRef idx="2">
+            <a:schemeClr val="accent1">
+              <a:shade val="50000"/>
+            </a:schemeClr>
+          </a:lnRef>
+          <a:fillRef idx="1">
+            <a:schemeClr val="accent1"/>
+          </a:fillRef>
+          <a:effectRef idx="0">
+            <a:schemeClr val="accent1"/>
+          </a:effectRef>
+          <a:fontRef idx="minor">
+            <a:schemeClr val="lt1"/>
+          </a:fontRef>
+        </p:style>
+        <p:txBody>
+          <a:bodyPr rtlCol="0" anchor="ctr"/>
+          <a:lstStyle/>
+          <a:p>
+            <a:pPr algn="ctr"/>
+            <a:r>
+              <a:rPr lang="en-IN" sz="2000" b="1" dirty="0"/>
+              <a:t>WEDNESDAY’S WICKED ADVENTURES</a:t>
+            </a:r>
+          </a:p>
+        </p:txBody>
+      </p:sp>
+      <p:sp>
+        <p:nvSpPr>
+          <p:cNvPr id="5" name="Rectangle 4">
+            <a:extLst>
+              <a:ext uri="{FF2B5EF4-FFF2-40B4-BE49-F238E27FC236}">
+                <a16:creationId xmlns:a16="http://schemas.microsoft.com/office/drawing/2014/main" id="{ADD2B0B5-489C-4527-87A1-6AE32256E8B1}"/>
+              </a:ext>
+            </a:extLst>
+          </p:cNvPr>
+          <p:cNvSpPr/>
+          <p:nvPr/>
+        </p:nvSpPr>
+        <p:spPr>
+          <a:xfrm>
+            <a:off x="11363325" y="6067425"/>
+            <a:ext cx="828675" cy="790575"/>
+          </a:xfrm>
+          <a:prstGeom prst="rect">
+            <a:avLst/>
+          </a:prstGeom>
+          <a:scene3d>
+            <a:camera prst="orthographicFront"/>
+            <a:lightRig rig="threePt" dir="t"/>
+          </a:scene3d>
+          <a:sp3d>
+            <a:bevelT w="114300" prst="hardEdge"/>
+          </a:sp3d>
+        </p:spPr>
+        <p:style>
+          <a:lnRef idx="2">
+            <a:schemeClr val="accent1">
+              <a:shade val="50000"/>
+            </a:schemeClr>
+          </a:lnRef>
+          <a:fillRef idx="1">
+            <a:schemeClr val="accent1"/>
+          </a:fillRef>
+          <a:effectRef idx="0">
+            <a:schemeClr val="accent1"/>
+          </a:effectRef>
+          <a:fontRef idx="minor">
+            <a:schemeClr val="lt1"/>
+          </a:fontRef>
+        </p:style>
+        <p:txBody>
+          <a:bodyPr rtlCol="0" anchor="ctr"/>
+          <a:lstStyle/>
+          <a:p>
+            <a:pPr algn="ctr"/>
+            <a:endParaRPr lang="en-IN"/>
+          </a:p>
+        </p:txBody>
+      </p:sp>
+      <p:sp>
+        <p:nvSpPr>
+          <p:cNvPr id="6" name="Rectangle 5">
+            <a:extLst>
+              <a:ext uri="{FF2B5EF4-FFF2-40B4-BE49-F238E27FC236}">
+                <a16:creationId xmlns:a16="http://schemas.microsoft.com/office/drawing/2014/main" id="{8F298F8F-A536-48DC-9BA2-D0C59AC19A33}"/>
+              </a:ext>
+            </a:extLst>
+          </p:cNvPr>
+          <p:cNvSpPr/>
+          <p:nvPr/>
+        </p:nvSpPr>
+        <p:spPr>
+          <a:xfrm>
+            <a:off x="9305925" y="6067424"/>
+            <a:ext cx="2057400" cy="790575"/>
+          </a:xfrm>
+          <a:prstGeom prst="rect">
+            <a:avLst/>
+          </a:prstGeom>
+          <a:scene3d>
+            <a:camera prst="orthographicFront"/>
+            <a:lightRig rig="threePt" dir="t"/>
+          </a:scene3d>
+          <a:sp3d>
+            <a:bevelT w="114300" prst="hardEdge"/>
+          </a:sp3d>
+        </p:spPr>
+        <p:style>
+          <a:lnRef idx="2">
+            <a:schemeClr val="accent1">
+              <a:shade val="50000"/>
+            </a:schemeClr>
+          </a:lnRef>
+          <a:fillRef idx="1">
+            <a:schemeClr val="accent1"/>
+          </a:fillRef>
+          <a:effectRef idx="0">
+            <a:schemeClr val="accent1"/>
+          </a:effectRef>
+          <a:fontRef idx="minor">
+            <a:schemeClr val="lt1"/>
+          </a:fontRef>
+        </p:style>
+        <p:txBody>
+          <a:bodyPr rtlCol="0" anchor="ctr"/>
+          <a:lstStyle/>
+          <a:p>
+            <a:pPr algn="ctr"/>
+            <a:r>
+              <a:rPr lang="en-IN" sz="2000" b="1" dirty="0"/>
+              <a:t>APRIL 2022</a:t>
+            </a:r>
+          </a:p>
+        </p:txBody>
+      </p:sp>
+      <p:sp>
+        <p:nvSpPr>
+          <p:cNvPr id="8" name="Slide Number Placeholder 11">
+            <a:extLst>
+              <a:ext uri="{FF2B5EF4-FFF2-40B4-BE49-F238E27FC236}">
+                <a16:creationId xmlns:a16="http://schemas.microsoft.com/office/drawing/2014/main" id="{66E5E76B-63DE-49C5-B59F-65367A92139F}"/>
+              </a:ext>
+            </a:extLst>
+          </p:cNvPr>
+          <p:cNvSpPr>
+            <a:spLocks noGrp="1"/>
+          </p:cNvSpPr>
+          <p:nvPr>
+            <p:ph type="sldNum" sz="quarter" idx="12"/>
+          </p:nvPr>
+        </p:nvSpPr>
+        <p:spPr>
+          <a:xfrm>
+            <a:off x="11563349" y="6280148"/>
+            <a:ext cx="428625" cy="365125"/>
+          </a:xfrm>
+        </p:spPr>
+        <p:txBody>
+          <a:bodyPr/>
+          <a:lstStyle/>
+          <a:p>
+            <a:fld id="{F37EE007-93F6-4DD3-A485-65881C8FA8D0}" type="slidenum">
+              <a:rPr lang="en-IN" sz="2000" b="1" smtClean="0">
+                <a:solidFill>
+                  <a:schemeClr val="bg1"/>
+                </a:solidFill>
+              </a:rPr>
+              <a:t>8</a:t>
+            </a:fld>
+            <a:endParaRPr lang="en-IN" sz="2000" b="1" dirty="0">
+              <a:solidFill>
+                <a:schemeClr val="bg1"/>
+              </a:solidFill>
+            </a:endParaRPr>
+          </a:p>
+        </p:txBody>
+      </p:sp>
+      <p:pic>
+        <p:nvPicPr>
+          <p:cNvPr id="2050" name="Picture 2" descr="See the source image">
+            <a:extLst>
+              <a:ext uri="{FF2B5EF4-FFF2-40B4-BE49-F238E27FC236}">
+                <a16:creationId xmlns:a16="http://schemas.microsoft.com/office/drawing/2014/main" id="{B5B67862-A69F-498B-B814-F7947A0A1E0A}"/>
+              </a:ext>
+            </a:extLst>
+          </p:cNvPr>
+          <p:cNvPicPr>
+            <a:picLocks noChangeAspect="1" noChangeArrowheads="1"/>
+          </p:cNvPicPr>
+          <p:nvPr/>
+        </p:nvPicPr>
+        <p:blipFill>
+          <a:blip r:embed="rId2">
+            <a:extLst>
+              <a:ext uri="{28A0092B-C50C-407E-A947-70E740481C1C}">
+                <a14:useLocalDpi xmlns:a14="http://schemas.microsoft.com/office/drawing/2010/main" val="0"/>
+              </a:ext>
+            </a:extLst>
+          </a:blip>
+          <a:srcRect/>
+          <a:stretch>
+            <a:fillRect/>
+          </a:stretch>
+        </p:blipFill>
+        <p:spPr bwMode="auto">
+          <a:xfrm>
+            <a:off x="0" y="0"/>
+            <a:ext cx="12192000" cy="6067421"/>
+          </a:xfrm>
+          <a:prstGeom prst="rect">
+            <a:avLst/>
+          </a:prstGeom>
+          <a:noFill/>
+          <a:extLst>
+            <a:ext uri="{909E8E84-426E-40DD-AFC4-6F175D3DCCD1}">
+              <a14:hiddenFill xmlns:a14="http://schemas.microsoft.com/office/drawing/2010/main">
+                <a:solidFill>
+                  <a:srgbClr val="FFFFFF"/>
+                </a:solidFill>
+              </a14:hiddenFill>
+            </a:ext>
+          </a:extLst>
+        </p:spPr>
+      </p:pic>
+    </p:spTree>
+    <p:extLst>
+      <p:ext uri="{BB962C8B-B14F-4D97-AF65-F5344CB8AC3E}">
+        <p14:creationId xmlns:p14="http://schemas.microsoft.com/office/powerpoint/2010/main" val="2087571555"/>
+      </p:ext>
+    </p:extLst>
+  </p:cSld>
+  <p:clrMapOvr>
+    <a:masterClrMapping/>
+  </p:clrMapOvr>
+</p:sld>
+</file>
+
+<file path=ppt/slides/slide9.xml><?xml version="1.0" encoding="utf-8"?>
+<p:sld xmlns:a="http://schemas.openxmlformats.org/drawingml/2006/main" xmlns:r="http://schemas.openxmlformats.org/officeDocument/2006/relationships" xmlns:p="http://schemas.openxmlformats.org/presentationml/2006/main">
+  <p:cSld>
+    <p:spTree>
+      <p:nvGrpSpPr>
+        <p:cNvPr id="1" name=""/>
+        <p:cNvGrpSpPr/>
+        <p:nvPr/>
+      </p:nvGrpSpPr>
+      <p:grpSpPr>
+        <a:xfrm>
+          <a:off x="0" y="0"/>
+          <a:ext cx="0" cy="0"/>
+          <a:chOff x="0" y="0"/>
+          <a:chExt cx="0" cy="0"/>
+        </a:xfrm>
+      </p:grpSpPr>
+      <p:sp>
+        <p:nvSpPr>
+          <p:cNvPr id="4" name="Rectangle 3">
+            <a:extLst>
+              <a:ext uri="{FF2B5EF4-FFF2-40B4-BE49-F238E27FC236}">
+                <a16:creationId xmlns:a16="http://schemas.microsoft.com/office/drawing/2014/main" id="{8D973F9E-231E-4F4E-BF92-D9C84C7AB5A7}"/>
+              </a:ext>
+            </a:extLst>
+          </p:cNvPr>
+          <p:cNvSpPr/>
+          <p:nvPr/>
+        </p:nvSpPr>
+        <p:spPr>
+          <a:xfrm>
+            <a:off x="0" y="6067425"/>
+            <a:ext cx="9305925" cy="790575"/>
+          </a:xfrm>
+          <a:prstGeom prst="rect">
+            <a:avLst/>
+          </a:prstGeom>
+          <a:scene3d>
+            <a:camera prst="orthographicFront"/>
+            <a:lightRig rig="threePt" dir="t"/>
+          </a:scene3d>
+          <a:sp3d>
+            <a:bevelT w="114300" prst="hardEdge"/>
+          </a:sp3d>
+        </p:spPr>
+        <p:style>
+          <a:lnRef idx="2">
+            <a:schemeClr val="accent1">
+              <a:shade val="50000"/>
+            </a:schemeClr>
+          </a:lnRef>
+          <a:fillRef idx="1">
+            <a:schemeClr val="accent1"/>
+          </a:fillRef>
+          <a:effectRef idx="0">
+            <a:schemeClr val="accent1"/>
+          </a:effectRef>
+          <a:fontRef idx="minor">
+            <a:schemeClr val="lt1"/>
+          </a:fontRef>
+        </p:style>
+        <p:txBody>
+          <a:bodyPr rtlCol="0" anchor="ctr"/>
+          <a:lstStyle/>
+          <a:p>
+            <a:pPr algn="ctr"/>
+            <a:r>
+              <a:rPr lang="en-IN" sz="2000" b="1" dirty="0"/>
+              <a:t>WEDNESDAY’S WICKED ADVENTURES</a:t>
+            </a:r>
+          </a:p>
+        </p:txBody>
+      </p:sp>
+      <p:sp>
+        <p:nvSpPr>
+          <p:cNvPr id="5" name="Rectangle 4">
+            <a:extLst>
+              <a:ext uri="{FF2B5EF4-FFF2-40B4-BE49-F238E27FC236}">
+                <a16:creationId xmlns:a16="http://schemas.microsoft.com/office/drawing/2014/main" id="{ADD2B0B5-489C-4527-87A1-6AE32256E8B1}"/>
+              </a:ext>
+            </a:extLst>
+          </p:cNvPr>
+          <p:cNvSpPr/>
+          <p:nvPr/>
+        </p:nvSpPr>
+        <p:spPr>
+          <a:xfrm>
+            <a:off x="11363325" y="6067425"/>
+            <a:ext cx="828675" cy="790575"/>
+          </a:xfrm>
+          <a:prstGeom prst="rect">
+            <a:avLst/>
+          </a:prstGeom>
+          <a:scene3d>
+            <a:camera prst="orthographicFront"/>
+            <a:lightRig rig="threePt" dir="t"/>
+          </a:scene3d>
+          <a:sp3d>
+            <a:bevelT w="114300" prst="hardEdge"/>
+          </a:sp3d>
+        </p:spPr>
+        <p:style>
+          <a:lnRef idx="2">
+            <a:schemeClr val="accent1">
+              <a:shade val="50000"/>
+            </a:schemeClr>
+          </a:lnRef>
+          <a:fillRef idx="1">
+            <a:schemeClr val="accent1"/>
+          </a:fillRef>
+          <a:effectRef idx="0">
+            <a:schemeClr val="accent1"/>
+          </a:effectRef>
+          <a:fontRef idx="minor">
+            <a:schemeClr val="lt1"/>
+          </a:fontRef>
+        </p:style>
+        <p:txBody>
+          <a:bodyPr rtlCol="0" anchor="ctr"/>
+          <a:lstStyle/>
+          <a:p>
+            <a:pPr algn="ctr"/>
+            <a:endParaRPr lang="en-IN"/>
+          </a:p>
+        </p:txBody>
+      </p:sp>
+      <p:sp>
+        <p:nvSpPr>
+          <p:cNvPr id="6" name="Rectangle 5">
+            <a:extLst>
+              <a:ext uri="{FF2B5EF4-FFF2-40B4-BE49-F238E27FC236}">
+                <a16:creationId xmlns:a16="http://schemas.microsoft.com/office/drawing/2014/main" id="{8F298F8F-A536-48DC-9BA2-D0C59AC19A33}"/>
+              </a:ext>
+            </a:extLst>
+          </p:cNvPr>
+          <p:cNvSpPr/>
+          <p:nvPr/>
+        </p:nvSpPr>
+        <p:spPr>
+          <a:xfrm>
+            <a:off x="9305925" y="6067424"/>
+            <a:ext cx="2057400" cy="790575"/>
+          </a:xfrm>
+          <a:prstGeom prst="rect">
+            <a:avLst/>
+          </a:prstGeom>
+          <a:scene3d>
+            <a:camera prst="orthographicFront"/>
+            <a:lightRig rig="threePt" dir="t"/>
+          </a:scene3d>
+          <a:sp3d>
+            <a:bevelT w="114300" prst="hardEdge"/>
+          </a:sp3d>
+        </p:spPr>
+        <p:style>
+          <a:lnRef idx="2">
+            <a:schemeClr val="accent1">
+              <a:shade val="50000"/>
+            </a:schemeClr>
+          </a:lnRef>
+          <a:fillRef idx="1">
+            <a:schemeClr val="accent1"/>
+          </a:fillRef>
+          <a:effectRef idx="0">
+            <a:schemeClr val="accent1"/>
+          </a:effectRef>
+          <a:fontRef idx="minor">
+            <a:schemeClr val="lt1"/>
+          </a:fontRef>
+        </p:style>
+        <p:txBody>
+          <a:bodyPr rtlCol="0" anchor="ctr"/>
+          <a:lstStyle/>
+          <a:p>
+            <a:pPr algn="ctr"/>
+            <a:r>
+              <a:rPr lang="en-IN" sz="2000" b="1" dirty="0"/>
+              <a:t>APRIL 2022</a:t>
+            </a:r>
+          </a:p>
+        </p:txBody>
+      </p:sp>
+      <p:sp>
+        <p:nvSpPr>
+          <p:cNvPr id="8" name="Slide Number Placeholder 11">
+            <a:extLst>
+              <a:ext uri="{FF2B5EF4-FFF2-40B4-BE49-F238E27FC236}">
+                <a16:creationId xmlns:a16="http://schemas.microsoft.com/office/drawing/2014/main" id="{66E5E76B-63DE-49C5-B59F-65367A92139F}"/>
+              </a:ext>
+            </a:extLst>
+          </p:cNvPr>
+          <p:cNvSpPr>
+            <a:spLocks noGrp="1"/>
+          </p:cNvSpPr>
+          <p:nvPr>
+            <p:ph type="sldNum" sz="quarter" idx="12"/>
+          </p:nvPr>
+        </p:nvSpPr>
+        <p:spPr>
+          <a:xfrm>
+            <a:off x="11563349" y="6280148"/>
+            <a:ext cx="428625" cy="365125"/>
+          </a:xfrm>
+        </p:spPr>
+        <p:txBody>
+          <a:bodyPr/>
+          <a:lstStyle/>
+          <a:p>
+            <a:fld id="{F37EE007-93F6-4DD3-A485-65881C8FA8D0}" type="slidenum">
+              <a:rPr lang="en-IN" sz="2000" b="1" smtClean="0">
+                <a:solidFill>
+                  <a:schemeClr val="bg1"/>
+                </a:solidFill>
+              </a:rPr>
+              <a:t>9</a:t>
             </a:fld>
             <a:endParaRPr lang="en-IN" sz="2000" b="1" dirty="0">
               <a:solidFill>

</xml_diff>

<commit_message>
Updated the presentation file with the Database page
</commit_message>
<xml_diff>
--- a/Wicked Adventures.pptx
+++ b/Wicked Adventures.pptx
@@ -5,7 +5,7 @@
     <p:sldMasterId id="2147483648" r:id="rId1"/>
   </p:sldMasterIdLst>
   <p:notesMasterIdLst>
-    <p:notesMasterId r:id="rId11"/>
+    <p:notesMasterId r:id="rId13"/>
   </p:notesMasterIdLst>
   <p:sldIdLst>
     <p:sldId id="258" r:id="rId2"/>
@@ -13,10 +13,12 @@
     <p:sldId id="260" r:id="rId4"/>
     <p:sldId id="261" r:id="rId5"/>
     <p:sldId id="266" r:id="rId6"/>
-    <p:sldId id="265" r:id="rId7"/>
-    <p:sldId id="262" r:id="rId8"/>
-    <p:sldId id="264" r:id="rId9"/>
-    <p:sldId id="263" r:id="rId10"/>
+    <p:sldId id="268" r:id="rId7"/>
+    <p:sldId id="265" r:id="rId8"/>
+    <p:sldId id="262" r:id="rId9"/>
+    <p:sldId id="267" r:id="rId10"/>
+    <p:sldId id="264" r:id="rId11"/>
+    <p:sldId id="263" r:id="rId12"/>
   </p:sldIdLst>
   <p:sldSz cx="12192000" cy="6858000"/>
   <p:notesSz cx="6858000" cy="9144000"/>
@@ -4446,6 +4448,574 @@
 </p:sld>
 </file>
 
+<file path=ppt/slides/slide10.xml><?xml version="1.0" encoding="utf-8"?>
+<p:sld xmlns:a="http://schemas.openxmlformats.org/drawingml/2006/main" xmlns:r="http://schemas.openxmlformats.org/officeDocument/2006/relationships" xmlns:p="http://schemas.openxmlformats.org/presentationml/2006/main">
+  <p:cSld>
+    <p:spTree>
+      <p:nvGrpSpPr>
+        <p:cNvPr id="1" name=""/>
+        <p:cNvGrpSpPr/>
+        <p:nvPr/>
+      </p:nvGrpSpPr>
+      <p:grpSpPr>
+        <a:xfrm>
+          <a:off x="0" y="0"/>
+          <a:ext cx="0" cy="0"/>
+          <a:chOff x="0" y="0"/>
+          <a:chExt cx="0" cy="0"/>
+        </a:xfrm>
+      </p:grpSpPr>
+      <p:sp>
+        <p:nvSpPr>
+          <p:cNvPr id="4" name="Rectangle 3">
+            <a:extLst>
+              <a:ext uri="{FF2B5EF4-FFF2-40B4-BE49-F238E27FC236}">
+                <a16:creationId xmlns:a16="http://schemas.microsoft.com/office/drawing/2014/main" id="{8D973F9E-231E-4F4E-BF92-D9C84C7AB5A7}"/>
+              </a:ext>
+            </a:extLst>
+          </p:cNvPr>
+          <p:cNvSpPr/>
+          <p:nvPr/>
+        </p:nvSpPr>
+        <p:spPr>
+          <a:xfrm>
+            <a:off x="0" y="6067425"/>
+            <a:ext cx="9305925" cy="790575"/>
+          </a:xfrm>
+          <a:prstGeom prst="rect">
+            <a:avLst/>
+          </a:prstGeom>
+          <a:scene3d>
+            <a:camera prst="orthographicFront"/>
+            <a:lightRig rig="threePt" dir="t"/>
+          </a:scene3d>
+          <a:sp3d>
+            <a:bevelT w="114300" prst="hardEdge"/>
+          </a:sp3d>
+        </p:spPr>
+        <p:style>
+          <a:lnRef idx="2">
+            <a:schemeClr val="accent1">
+              <a:shade val="50000"/>
+            </a:schemeClr>
+          </a:lnRef>
+          <a:fillRef idx="1">
+            <a:schemeClr val="accent1"/>
+          </a:fillRef>
+          <a:effectRef idx="0">
+            <a:schemeClr val="accent1"/>
+          </a:effectRef>
+          <a:fontRef idx="minor">
+            <a:schemeClr val="lt1"/>
+          </a:fontRef>
+        </p:style>
+        <p:txBody>
+          <a:bodyPr rtlCol="0" anchor="ctr"/>
+          <a:lstStyle/>
+          <a:p>
+            <a:pPr algn="ctr"/>
+            <a:r>
+              <a:rPr lang="en-IN" sz="2000" b="1" dirty="0"/>
+              <a:t>WEDNESDAY’S WICKED ADVENTURES</a:t>
+            </a:r>
+          </a:p>
+        </p:txBody>
+      </p:sp>
+      <p:sp>
+        <p:nvSpPr>
+          <p:cNvPr id="5" name="Rectangle 4">
+            <a:extLst>
+              <a:ext uri="{FF2B5EF4-FFF2-40B4-BE49-F238E27FC236}">
+                <a16:creationId xmlns:a16="http://schemas.microsoft.com/office/drawing/2014/main" id="{ADD2B0B5-489C-4527-87A1-6AE32256E8B1}"/>
+              </a:ext>
+            </a:extLst>
+          </p:cNvPr>
+          <p:cNvSpPr/>
+          <p:nvPr/>
+        </p:nvSpPr>
+        <p:spPr>
+          <a:xfrm>
+            <a:off x="11363325" y="6067425"/>
+            <a:ext cx="828675" cy="790575"/>
+          </a:xfrm>
+          <a:prstGeom prst="rect">
+            <a:avLst/>
+          </a:prstGeom>
+          <a:scene3d>
+            <a:camera prst="orthographicFront"/>
+            <a:lightRig rig="threePt" dir="t"/>
+          </a:scene3d>
+          <a:sp3d>
+            <a:bevelT w="114300" prst="hardEdge"/>
+          </a:sp3d>
+        </p:spPr>
+        <p:style>
+          <a:lnRef idx="2">
+            <a:schemeClr val="accent1">
+              <a:shade val="50000"/>
+            </a:schemeClr>
+          </a:lnRef>
+          <a:fillRef idx="1">
+            <a:schemeClr val="accent1"/>
+          </a:fillRef>
+          <a:effectRef idx="0">
+            <a:schemeClr val="accent1"/>
+          </a:effectRef>
+          <a:fontRef idx="minor">
+            <a:schemeClr val="lt1"/>
+          </a:fontRef>
+        </p:style>
+        <p:txBody>
+          <a:bodyPr rtlCol="0" anchor="ctr"/>
+          <a:lstStyle/>
+          <a:p>
+            <a:pPr algn="ctr"/>
+            <a:endParaRPr lang="en-IN"/>
+          </a:p>
+        </p:txBody>
+      </p:sp>
+      <p:sp>
+        <p:nvSpPr>
+          <p:cNvPr id="6" name="Rectangle 5">
+            <a:extLst>
+              <a:ext uri="{FF2B5EF4-FFF2-40B4-BE49-F238E27FC236}">
+                <a16:creationId xmlns:a16="http://schemas.microsoft.com/office/drawing/2014/main" id="{8F298F8F-A536-48DC-9BA2-D0C59AC19A33}"/>
+              </a:ext>
+            </a:extLst>
+          </p:cNvPr>
+          <p:cNvSpPr/>
+          <p:nvPr/>
+        </p:nvSpPr>
+        <p:spPr>
+          <a:xfrm>
+            <a:off x="9305925" y="6067424"/>
+            <a:ext cx="2057400" cy="790575"/>
+          </a:xfrm>
+          <a:prstGeom prst="rect">
+            <a:avLst/>
+          </a:prstGeom>
+          <a:scene3d>
+            <a:camera prst="orthographicFront"/>
+            <a:lightRig rig="threePt" dir="t"/>
+          </a:scene3d>
+          <a:sp3d>
+            <a:bevelT w="114300" prst="hardEdge"/>
+          </a:sp3d>
+        </p:spPr>
+        <p:style>
+          <a:lnRef idx="2">
+            <a:schemeClr val="accent1">
+              <a:shade val="50000"/>
+            </a:schemeClr>
+          </a:lnRef>
+          <a:fillRef idx="1">
+            <a:schemeClr val="accent1"/>
+          </a:fillRef>
+          <a:effectRef idx="0">
+            <a:schemeClr val="accent1"/>
+          </a:effectRef>
+          <a:fontRef idx="minor">
+            <a:schemeClr val="lt1"/>
+          </a:fontRef>
+        </p:style>
+        <p:txBody>
+          <a:bodyPr rtlCol="0" anchor="ctr"/>
+          <a:lstStyle/>
+          <a:p>
+            <a:pPr algn="ctr"/>
+            <a:r>
+              <a:rPr lang="en-IN" sz="2000" b="1" dirty="0"/>
+              <a:t>APRIL 2022</a:t>
+            </a:r>
+          </a:p>
+        </p:txBody>
+      </p:sp>
+      <p:sp>
+        <p:nvSpPr>
+          <p:cNvPr id="8" name="Slide Number Placeholder 11">
+            <a:extLst>
+              <a:ext uri="{FF2B5EF4-FFF2-40B4-BE49-F238E27FC236}">
+                <a16:creationId xmlns:a16="http://schemas.microsoft.com/office/drawing/2014/main" id="{66E5E76B-63DE-49C5-B59F-65367A92139F}"/>
+              </a:ext>
+            </a:extLst>
+          </p:cNvPr>
+          <p:cNvSpPr>
+            <a:spLocks noGrp="1"/>
+          </p:cNvSpPr>
+          <p:nvPr>
+            <p:ph type="sldNum" sz="quarter" idx="12"/>
+          </p:nvPr>
+        </p:nvSpPr>
+        <p:spPr>
+          <a:xfrm>
+            <a:off x="11563349" y="6280148"/>
+            <a:ext cx="428625" cy="365125"/>
+          </a:xfrm>
+        </p:spPr>
+        <p:txBody>
+          <a:bodyPr/>
+          <a:lstStyle/>
+          <a:p>
+            <a:fld id="{F37EE007-93F6-4DD3-A485-65881C8FA8D0}" type="slidenum">
+              <a:rPr lang="en-IN" sz="2000" b="1" smtClean="0">
+                <a:solidFill>
+                  <a:schemeClr val="bg1"/>
+                </a:solidFill>
+              </a:rPr>
+              <a:t>10</a:t>
+            </a:fld>
+            <a:endParaRPr lang="en-IN" sz="2000" b="1" dirty="0">
+              <a:solidFill>
+                <a:schemeClr val="bg1"/>
+              </a:solidFill>
+            </a:endParaRPr>
+          </a:p>
+        </p:txBody>
+      </p:sp>
+      <p:pic>
+        <p:nvPicPr>
+          <p:cNvPr id="2050" name="Picture 2" descr="See the source image">
+            <a:extLst>
+              <a:ext uri="{FF2B5EF4-FFF2-40B4-BE49-F238E27FC236}">
+                <a16:creationId xmlns:a16="http://schemas.microsoft.com/office/drawing/2014/main" id="{B5B67862-A69F-498B-B814-F7947A0A1E0A}"/>
+              </a:ext>
+            </a:extLst>
+          </p:cNvPr>
+          <p:cNvPicPr>
+            <a:picLocks noChangeAspect="1" noChangeArrowheads="1"/>
+          </p:cNvPicPr>
+          <p:nvPr/>
+        </p:nvPicPr>
+        <p:blipFill>
+          <a:blip r:embed="rId2">
+            <a:extLst>
+              <a:ext uri="{28A0092B-C50C-407E-A947-70E740481C1C}">
+                <a14:useLocalDpi xmlns:a14="http://schemas.microsoft.com/office/drawing/2010/main" val="0"/>
+              </a:ext>
+            </a:extLst>
+          </a:blip>
+          <a:srcRect/>
+          <a:stretch>
+            <a:fillRect/>
+          </a:stretch>
+        </p:blipFill>
+        <p:spPr bwMode="auto">
+          <a:xfrm>
+            <a:off x="0" y="0"/>
+            <a:ext cx="12192000" cy="6067421"/>
+          </a:xfrm>
+          <a:prstGeom prst="rect">
+            <a:avLst/>
+          </a:prstGeom>
+          <a:noFill/>
+          <a:extLst>
+            <a:ext uri="{909E8E84-426E-40DD-AFC4-6F175D3DCCD1}">
+              <a14:hiddenFill xmlns:a14="http://schemas.microsoft.com/office/drawing/2010/main">
+                <a:solidFill>
+                  <a:srgbClr val="FFFFFF"/>
+                </a:solidFill>
+              </a14:hiddenFill>
+            </a:ext>
+          </a:extLst>
+        </p:spPr>
+      </p:pic>
+    </p:spTree>
+    <p:extLst>
+      <p:ext uri="{BB962C8B-B14F-4D97-AF65-F5344CB8AC3E}">
+        <p14:creationId xmlns:p14="http://schemas.microsoft.com/office/powerpoint/2010/main" val="2087571555"/>
+      </p:ext>
+    </p:extLst>
+  </p:cSld>
+  <p:clrMapOvr>
+    <a:masterClrMapping/>
+  </p:clrMapOvr>
+</p:sld>
+</file>
+
+<file path=ppt/slides/slide11.xml><?xml version="1.0" encoding="utf-8"?>
+<p:sld xmlns:a="http://schemas.openxmlformats.org/drawingml/2006/main" xmlns:r="http://schemas.openxmlformats.org/officeDocument/2006/relationships" xmlns:p="http://schemas.openxmlformats.org/presentationml/2006/main">
+  <p:cSld>
+    <p:spTree>
+      <p:nvGrpSpPr>
+        <p:cNvPr id="1" name=""/>
+        <p:cNvGrpSpPr/>
+        <p:nvPr/>
+      </p:nvGrpSpPr>
+      <p:grpSpPr>
+        <a:xfrm>
+          <a:off x="0" y="0"/>
+          <a:ext cx="0" cy="0"/>
+          <a:chOff x="0" y="0"/>
+          <a:chExt cx="0" cy="0"/>
+        </a:xfrm>
+      </p:grpSpPr>
+      <p:sp>
+        <p:nvSpPr>
+          <p:cNvPr id="4" name="Rectangle 3">
+            <a:extLst>
+              <a:ext uri="{FF2B5EF4-FFF2-40B4-BE49-F238E27FC236}">
+                <a16:creationId xmlns:a16="http://schemas.microsoft.com/office/drawing/2014/main" id="{8D973F9E-231E-4F4E-BF92-D9C84C7AB5A7}"/>
+              </a:ext>
+            </a:extLst>
+          </p:cNvPr>
+          <p:cNvSpPr/>
+          <p:nvPr/>
+        </p:nvSpPr>
+        <p:spPr>
+          <a:xfrm>
+            <a:off x="0" y="6067425"/>
+            <a:ext cx="9305925" cy="790575"/>
+          </a:xfrm>
+          <a:prstGeom prst="rect">
+            <a:avLst/>
+          </a:prstGeom>
+          <a:scene3d>
+            <a:camera prst="orthographicFront"/>
+            <a:lightRig rig="threePt" dir="t"/>
+          </a:scene3d>
+          <a:sp3d>
+            <a:bevelT w="114300" prst="hardEdge"/>
+          </a:sp3d>
+        </p:spPr>
+        <p:style>
+          <a:lnRef idx="2">
+            <a:schemeClr val="accent1">
+              <a:shade val="50000"/>
+            </a:schemeClr>
+          </a:lnRef>
+          <a:fillRef idx="1">
+            <a:schemeClr val="accent1"/>
+          </a:fillRef>
+          <a:effectRef idx="0">
+            <a:schemeClr val="accent1"/>
+          </a:effectRef>
+          <a:fontRef idx="minor">
+            <a:schemeClr val="lt1"/>
+          </a:fontRef>
+        </p:style>
+        <p:txBody>
+          <a:bodyPr rtlCol="0" anchor="ctr"/>
+          <a:lstStyle/>
+          <a:p>
+            <a:pPr algn="ctr"/>
+            <a:r>
+              <a:rPr lang="en-IN" sz="2000" b="1" dirty="0"/>
+              <a:t>WEDNESDAY’S WICKED ADVENTURES</a:t>
+            </a:r>
+          </a:p>
+        </p:txBody>
+      </p:sp>
+      <p:sp>
+        <p:nvSpPr>
+          <p:cNvPr id="5" name="Rectangle 4">
+            <a:extLst>
+              <a:ext uri="{FF2B5EF4-FFF2-40B4-BE49-F238E27FC236}">
+                <a16:creationId xmlns:a16="http://schemas.microsoft.com/office/drawing/2014/main" id="{ADD2B0B5-489C-4527-87A1-6AE32256E8B1}"/>
+              </a:ext>
+            </a:extLst>
+          </p:cNvPr>
+          <p:cNvSpPr/>
+          <p:nvPr/>
+        </p:nvSpPr>
+        <p:spPr>
+          <a:xfrm>
+            <a:off x="11363325" y="6067425"/>
+            <a:ext cx="828675" cy="790575"/>
+          </a:xfrm>
+          <a:prstGeom prst="rect">
+            <a:avLst/>
+          </a:prstGeom>
+          <a:scene3d>
+            <a:camera prst="orthographicFront"/>
+            <a:lightRig rig="threePt" dir="t"/>
+          </a:scene3d>
+          <a:sp3d>
+            <a:bevelT w="114300" prst="hardEdge"/>
+          </a:sp3d>
+        </p:spPr>
+        <p:style>
+          <a:lnRef idx="2">
+            <a:schemeClr val="accent1">
+              <a:shade val="50000"/>
+            </a:schemeClr>
+          </a:lnRef>
+          <a:fillRef idx="1">
+            <a:schemeClr val="accent1"/>
+          </a:fillRef>
+          <a:effectRef idx="0">
+            <a:schemeClr val="accent1"/>
+          </a:effectRef>
+          <a:fontRef idx="minor">
+            <a:schemeClr val="lt1"/>
+          </a:fontRef>
+        </p:style>
+        <p:txBody>
+          <a:bodyPr rtlCol="0" anchor="ctr"/>
+          <a:lstStyle/>
+          <a:p>
+            <a:pPr algn="ctr"/>
+            <a:endParaRPr lang="en-IN"/>
+          </a:p>
+        </p:txBody>
+      </p:sp>
+      <p:sp>
+        <p:nvSpPr>
+          <p:cNvPr id="6" name="Rectangle 5">
+            <a:extLst>
+              <a:ext uri="{FF2B5EF4-FFF2-40B4-BE49-F238E27FC236}">
+                <a16:creationId xmlns:a16="http://schemas.microsoft.com/office/drawing/2014/main" id="{8F298F8F-A536-48DC-9BA2-D0C59AC19A33}"/>
+              </a:ext>
+            </a:extLst>
+          </p:cNvPr>
+          <p:cNvSpPr/>
+          <p:nvPr/>
+        </p:nvSpPr>
+        <p:spPr>
+          <a:xfrm>
+            <a:off x="9305925" y="6067424"/>
+            <a:ext cx="2057400" cy="790575"/>
+          </a:xfrm>
+          <a:prstGeom prst="rect">
+            <a:avLst/>
+          </a:prstGeom>
+          <a:scene3d>
+            <a:camera prst="orthographicFront"/>
+            <a:lightRig rig="threePt" dir="t"/>
+          </a:scene3d>
+          <a:sp3d>
+            <a:bevelT w="114300" prst="hardEdge"/>
+          </a:sp3d>
+        </p:spPr>
+        <p:style>
+          <a:lnRef idx="2">
+            <a:schemeClr val="accent1">
+              <a:shade val="50000"/>
+            </a:schemeClr>
+          </a:lnRef>
+          <a:fillRef idx="1">
+            <a:schemeClr val="accent1"/>
+          </a:fillRef>
+          <a:effectRef idx="0">
+            <a:schemeClr val="accent1"/>
+          </a:effectRef>
+          <a:fontRef idx="minor">
+            <a:schemeClr val="lt1"/>
+          </a:fontRef>
+        </p:style>
+        <p:txBody>
+          <a:bodyPr rtlCol="0" anchor="ctr"/>
+          <a:lstStyle/>
+          <a:p>
+            <a:pPr algn="ctr"/>
+            <a:r>
+              <a:rPr lang="en-IN" sz="2000" b="1" dirty="0"/>
+              <a:t>APRIL 2022</a:t>
+            </a:r>
+          </a:p>
+        </p:txBody>
+      </p:sp>
+      <p:sp>
+        <p:nvSpPr>
+          <p:cNvPr id="8" name="Slide Number Placeholder 11">
+            <a:extLst>
+              <a:ext uri="{FF2B5EF4-FFF2-40B4-BE49-F238E27FC236}">
+                <a16:creationId xmlns:a16="http://schemas.microsoft.com/office/drawing/2014/main" id="{66E5E76B-63DE-49C5-B59F-65367A92139F}"/>
+              </a:ext>
+            </a:extLst>
+          </p:cNvPr>
+          <p:cNvSpPr>
+            <a:spLocks noGrp="1"/>
+          </p:cNvSpPr>
+          <p:nvPr>
+            <p:ph type="sldNum" sz="quarter" idx="12"/>
+          </p:nvPr>
+        </p:nvSpPr>
+        <p:spPr>
+          <a:xfrm>
+            <a:off x="11563349" y="6280148"/>
+            <a:ext cx="428625" cy="365125"/>
+          </a:xfrm>
+        </p:spPr>
+        <p:txBody>
+          <a:bodyPr/>
+          <a:lstStyle/>
+          <a:p>
+            <a:fld id="{F37EE007-93F6-4DD3-A485-65881C8FA8D0}" type="slidenum">
+              <a:rPr lang="en-IN" sz="2000" b="1" smtClean="0">
+                <a:solidFill>
+                  <a:schemeClr val="bg1"/>
+                </a:solidFill>
+              </a:rPr>
+              <a:t>11</a:t>
+            </a:fld>
+            <a:endParaRPr lang="en-IN" sz="2000" b="1" dirty="0">
+              <a:solidFill>
+                <a:schemeClr val="bg1"/>
+              </a:solidFill>
+            </a:endParaRPr>
+          </a:p>
+        </p:txBody>
+      </p:sp>
+      <p:pic>
+        <p:nvPicPr>
+          <p:cNvPr id="1026" name="Picture 2" descr="See the source image">
+            <a:extLst>
+              <a:ext uri="{FF2B5EF4-FFF2-40B4-BE49-F238E27FC236}">
+                <a16:creationId xmlns:a16="http://schemas.microsoft.com/office/drawing/2014/main" id="{543FEFA3-C29F-4D2A-9A5C-7218104852CA}"/>
+              </a:ext>
+            </a:extLst>
+          </p:cNvPr>
+          <p:cNvPicPr>
+            <a:picLocks noChangeAspect="1" noChangeArrowheads="1"/>
+          </p:cNvPicPr>
+          <p:nvPr/>
+        </p:nvPicPr>
+        <p:blipFill>
+          <a:blip r:embed="rId2">
+            <a:extLst>
+              <a:ext uri="{28A0092B-C50C-407E-A947-70E740481C1C}">
+                <a14:useLocalDpi xmlns:a14="http://schemas.microsoft.com/office/drawing/2010/main" val="0"/>
+              </a:ext>
+            </a:extLst>
+          </a:blip>
+          <a:srcRect/>
+          <a:stretch>
+            <a:fillRect/>
+          </a:stretch>
+        </p:blipFill>
+        <p:spPr bwMode="auto">
+          <a:xfrm>
+            <a:off x="3338512" y="911541"/>
+            <a:ext cx="5514975" cy="3860483"/>
+          </a:xfrm>
+          <a:prstGeom prst="rect">
+            <a:avLst/>
+          </a:prstGeom>
+          <a:noFill/>
+          <a:extLst>
+            <a:ext uri="{909E8E84-426E-40DD-AFC4-6F175D3DCCD1}">
+              <a14:hiddenFill xmlns:a14="http://schemas.microsoft.com/office/drawing/2010/main">
+                <a:solidFill>
+                  <a:srgbClr val="FFFFFF"/>
+                </a:solidFill>
+              </a14:hiddenFill>
+            </a:ext>
+          </a:extLst>
+        </p:spPr>
+      </p:pic>
+    </p:spTree>
+    <p:extLst>
+      <p:ext uri="{BB962C8B-B14F-4D97-AF65-F5344CB8AC3E}">
+        <p14:creationId xmlns:p14="http://schemas.microsoft.com/office/powerpoint/2010/main" val="3209703990"/>
+      </p:ext>
+    </p:extLst>
+  </p:cSld>
+  <p:clrMapOvr>
+    <a:masterClrMapping/>
+  </p:clrMapOvr>
+</p:sld>
+</file>
+
 <file path=ppt/slides/slide2.xml><?xml version="1.0" encoding="utf-8"?>
 <p:sld xmlns:a="http://schemas.openxmlformats.org/drawingml/2006/main" xmlns:r="http://schemas.openxmlformats.org/officeDocument/2006/relationships" xmlns:p="http://schemas.openxmlformats.org/presentationml/2006/main">
   <p:cSld>
@@ -5978,10 +6548,6 @@
           </p:nvPr>
         </p:nvSpPr>
         <p:spPr>
-          <a:xfrm>
-            <a:off x="838200" y="365125"/>
-            <a:ext cx="10515600" cy="1119961"/>
-          </a:xfrm>
           <a:effectLst>
             <a:outerShdw blurRad="50800" dist="38100" dir="5400000" algn="t" rotWithShape="0">
               <a:prstClr val="black">
@@ -6005,13 +6571,22 @@
           </a:fontRef>
         </p:style>
         <p:txBody>
-          <a:bodyPr/>
+          <a:bodyPr vert="horz" lIns="91440" tIns="45720" rIns="91440" bIns="45720" rtlCol="0" anchor="ctr">
+            <a:normAutofit/>
+          </a:bodyPr>
           <a:lstStyle/>
           <a:p>
             <a:pPr algn="ctr"/>
             <a:r>
-              <a:rPr lang="en-IN" b="1" dirty="0"/>
-              <a:t>3. Sphinx Tool for Auto Documentation</a:t>
+              <a:rPr lang="en-IN" b="1" dirty="0">
+                <a:solidFill>
+                  <a:schemeClr val="lt1"/>
+                </a:solidFill>
+                <a:latin typeface="+mn-lt"/>
+                <a:ea typeface="+mn-ea"/>
+                <a:cs typeface="+mn-cs"/>
+              </a:rPr>
+              <a:t>Database</a:t>
             </a:r>
           </a:p>
         </p:txBody>
@@ -6034,144 +6609,38 @@
         </p:nvSpPr>
         <p:spPr>
           <a:xfrm>
-            <a:off x="838200" y="2836599"/>
-            <a:ext cx="10143062" cy="3154279"/>
+            <a:off x="838200" y="1825625"/>
+            <a:ext cx="7559351" cy="2475788"/>
           </a:xfrm>
         </p:spPr>
         <p:txBody>
           <a:bodyPr>
-            <a:normAutofit fontScale="92500" lnSpcReduction="20000"/>
+            <a:normAutofit fontScale="92500" lnSpcReduction="10000"/>
           </a:bodyPr>
           <a:lstStyle/>
           <a:p>
-            <a:pPr algn="just"/>
             <a:r>
               <a:rPr lang="en-US" dirty="0"/>
-              <a:t>An Open-source third party Tool used for auto documentation.</a:t>
-            </a:r>
-          </a:p>
-          <a:p>
-            <a:pPr algn="just"/>
-            <a:r>
-              <a:rPr lang="en-IN" b="0" i="0" dirty="0">
-                <a:solidFill>
-                  <a:srgbClr val="24292F"/>
-                </a:solidFill>
-                <a:effectLst/>
-                <a:latin typeface="-apple-system"/>
-              </a:rPr>
-              <a:t>Sphinx is a documentation generator written in python language.</a:t>
-            </a:r>
-          </a:p>
-          <a:p>
-            <a:pPr algn="just"/>
-            <a:r>
-              <a:rPr lang="en-IN" dirty="0">
-                <a:solidFill>
-                  <a:srgbClr val="24292F"/>
-                </a:solidFill>
-                <a:latin typeface="-apple-system"/>
-              </a:rPr>
-              <a:t>Implementation of Sphinx tool by creating YAML file executed using “GitHub Actions”.</a:t>
-            </a:r>
-          </a:p>
-          <a:p>
-            <a:pPr algn="just"/>
-            <a:r>
-              <a:rPr lang="en-IN" dirty="0">
-                <a:solidFill>
-                  <a:srgbClr val="24292F"/>
-                </a:solidFill>
-                <a:latin typeface="-apple-system"/>
-              </a:rPr>
-              <a:t>Themes available in the URL below : </a:t>
-            </a:r>
-          </a:p>
-          <a:p>
-            <a:pPr marL="0" indent="0" algn="ctr">
-              <a:buNone/>
-            </a:pPr>
-            <a:r>
-              <a:rPr lang="en-IN" dirty="0">
-                <a:solidFill>
-                  <a:srgbClr val="24292F"/>
-                </a:solidFill>
-                <a:latin typeface="-apple-system"/>
-                <a:hlinkClick r:id="rId2"/>
-              </a:rPr>
-              <a:t>https://www.sphinx-doc.org/en/master/usage/theming.html</a:t>
-            </a:r>
-            <a:endParaRPr lang="en-IN" dirty="0">
-              <a:solidFill>
-                <a:srgbClr val="24292F"/>
-              </a:solidFill>
-              <a:latin typeface="-apple-system"/>
-            </a:endParaRPr>
-          </a:p>
-          <a:p>
-            <a:pPr algn="just"/>
-            <a:r>
-              <a:rPr lang="en-IN" dirty="0">
-                <a:solidFill>
-                  <a:srgbClr val="24292F"/>
-                </a:solidFill>
-                <a:latin typeface="-apple-system"/>
-              </a:rPr>
-              <a:t>Details provided in the Git Wiki link in our repository. Click </a:t>
-            </a:r>
-            <a:r>
-              <a:rPr lang="en-IN" dirty="0">
-                <a:solidFill>
-                  <a:srgbClr val="24292F"/>
-                </a:solidFill>
-                <a:latin typeface="-apple-system"/>
-                <a:hlinkClick r:id="rId3"/>
-              </a:rPr>
-              <a:t>here</a:t>
-            </a:r>
-            <a:r>
-              <a:rPr lang="en-IN" dirty="0">
-                <a:solidFill>
-                  <a:srgbClr val="24292F"/>
-                </a:solidFill>
-                <a:latin typeface="-apple-system"/>
-              </a:rPr>
-              <a:t>.</a:t>
-            </a:r>
-          </a:p>
-          <a:p>
-            <a:pPr algn="just"/>
-            <a:r>
-              <a:rPr lang="en-IN" dirty="0">
-                <a:solidFill>
-                  <a:srgbClr val="24292F"/>
-                </a:solidFill>
-                <a:latin typeface="-apple-system"/>
-              </a:rPr>
-              <a:t>Branch created for auto documentation – ‘</a:t>
-            </a:r>
-            <a:r>
-              <a:rPr lang="en-IN" dirty="0" err="1">
-                <a:solidFill>
-                  <a:srgbClr val="24292F"/>
-                </a:solidFill>
-                <a:latin typeface="-apple-system"/>
-              </a:rPr>
-              <a:t>gh</a:t>
-            </a:r>
-            <a:r>
-              <a:rPr lang="en-IN" dirty="0">
-                <a:solidFill>
-                  <a:srgbClr val="24292F"/>
-                </a:solidFill>
-                <a:latin typeface="-apple-system"/>
-              </a:rPr>
-              <a:t>-pages’ (Default).</a:t>
-            </a:r>
-          </a:p>
-          <a:p>
-            <a:pPr algn="just"/>
-            <a:endParaRPr lang="en-IN" dirty="0"/>
+              <a:t>Database used – MySQL.</a:t>
+            </a:r>
+          </a:p>
+          <a:p>
+            <a:r>
+              <a:rPr lang="en-US" dirty="0"/>
+              <a:t>Initial development and testing done in Local DB.</a:t>
+            </a:r>
+          </a:p>
+          <a:p>
+            <a:r>
+              <a:rPr lang="en-US" dirty="0"/>
+              <a:t>Database used to store the customer data and connect the Front-end (HTML) for access.</a:t>
+            </a:r>
+          </a:p>
+          <a:p>
+            <a:r>
+              <a:rPr lang="en-US" dirty="0"/>
+              <a:t>Third party tools used to develop and run the queries including SQL workbench.</a:t>
+            </a:r>
           </a:p>
         </p:txBody>
       </p:sp>
@@ -6387,7 +6856,7 @@
           <p:cNvPr id="9" name="Picture 8">
             <a:extLst>
               <a:ext uri="{FF2B5EF4-FFF2-40B4-BE49-F238E27FC236}">
-                <a16:creationId xmlns:a16="http://schemas.microsoft.com/office/drawing/2014/main" id="{FE2ECC11-E713-46DD-A8C9-F2FE792FD345}"/>
+                <a16:creationId xmlns:a16="http://schemas.microsoft.com/office/drawing/2014/main" id="{CD354BF4-D155-41FA-AB2F-83D9640FA8B1}"/>
               </a:ext>
             </a:extLst>
           </p:cNvPr>
@@ -6397,25 +6866,246 @@
           <p:nvPr/>
         </p:nvPicPr>
         <p:blipFill>
-          <a:blip r:embed="rId4"/>
+          <a:blip r:embed="rId2"/>
           <a:stretch>
             <a:fillRect/>
           </a:stretch>
         </p:blipFill>
         <p:spPr>
           <a:xfrm>
-            <a:off x="3013010" y="1523359"/>
-            <a:ext cx="5793442" cy="1274966"/>
+            <a:off x="8472197" y="1825624"/>
+            <a:ext cx="2881604" cy="1968191"/>
           </a:xfrm>
           <a:prstGeom prst="rect">
             <a:avLst/>
           </a:prstGeom>
+          <a:noFill/>
+          <a:ln>
+            <a:solidFill>
+              <a:schemeClr val="accent1"/>
+            </a:solidFill>
+          </a:ln>
         </p:spPr>
       </p:pic>
+      <p:sp>
+        <p:nvSpPr>
+          <p:cNvPr id="10" name="Content Placeholder 2">
+            <a:extLst>
+              <a:ext uri="{FF2B5EF4-FFF2-40B4-BE49-F238E27FC236}">
+                <a16:creationId xmlns:a16="http://schemas.microsoft.com/office/drawing/2014/main" id="{1DCCA6E6-4A01-4CEC-907F-4A388BBE9581}"/>
+              </a:ext>
+            </a:extLst>
+          </p:cNvPr>
+          <p:cNvSpPr txBox="1">
+            <a:spLocks/>
+          </p:cNvSpPr>
+          <p:nvPr/>
+        </p:nvSpPr>
+        <p:spPr>
+          <a:xfrm>
+            <a:off x="838200" y="4266323"/>
+            <a:ext cx="10515600" cy="1200734"/>
+          </a:xfrm>
+          <a:prstGeom prst="rect">
+            <a:avLst/>
+          </a:prstGeom>
+        </p:spPr>
+        <p:txBody>
+          <a:bodyPr vert="horz" lIns="91440" tIns="45720" rIns="91440" bIns="45720" rtlCol="0">
+            <a:normAutofit fontScale="92500" lnSpcReduction="10000"/>
+          </a:bodyPr>
+          <a:lstStyle>
+            <a:lvl1pPr marL="228600" indent="-228600" algn="l" defTabSz="914400" rtl="0" eaLnBrk="1" latinLnBrk="0" hangingPunct="1">
+              <a:lnSpc>
+                <a:spcPct val="90000"/>
+              </a:lnSpc>
+              <a:spcBef>
+                <a:spcPts val="1000"/>
+              </a:spcBef>
+              <a:buFont typeface="Arial" panose="020B0604020202020204" pitchFamily="34" charset="0"/>
+              <a:buChar char="•"/>
+              <a:defRPr sz="2800" kern="1200">
+                <a:solidFill>
+                  <a:schemeClr val="tx1"/>
+                </a:solidFill>
+                <a:latin typeface="+mn-lt"/>
+                <a:ea typeface="+mn-ea"/>
+                <a:cs typeface="+mn-cs"/>
+              </a:defRPr>
+            </a:lvl1pPr>
+            <a:lvl2pPr marL="685800" indent="-228600" algn="l" defTabSz="914400" rtl="0" eaLnBrk="1" latinLnBrk="0" hangingPunct="1">
+              <a:lnSpc>
+                <a:spcPct val="90000"/>
+              </a:lnSpc>
+              <a:spcBef>
+                <a:spcPts val="500"/>
+              </a:spcBef>
+              <a:buFont typeface="Arial" panose="020B0604020202020204" pitchFamily="34" charset="0"/>
+              <a:buChar char="•"/>
+              <a:defRPr sz="2400" kern="1200">
+                <a:solidFill>
+                  <a:schemeClr val="tx1"/>
+                </a:solidFill>
+                <a:latin typeface="+mn-lt"/>
+                <a:ea typeface="+mn-ea"/>
+                <a:cs typeface="+mn-cs"/>
+              </a:defRPr>
+            </a:lvl2pPr>
+            <a:lvl3pPr marL="1143000" indent="-228600" algn="l" defTabSz="914400" rtl="0" eaLnBrk="1" latinLnBrk="0" hangingPunct="1">
+              <a:lnSpc>
+                <a:spcPct val="90000"/>
+              </a:lnSpc>
+              <a:spcBef>
+                <a:spcPts val="500"/>
+              </a:spcBef>
+              <a:buFont typeface="Arial" panose="020B0604020202020204" pitchFamily="34" charset="0"/>
+              <a:buChar char="•"/>
+              <a:defRPr sz="2000" kern="1200">
+                <a:solidFill>
+                  <a:schemeClr val="tx1"/>
+                </a:solidFill>
+                <a:latin typeface="+mn-lt"/>
+                <a:ea typeface="+mn-ea"/>
+                <a:cs typeface="+mn-cs"/>
+              </a:defRPr>
+            </a:lvl3pPr>
+            <a:lvl4pPr marL="1600200" indent="-228600" algn="l" defTabSz="914400" rtl="0" eaLnBrk="1" latinLnBrk="0" hangingPunct="1">
+              <a:lnSpc>
+                <a:spcPct val="90000"/>
+              </a:lnSpc>
+              <a:spcBef>
+                <a:spcPts val="500"/>
+              </a:spcBef>
+              <a:buFont typeface="Arial" panose="020B0604020202020204" pitchFamily="34" charset="0"/>
+              <a:buChar char="•"/>
+              <a:defRPr sz="1800" kern="1200">
+                <a:solidFill>
+                  <a:schemeClr val="tx1"/>
+                </a:solidFill>
+                <a:latin typeface="+mn-lt"/>
+                <a:ea typeface="+mn-ea"/>
+                <a:cs typeface="+mn-cs"/>
+              </a:defRPr>
+            </a:lvl4pPr>
+            <a:lvl5pPr marL="2057400" indent="-228600" algn="l" defTabSz="914400" rtl="0" eaLnBrk="1" latinLnBrk="0" hangingPunct="1">
+              <a:lnSpc>
+                <a:spcPct val="90000"/>
+              </a:lnSpc>
+              <a:spcBef>
+                <a:spcPts val="500"/>
+              </a:spcBef>
+              <a:buFont typeface="Arial" panose="020B0604020202020204" pitchFamily="34" charset="0"/>
+              <a:buChar char="•"/>
+              <a:defRPr sz="1800" kern="1200">
+                <a:solidFill>
+                  <a:schemeClr val="tx1"/>
+                </a:solidFill>
+                <a:latin typeface="+mn-lt"/>
+                <a:ea typeface="+mn-ea"/>
+                <a:cs typeface="+mn-cs"/>
+              </a:defRPr>
+            </a:lvl5pPr>
+            <a:lvl6pPr marL="2514600" indent="-228600" algn="l" defTabSz="914400" rtl="0" eaLnBrk="1" latinLnBrk="0" hangingPunct="1">
+              <a:lnSpc>
+                <a:spcPct val="90000"/>
+              </a:lnSpc>
+              <a:spcBef>
+                <a:spcPts val="500"/>
+              </a:spcBef>
+              <a:buFont typeface="Arial" panose="020B0604020202020204" pitchFamily="34" charset="0"/>
+              <a:buChar char="•"/>
+              <a:defRPr sz="1800" kern="1200">
+                <a:solidFill>
+                  <a:schemeClr val="tx1"/>
+                </a:solidFill>
+                <a:latin typeface="+mn-lt"/>
+                <a:ea typeface="+mn-ea"/>
+                <a:cs typeface="+mn-cs"/>
+              </a:defRPr>
+            </a:lvl6pPr>
+            <a:lvl7pPr marL="2971800" indent="-228600" algn="l" defTabSz="914400" rtl="0" eaLnBrk="1" latinLnBrk="0" hangingPunct="1">
+              <a:lnSpc>
+                <a:spcPct val="90000"/>
+              </a:lnSpc>
+              <a:spcBef>
+                <a:spcPts val="500"/>
+              </a:spcBef>
+              <a:buFont typeface="Arial" panose="020B0604020202020204" pitchFamily="34" charset="0"/>
+              <a:buChar char="•"/>
+              <a:defRPr sz="1800" kern="1200">
+                <a:solidFill>
+                  <a:schemeClr val="tx1"/>
+                </a:solidFill>
+                <a:latin typeface="+mn-lt"/>
+                <a:ea typeface="+mn-ea"/>
+                <a:cs typeface="+mn-cs"/>
+              </a:defRPr>
+            </a:lvl7pPr>
+            <a:lvl8pPr marL="3429000" indent="-228600" algn="l" defTabSz="914400" rtl="0" eaLnBrk="1" latinLnBrk="0" hangingPunct="1">
+              <a:lnSpc>
+                <a:spcPct val="90000"/>
+              </a:lnSpc>
+              <a:spcBef>
+                <a:spcPts val="500"/>
+              </a:spcBef>
+              <a:buFont typeface="Arial" panose="020B0604020202020204" pitchFamily="34" charset="0"/>
+              <a:buChar char="•"/>
+              <a:defRPr sz="1800" kern="1200">
+                <a:solidFill>
+                  <a:schemeClr val="tx1"/>
+                </a:solidFill>
+                <a:latin typeface="+mn-lt"/>
+                <a:ea typeface="+mn-ea"/>
+                <a:cs typeface="+mn-cs"/>
+              </a:defRPr>
+            </a:lvl8pPr>
+            <a:lvl9pPr marL="3886200" indent="-228600" algn="l" defTabSz="914400" rtl="0" eaLnBrk="1" latinLnBrk="0" hangingPunct="1">
+              <a:lnSpc>
+                <a:spcPct val="90000"/>
+              </a:lnSpc>
+              <a:spcBef>
+                <a:spcPts val="500"/>
+              </a:spcBef>
+              <a:buFont typeface="Arial" panose="020B0604020202020204" pitchFamily="34" charset="0"/>
+              <a:buChar char="•"/>
+              <a:defRPr sz="1800" kern="1200">
+                <a:solidFill>
+                  <a:schemeClr val="tx1"/>
+                </a:solidFill>
+                <a:latin typeface="+mn-lt"/>
+                <a:ea typeface="+mn-ea"/>
+                <a:cs typeface="+mn-cs"/>
+              </a:defRPr>
+            </a:lvl9pPr>
+          </a:lstStyle>
+          <a:p>
+            <a:r>
+              <a:rPr lang="en-US" dirty="0"/>
+              <a:t>Pre-requisites – Installation of MySQL Server.</a:t>
+            </a:r>
+          </a:p>
+          <a:p>
+            <a:r>
+              <a:rPr lang="en-US" dirty="0"/>
+              <a:t>Higher environment testing done in free and open-source MySQL hosting website configured by : </a:t>
+            </a:r>
+            <a:r>
+              <a:rPr lang="en-US" dirty="0">
+                <a:hlinkClick r:id="rId3"/>
+              </a:rPr>
+              <a:t>https://www.freemysqlhosting.net</a:t>
+            </a:r>
+            <a:r>
+              <a:rPr lang="en-US" dirty="0"/>
+              <a:t>.</a:t>
+            </a:r>
+          </a:p>
+        </p:txBody>
+      </p:sp>
     </p:spTree>
     <p:extLst>
       <p:ext uri="{BB962C8B-B14F-4D97-AF65-F5344CB8AC3E}">
-        <p14:creationId xmlns:p14="http://schemas.microsoft.com/office/powerpoint/2010/main" val="2108658942"/>
+        <p14:creationId xmlns:p14="http://schemas.microsoft.com/office/powerpoint/2010/main" val="939528484"/>
       </p:ext>
     </p:extLst>
   </p:cSld>
@@ -6458,14 +7148,41 @@
             <p:ph type="title"/>
           </p:nvPr>
         </p:nvSpPr>
-        <p:spPr/>
+        <p:spPr>
+          <a:xfrm>
+            <a:off x="838200" y="365125"/>
+            <a:ext cx="10515600" cy="1119961"/>
+          </a:xfrm>
+          <a:effectLst>
+            <a:outerShdw blurRad="50800" dist="38100" dir="5400000" algn="t" rotWithShape="0">
+              <a:prstClr val="black">
+                <a:alpha val="40000"/>
+              </a:prstClr>
+            </a:outerShdw>
+          </a:effectLst>
+        </p:spPr>
+        <p:style>
+          <a:lnRef idx="3">
+            <a:schemeClr val="lt1"/>
+          </a:lnRef>
+          <a:fillRef idx="1">
+            <a:schemeClr val="accent5"/>
+          </a:fillRef>
+          <a:effectRef idx="1">
+            <a:schemeClr val="accent5"/>
+          </a:effectRef>
+          <a:fontRef idx="minor">
+            <a:schemeClr val="lt1"/>
+          </a:fontRef>
+        </p:style>
         <p:txBody>
           <a:bodyPr/>
           <a:lstStyle/>
           <a:p>
+            <a:pPr algn="ctr"/>
             <a:r>
               <a:rPr lang="en-IN" b="1" dirty="0"/>
-              <a:t>4. CONCLUSION</a:t>
+              <a:t>3. Sphinx Tool for Auto Documentation</a:t>
             </a:r>
           </a:p>
         </p:txBody>
@@ -6486,12 +7203,146 @@
             <p:ph idx="1"/>
           </p:nvPr>
         </p:nvSpPr>
-        <p:spPr/>
-        <p:txBody>
-          <a:bodyPr/>
-          <a:lstStyle/>
-          <a:p>
-            <a:endParaRPr lang="en-IN"/>
+        <p:spPr>
+          <a:xfrm>
+            <a:off x="838200" y="2836599"/>
+            <a:ext cx="10143062" cy="3154279"/>
+          </a:xfrm>
+        </p:spPr>
+        <p:txBody>
+          <a:bodyPr>
+            <a:normAutofit fontScale="92500" lnSpcReduction="20000"/>
+          </a:bodyPr>
+          <a:lstStyle/>
+          <a:p>
+            <a:pPr algn="just"/>
+            <a:r>
+              <a:rPr lang="en-US" dirty="0"/>
+              <a:t>An Open-source third party Tool used for auto documentation.</a:t>
+            </a:r>
+          </a:p>
+          <a:p>
+            <a:pPr algn="just"/>
+            <a:r>
+              <a:rPr lang="en-IN" b="0" i="0" dirty="0">
+                <a:solidFill>
+                  <a:srgbClr val="24292F"/>
+                </a:solidFill>
+                <a:effectLst/>
+                <a:latin typeface="-apple-system"/>
+              </a:rPr>
+              <a:t>Sphinx is a documentation generator written in python language.</a:t>
+            </a:r>
+          </a:p>
+          <a:p>
+            <a:pPr algn="just"/>
+            <a:r>
+              <a:rPr lang="en-IN" dirty="0">
+                <a:solidFill>
+                  <a:srgbClr val="24292F"/>
+                </a:solidFill>
+                <a:latin typeface="-apple-system"/>
+              </a:rPr>
+              <a:t>Implementation of Sphinx tool by creating YAML file executed using “GitHub Actions”.</a:t>
+            </a:r>
+          </a:p>
+          <a:p>
+            <a:pPr algn="just"/>
+            <a:r>
+              <a:rPr lang="en-IN" dirty="0">
+                <a:solidFill>
+                  <a:srgbClr val="24292F"/>
+                </a:solidFill>
+                <a:latin typeface="-apple-system"/>
+              </a:rPr>
+              <a:t>Themes available in the URL below : </a:t>
+            </a:r>
+          </a:p>
+          <a:p>
+            <a:pPr marL="0" indent="0" algn="ctr">
+              <a:buNone/>
+            </a:pPr>
+            <a:r>
+              <a:rPr lang="en-IN" dirty="0">
+                <a:solidFill>
+                  <a:srgbClr val="24292F"/>
+                </a:solidFill>
+                <a:latin typeface="-apple-system"/>
+                <a:hlinkClick r:id="rId2"/>
+              </a:rPr>
+              <a:t>https://www.sphinx-doc.org/en/master/usage/theming.html</a:t>
+            </a:r>
+            <a:endParaRPr lang="en-IN" dirty="0">
+              <a:solidFill>
+                <a:srgbClr val="24292F"/>
+              </a:solidFill>
+              <a:latin typeface="-apple-system"/>
+            </a:endParaRPr>
+          </a:p>
+          <a:p>
+            <a:pPr algn="just"/>
+            <a:r>
+              <a:rPr lang="en-IN" dirty="0">
+                <a:solidFill>
+                  <a:srgbClr val="24292F"/>
+                </a:solidFill>
+                <a:latin typeface="-apple-system"/>
+              </a:rPr>
+              <a:t>Details provided in the Git Wiki link in our repository. Click </a:t>
+            </a:r>
+            <a:r>
+              <a:rPr lang="en-IN" dirty="0">
+                <a:solidFill>
+                  <a:srgbClr val="24292F"/>
+                </a:solidFill>
+                <a:latin typeface="-apple-system"/>
+                <a:hlinkClick r:id="rId3"/>
+              </a:rPr>
+              <a:t>here</a:t>
+            </a:r>
+            <a:r>
+              <a:rPr lang="en-IN" dirty="0">
+                <a:solidFill>
+                  <a:srgbClr val="24292F"/>
+                </a:solidFill>
+                <a:latin typeface="-apple-system"/>
+              </a:rPr>
+              <a:t>.</a:t>
+            </a:r>
+          </a:p>
+          <a:p>
+            <a:pPr algn="just"/>
+            <a:r>
+              <a:rPr lang="en-IN" dirty="0">
+                <a:solidFill>
+                  <a:srgbClr val="24292F"/>
+                </a:solidFill>
+                <a:latin typeface="-apple-system"/>
+              </a:rPr>
+              <a:t>Branch created for auto documentation – ‘</a:t>
+            </a:r>
+            <a:r>
+              <a:rPr lang="en-IN" dirty="0" err="1">
+                <a:solidFill>
+                  <a:srgbClr val="24292F"/>
+                </a:solidFill>
+                <a:latin typeface="-apple-system"/>
+              </a:rPr>
+              <a:t>gh</a:t>
+            </a:r>
+            <a:r>
+              <a:rPr lang="en-IN" dirty="0">
+                <a:solidFill>
+                  <a:srgbClr val="24292F"/>
+                </a:solidFill>
+                <a:latin typeface="-apple-system"/>
+              </a:rPr>
+              <a:t>-pages’ (Default).</a:t>
+            </a:r>
+          </a:p>
+          <a:p>
+            <a:pPr algn="just"/>
+            <a:endParaRPr lang="en-IN" dirty="0"/>
           </a:p>
         </p:txBody>
       </p:sp>
@@ -6702,10 +7553,40 @@
           </a:p>
         </p:txBody>
       </p:sp>
+      <p:pic>
+        <p:nvPicPr>
+          <p:cNvPr id="9" name="Picture 8">
+            <a:extLst>
+              <a:ext uri="{FF2B5EF4-FFF2-40B4-BE49-F238E27FC236}">
+                <a16:creationId xmlns:a16="http://schemas.microsoft.com/office/drawing/2014/main" id="{FE2ECC11-E713-46DD-A8C9-F2FE792FD345}"/>
+              </a:ext>
+            </a:extLst>
+          </p:cNvPr>
+          <p:cNvPicPr>
+            <a:picLocks noChangeAspect="1"/>
+          </p:cNvPicPr>
+          <p:nvPr/>
+        </p:nvPicPr>
+        <p:blipFill>
+          <a:blip r:embed="rId4"/>
+          <a:stretch>
+            <a:fillRect/>
+          </a:stretch>
+        </p:blipFill>
+        <p:spPr>
+          <a:xfrm>
+            <a:off x="3013010" y="1523359"/>
+            <a:ext cx="5793442" cy="1274966"/>
+          </a:xfrm>
+          <a:prstGeom prst="rect">
+            <a:avLst/>
+          </a:prstGeom>
+        </p:spPr>
+      </p:pic>
     </p:spTree>
     <p:extLst>
       <p:ext uri="{BB962C8B-B14F-4D97-AF65-F5344CB8AC3E}">
-        <p14:creationId xmlns:p14="http://schemas.microsoft.com/office/powerpoint/2010/main" val="2907635473"/>
+        <p14:creationId xmlns:p14="http://schemas.microsoft.com/office/powerpoint/2010/main" val="2108658942"/>
       </p:ext>
     </p:extLst>
   </p:cSld>
@@ -6734,6 +7615,96 @@
       </p:grpSpPr>
       <p:sp>
         <p:nvSpPr>
+          <p:cNvPr id="2" name="Title 1">
+            <a:extLst>
+              <a:ext uri="{FF2B5EF4-FFF2-40B4-BE49-F238E27FC236}">
+                <a16:creationId xmlns:a16="http://schemas.microsoft.com/office/drawing/2014/main" id="{C0666519-3484-48F3-927E-47679DE94711}"/>
+              </a:ext>
+            </a:extLst>
+          </p:cNvPr>
+          <p:cNvSpPr>
+            <a:spLocks noGrp="1"/>
+          </p:cNvSpPr>
+          <p:nvPr>
+            <p:ph type="title"/>
+          </p:nvPr>
+        </p:nvSpPr>
+        <p:spPr>
+          <a:effectLst>
+            <a:outerShdw blurRad="50800" dist="38100" dir="5400000" algn="t" rotWithShape="0">
+              <a:prstClr val="black">
+                <a:alpha val="40000"/>
+              </a:prstClr>
+            </a:outerShdw>
+          </a:effectLst>
+        </p:spPr>
+        <p:style>
+          <a:lnRef idx="3">
+            <a:schemeClr val="lt1"/>
+          </a:lnRef>
+          <a:fillRef idx="1">
+            <a:schemeClr val="accent5"/>
+          </a:fillRef>
+          <a:effectRef idx="1">
+            <a:schemeClr val="accent5"/>
+          </a:effectRef>
+          <a:fontRef idx="minor">
+            <a:schemeClr val="lt1"/>
+          </a:fontRef>
+        </p:style>
+        <p:txBody>
+          <a:bodyPr vert="horz" lIns="91440" tIns="45720" rIns="91440" bIns="45720" rtlCol="0" anchor="ctr">
+            <a:normAutofit/>
+          </a:bodyPr>
+          <a:lstStyle/>
+          <a:p>
+            <a:pPr algn="ctr"/>
+            <a:r>
+              <a:rPr lang="en-IN" b="1" dirty="0">
+                <a:solidFill>
+                  <a:schemeClr val="lt1"/>
+                </a:solidFill>
+                <a:latin typeface="+mn-lt"/>
+                <a:ea typeface="+mn-ea"/>
+                <a:cs typeface="+mn-cs"/>
+              </a:rPr>
+              <a:t>Git Wiki for User guide and Instructions</a:t>
+            </a:r>
+          </a:p>
+        </p:txBody>
+      </p:sp>
+      <p:sp>
+        <p:nvSpPr>
+          <p:cNvPr id="3" name="Content Placeholder 2">
+            <a:extLst>
+              <a:ext uri="{FF2B5EF4-FFF2-40B4-BE49-F238E27FC236}">
+                <a16:creationId xmlns:a16="http://schemas.microsoft.com/office/drawing/2014/main" id="{D3F11377-6BB3-4E47-B174-861CD150A86B}"/>
+              </a:ext>
+            </a:extLst>
+          </p:cNvPr>
+          <p:cNvSpPr>
+            <a:spLocks noGrp="1"/>
+          </p:cNvSpPr>
+          <p:nvPr>
+            <p:ph idx="1"/>
+          </p:nvPr>
+        </p:nvSpPr>
+        <p:spPr>
+          <a:xfrm>
+            <a:off x="838200" y="1825625"/>
+            <a:ext cx="10515600" cy="4061991"/>
+          </a:xfrm>
+        </p:spPr>
+        <p:txBody>
+          <a:bodyPr/>
+          <a:lstStyle/>
+          <a:p>
+            <a:endParaRPr lang="en-IN" dirty="0"/>
+          </a:p>
+        </p:txBody>
+      </p:sp>
+      <p:sp>
+        <p:nvSpPr>
           <p:cNvPr id="4" name="Rectangle 3">
             <a:extLst>
               <a:ext uri="{FF2B5EF4-FFF2-40B4-BE49-F238E27FC236}">
@@ -6939,57 +7910,10 @@
           </a:p>
         </p:txBody>
       </p:sp>
-      <p:pic>
-        <p:nvPicPr>
-          <p:cNvPr id="2050" name="Picture 2" descr="See the source image">
-            <a:extLst>
-              <a:ext uri="{FF2B5EF4-FFF2-40B4-BE49-F238E27FC236}">
-                <a16:creationId xmlns:a16="http://schemas.microsoft.com/office/drawing/2014/main" id="{B5B67862-A69F-498B-B814-F7947A0A1E0A}"/>
-              </a:ext>
-            </a:extLst>
-          </p:cNvPr>
-          <p:cNvPicPr>
-            <a:picLocks noChangeAspect="1" noChangeArrowheads="1"/>
-          </p:cNvPicPr>
-          <p:nvPr/>
-        </p:nvPicPr>
-        <p:blipFill>
-          <a:blip r:embed="rId2">
-            <a:extLst>
-              <a:ext uri="{28A0092B-C50C-407E-A947-70E740481C1C}">
-                <a14:useLocalDpi xmlns:a14="http://schemas.microsoft.com/office/drawing/2010/main" val="0"/>
-              </a:ext>
-            </a:extLst>
-          </a:blip>
-          <a:srcRect/>
-          <a:stretch>
-            <a:fillRect/>
-          </a:stretch>
-        </p:blipFill>
-        <p:spPr bwMode="auto">
-          <a:xfrm>
-            <a:off x="0" y="0"/>
-            <a:ext cx="12192000" cy="6067421"/>
-          </a:xfrm>
-          <a:prstGeom prst="rect">
-            <a:avLst/>
-          </a:prstGeom>
-          <a:noFill/>
-          <a:extLst>
-            <a:ext uri="{909E8E84-426E-40DD-AFC4-6F175D3DCCD1}">
-              <a14:hiddenFill xmlns:a14="http://schemas.microsoft.com/office/drawing/2010/main">
-                <a:solidFill>
-                  <a:srgbClr val="FFFFFF"/>
-                </a:solidFill>
-              </a14:hiddenFill>
-            </a:ext>
-          </a:extLst>
-        </p:spPr>
-      </p:pic>
     </p:spTree>
     <p:extLst>
       <p:ext uri="{BB962C8B-B14F-4D97-AF65-F5344CB8AC3E}">
-        <p14:creationId xmlns:p14="http://schemas.microsoft.com/office/powerpoint/2010/main" val="2087571555"/>
+        <p14:creationId xmlns:p14="http://schemas.microsoft.com/office/powerpoint/2010/main" val="2907635473"/>
       </p:ext>
     </p:extLst>
   </p:cSld>
@@ -7018,6 +7942,59 @@
       </p:grpSpPr>
       <p:sp>
         <p:nvSpPr>
+          <p:cNvPr id="2" name="Title 1">
+            <a:extLst>
+              <a:ext uri="{FF2B5EF4-FFF2-40B4-BE49-F238E27FC236}">
+                <a16:creationId xmlns:a16="http://schemas.microsoft.com/office/drawing/2014/main" id="{C0666519-3484-48F3-927E-47679DE94711}"/>
+              </a:ext>
+            </a:extLst>
+          </p:cNvPr>
+          <p:cNvSpPr>
+            <a:spLocks noGrp="1"/>
+          </p:cNvSpPr>
+          <p:nvPr>
+            <p:ph type="title"/>
+          </p:nvPr>
+        </p:nvSpPr>
+        <p:spPr/>
+        <p:txBody>
+          <a:bodyPr/>
+          <a:lstStyle/>
+          <a:p>
+            <a:r>
+              <a:rPr lang="en-IN" b="1" dirty="0"/>
+              <a:t>4. CONCLUSION</a:t>
+            </a:r>
+          </a:p>
+        </p:txBody>
+      </p:sp>
+      <p:sp>
+        <p:nvSpPr>
+          <p:cNvPr id="3" name="Content Placeholder 2">
+            <a:extLst>
+              <a:ext uri="{FF2B5EF4-FFF2-40B4-BE49-F238E27FC236}">
+                <a16:creationId xmlns:a16="http://schemas.microsoft.com/office/drawing/2014/main" id="{D3F11377-6BB3-4E47-B174-861CD150A86B}"/>
+              </a:ext>
+            </a:extLst>
+          </p:cNvPr>
+          <p:cNvSpPr>
+            <a:spLocks noGrp="1"/>
+          </p:cNvSpPr>
+          <p:nvPr>
+            <p:ph idx="1"/>
+          </p:nvPr>
+        </p:nvSpPr>
+        <p:spPr/>
+        <p:txBody>
+          <a:bodyPr/>
+          <a:lstStyle/>
+          <a:p>
+            <a:endParaRPr lang="en-IN"/>
+          </a:p>
+        </p:txBody>
+      </p:sp>
+      <p:sp>
+        <p:nvSpPr>
           <p:cNvPr id="4" name="Rectangle 3">
             <a:extLst>
               <a:ext uri="{FF2B5EF4-FFF2-40B4-BE49-F238E27FC236}">
@@ -7223,57 +8200,10 @@
           </a:p>
         </p:txBody>
       </p:sp>
-      <p:pic>
-        <p:nvPicPr>
-          <p:cNvPr id="1026" name="Picture 2" descr="See the source image">
-            <a:extLst>
-              <a:ext uri="{FF2B5EF4-FFF2-40B4-BE49-F238E27FC236}">
-                <a16:creationId xmlns:a16="http://schemas.microsoft.com/office/drawing/2014/main" id="{543FEFA3-C29F-4D2A-9A5C-7218104852CA}"/>
-              </a:ext>
-            </a:extLst>
-          </p:cNvPr>
-          <p:cNvPicPr>
-            <a:picLocks noChangeAspect="1" noChangeArrowheads="1"/>
-          </p:cNvPicPr>
-          <p:nvPr/>
-        </p:nvPicPr>
-        <p:blipFill>
-          <a:blip r:embed="rId2">
-            <a:extLst>
-              <a:ext uri="{28A0092B-C50C-407E-A947-70E740481C1C}">
-                <a14:useLocalDpi xmlns:a14="http://schemas.microsoft.com/office/drawing/2010/main" val="0"/>
-              </a:ext>
-            </a:extLst>
-          </a:blip>
-          <a:srcRect/>
-          <a:stretch>
-            <a:fillRect/>
-          </a:stretch>
-        </p:blipFill>
-        <p:spPr bwMode="auto">
-          <a:xfrm>
-            <a:off x="3338512" y="911541"/>
-            <a:ext cx="5514975" cy="3860483"/>
-          </a:xfrm>
-          <a:prstGeom prst="rect">
-            <a:avLst/>
-          </a:prstGeom>
-          <a:noFill/>
-          <a:extLst>
-            <a:ext uri="{909E8E84-426E-40DD-AFC4-6F175D3DCCD1}">
-              <a14:hiddenFill xmlns:a14="http://schemas.microsoft.com/office/drawing/2010/main">
-                <a:solidFill>
-                  <a:srgbClr val="FFFFFF"/>
-                </a:solidFill>
-              </a14:hiddenFill>
-            </a:ext>
-          </a:extLst>
-        </p:spPr>
-      </p:pic>
     </p:spTree>
     <p:extLst>
       <p:ext uri="{BB962C8B-B14F-4D97-AF65-F5344CB8AC3E}">
-        <p14:creationId xmlns:p14="http://schemas.microsoft.com/office/powerpoint/2010/main" val="3209703990"/>
+        <p14:creationId xmlns:p14="http://schemas.microsoft.com/office/powerpoint/2010/main" val="4193434119"/>
       </p:ext>
     </p:extLst>
   </p:cSld>

</xml_diff>

<commit_message>
Updated the Presentation ppt document with HTML, CSS, GitHub, Git Wiki pages
</commit_message>
<xml_diff>
--- a/Wicked Adventures.pptx
+++ b/Wicked Adventures.pptx
@@ -5,7 +5,7 @@
     <p:sldMasterId id="2147483648" r:id="rId1"/>
   </p:sldMasterIdLst>
   <p:notesMasterIdLst>
-    <p:notesMasterId r:id="rId13"/>
+    <p:notesMasterId r:id="rId15"/>
   </p:notesMasterIdLst>
   <p:sldIdLst>
     <p:sldId id="258" r:id="rId2"/>
@@ -14,11 +14,13 @@
     <p:sldId id="261" r:id="rId5"/>
     <p:sldId id="266" r:id="rId6"/>
     <p:sldId id="268" r:id="rId7"/>
-    <p:sldId id="265" r:id="rId8"/>
-    <p:sldId id="262" r:id="rId9"/>
-    <p:sldId id="267" r:id="rId10"/>
-    <p:sldId id="264" r:id="rId11"/>
-    <p:sldId id="263" r:id="rId12"/>
+    <p:sldId id="262" r:id="rId8"/>
+    <p:sldId id="269" r:id="rId9"/>
+    <p:sldId id="265" r:id="rId10"/>
+    <p:sldId id="270" r:id="rId11"/>
+    <p:sldId id="267" r:id="rId12"/>
+    <p:sldId id="264" r:id="rId13"/>
+    <p:sldId id="263" r:id="rId14"/>
   </p:sldIdLst>
   <p:sldSz cx="12192000" cy="6858000"/>
   <p:notesSz cx="6858000" cy="9144000"/>
@@ -4467,6 +4469,103 @@
       </p:grpSpPr>
       <p:sp>
         <p:nvSpPr>
+          <p:cNvPr id="2" name="Title 1">
+            <a:extLst>
+              <a:ext uri="{FF2B5EF4-FFF2-40B4-BE49-F238E27FC236}">
+                <a16:creationId xmlns:a16="http://schemas.microsoft.com/office/drawing/2014/main" id="{C0666519-3484-48F3-927E-47679DE94711}"/>
+              </a:ext>
+            </a:extLst>
+          </p:cNvPr>
+          <p:cNvSpPr>
+            <a:spLocks noGrp="1"/>
+          </p:cNvSpPr>
+          <p:nvPr>
+            <p:ph type="title"/>
+          </p:nvPr>
+        </p:nvSpPr>
+        <p:spPr>
+          <a:effectLst>
+            <a:outerShdw blurRad="50800" dist="38100" dir="5400000" algn="t" rotWithShape="0">
+              <a:prstClr val="black">
+                <a:alpha val="40000"/>
+              </a:prstClr>
+            </a:outerShdw>
+          </a:effectLst>
+        </p:spPr>
+        <p:style>
+          <a:lnRef idx="3">
+            <a:schemeClr val="lt1"/>
+          </a:lnRef>
+          <a:fillRef idx="1">
+            <a:schemeClr val="accent5"/>
+          </a:fillRef>
+          <a:effectRef idx="1">
+            <a:schemeClr val="accent5"/>
+          </a:effectRef>
+          <a:fontRef idx="minor">
+            <a:schemeClr val="lt1"/>
+          </a:fontRef>
+        </p:style>
+        <p:txBody>
+          <a:bodyPr vert="horz" lIns="91440" tIns="45720" rIns="91440" bIns="45720" rtlCol="0" anchor="ctr">
+            <a:normAutofit/>
+          </a:bodyPr>
+          <a:lstStyle/>
+          <a:p>
+            <a:pPr algn="ctr"/>
+            <a:r>
+              <a:rPr lang="en-IN" b="1" dirty="0">
+                <a:solidFill>
+                  <a:schemeClr val="lt1"/>
+                </a:solidFill>
+                <a:latin typeface="+mn-lt"/>
+                <a:ea typeface="+mn-ea"/>
+                <a:cs typeface="+mn-cs"/>
+              </a:rPr>
+              <a:t>Git Wiki for User guides and Instructions</a:t>
+            </a:r>
+          </a:p>
+        </p:txBody>
+      </p:sp>
+      <p:sp>
+        <p:nvSpPr>
+          <p:cNvPr id="3" name="Content Placeholder 2">
+            <a:extLst>
+              <a:ext uri="{FF2B5EF4-FFF2-40B4-BE49-F238E27FC236}">
+                <a16:creationId xmlns:a16="http://schemas.microsoft.com/office/drawing/2014/main" id="{D3F11377-6BB3-4E47-B174-861CD150A86B}"/>
+              </a:ext>
+            </a:extLst>
+          </p:cNvPr>
+          <p:cNvSpPr>
+            <a:spLocks noGrp="1"/>
+          </p:cNvSpPr>
+          <p:nvPr>
+            <p:ph idx="1"/>
+          </p:nvPr>
+        </p:nvSpPr>
+        <p:spPr>
+          <a:xfrm>
+            <a:off x="838201" y="1838325"/>
+            <a:ext cx="6286500" cy="1462623"/>
+          </a:xfrm>
+        </p:spPr>
+        <p:txBody>
+          <a:bodyPr>
+            <a:normAutofit/>
+          </a:bodyPr>
+          <a:lstStyle/>
+          <a:p>
+            <a:pPr algn="just"/>
+            <a:r>
+              <a:rPr lang="en-US" dirty="0"/>
+              <a:t>Platform provided by Git for adding documentation for the projects hosted in the GitHub repository.</a:t>
+            </a:r>
+            <a:endParaRPr lang="en-IN" dirty="0"/>
+          </a:p>
+        </p:txBody>
+      </p:sp>
+      <p:sp>
+        <p:nvSpPr>
           <p:cNvPr id="4" name="Rectangle 3">
             <a:extLst>
               <a:ext uri="{FF2B5EF4-FFF2-40B4-BE49-F238E27FC236}">
@@ -4672,57 +4771,297 @@
           </a:p>
         </p:txBody>
       </p:sp>
-      <p:pic>
-        <p:nvPicPr>
-          <p:cNvPr id="2050" name="Picture 2" descr="See the source image">
-            <a:extLst>
-              <a:ext uri="{FF2B5EF4-FFF2-40B4-BE49-F238E27FC236}">
-                <a16:creationId xmlns:a16="http://schemas.microsoft.com/office/drawing/2014/main" id="{B5B67862-A69F-498B-B814-F7947A0A1E0A}"/>
-              </a:ext>
-            </a:extLst>
-          </p:cNvPr>
-          <p:cNvPicPr>
-            <a:picLocks noChangeAspect="1" noChangeArrowheads="1"/>
-          </p:cNvPicPr>
+      <p:graphicFrame>
+        <p:nvGraphicFramePr>
+          <p:cNvPr id="11" name="Object 10">
+            <a:extLst>
+              <a:ext uri="{FF2B5EF4-FFF2-40B4-BE49-F238E27FC236}">
+                <a16:creationId xmlns:a16="http://schemas.microsoft.com/office/drawing/2014/main" id="{12EA8B24-4EBE-4014-8569-FB3930D32E1E}"/>
+              </a:ext>
+            </a:extLst>
+          </p:cNvPr>
+          <p:cNvGraphicFramePr>
+            <a:graphicFrameLocks noChangeAspect="1"/>
+          </p:cNvGraphicFramePr>
+          <p:nvPr>
+            <p:extLst>
+              <p:ext uri="{D42A27DB-BD31-4B8C-83A1-F6EECF244321}">
+                <p14:modId xmlns:p14="http://schemas.microsoft.com/office/powerpoint/2010/main" val="2205120546"/>
+              </p:ext>
+            </p:extLst>
+          </p:nvPr>
+        </p:nvGraphicFramePr>
+        <p:xfrm>
+          <a:off x="7353299" y="1809750"/>
+          <a:ext cx="4000500" cy="1372136"/>
+        </p:xfrm>
+        <a:graphic>
+          <a:graphicData uri="http://schemas.openxmlformats.org/presentationml/2006/ole">
+            <mc:AlternateContent xmlns:mc="http://schemas.openxmlformats.org/markup-compatibility/2006">
+              <mc:Choice xmlns:v="urn:schemas-microsoft-com:vml" Requires="v">
+                <p:oleObj spid="_x0000_s3081" name="Bitmap Image" r:id="rId3" imgW="5753160" imgH="1973520" progId="Paint.Picture">
+                  <p:embed/>
+                </p:oleObj>
+              </mc:Choice>
+              <mc:Fallback>
+                <p:oleObj name="Bitmap Image" r:id="rId3" imgW="5753160" imgH="1973520" progId="Paint.Picture">
+                  <p:embed/>
+                  <p:pic>
+                    <p:nvPicPr>
+                      <p:cNvPr id="0" name=""/>
+                      <p:cNvPicPr/>
+                      <p:nvPr/>
+                    </p:nvPicPr>
+                    <p:blipFill>
+                      <a:blip r:embed="rId4"/>
+                      <a:stretch>
+                        <a:fillRect/>
+                      </a:stretch>
+                    </p:blipFill>
+                    <p:spPr>
+                      <a:xfrm>
+                        <a:off x="7353299" y="1809750"/>
+                        <a:ext cx="4000500" cy="1372136"/>
+                      </a:xfrm>
+                      <a:prstGeom prst="rect">
+                        <a:avLst/>
+                      </a:prstGeom>
+                    </p:spPr>
+                  </p:pic>
+                </p:oleObj>
+              </mc:Fallback>
+            </mc:AlternateContent>
+          </a:graphicData>
+        </a:graphic>
+      </p:graphicFrame>
+      <p:sp>
+        <p:nvSpPr>
+          <p:cNvPr id="12" name="Content Placeholder 2">
+            <a:extLst>
+              <a:ext uri="{FF2B5EF4-FFF2-40B4-BE49-F238E27FC236}">
+                <a16:creationId xmlns:a16="http://schemas.microsoft.com/office/drawing/2014/main" id="{B41F066D-3B95-4D7F-80B5-56A702725804}"/>
+              </a:ext>
+            </a:extLst>
+          </p:cNvPr>
+          <p:cNvSpPr txBox="1">
+            <a:spLocks/>
+          </p:cNvSpPr>
           <p:nvPr/>
-        </p:nvPicPr>
-        <p:blipFill>
-          <a:blip r:embed="rId2">
-            <a:extLst>
-              <a:ext uri="{28A0092B-C50C-407E-A947-70E740481C1C}">
-                <a14:useLocalDpi xmlns:a14="http://schemas.microsoft.com/office/drawing/2010/main" val="0"/>
-              </a:ext>
-            </a:extLst>
-          </a:blip>
-          <a:srcRect/>
-          <a:stretch>
-            <a:fillRect/>
-          </a:stretch>
-        </p:blipFill>
-        <p:spPr bwMode="auto">
-          <a:xfrm>
-            <a:off x="0" y="0"/>
-            <a:ext cx="12192000" cy="6067421"/>
+        </p:nvSpPr>
+        <p:spPr>
+          <a:xfrm>
+            <a:off x="828674" y="3115212"/>
+            <a:ext cx="10525125" cy="2833151"/>
           </a:xfrm>
           <a:prstGeom prst="rect">
             <a:avLst/>
           </a:prstGeom>
-          <a:noFill/>
-          <a:extLst>
-            <a:ext uri="{909E8E84-426E-40DD-AFC4-6F175D3DCCD1}">
-              <a14:hiddenFill xmlns:a14="http://schemas.microsoft.com/office/drawing/2010/main">
+        </p:spPr>
+        <p:txBody>
+          <a:bodyPr vert="horz" lIns="91440" tIns="45720" rIns="91440" bIns="45720" rtlCol="0">
+            <a:normAutofit/>
+          </a:bodyPr>
+          <a:lstStyle>
+            <a:lvl1pPr marL="228600" indent="-228600" algn="l" defTabSz="914400" rtl="0" eaLnBrk="1" latinLnBrk="0" hangingPunct="1">
+              <a:lnSpc>
+                <a:spcPct val="90000"/>
+              </a:lnSpc>
+              <a:spcBef>
+                <a:spcPts val="1000"/>
+              </a:spcBef>
+              <a:buFont typeface="Arial" panose="020B0604020202020204" pitchFamily="34" charset="0"/>
+              <a:buChar char="•"/>
+              <a:defRPr sz="2800" kern="1200">
                 <a:solidFill>
-                  <a:srgbClr val="FFFFFF"/>
+                  <a:schemeClr val="tx1"/>
                 </a:solidFill>
-              </a14:hiddenFill>
-            </a:ext>
-          </a:extLst>
-        </p:spPr>
-      </p:pic>
+                <a:latin typeface="+mn-lt"/>
+                <a:ea typeface="+mn-ea"/>
+                <a:cs typeface="+mn-cs"/>
+              </a:defRPr>
+            </a:lvl1pPr>
+            <a:lvl2pPr marL="685800" indent="-228600" algn="l" defTabSz="914400" rtl="0" eaLnBrk="1" latinLnBrk="0" hangingPunct="1">
+              <a:lnSpc>
+                <a:spcPct val="90000"/>
+              </a:lnSpc>
+              <a:spcBef>
+                <a:spcPts val="500"/>
+              </a:spcBef>
+              <a:buFont typeface="Arial" panose="020B0604020202020204" pitchFamily="34" charset="0"/>
+              <a:buChar char="•"/>
+              <a:defRPr sz="2400" kern="1200">
+                <a:solidFill>
+                  <a:schemeClr val="tx1"/>
+                </a:solidFill>
+                <a:latin typeface="+mn-lt"/>
+                <a:ea typeface="+mn-ea"/>
+                <a:cs typeface="+mn-cs"/>
+              </a:defRPr>
+            </a:lvl2pPr>
+            <a:lvl3pPr marL="1143000" indent="-228600" algn="l" defTabSz="914400" rtl="0" eaLnBrk="1" latinLnBrk="0" hangingPunct="1">
+              <a:lnSpc>
+                <a:spcPct val="90000"/>
+              </a:lnSpc>
+              <a:spcBef>
+                <a:spcPts val="500"/>
+              </a:spcBef>
+              <a:buFont typeface="Arial" panose="020B0604020202020204" pitchFamily="34" charset="0"/>
+              <a:buChar char="•"/>
+              <a:defRPr sz="2000" kern="1200">
+                <a:solidFill>
+                  <a:schemeClr val="tx1"/>
+                </a:solidFill>
+                <a:latin typeface="+mn-lt"/>
+                <a:ea typeface="+mn-ea"/>
+                <a:cs typeface="+mn-cs"/>
+              </a:defRPr>
+            </a:lvl3pPr>
+            <a:lvl4pPr marL="1600200" indent="-228600" algn="l" defTabSz="914400" rtl="0" eaLnBrk="1" latinLnBrk="0" hangingPunct="1">
+              <a:lnSpc>
+                <a:spcPct val="90000"/>
+              </a:lnSpc>
+              <a:spcBef>
+                <a:spcPts val="500"/>
+              </a:spcBef>
+              <a:buFont typeface="Arial" panose="020B0604020202020204" pitchFamily="34" charset="0"/>
+              <a:buChar char="•"/>
+              <a:defRPr sz="1800" kern="1200">
+                <a:solidFill>
+                  <a:schemeClr val="tx1"/>
+                </a:solidFill>
+                <a:latin typeface="+mn-lt"/>
+                <a:ea typeface="+mn-ea"/>
+                <a:cs typeface="+mn-cs"/>
+              </a:defRPr>
+            </a:lvl4pPr>
+            <a:lvl5pPr marL="2057400" indent="-228600" algn="l" defTabSz="914400" rtl="0" eaLnBrk="1" latinLnBrk="0" hangingPunct="1">
+              <a:lnSpc>
+                <a:spcPct val="90000"/>
+              </a:lnSpc>
+              <a:spcBef>
+                <a:spcPts val="500"/>
+              </a:spcBef>
+              <a:buFont typeface="Arial" panose="020B0604020202020204" pitchFamily="34" charset="0"/>
+              <a:buChar char="•"/>
+              <a:defRPr sz="1800" kern="1200">
+                <a:solidFill>
+                  <a:schemeClr val="tx1"/>
+                </a:solidFill>
+                <a:latin typeface="+mn-lt"/>
+                <a:ea typeface="+mn-ea"/>
+                <a:cs typeface="+mn-cs"/>
+              </a:defRPr>
+            </a:lvl5pPr>
+            <a:lvl6pPr marL="2514600" indent="-228600" algn="l" defTabSz="914400" rtl="0" eaLnBrk="1" latinLnBrk="0" hangingPunct="1">
+              <a:lnSpc>
+                <a:spcPct val="90000"/>
+              </a:lnSpc>
+              <a:spcBef>
+                <a:spcPts val="500"/>
+              </a:spcBef>
+              <a:buFont typeface="Arial" panose="020B0604020202020204" pitchFamily="34" charset="0"/>
+              <a:buChar char="•"/>
+              <a:defRPr sz="1800" kern="1200">
+                <a:solidFill>
+                  <a:schemeClr val="tx1"/>
+                </a:solidFill>
+                <a:latin typeface="+mn-lt"/>
+                <a:ea typeface="+mn-ea"/>
+                <a:cs typeface="+mn-cs"/>
+              </a:defRPr>
+            </a:lvl6pPr>
+            <a:lvl7pPr marL="2971800" indent="-228600" algn="l" defTabSz="914400" rtl="0" eaLnBrk="1" latinLnBrk="0" hangingPunct="1">
+              <a:lnSpc>
+                <a:spcPct val="90000"/>
+              </a:lnSpc>
+              <a:spcBef>
+                <a:spcPts val="500"/>
+              </a:spcBef>
+              <a:buFont typeface="Arial" panose="020B0604020202020204" pitchFamily="34" charset="0"/>
+              <a:buChar char="•"/>
+              <a:defRPr sz="1800" kern="1200">
+                <a:solidFill>
+                  <a:schemeClr val="tx1"/>
+                </a:solidFill>
+                <a:latin typeface="+mn-lt"/>
+                <a:ea typeface="+mn-ea"/>
+                <a:cs typeface="+mn-cs"/>
+              </a:defRPr>
+            </a:lvl7pPr>
+            <a:lvl8pPr marL="3429000" indent="-228600" algn="l" defTabSz="914400" rtl="0" eaLnBrk="1" latinLnBrk="0" hangingPunct="1">
+              <a:lnSpc>
+                <a:spcPct val="90000"/>
+              </a:lnSpc>
+              <a:spcBef>
+                <a:spcPts val="500"/>
+              </a:spcBef>
+              <a:buFont typeface="Arial" panose="020B0604020202020204" pitchFamily="34" charset="0"/>
+              <a:buChar char="•"/>
+              <a:defRPr sz="1800" kern="1200">
+                <a:solidFill>
+                  <a:schemeClr val="tx1"/>
+                </a:solidFill>
+                <a:latin typeface="+mn-lt"/>
+                <a:ea typeface="+mn-ea"/>
+                <a:cs typeface="+mn-cs"/>
+              </a:defRPr>
+            </a:lvl8pPr>
+            <a:lvl9pPr marL="3886200" indent="-228600" algn="l" defTabSz="914400" rtl="0" eaLnBrk="1" latinLnBrk="0" hangingPunct="1">
+              <a:lnSpc>
+                <a:spcPct val="90000"/>
+              </a:lnSpc>
+              <a:spcBef>
+                <a:spcPts val="500"/>
+              </a:spcBef>
+              <a:buFont typeface="Arial" panose="020B0604020202020204" pitchFamily="34" charset="0"/>
+              <a:buChar char="•"/>
+              <a:defRPr sz="1800" kern="1200">
+                <a:solidFill>
+                  <a:schemeClr val="tx1"/>
+                </a:solidFill>
+                <a:latin typeface="+mn-lt"/>
+                <a:ea typeface="+mn-ea"/>
+                <a:cs typeface="+mn-cs"/>
+              </a:defRPr>
+            </a:lvl9pPr>
+          </a:lstStyle>
+          <a:p>
+            <a:pPr algn="just"/>
+            <a:r>
+              <a:rPr lang="en-US" dirty="0"/>
+              <a:t>Users can add and edit wiki pages directly on GitHub or locally using the command line.</a:t>
+            </a:r>
+          </a:p>
+          <a:p>
+            <a:pPr algn="just"/>
+            <a:r>
+              <a:rPr lang="en-US" dirty="0"/>
+              <a:t>GitHub repository for our project can be accessed using the link below.</a:t>
+            </a:r>
+          </a:p>
+          <a:p>
+            <a:pPr marL="0" indent="0" algn="ctr">
+              <a:buFont typeface="Arial" panose="020B0604020202020204" pitchFamily="34" charset="0"/>
+              <a:buNone/>
+            </a:pPr>
+            <a:r>
+              <a:rPr lang="en-US" dirty="0"/>
+              <a:t>URL: </a:t>
+            </a:r>
+            <a:r>
+              <a:rPr lang="en-US" dirty="0">
+                <a:hlinkClick r:id="rId5"/>
+              </a:rPr>
+              <a:t>https://github.com/devopslecturer/awmsc2022/wiki</a:t>
+            </a:r>
+            <a:endParaRPr lang="en-US" dirty="0"/>
+          </a:p>
+        </p:txBody>
+      </p:sp>
     </p:spTree>
     <p:extLst>
       <p:ext uri="{BB962C8B-B14F-4D97-AF65-F5344CB8AC3E}">
-        <p14:creationId xmlns:p14="http://schemas.microsoft.com/office/powerpoint/2010/main" val="2087571555"/>
+        <p14:creationId xmlns:p14="http://schemas.microsoft.com/office/powerpoint/2010/main" val="2765542258"/>
       </p:ext>
     </p:extLst>
   </p:cSld>
@@ -4751,6 +5090,59 @@
       </p:grpSpPr>
       <p:sp>
         <p:nvSpPr>
+          <p:cNvPr id="2" name="Title 1">
+            <a:extLst>
+              <a:ext uri="{FF2B5EF4-FFF2-40B4-BE49-F238E27FC236}">
+                <a16:creationId xmlns:a16="http://schemas.microsoft.com/office/drawing/2014/main" id="{C0666519-3484-48F3-927E-47679DE94711}"/>
+              </a:ext>
+            </a:extLst>
+          </p:cNvPr>
+          <p:cNvSpPr>
+            <a:spLocks noGrp="1"/>
+          </p:cNvSpPr>
+          <p:nvPr>
+            <p:ph type="title"/>
+          </p:nvPr>
+        </p:nvSpPr>
+        <p:spPr/>
+        <p:txBody>
+          <a:bodyPr/>
+          <a:lstStyle/>
+          <a:p>
+            <a:r>
+              <a:rPr lang="en-IN" b="1" dirty="0"/>
+              <a:t>4. CONCLUSION</a:t>
+            </a:r>
+          </a:p>
+        </p:txBody>
+      </p:sp>
+      <p:sp>
+        <p:nvSpPr>
+          <p:cNvPr id="3" name="Content Placeholder 2">
+            <a:extLst>
+              <a:ext uri="{FF2B5EF4-FFF2-40B4-BE49-F238E27FC236}">
+                <a16:creationId xmlns:a16="http://schemas.microsoft.com/office/drawing/2014/main" id="{D3F11377-6BB3-4E47-B174-861CD150A86B}"/>
+              </a:ext>
+            </a:extLst>
+          </p:cNvPr>
+          <p:cNvSpPr>
+            <a:spLocks noGrp="1"/>
+          </p:cNvSpPr>
+          <p:nvPr>
+            <p:ph idx="1"/>
+          </p:nvPr>
+        </p:nvSpPr>
+        <p:spPr/>
+        <p:txBody>
+          <a:bodyPr/>
+          <a:lstStyle/>
+          <a:p>
+            <a:endParaRPr lang="en-IN"/>
+          </a:p>
+        </p:txBody>
+      </p:sp>
+      <p:sp>
+        <p:nvSpPr>
           <p:cNvPr id="4" name="Rectangle 3">
             <a:extLst>
               <a:ext uri="{FF2B5EF4-FFF2-40B4-BE49-F238E27FC236}">
@@ -4947,6 +5339,527 @@
                 </a:solidFill>
               </a:rPr>
               <a:t>11</a:t>
+            </a:fld>
+            <a:endParaRPr lang="en-IN" sz="2000" b="1" dirty="0">
+              <a:solidFill>
+                <a:schemeClr val="bg1"/>
+              </a:solidFill>
+            </a:endParaRPr>
+          </a:p>
+        </p:txBody>
+      </p:sp>
+    </p:spTree>
+    <p:extLst>
+      <p:ext uri="{BB962C8B-B14F-4D97-AF65-F5344CB8AC3E}">
+        <p14:creationId xmlns:p14="http://schemas.microsoft.com/office/powerpoint/2010/main" val="4193434119"/>
+      </p:ext>
+    </p:extLst>
+  </p:cSld>
+  <p:clrMapOvr>
+    <a:masterClrMapping/>
+  </p:clrMapOvr>
+</p:sld>
+</file>
+
+<file path=ppt/slides/slide12.xml><?xml version="1.0" encoding="utf-8"?>
+<p:sld xmlns:a="http://schemas.openxmlformats.org/drawingml/2006/main" xmlns:r="http://schemas.openxmlformats.org/officeDocument/2006/relationships" xmlns:p="http://schemas.openxmlformats.org/presentationml/2006/main">
+  <p:cSld>
+    <p:spTree>
+      <p:nvGrpSpPr>
+        <p:cNvPr id="1" name=""/>
+        <p:cNvGrpSpPr/>
+        <p:nvPr/>
+      </p:nvGrpSpPr>
+      <p:grpSpPr>
+        <a:xfrm>
+          <a:off x="0" y="0"/>
+          <a:ext cx="0" cy="0"/>
+          <a:chOff x="0" y="0"/>
+          <a:chExt cx="0" cy="0"/>
+        </a:xfrm>
+      </p:grpSpPr>
+      <p:sp>
+        <p:nvSpPr>
+          <p:cNvPr id="4" name="Rectangle 3">
+            <a:extLst>
+              <a:ext uri="{FF2B5EF4-FFF2-40B4-BE49-F238E27FC236}">
+                <a16:creationId xmlns:a16="http://schemas.microsoft.com/office/drawing/2014/main" id="{8D973F9E-231E-4F4E-BF92-D9C84C7AB5A7}"/>
+              </a:ext>
+            </a:extLst>
+          </p:cNvPr>
+          <p:cNvSpPr/>
+          <p:nvPr/>
+        </p:nvSpPr>
+        <p:spPr>
+          <a:xfrm>
+            <a:off x="0" y="6067425"/>
+            <a:ext cx="9305925" cy="790575"/>
+          </a:xfrm>
+          <a:prstGeom prst="rect">
+            <a:avLst/>
+          </a:prstGeom>
+          <a:scene3d>
+            <a:camera prst="orthographicFront"/>
+            <a:lightRig rig="threePt" dir="t"/>
+          </a:scene3d>
+          <a:sp3d>
+            <a:bevelT w="114300" prst="hardEdge"/>
+          </a:sp3d>
+        </p:spPr>
+        <p:style>
+          <a:lnRef idx="2">
+            <a:schemeClr val="accent1">
+              <a:shade val="50000"/>
+            </a:schemeClr>
+          </a:lnRef>
+          <a:fillRef idx="1">
+            <a:schemeClr val="accent1"/>
+          </a:fillRef>
+          <a:effectRef idx="0">
+            <a:schemeClr val="accent1"/>
+          </a:effectRef>
+          <a:fontRef idx="minor">
+            <a:schemeClr val="lt1"/>
+          </a:fontRef>
+        </p:style>
+        <p:txBody>
+          <a:bodyPr rtlCol="0" anchor="ctr"/>
+          <a:lstStyle/>
+          <a:p>
+            <a:pPr algn="ctr"/>
+            <a:r>
+              <a:rPr lang="en-IN" sz="2000" b="1" dirty="0"/>
+              <a:t>WEDNESDAY’S WICKED ADVENTURES</a:t>
+            </a:r>
+          </a:p>
+        </p:txBody>
+      </p:sp>
+      <p:sp>
+        <p:nvSpPr>
+          <p:cNvPr id="5" name="Rectangle 4">
+            <a:extLst>
+              <a:ext uri="{FF2B5EF4-FFF2-40B4-BE49-F238E27FC236}">
+                <a16:creationId xmlns:a16="http://schemas.microsoft.com/office/drawing/2014/main" id="{ADD2B0B5-489C-4527-87A1-6AE32256E8B1}"/>
+              </a:ext>
+            </a:extLst>
+          </p:cNvPr>
+          <p:cNvSpPr/>
+          <p:nvPr/>
+        </p:nvSpPr>
+        <p:spPr>
+          <a:xfrm>
+            <a:off x="11363325" y="6067425"/>
+            <a:ext cx="828675" cy="790575"/>
+          </a:xfrm>
+          <a:prstGeom prst="rect">
+            <a:avLst/>
+          </a:prstGeom>
+          <a:scene3d>
+            <a:camera prst="orthographicFront"/>
+            <a:lightRig rig="threePt" dir="t"/>
+          </a:scene3d>
+          <a:sp3d>
+            <a:bevelT w="114300" prst="hardEdge"/>
+          </a:sp3d>
+        </p:spPr>
+        <p:style>
+          <a:lnRef idx="2">
+            <a:schemeClr val="accent1">
+              <a:shade val="50000"/>
+            </a:schemeClr>
+          </a:lnRef>
+          <a:fillRef idx="1">
+            <a:schemeClr val="accent1"/>
+          </a:fillRef>
+          <a:effectRef idx="0">
+            <a:schemeClr val="accent1"/>
+          </a:effectRef>
+          <a:fontRef idx="minor">
+            <a:schemeClr val="lt1"/>
+          </a:fontRef>
+        </p:style>
+        <p:txBody>
+          <a:bodyPr rtlCol="0" anchor="ctr"/>
+          <a:lstStyle/>
+          <a:p>
+            <a:pPr algn="ctr"/>
+            <a:endParaRPr lang="en-IN"/>
+          </a:p>
+        </p:txBody>
+      </p:sp>
+      <p:sp>
+        <p:nvSpPr>
+          <p:cNvPr id="6" name="Rectangle 5">
+            <a:extLst>
+              <a:ext uri="{FF2B5EF4-FFF2-40B4-BE49-F238E27FC236}">
+                <a16:creationId xmlns:a16="http://schemas.microsoft.com/office/drawing/2014/main" id="{8F298F8F-A536-48DC-9BA2-D0C59AC19A33}"/>
+              </a:ext>
+            </a:extLst>
+          </p:cNvPr>
+          <p:cNvSpPr/>
+          <p:nvPr/>
+        </p:nvSpPr>
+        <p:spPr>
+          <a:xfrm>
+            <a:off x="9305925" y="6067424"/>
+            <a:ext cx="2057400" cy="790575"/>
+          </a:xfrm>
+          <a:prstGeom prst="rect">
+            <a:avLst/>
+          </a:prstGeom>
+          <a:scene3d>
+            <a:camera prst="orthographicFront"/>
+            <a:lightRig rig="threePt" dir="t"/>
+          </a:scene3d>
+          <a:sp3d>
+            <a:bevelT w="114300" prst="hardEdge"/>
+          </a:sp3d>
+        </p:spPr>
+        <p:style>
+          <a:lnRef idx="2">
+            <a:schemeClr val="accent1">
+              <a:shade val="50000"/>
+            </a:schemeClr>
+          </a:lnRef>
+          <a:fillRef idx="1">
+            <a:schemeClr val="accent1"/>
+          </a:fillRef>
+          <a:effectRef idx="0">
+            <a:schemeClr val="accent1"/>
+          </a:effectRef>
+          <a:fontRef idx="minor">
+            <a:schemeClr val="lt1"/>
+          </a:fontRef>
+        </p:style>
+        <p:txBody>
+          <a:bodyPr rtlCol="0" anchor="ctr"/>
+          <a:lstStyle/>
+          <a:p>
+            <a:pPr algn="ctr"/>
+            <a:r>
+              <a:rPr lang="en-IN" sz="2000" b="1" dirty="0"/>
+              <a:t>APRIL 2022</a:t>
+            </a:r>
+          </a:p>
+        </p:txBody>
+      </p:sp>
+      <p:sp>
+        <p:nvSpPr>
+          <p:cNvPr id="8" name="Slide Number Placeholder 11">
+            <a:extLst>
+              <a:ext uri="{FF2B5EF4-FFF2-40B4-BE49-F238E27FC236}">
+                <a16:creationId xmlns:a16="http://schemas.microsoft.com/office/drawing/2014/main" id="{66E5E76B-63DE-49C5-B59F-65367A92139F}"/>
+              </a:ext>
+            </a:extLst>
+          </p:cNvPr>
+          <p:cNvSpPr>
+            <a:spLocks noGrp="1"/>
+          </p:cNvSpPr>
+          <p:nvPr>
+            <p:ph type="sldNum" sz="quarter" idx="12"/>
+          </p:nvPr>
+        </p:nvSpPr>
+        <p:spPr>
+          <a:xfrm>
+            <a:off x="11563349" y="6280148"/>
+            <a:ext cx="428625" cy="365125"/>
+          </a:xfrm>
+        </p:spPr>
+        <p:txBody>
+          <a:bodyPr/>
+          <a:lstStyle/>
+          <a:p>
+            <a:fld id="{F37EE007-93F6-4DD3-A485-65881C8FA8D0}" type="slidenum">
+              <a:rPr lang="en-IN" sz="2000" b="1" smtClean="0">
+                <a:solidFill>
+                  <a:schemeClr val="bg1"/>
+                </a:solidFill>
+              </a:rPr>
+              <a:t>12</a:t>
+            </a:fld>
+            <a:endParaRPr lang="en-IN" sz="2000" b="1" dirty="0">
+              <a:solidFill>
+                <a:schemeClr val="bg1"/>
+              </a:solidFill>
+            </a:endParaRPr>
+          </a:p>
+        </p:txBody>
+      </p:sp>
+      <p:pic>
+        <p:nvPicPr>
+          <p:cNvPr id="2050" name="Picture 2" descr="See the source image">
+            <a:extLst>
+              <a:ext uri="{FF2B5EF4-FFF2-40B4-BE49-F238E27FC236}">
+                <a16:creationId xmlns:a16="http://schemas.microsoft.com/office/drawing/2014/main" id="{B5B67862-A69F-498B-B814-F7947A0A1E0A}"/>
+              </a:ext>
+            </a:extLst>
+          </p:cNvPr>
+          <p:cNvPicPr>
+            <a:picLocks noChangeAspect="1" noChangeArrowheads="1"/>
+          </p:cNvPicPr>
+          <p:nvPr/>
+        </p:nvPicPr>
+        <p:blipFill>
+          <a:blip r:embed="rId2">
+            <a:extLst>
+              <a:ext uri="{28A0092B-C50C-407E-A947-70E740481C1C}">
+                <a14:useLocalDpi xmlns:a14="http://schemas.microsoft.com/office/drawing/2010/main" val="0"/>
+              </a:ext>
+            </a:extLst>
+          </a:blip>
+          <a:srcRect/>
+          <a:stretch>
+            <a:fillRect/>
+          </a:stretch>
+        </p:blipFill>
+        <p:spPr bwMode="auto">
+          <a:xfrm>
+            <a:off x="0" y="0"/>
+            <a:ext cx="12192000" cy="6067421"/>
+          </a:xfrm>
+          <a:prstGeom prst="rect">
+            <a:avLst/>
+          </a:prstGeom>
+          <a:noFill/>
+          <a:extLst>
+            <a:ext uri="{909E8E84-426E-40DD-AFC4-6F175D3DCCD1}">
+              <a14:hiddenFill xmlns:a14="http://schemas.microsoft.com/office/drawing/2010/main">
+                <a:solidFill>
+                  <a:srgbClr val="FFFFFF"/>
+                </a:solidFill>
+              </a14:hiddenFill>
+            </a:ext>
+          </a:extLst>
+        </p:spPr>
+      </p:pic>
+    </p:spTree>
+    <p:extLst>
+      <p:ext uri="{BB962C8B-B14F-4D97-AF65-F5344CB8AC3E}">
+        <p14:creationId xmlns:p14="http://schemas.microsoft.com/office/powerpoint/2010/main" val="2087571555"/>
+      </p:ext>
+    </p:extLst>
+  </p:cSld>
+  <p:clrMapOvr>
+    <a:masterClrMapping/>
+  </p:clrMapOvr>
+</p:sld>
+</file>
+
+<file path=ppt/slides/slide13.xml><?xml version="1.0" encoding="utf-8"?>
+<p:sld xmlns:a="http://schemas.openxmlformats.org/drawingml/2006/main" xmlns:r="http://schemas.openxmlformats.org/officeDocument/2006/relationships" xmlns:p="http://schemas.openxmlformats.org/presentationml/2006/main">
+  <p:cSld>
+    <p:spTree>
+      <p:nvGrpSpPr>
+        <p:cNvPr id="1" name=""/>
+        <p:cNvGrpSpPr/>
+        <p:nvPr/>
+      </p:nvGrpSpPr>
+      <p:grpSpPr>
+        <a:xfrm>
+          <a:off x="0" y="0"/>
+          <a:ext cx="0" cy="0"/>
+          <a:chOff x="0" y="0"/>
+          <a:chExt cx="0" cy="0"/>
+        </a:xfrm>
+      </p:grpSpPr>
+      <p:sp>
+        <p:nvSpPr>
+          <p:cNvPr id="4" name="Rectangle 3">
+            <a:extLst>
+              <a:ext uri="{FF2B5EF4-FFF2-40B4-BE49-F238E27FC236}">
+                <a16:creationId xmlns:a16="http://schemas.microsoft.com/office/drawing/2014/main" id="{8D973F9E-231E-4F4E-BF92-D9C84C7AB5A7}"/>
+              </a:ext>
+            </a:extLst>
+          </p:cNvPr>
+          <p:cNvSpPr/>
+          <p:nvPr/>
+        </p:nvSpPr>
+        <p:spPr>
+          <a:xfrm>
+            <a:off x="0" y="6067425"/>
+            <a:ext cx="9305925" cy="790575"/>
+          </a:xfrm>
+          <a:prstGeom prst="rect">
+            <a:avLst/>
+          </a:prstGeom>
+          <a:scene3d>
+            <a:camera prst="orthographicFront"/>
+            <a:lightRig rig="threePt" dir="t"/>
+          </a:scene3d>
+          <a:sp3d>
+            <a:bevelT w="114300" prst="hardEdge"/>
+          </a:sp3d>
+        </p:spPr>
+        <p:style>
+          <a:lnRef idx="2">
+            <a:schemeClr val="accent1">
+              <a:shade val="50000"/>
+            </a:schemeClr>
+          </a:lnRef>
+          <a:fillRef idx="1">
+            <a:schemeClr val="accent1"/>
+          </a:fillRef>
+          <a:effectRef idx="0">
+            <a:schemeClr val="accent1"/>
+          </a:effectRef>
+          <a:fontRef idx="minor">
+            <a:schemeClr val="lt1"/>
+          </a:fontRef>
+        </p:style>
+        <p:txBody>
+          <a:bodyPr rtlCol="0" anchor="ctr"/>
+          <a:lstStyle/>
+          <a:p>
+            <a:pPr algn="ctr"/>
+            <a:r>
+              <a:rPr lang="en-IN" sz="2000" b="1" dirty="0"/>
+              <a:t>WEDNESDAY’S WICKED ADVENTURES</a:t>
+            </a:r>
+          </a:p>
+        </p:txBody>
+      </p:sp>
+      <p:sp>
+        <p:nvSpPr>
+          <p:cNvPr id="5" name="Rectangle 4">
+            <a:extLst>
+              <a:ext uri="{FF2B5EF4-FFF2-40B4-BE49-F238E27FC236}">
+                <a16:creationId xmlns:a16="http://schemas.microsoft.com/office/drawing/2014/main" id="{ADD2B0B5-489C-4527-87A1-6AE32256E8B1}"/>
+              </a:ext>
+            </a:extLst>
+          </p:cNvPr>
+          <p:cNvSpPr/>
+          <p:nvPr/>
+        </p:nvSpPr>
+        <p:spPr>
+          <a:xfrm>
+            <a:off x="11363325" y="6067425"/>
+            <a:ext cx="828675" cy="790575"/>
+          </a:xfrm>
+          <a:prstGeom prst="rect">
+            <a:avLst/>
+          </a:prstGeom>
+          <a:scene3d>
+            <a:camera prst="orthographicFront"/>
+            <a:lightRig rig="threePt" dir="t"/>
+          </a:scene3d>
+          <a:sp3d>
+            <a:bevelT w="114300" prst="hardEdge"/>
+          </a:sp3d>
+        </p:spPr>
+        <p:style>
+          <a:lnRef idx="2">
+            <a:schemeClr val="accent1">
+              <a:shade val="50000"/>
+            </a:schemeClr>
+          </a:lnRef>
+          <a:fillRef idx="1">
+            <a:schemeClr val="accent1"/>
+          </a:fillRef>
+          <a:effectRef idx="0">
+            <a:schemeClr val="accent1"/>
+          </a:effectRef>
+          <a:fontRef idx="minor">
+            <a:schemeClr val="lt1"/>
+          </a:fontRef>
+        </p:style>
+        <p:txBody>
+          <a:bodyPr rtlCol="0" anchor="ctr"/>
+          <a:lstStyle/>
+          <a:p>
+            <a:pPr algn="ctr"/>
+            <a:endParaRPr lang="en-IN"/>
+          </a:p>
+        </p:txBody>
+      </p:sp>
+      <p:sp>
+        <p:nvSpPr>
+          <p:cNvPr id="6" name="Rectangle 5">
+            <a:extLst>
+              <a:ext uri="{FF2B5EF4-FFF2-40B4-BE49-F238E27FC236}">
+                <a16:creationId xmlns:a16="http://schemas.microsoft.com/office/drawing/2014/main" id="{8F298F8F-A536-48DC-9BA2-D0C59AC19A33}"/>
+              </a:ext>
+            </a:extLst>
+          </p:cNvPr>
+          <p:cNvSpPr/>
+          <p:nvPr/>
+        </p:nvSpPr>
+        <p:spPr>
+          <a:xfrm>
+            <a:off x="9305925" y="6067424"/>
+            <a:ext cx="2057400" cy="790575"/>
+          </a:xfrm>
+          <a:prstGeom prst="rect">
+            <a:avLst/>
+          </a:prstGeom>
+          <a:scene3d>
+            <a:camera prst="orthographicFront"/>
+            <a:lightRig rig="threePt" dir="t"/>
+          </a:scene3d>
+          <a:sp3d>
+            <a:bevelT w="114300" prst="hardEdge"/>
+          </a:sp3d>
+        </p:spPr>
+        <p:style>
+          <a:lnRef idx="2">
+            <a:schemeClr val="accent1">
+              <a:shade val="50000"/>
+            </a:schemeClr>
+          </a:lnRef>
+          <a:fillRef idx="1">
+            <a:schemeClr val="accent1"/>
+          </a:fillRef>
+          <a:effectRef idx="0">
+            <a:schemeClr val="accent1"/>
+          </a:effectRef>
+          <a:fontRef idx="minor">
+            <a:schemeClr val="lt1"/>
+          </a:fontRef>
+        </p:style>
+        <p:txBody>
+          <a:bodyPr rtlCol="0" anchor="ctr"/>
+          <a:lstStyle/>
+          <a:p>
+            <a:pPr algn="ctr"/>
+            <a:r>
+              <a:rPr lang="en-IN" sz="2000" b="1" dirty="0"/>
+              <a:t>APRIL 2022</a:t>
+            </a:r>
+          </a:p>
+        </p:txBody>
+      </p:sp>
+      <p:sp>
+        <p:nvSpPr>
+          <p:cNvPr id="8" name="Slide Number Placeholder 11">
+            <a:extLst>
+              <a:ext uri="{FF2B5EF4-FFF2-40B4-BE49-F238E27FC236}">
+                <a16:creationId xmlns:a16="http://schemas.microsoft.com/office/drawing/2014/main" id="{66E5E76B-63DE-49C5-B59F-65367A92139F}"/>
+              </a:ext>
+            </a:extLst>
+          </p:cNvPr>
+          <p:cNvSpPr>
+            <a:spLocks noGrp="1"/>
+          </p:cNvSpPr>
+          <p:nvPr>
+            <p:ph type="sldNum" sz="quarter" idx="12"/>
+          </p:nvPr>
+        </p:nvSpPr>
+        <p:spPr>
+          <a:xfrm>
+            <a:off x="11563349" y="6280148"/>
+            <a:ext cx="428625" cy="365125"/>
+          </a:xfrm>
+        </p:spPr>
+        <p:txBody>
+          <a:bodyPr/>
+          <a:lstStyle/>
+          <a:p>
+            <a:fld id="{F37EE007-93F6-4DD3-A485-65881C8FA8D0}" type="slidenum">
+              <a:rPr lang="en-IN" sz="2000" b="1" smtClean="0">
+                <a:solidFill>
+                  <a:schemeClr val="bg1"/>
+                </a:solidFill>
+              </a:rPr>
+              <a:t>13</a:t>
             </a:fld>
             <a:endParaRPr lang="en-IN" sz="2000" b="1" dirty="0">
               <a:solidFill>
@@ -7149,10 +8062,6 @@
           </p:nvPr>
         </p:nvSpPr>
         <p:spPr>
-          <a:xfrm>
-            <a:off x="838200" y="365125"/>
-            <a:ext cx="10515600" cy="1119961"/>
-          </a:xfrm>
           <a:effectLst>
             <a:outerShdw blurRad="50800" dist="38100" dir="5400000" algn="t" rotWithShape="0">
               <a:prstClr val="black">
@@ -7176,13 +8085,22 @@
           </a:fontRef>
         </p:style>
         <p:txBody>
-          <a:bodyPr/>
+          <a:bodyPr vert="horz" lIns="91440" tIns="45720" rIns="91440" bIns="45720" rtlCol="0" anchor="ctr">
+            <a:normAutofit/>
+          </a:bodyPr>
           <a:lstStyle/>
           <a:p>
             <a:pPr algn="ctr"/>
             <a:r>
-              <a:rPr lang="en-IN" b="1" dirty="0"/>
-              <a:t>3. Sphinx Tool for Auto Documentation</a:t>
+              <a:rPr lang="en-IN" b="1" dirty="0">
+                <a:solidFill>
+                  <a:schemeClr val="lt1"/>
+                </a:solidFill>
+                <a:latin typeface="+mn-lt"/>
+                <a:ea typeface="+mn-ea"/>
+                <a:cs typeface="+mn-cs"/>
+              </a:rPr>
+              <a:t>GitHub for Repository</a:t>
             </a:r>
           </a:p>
         </p:txBody>
@@ -7205,144 +8123,65 @@
         </p:nvSpPr>
         <p:spPr>
           <a:xfrm>
-            <a:off x="838200" y="2836599"/>
-            <a:ext cx="10143062" cy="3154279"/>
+            <a:off x="838200" y="1825625"/>
+            <a:ext cx="6648450" cy="4241799"/>
           </a:xfrm>
         </p:spPr>
         <p:txBody>
           <a:bodyPr>
-            <a:normAutofit fontScale="92500" lnSpcReduction="20000"/>
+            <a:normAutofit fontScale="92500" lnSpcReduction="10000"/>
           </a:bodyPr>
           <a:lstStyle/>
           <a:p>
             <a:pPr algn="just"/>
             <a:r>
               <a:rPr lang="en-US" dirty="0"/>
-              <a:t>An Open-source third party Tool used for auto documentation.</a:t>
+              <a:t>GitHub - Provider of Internet hosting for software development and version control using Git.</a:t>
             </a:r>
           </a:p>
           <a:p>
             <a:pPr algn="just"/>
             <a:r>
-              <a:rPr lang="en-IN" b="0" i="0" dirty="0">
-                <a:solidFill>
-                  <a:srgbClr val="24292F"/>
-                </a:solidFill>
-                <a:effectLst/>
-                <a:latin typeface="-apple-system"/>
-              </a:rPr>
-              <a:t>Sphinx is a documentation generator written in python language.</a:t>
-            </a:r>
-          </a:p>
-          <a:p>
-            <a:pPr algn="just"/>
-            <a:r>
-              <a:rPr lang="en-IN" dirty="0">
-                <a:solidFill>
-                  <a:srgbClr val="24292F"/>
-                </a:solidFill>
-                <a:latin typeface="-apple-system"/>
-              </a:rPr>
-              <a:t>Implementation of Sphinx tool by creating YAML file executed using “GitHub Actions”.</a:t>
-            </a:r>
-          </a:p>
-          <a:p>
-            <a:pPr algn="just"/>
-            <a:r>
-              <a:rPr lang="en-IN" dirty="0">
-                <a:solidFill>
-                  <a:srgbClr val="24292F"/>
-                </a:solidFill>
-                <a:latin typeface="-apple-system"/>
-              </a:rPr>
-              <a:t>Themes available in the URL below : </a:t>
-            </a:r>
-          </a:p>
-          <a:p>
-            <a:pPr marL="0" indent="0" algn="ctr">
+              <a:rPr lang="en-US" dirty="0"/>
+              <a:t>GitHub repository link for the project :</a:t>
+            </a:r>
+          </a:p>
+          <a:p>
+            <a:pPr marL="0" indent="0" algn="just">
               <a:buNone/>
             </a:pPr>
             <a:r>
               <a:rPr lang="en-IN" dirty="0">
-                <a:solidFill>
-                  <a:srgbClr val="24292F"/>
-                </a:solidFill>
-                <a:latin typeface="-apple-system"/>
-                <a:hlinkClick r:id="rId2"/>
-              </a:rPr>
-              <a:t>https://www.sphinx-doc.org/en/master/usage/theming.html</a:t>
-            </a:r>
-            <a:endParaRPr lang="en-IN" dirty="0">
-              <a:solidFill>
-                <a:srgbClr val="24292F"/>
-              </a:solidFill>
-              <a:latin typeface="-apple-system"/>
-            </a:endParaRPr>
-          </a:p>
-          <a:p>
-            <a:pPr algn="just"/>
-            <a:r>
-              <a:rPr lang="en-IN" dirty="0">
-                <a:solidFill>
-                  <a:srgbClr val="24292F"/>
-                </a:solidFill>
-                <a:latin typeface="-apple-system"/>
-              </a:rPr>
-              <a:t>Details provided in the Git Wiki link in our repository. Click </a:t>
-            </a:r>
-            <a:r>
-              <a:rPr lang="en-IN" dirty="0">
-                <a:solidFill>
-                  <a:srgbClr val="24292F"/>
-                </a:solidFill>
-                <a:latin typeface="-apple-system"/>
                 <a:hlinkClick r:id="rId3"/>
               </a:rPr>
-              <a:t>here</a:t>
-            </a:r>
-            <a:r>
-              <a:rPr lang="en-IN" dirty="0">
-                <a:solidFill>
-                  <a:srgbClr val="24292F"/>
-                </a:solidFill>
-                <a:latin typeface="-apple-system"/>
-              </a:rPr>
+              <a:t>https://github.com/devopslecturer/awmsc2022.git</a:t>
+            </a:r>
+            <a:r>
+              <a:rPr lang="en-IN" dirty="0"/>
               <a:t>.</a:t>
             </a:r>
           </a:p>
           <a:p>
             <a:pPr algn="just"/>
             <a:r>
-              <a:rPr lang="en-IN" dirty="0">
-                <a:solidFill>
-                  <a:srgbClr val="24292F"/>
-                </a:solidFill>
-                <a:latin typeface="-apple-system"/>
-              </a:rPr>
-              <a:t>Branch created for auto documentation – ‘</a:t>
-            </a:r>
-            <a:r>
-              <a:rPr lang="en-IN" dirty="0" err="1">
-                <a:solidFill>
-                  <a:srgbClr val="24292F"/>
-                </a:solidFill>
-                <a:latin typeface="-apple-system"/>
-              </a:rPr>
-              <a:t>gh</a:t>
-            </a:r>
-            <a:r>
-              <a:rPr lang="en-IN" dirty="0">
-                <a:solidFill>
-                  <a:srgbClr val="24292F"/>
-                </a:solidFill>
-                <a:latin typeface="-apple-system"/>
-              </a:rPr>
-              <a:t>-pages’ (Default).</a:t>
+              <a:rPr lang="en-IN" dirty="0"/>
+              <a:t>Build, deployments and other tools are integrated into GitHub using “GitHub Actions” functionality.</a:t>
             </a:r>
           </a:p>
           <a:p>
             <a:pPr algn="just"/>
-            <a:endParaRPr lang="en-IN" dirty="0"/>
+            <a:r>
+              <a:rPr lang="en-IN" dirty="0"/>
+              <a:t>YAML Files created and added to the ‘.</a:t>
+            </a:r>
+            <a:r>
+              <a:rPr lang="en-IN" dirty="0" err="1"/>
+              <a:t>github</a:t>
+            </a:r>
+            <a:r>
+              <a:rPr lang="en-IN" dirty="0"/>
+              <a:t>/workflows’ inside the repository.</a:t>
+            </a:r>
           </a:p>
         </p:txBody>
       </p:sp>
@@ -7553,40 +8392,78 @@
           </a:p>
         </p:txBody>
       </p:sp>
-      <p:pic>
-        <p:nvPicPr>
-          <p:cNvPr id="9" name="Picture 8">
-            <a:extLst>
-              <a:ext uri="{FF2B5EF4-FFF2-40B4-BE49-F238E27FC236}">
-                <a16:creationId xmlns:a16="http://schemas.microsoft.com/office/drawing/2014/main" id="{FE2ECC11-E713-46DD-A8C9-F2FE792FD345}"/>
-              </a:ext>
-            </a:extLst>
-          </p:cNvPr>
-          <p:cNvPicPr>
-            <a:picLocks noChangeAspect="1"/>
-          </p:cNvPicPr>
-          <p:nvPr/>
-        </p:nvPicPr>
-        <p:blipFill>
-          <a:blip r:embed="rId4"/>
-          <a:stretch>
-            <a:fillRect/>
-          </a:stretch>
-        </p:blipFill>
-        <p:spPr>
-          <a:xfrm>
-            <a:off x="3013010" y="1523359"/>
-            <a:ext cx="5793442" cy="1274966"/>
-          </a:xfrm>
-          <a:prstGeom prst="rect">
-            <a:avLst/>
-          </a:prstGeom>
-        </p:spPr>
-      </p:pic>
+      <p:graphicFrame>
+        <p:nvGraphicFramePr>
+          <p:cNvPr id="7" name="Object 6">
+            <a:extLst>
+              <a:ext uri="{FF2B5EF4-FFF2-40B4-BE49-F238E27FC236}">
+                <a16:creationId xmlns:a16="http://schemas.microsoft.com/office/drawing/2014/main" id="{DFD94466-9B32-41C0-AD5D-CD4B4E8D7CDC}"/>
+              </a:ext>
+            </a:extLst>
+          </p:cNvPr>
+          <p:cNvGraphicFramePr>
+            <a:graphicFrameLocks noChangeAspect="1"/>
+          </p:cNvGraphicFramePr>
+          <p:nvPr>
+            <p:extLst>
+              <p:ext uri="{D42A27DB-BD31-4B8C-83A1-F6EECF244321}">
+                <p14:modId xmlns:p14="http://schemas.microsoft.com/office/powerpoint/2010/main" val="3517263398"/>
+              </p:ext>
+            </p:extLst>
+          </p:nvPr>
+        </p:nvGraphicFramePr>
+        <p:xfrm>
+          <a:off x="7620000" y="1825624"/>
+          <a:ext cx="3721893" cy="4061991"/>
+        </p:xfrm>
+        <a:graphic>
+          <a:graphicData uri="http://schemas.openxmlformats.org/presentationml/2006/ole">
+            <mc:AlternateContent xmlns:mc="http://schemas.openxmlformats.org/markup-compatibility/2006">
+              <mc:Choice xmlns:v="urn:schemas-microsoft-com:vml" Requires="v">
+                <p:oleObj spid="_x0000_s1069" name="Bitmap Image" r:id="rId4" imgW="4267080" imgH="4389120" progId="Paint.Picture">
+                  <p:embed/>
+                </p:oleObj>
+              </mc:Choice>
+              <mc:Fallback>
+                <p:oleObj name="Bitmap Image" r:id="rId4" imgW="4267080" imgH="4389120" progId="Paint.Picture">
+                  <p:embed/>
+                  <p:pic>
+                    <p:nvPicPr>
+                      <p:cNvPr id="0" name=""/>
+                      <p:cNvPicPr/>
+                      <p:nvPr/>
+                    </p:nvPicPr>
+                    <p:blipFill>
+                      <a:blip r:embed="rId5"/>
+                      <a:stretch>
+                        <a:fillRect/>
+                      </a:stretch>
+                    </p:blipFill>
+                    <p:spPr>
+                      <a:xfrm>
+                        <a:off x="7620000" y="1825624"/>
+                        <a:ext cx="3721893" cy="4061991"/>
+                      </a:xfrm>
+                      <a:prstGeom prst="rect">
+                        <a:avLst/>
+                      </a:prstGeom>
+                      <a:ln w="12700">
+                        <a:solidFill>
+                          <a:schemeClr val="accent1"/>
+                        </a:solidFill>
+                      </a:ln>
+                    </p:spPr>
+                  </p:pic>
+                </p:oleObj>
+              </mc:Fallback>
+            </mc:AlternateContent>
+          </a:graphicData>
+        </a:graphic>
+      </p:graphicFrame>
     </p:spTree>
     <p:extLst>
       <p:ext uri="{BB962C8B-B14F-4D97-AF65-F5344CB8AC3E}">
-        <p14:creationId xmlns:p14="http://schemas.microsoft.com/office/powerpoint/2010/main" val="2108658942"/>
+        <p14:creationId xmlns:p14="http://schemas.microsoft.com/office/powerpoint/2010/main" val="2907635473"/>
       </p:ext>
     </p:extLst>
   </p:cSld>
@@ -7668,7 +8545,7 @@
                 <a:ea typeface="+mn-ea"/>
                 <a:cs typeface="+mn-cs"/>
               </a:rPr>
-              <a:t>Git Wiki for User guide and Instructions</a:t>
+              <a:t>Tools Implemented with GitHub Actions</a:t>
             </a:r>
           </a:p>
         </p:txBody>
@@ -7691,15 +8568,84 @@
         </p:nvSpPr>
         <p:spPr>
           <a:xfrm>
-            <a:off x="838200" y="1825625"/>
-            <a:ext cx="10515600" cy="4061991"/>
-          </a:xfrm>
-        </p:spPr>
-        <p:txBody>
-          <a:bodyPr/>
-          <a:lstStyle/>
-          <a:p>
-            <a:endParaRPr lang="en-IN" dirty="0"/>
+            <a:off x="3467100" y="1858962"/>
+            <a:ext cx="7896225" cy="4070350"/>
+          </a:xfrm>
+        </p:spPr>
+        <p:txBody>
+          <a:bodyPr>
+            <a:normAutofit/>
+          </a:bodyPr>
+          <a:lstStyle/>
+          <a:p>
+            <a:pPr marL="514350" indent="-514350">
+              <a:buFont typeface="+mj-lt"/>
+              <a:buAutoNum type="arabicParenR"/>
+            </a:pPr>
+            <a:r>
+              <a:rPr lang="en-US" dirty="0"/>
+              <a:t>Docker.</a:t>
+            </a:r>
+          </a:p>
+          <a:p>
+            <a:pPr marL="514350" indent="-514350">
+              <a:buFont typeface="+mj-lt"/>
+              <a:buAutoNum type="arabicParenR"/>
+            </a:pPr>
+            <a:r>
+              <a:rPr lang="en-US" dirty="0" err="1"/>
+              <a:t>Jmeter</a:t>
+            </a:r>
+            <a:r>
+              <a:rPr lang="en-US" dirty="0"/>
+              <a:t>.</a:t>
+            </a:r>
+          </a:p>
+          <a:p>
+            <a:pPr marL="514350" indent="-514350">
+              <a:buFont typeface="+mj-lt"/>
+              <a:buAutoNum type="arabicParenR"/>
+            </a:pPr>
+            <a:r>
+              <a:rPr lang="en-US" dirty="0" err="1"/>
+              <a:t>Pytest</a:t>
+            </a:r>
+            <a:r>
+              <a:rPr lang="en-US" dirty="0"/>
+              <a:t> for Unit testing.</a:t>
+            </a:r>
+          </a:p>
+          <a:p>
+            <a:pPr marL="514350" indent="-514350">
+              <a:buFont typeface="+mj-lt"/>
+              <a:buAutoNum type="arabicParenR"/>
+            </a:pPr>
+            <a:r>
+              <a:rPr lang="en-US" dirty="0" err="1"/>
+              <a:t>Snyk</a:t>
+            </a:r>
+            <a:r>
+              <a:rPr lang="en-US" dirty="0"/>
+              <a:t> for security.</a:t>
+            </a:r>
+          </a:p>
+          <a:p>
+            <a:pPr marL="514350" indent="-514350">
+              <a:buFont typeface="+mj-lt"/>
+              <a:buAutoNum type="arabicParenR"/>
+            </a:pPr>
+            <a:r>
+              <a:rPr lang="en-US" dirty="0"/>
+              <a:t>Sphinx for </a:t>
+            </a:r>
+            <a:r>
+              <a:rPr lang="en-US" dirty="0" err="1"/>
+              <a:t>Autodocumentation</a:t>
+            </a:r>
+            <a:r>
+              <a:rPr lang="en-US" dirty="0"/>
+              <a:t>.</a:t>
+            </a:r>
           </a:p>
         </p:txBody>
       </p:sp>
@@ -7910,10 +8856,78 @@
           </a:p>
         </p:txBody>
       </p:sp>
+      <p:graphicFrame>
+        <p:nvGraphicFramePr>
+          <p:cNvPr id="7" name="Object 6">
+            <a:extLst>
+              <a:ext uri="{FF2B5EF4-FFF2-40B4-BE49-F238E27FC236}">
+                <a16:creationId xmlns:a16="http://schemas.microsoft.com/office/drawing/2014/main" id="{CA797E7B-A185-4544-8E37-0ABD5653C688}"/>
+              </a:ext>
+            </a:extLst>
+          </p:cNvPr>
+          <p:cNvGraphicFramePr>
+            <a:graphicFrameLocks noChangeAspect="1"/>
+          </p:cNvGraphicFramePr>
+          <p:nvPr>
+            <p:extLst>
+              <p:ext uri="{D42A27DB-BD31-4B8C-83A1-F6EECF244321}">
+                <p14:modId xmlns:p14="http://schemas.microsoft.com/office/powerpoint/2010/main" val="3948285832"/>
+              </p:ext>
+            </p:extLst>
+          </p:nvPr>
+        </p:nvGraphicFramePr>
+        <p:xfrm>
+          <a:off x="838200" y="1836470"/>
+          <a:ext cx="2505075" cy="4085172"/>
+        </p:xfrm>
+        <a:graphic>
+          <a:graphicData uri="http://schemas.openxmlformats.org/presentationml/2006/ole">
+            <mc:AlternateContent xmlns:mc="http://schemas.openxmlformats.org/markup-compatibility/2006">
+              <mc:Choice xmlns:v="urn:schemas-microsoft-com:vml" Requires="v">
+                <p:oleObj spid="_x0000_s2066" name="Bitmap Image" r:id="rId3" imgW="2209680" imgH="3916800" progId="Paint.Picture">
+                  <p:embed/>
+                </p:oleObj>
+              </mc:Choice>
+              <mc:Fallback>
+                <p:oleObj name="Bitmap Image" r:id="rId3" imgW="2209680" imgH="3916800" progId="Paint.Picture">
+                  <p:embed/>
+                  <p:pic>
+                    <p:nvPicPr>
+                      <p:cNvPr id="0" name=""/>
+                      <p:cNvPicPr/>
+                      <p:nvPr/>
+                    </p:nvPicPr>
+                    <p:blipFill>
+                      <a:blip r:embed="rId4"/>
+                      <a:stretch>
+                        <a:fillRect/>
+                      </a:stretch>
+                    </p:blipFill>
+                    <p:spPr>
+                      <a:xfrm>
+                        <a:off x="838200" y="1836470"/>
+                        <a:ext cx="2505075" cy="4085172"/>
+                      </a:xfrm>
+                      <a:prstGeom prst="rect">
+                        <a:avLst/>
+                      </a:prstGeom>
+                      <a:ln w="12700">
+                        <a:solidFill>
+                          <a:schemeClr val="accent1"/>
+                        </a:solidFill>
+                      </a:ln>
+                    </p:spPr>
+                  </p:pic>
+                </p:oleObj>
+              </mc:Fallback>
+            </mc:AlternateContent>
+          </a:graphicData>
+        </a:graphic>
+      </p:graphicFrame>
     </p:spTree>
     <p:extLst>
       <p:ext uri="{BB962C8B-B14F-4D97-AF65-F5344CB8AC3E}">
-        <p14:creationId xmlns:p14="http://schemas.microsoft.com/office/powerpoint/2010/main" val="2907635473"/>
+        <p14:creationId xmlns:p14="http://schemas.microsoft.com/office/powerpoint/2010/main" val="3945409788"/>
       </p:ext>
     </p:extLst>
   </p:cSld>
@@ -7956,14 +8970,41 @@
             <p:ph type="title"/>
           </p:nvPr>
         </p:nvSpPr>
-        <p:spPr/>
+        <p:spPr>
+          <a:xfrm>
+            <a:off x="838200" y="365125"/>
+            <a:ext cx="10515600" cy="1119961"/>
+          </a:xfrm>
+          <a:effectLst>
+            <a:outerShdw blurRad="50800" dist="38100" dir="5400000" algn="t" rotWithShape="0">
+              <a:prstClr val="black">
+                <a:alpha val="40000"/>
+              </a:prstClr>
+            </a:outerShdw>
+          </a:effectLst>
+        </p:spPr>
+        <p:style>
+          <a:lnRef idx="3">
+            <a:schemeClr val="lt1"/>
+          </a:lnRef>
+          <a:fillRef idx="1">
+            <a:schemeClr val="accent5"/>
+          </a:fillRef>
+          <a:effectRef idx="1">
+            <a:schemeClr val="accent5"/>
+          </a:effectRef>
+          <a:fontRef idx="minor">
+            <a:schemeClr val="lt1"/>
+          </a:fontRef>
+        </p:style>
         <p:txBody>
           <a:bodyPr/>
           <a:lstStyle/>
           <a:p>
+            <a:pPr algn="ctr"/>
             <a:r>
               <a:rPr lang="en-IN" b="1" dirty="0"/>
-              <a:t>4. CONCLUSION</a:t>
+              <a:t>5. Sphinx Tool for Auto Documentation</a:t>
             </a:r>
           </a:p>
         </p:txBody>
@@ -7984,12 +9025,146 @@
             <p:ph idx="1"/>
           </p:nvPr>
         </p:nvSpPr>
-        <p:spPr/>
-        <p:txBody>
-          <a:bodyPr/>
-          <a:lstStyle/>
-          <a:p>
-            <a:endParaRPr lang="en-IN"/>
+        <p:spPr>
+          <a:xfrm>
+            <a:off x="838200" y="2836599"/>
+            <a:ext cx="10143062" cy="3154279"/>
+          </a:xfrm>
+        </p:spPr>
+        <p:txBody>
+          <a:bodyPr>
+            <a:normAutofit fontScale="92500" lnSpcReduction="20000"/>
+          </a:bodyPr>
+          <a:lstStyle/>
+          <a:p>
+            <a:pPr algn="just"/>
+            <a:r>
+              <a:rPr lang="en-US" dirty="0"/>
+              <a:t>An Open-source third party Tool used for auto documentation.</a:t>
+            </a:r>
+          </a:p>
+          <a:p>
+            <a:pPr algn="just"/>
+            <a:r>
+              <a:rPr lang="en-IN" b="0" i="0" dirty="0">
+                <a:solidFill>
+                  <a:srgbClr val="24292F"/>
+                </a:solidFill>
+                <a:effectLst/>
+                <a:latin typeface="-apple-system"/>
+              </a:rPr>
+              <a:t>Sphinx is a documentation generator written in python language.</a:t>
+            </a:r>
+          </a:p>
+          <a:p>
+            <a:pPr algn="just"/>
+            <a:r>
+              <a:rPr lang="en-IN" dirty="0">
+                <a:solidFill>
+                  <a:srgbClr val="24292F"/>
+                </a:solidFill>
+                <a:latin typeface="-apple-system"/>
+              </a:rPr>
+              <a:t>Implementation of Sphinx tool by creating YAML file executed using “GitHub Actions”.</a:t>
+            </a:r>
+          </a:p>
+          <a:p>
+            <a:pPr algn="just"/>
+            <a:r>
+              <a:rPr lang="en-IN" dirty="0">
+                <a:solidFill>
+                  <a:srgbClr val="24292F"/>
+                </a:solidFill>
+                <a:latin typeface="-apple-system"/>
+              </a:rPr>
+              <a:t>Themes available in the URL below : </a:t>
+            </a:r>
+          </a:p>
+          <a:p>
+            <a:pPr marL="0" indent="0" algn="ctr">
+              <a:buNone/>
+            </a:pPr>
+            <a:r>
+              <a:rPr lang="en-IN" dirty="0">
+                <a:solidFill>
+                  <a:srgbClr val="24292F"/>
+                </a:solidFill>
+                <a:latin typeface="-apple-system"/>
+                <a:hlinkClick r:id="rId2"/>
+              </a:rPr>
+              <a:t>https://www.sphinx-doc.org/en/master/usage/theming.html</a:t>
+            </a:r>
+            <a:endParaRPr lang="en-IN" dirty="0">
+              <a:solidFill>
+                <a:srgbClr val="24292F"/>
+              </a:solidFill>
+              <a:latin typeface="-apple-system"/>
+            </a:endParaRPr>
+          </a:p>
+          <a:p>
+            <a:pPr algn="just"/>
+            <a:r>
+              <a:rPr lang="en-IN" dirty="0">
+                <a:solidFill>
+                  <a:srgbClr val="24292F"/>
+                </a:solidFill>
+                <a:latin typeface="-apple-system"/>
+              </a:rPr>
+              <a:t>Details provided in the Git Wiki link in our repository. Click </a:t>
+            </a:r>
+            <a:r>
+              <a:rPr lang="en-IN" dirty="0">
+                <a:solidFill>
+                  <a:srgbClr val="24292F"/>
+                </a:solidFill>
+                <a:latin typeface="-apple-system"/>
+                <a:hlinkClick r:id="rId3"/>
+              </a:rPr>
+              <a:t>here</a:t>
+            </a:r>
+            <a:r>
+              <a:rPr lang="en-IN" dirty="0">
+                <a:solidFill>
+                  <a:srgbClr val="24292F"/>
+                </a:solidFill>
+                <a:latin typeface="-apple-system"/>
+              </a:rPr>
+              <a:t>.</a:t>
+            </a:r>
+          </a:p>
+          <a:p>
+            <a:pPr algn="just"/>
+            <a:r>
+              <a:rPr lang="en-IN" dirty="0">
+                <a:solidFill>
+                  <a:srgbClr val="24292F"/>
+                </a:solidFill>
+                <a:latin typeface="-apple-system"/>
+              </a:rPr>
+              <a:t>Branch created for auto documentation – ‘</a:t>
+            </a:r>
+            <a:r>
+              <a:rPr lang="en-IN" dirty="0" err="1">
+                <a:solidFill>
+                  <a:srgbClr val="24292F"/>
+                </a:solidFill>
+                <a:latin typeface="-apple-system"/>
+              </a:rPr>
+              <a:t>gh</a:t>
+            </a:r>
+            <a:r>
+              <a:rPr lang="en-IN" dirty="0">
+                <a:solidFill>
+                  <a:srgbClr val="24292F"/>
+                </a:solidFill>
+                <a:latin typeface="-apple-system"/>
+              </a:rPr>
+              <a:t>-pages’ (Default).</a:t>
+            </a:r>
+          </a:p>
+          <a:p>
+            <a:pPr algn="just"/>
+            <a:endParaRPr lang="en-IN" dirty="0"/>
           </a:p>
         </p:txBody>
       </p:sp>
@@ -8200,10 +9375,40 @@
           </a:p>
         </p:txBody>
       </p:sp>
+      <p:pic>
+        <p:nvPicPr>
+          <p:cNvPr id="9" name="Picture 8">
+            <a:extLst>
+              <a:ext uri="{FF2B5EF4-FFF2-40B4-BE49-F238E27FC236}">
+                <a16:creationId xmlns:a16="http://schemas.microsoft.com/office/drawing/2014/main" id="{FE2ECC11-E713-46DD-A8C9-F2FE792FD345}"/>
+              </a:ext>
+            </a:extLst>
+          </p:cNvPr>
+          <p:cNvPicPr>
+            <a:picLocks noChangeAspect="1"/>
+          </p:cNvPicPr>
+          <p:nvPr/>
+        </p:nvPicPr>
+        <p:blipFill>
+          <a:blip r:embed="rId4"/>
+          <a:stretch>
+            <a:fillRect/>
+          </a:stretch>
+        </p:blipFill>
+        <p:spPr>
+          <a:xfrm>
+            <a:off x="3013010" y="1523359"/>
+            <a:ext cx="5793442" cy="1274966"/>
+          </a:xfrm>
+          <a:prstGeom prst="rect">
+            <a:avLst/>
+          </a:prstGeom>
+        </p:spPr>
+      </p:pic>
     </p:spTree>
     <p:extLst>
       <p:ext uri="{BB962C8B-B14F-4D97-AF65-F5344CB8AC3E}">
-        <p14:creationId xmlns:p14="http://schemas.microsoft.com/office/powerpoint/2010/main" val="4193434119"/>
+        <p14:creationId xmlns:p14="http://schemas.microsoft.com/office/powerpoint/2010/main" val="2108658942"/>
       </p:ext>
     </p:extLst>
   </p:cSld>

</xml_diff>

<commit_message>
Updated the Job names for better understanding
</commit_message>
<xml_diff>
--- a/Wicked Adventures.pptx
+++ b/Wicked Adventures.pptx
@@ -210,7 +210,7 @@
           <a:p>
             <a:fld id="{699807B5-D91D-4BD3-A7F9-ADD7559991AC}" type="datetimeFigureOut">
               <a:rPr lang="en-IN" smtClean="0"/>
-              <a:t>03-04-2022</a:t>
+              <a:t>05-04-2022</a:t>
             </a:fld>
             <a:endParaRPr lang="en-IN"/>
           </a:p>
@@ -627,7 +627,7 @@
           <a:p>
             <a:fld id="{639C5C35-4D10-4B81-A2B2-3672B162D0EF}" type="datetimeFigureOut">
               <a:rPr lang="en-IN" smtClean="0"/>
-              <a:t>03-04-2022</a:t>
+              <a:t>05-04-2022</a:t>
             </a:fld>
             <a:endParaRPr lang="en-IN"/>
           </a:p>
@@ -827,7 +827,7 @@
           <a:p>
             <a:fld id="{639C5C35-4D10-4B81-A2B2-3672B162D0EF}" type="datetimeFigureOut">
               <a:rPr lang="en-IN" smtClean="0"/>
-              <a:t>03-04-2022</a:t>
+              <a:t>05-04-2022</a:t>
             </a:fld>
             <a:endParaRPr lang="en-IN"/>
           </a:p>
@@ -1037,7 +1037,7 @@
           <a:p>
             <a:fld id="{639C5C35-4D10-4B81-A2B2-3672B162D0EF}" type="datetimeFigureOut">
               <a:rPr lang="en-IN" smtClean="0"/>
-              <a:t>03-04-2022</a:t>
+              <a:t>05-04-2022</a:t>
             </a:fld>
             <a:endParaRPr lang="en-IN"/>
           </a:p>
@@ -1237,7 +1237,7 @@
           <a:p>
             <a:fld id="{639C5C35-4D10-4B81-A2B2-3672B162D0EF}" type="datetimeFigureOut">
               <a:rPr lang="en-IN" smtClean="0"/>
-              <a:t>03-04-2022</a:t>
+              <a:t>05-04-2022</a:t>
             </a:fld>
             <a:endParaRPr lang="en-IN"/>
           </a:p>
@@ -1513,7 +1513,7 @@
           <a:p>
             <a:fld id="{639C5C35-4D10-4B81-A2B2-3672B162D0EF}" type="datetimeFigureOut">
               <a:rPr lang="en-IN" smtClean="0"/>
-              <a:t>03-04-2022</a:t>
+              <a:t>05-04-2022</a:t>
             </a:fld>
             <a:endParaRPr lang="en-IN"/>
           </a:p>
@@ -1781,7 +1781,7 @@
           <a:p>
             <a:fld id="{639C5C35-4D10-4B81-A2B2-3672B162D0EF}" type="datetimeFigureOut">
               <a:rPr lang="en-IN" smtClean="0"/>
-              <a:t>03-04-2022</a:t>
+              <a:t>05-04-2022</a:t>
             </a:fld>
             <a:endParaRPr lang="en-IN"/>
           </a:p>
@@ -2196,7 +2196,7 @@
           <a:p>
             <a:fld id="{639C5C35-4D10-4B81-A2B2-3672B162D0EF}" type="datetimeFigureOut">
               <a:rPr lang="en-IN" smtClean="0"/>
-              <a:t>03-04-2022</a:t>
+              <a:t>05-04-2022</a:t>
             </a:fld>
             <a:endParaRPr lang="en-IN"/>
           </a:p>
@@ -2338,7 +2338,7 @@
           <a:p>
             <a:fld id="{639C5C35-4D10-4B81-A2B2-3672B162D0EF}" type="datetimeFigureOut">
               <a:rPr lang="en-IN" smtClean="0"/>
-              <a:t>03-04-2022</a:t>
+              <a:t>05-04-2022</a:t>
             </a:fld>
             <a:endParaRPr lang="en-IN"/>
           </a:p>
@@ -2451,7 +2451,7 @@
           <a:p>
             <a:fld id="{639C5C35-4D10-4B81-A2B2-3672B162D0EF}" type="datetimeFigureOut">
               <a:rPr lang="en-IN" smtClean="0"/>
-              <a:t>03-04-2022</a:t>
+              <a:t>05-04-2022</a:t>
             </a:fld>
             <a:endParaRPr lang="en-IN"/>
           </a:p>
@@ -2764,7 +2764,7 @@
           <a:p>
             <a:fld id="{639C5C35-4D10-4B81-A2B2-3672B162D0EF}" type="datetimeFigureOut">
               <a:rPr lang="en-IN" smtClean="0"/>
-              <a:t>03-04-2022</a:t>
+              <a:t>05-04-2022</a:t>
             </a:fld>
             <a:endParaRPr lang="en-IN"/>
           </a:p>
@@ -3053,7 +3053,7 @@
           <a:p>
             <a:fld id="{639C5C35-4D10-4B81-A2B2-3672B162D0EF}" type="datetimeFigureOut">
               <a:rPr lang="en-IN" smtClean="0"/>
-              <a:t>03-04-2022</a:t>
+              <a:t>05-04-2022</a:t>
             </a:fld>
             <a:endParaRPr lang="en-IN"/>
           </a:p>
@@ -3296,7 +3296,7 @@
           <a:p>
             <a:fld id="{639C5C35-4D10-4B81-A2B2-3672B162D0EF}" type="datetimeFigureOut">
               <a:rPr lang="en-IN" smtClean="0"/>
-              <a:t>03-04-2022</a:t>
+              <a:t>05-04-2022</a:t>
             </a:fld>
             <a:endParaRPr lang="en-IN"/>
           </a:p>
@@ -3935,7 +3935,7 @@
                   <a:schemeClr val="tx1"/>
                 </a:solidFill>
               </a:rPr>
-              <a:t>03-04-2022</a:t>
+              <a:t>05-04-2022</a:t>
             </a:fld>
             <a:endParaRPr lang="en-IN" sz="2000" b="1" dirty="0">
               <a:solidFill>
@@ -5281,7 +5281,7 @@
           <a:graphicData uri="http://schemas.openxmlformats.org/presentationml/2006/ole">
             <mc:AlternateContent xmlns:mc="http://schemas.openxmlformats.org/markup-compatibility/2006">
               <mc:Choice xmlns:v="urn:schemas-microsoft-com:vml" Requires="v">
-                <p:oleObj spid="_x0000_s3084" name="Bitmap Image" r:id="rId3" imgW="5753160" imgH="1973520" progId="Paint.Picture">
+                <p:oleObj spid="_x0000_s3085" name="Bitmap Image" r:id="rId3" imgW="5753160" imgH="1973520" progId="Paint.Picture">
                   <p:embed/>
                 </p:oleObj>
               </mc:Choice>
@@ -6767,7 +6767,7 @@
           <a:bodyPr/>
           <a:lstStyle/>
           <a:p>
-            <a:endParaRPr lang="en-IN"/>
+            <a:endParaRPr lang="en-IN" dirty="0"/>
           </a:p>
         </p:txBody>
       </p:sp>
@@ -7024,14 +7024,46 @@
             <p:ph type="title"/>
           </p:nvPr>
         </p:nvSpPr>
-        <p:spPr/>
-        <p:txBody>
-          <a:bodyPr/>
-          <a:lstStyle/>
-          <a:p>
-            <a:r>
-              <a:rPr lang="en-IN" b="1" dirty="0"/>
-              <a:t>3. APPLICATION</a:t>
+        <p:spPr>
+          <a:effectLst>
+            <a:outerShdw blurRad="50800" dist="38100" dir="5400000" algn="t" rotWithShape="0">
+              <a:prstClr val="black">
+                <a:alpha val="40000"/>
+              </a:prstClr>
+            </a:outerShdw>
+          </a:effectLst>
+        </p:spPr>
+        <p:style>
+          <a:lnRef idx="3">
+            <a:schemeClr val="lt1"/>
+          </a:lnRef>
+          <a:fillRef idx="1">
+            <a:schemeClr val="accent5"/>
+          </a:fillRef>
+          <a:effectRef idx="1">
+            <a:schemeClr val="accent5"/>
+          </a:effectRef>
+          <a:fontRef idx="minor">
+            <a:schemeClr val="lt1"/>
+          </a:fontRef>
+        </p:style>
+        <p:txBody>
+          <a:bodyPr vert="horz" lIns="91440" tIns="45720" rIns="91440" bIns="45720" rtlCol="0" anchor="ctr">
+            <a:normAutofit/>
+          </a:bodyPr>
+          <a:lstStyle/>
+          <a:p>
+            <a:pPr algn="ctr"/>
+            <a:r>
+              <a:rPr lang="en-IN" b="1" dirty="0">
+                <a:solidFill>
+                  <a:schemeClr val="lt1"/>
+                </a:solidFill>
+                <a:latin typeface="+mn-lt"/>
+                <a:ea typeface="+mn-ea"/>
+                <a:cs typeface="+mn-cs"/>
+              </a:rPr>
+              <a:t>APPLICATION</a:t>
             </a:r>
           </a:p>
         </p:txBody>
@@ -7315,6 +7347,10 @@
           </p:nvPr>
         </p:nvSpPr>
         <p:spPr>
+          <a:xfrm>
+            <a:off x="838200" y="346464"/>
+            <a:ext cx="10515600" cy="1325563"/>
+          </a:xfrm>
           <a:effectLst>
             <a:outerShdw blurRad="50800" dist="38100" dir="5400000" algn="t" rotWithShape="0">
               <a:prstClr val="black">
@@ -9508,7 +9544,7 @@
           <a:graphicData uri="http://schemas.openxmlformats.org/presentationml/2006/ole">
             <mc:AlternateContent xmlns:mc="http://schemas.openxmlformats.org/markup-compatibility/2006">
               <mc:Choice xmlns:v="urn:schemas-microsoft-com:vml" Requires="v">
-                <p:oleObj spid="_x0000_s1072" name="Bitmap Image" r:id="rId4" imgW="4267080" imgH="4389120" progId="Paint.Picture">
+                <p:oleObj spid="_x0000_s1073" name="Bitmap Image" r:id="rId4" imgW="4267080" imgH="4389120" progId="Paint.Picture">
                   <p:embed/>
                 </p:oleObj>
               </mc:Choice>
@@ -9972,7 +10008,7 @@
           <a:graphicData uri="http://schemas.openxmlformats.org/presentationml/2006/ole">
             <mc:AlternateContent xmlns:mc="http://schemas.openxmlformats.org/markup-compatibility/2006">
               <mc:Choice xmlns:v="urn:schemas-microsoft-com:vml" Requires="v">
-                <p:oleObj spid="_x0000_s2069" name="Bitmap Image" r:id="rId3" imgW="2209680" imgH="3916800" progId="Paint.Picture">
+                <p:oleObj spid="_x0000_s2070" name="Bitmap Image" r:id="rId3" imgW="2209680" imgH="3916800" progId="Paint.Picture">
                   <p:embed/>
                 </p:oleObj>
               </mc:Choice>

</xml_diff>

<commit_message>
pytest flow ppt update
</commit_message>
<xml_diff>
--- a/Wicked Adventures.pptx
+++ b/Wicked Adventures.pptx
@@ -5,7 +5,7 @@
     <p:sldMasterId id="2147483648" r:id="rId1"/>
   </p:sldMasterIdLst>
   <p:notesMasterIdLst>
-    <p:notesMasterId r:id="rId16"/>
+    <p:notesMasterId r:id="rId17"/>
   </p:notesMasterIdLst>
   <p:sldIdLst>
     <p:sldId id="258" r:id="rId2"/>
@@ -17,11 +17,12 @@
     <p:sldId id="268" r:id="rId8"/>
     <p:sldId id="262" r:id="rId9"/>
     <p:sldId id="269" r:id="rId10"/>
-    <p:sldId id="265" r:id="rId11"/>
-    <p:sldId id="270" r:id="rId12"/>
-    <p:sldId id="267" r:id="rId13"/>
-    <p:sldId id="264" r:id="rId14"/>
-    <p:sldId id="263" r:id="rId15"/>
+    <p:sldId id="273" r:id="rId11"/>
+    <p:sldId id="265" r:id="rId12"/>
+    <p:sldId id="270" r:id="rId13"/>
+    <p:sldId id="267" r:id="rId14"/>
+    <p:sldId id="264" r:id="rId15"/>
+    <p:sldId id="263" r:id="rId16"/>
   </p:sldIdLst>
   <p:sldSz cx="12192000" cy="6858000"/>
   <p:notesSz cx="6858000" cy="9144000"/>
@@ -4473,7 +4474,7 @@
           <p:cNvPr id="2" name="Title 1">
             <a:extLst>
               <a:ext uri="{FF2B5EF4-FFF2-40B4-BE49-F238E27FC236}">
-                <a16:creationId xmlns:a16="http://schemas.microsoft.com/office/drawing/2014/main" id="{C0666519-3484-48F3-927E-47679DE94711}"/>
+                <a16:creationId xmlns:a16="http://schemas.microsoft.com/office/drawing/2014/main" id="{FED447EA-CAB5-4B9D-8BA6-B4AFD140C0A9}"/>
               </a:ext>
             </a:extLst>
           </p:cNvPr>
@@ -4484,11 +4485,205 @@
             <p:ph type="title"/>
           </p:nvPr>
         </p:nvSpPr>
-        <p:spPr>
-          <a:xfrm>
-            <a:off x="838200" y="365125"/>
+        <p:spPr/>
+        <p:txBody>
+          <a:bodyPr/>
+          <a:lstStyle/>
+          <a:p>
+            <a:r>
+              <a:rPr lang="en-IN" b="1" dirty="0" err="1">
+                <a:solidFill>
+                  <a:schemeClr val="lt1"/>
+                </a:solidFill>
+                <a:latin typeface="+mn-lt"/>
+                <a:ea typeface="+mn-ea"/>
+                <a:cs typeface="+mn-cs"/>
+              </a:rPr>
+              <a:t>ytest</a:t>
+            </a:r>
+            <a:r>
+              <a:rPr lang="en-IN" b="1" dirty="0">
+                <a:solidFill>
+                  <a:schemeClr val="lt1"/>
+                </a:solidFill>
+                <a:latin typeface="+mn-lt"/>
+                <a:ea typeface="+mn-ea"/>
+                <a:cs typeface="+mn-cs"/>
+              </a:rPr>
+              <a:t> for unit </a:t>
+            </a:r>
+            <a:r>
+              <a:rPr lang="en-IN" b="1" dirty="0" err="1">
+                <a:solidFill>
+                  <a:schemeClr val="lt1"/>
+                </a:solidFill>
+                <a:latin typeface="+mn-lt"/>
+                <a:ea typeface="+mn-ea"/>
+                <a:cs typeface="+mn-cs"/>
+              </a:rPr>
+              <a:t>testingest</a:t>
+            </a:r>
+            <a:r>
+              <a:rPr lang="en-IN" b="1" dirty="0">
+                <a:solidFill>
+                  <a:schemeClr val="lt1"/>
+                </a:solidFill>
+                <a:latin typeface="+mn-lt"/>
+                <a:ea typeface="+mn-ea"/>
+                <a:cs typeface="+mn-cs"/>
+              </a:rPr>
+              <a:t> for unit </a:t>
+            </a:r>
+            <a:r>
+              <a:rPr lang="en-IN" b="1" dirty="0" err="1">
+                <a:solidFill>
+                  <a:schemeClr val="lt1"/>
+                </a:solidFill>
+                <a:latin typeface="+mn-lt"/>
+                <a:ea typeface="+mn-ea"/>
+                <a:cs typeface="+mn-cs"/>
+              </a:rPr>
+              <a:t>testingor</a:t>
+            </a:r>
+            <a:r>
+              <a:rPr lang="en-IN" b="1" dirty="0">
+                <a:solidFill>
+                  <a:schemeClr val="lt1"/>
+                </a:solidFill>
+                <a:latin typeface="+mn-lt"/>
+                <a:ea typeface="+mn-ea"/>
+                <a:cs typeface="+mn-cs"/>
+              </a:rPr>
+              <a:t> unit testing</a:t>
+            </a:r>
+            <a:endParaRPr lang="en-IE" dirty="0"/>
+          </a:p>
+        </p:txBody>
+      </p:sp>
+      <p:sp>
+        <p:nvSpPr>
+          <p:cNvPr id="3" name="Content Placeholder 2">
+            <a:extLst>
+              <a:ext uri="{FF2B5EF4-FFF2-40B4-BE49-F238E27FC236}">
+                <a16:creationId xmlns:a16="http://schemas.microsoft.com/office/drawing/2014/main" id="{B8C2C50D-E651-47FD-8B7C-D05DDE3A937A}"/>
+              </a:ext>
+            </a:extLst>
+          </p:cNvPr>
+          <p:cNvSpPr>
+            <a:spLocks noGrp="1"/>
+          </p:cNvSpPr>
+          <p:nvPr>
+            <p:ph idx="1"/>
+          </p:nvPr>
+        </p:nvSpPr>
+        <p:spPr/>
+        <p:txBody>
+          <a:bodyPr/>
+          <a:lstStyle/>
+          <a:p>
+            <a:r>
+              <a:rPr lang="en-US" dirty="0"/>
+              <a:t>PyTest is a testing framework that allows users to write test scripts in Python.</a:t>
+            </a:r>
+          </a:p>
+          <a:p>
+            <a:r>
+              <a:rPr lang="en-US" dirty="0"/>
+              <a:t>It helps with the development of tests ranging from </a:t>
+            </a:r>
+            <a:br>
+              <a:rPr lang="en-US" dirty="0"/>
+            </a:br>
+            <a:r>
+              <a:rPr lang="en-US" dirty="0"/>
+              <a:t>simple unit tests to large functional tests.</a:t>
+            </a:r>
+          </a:p>
+          <a:p>
+            <a:r>
+              <a:rPr lang="en-IE" dirty="0"/>
+              <a:t>Pytest is very easy, open source and run the test in parallel manner.</a:t>
+            </a:r>
+          </a:p>
+          <a:p>
+            <a:r>
+              <a:rPr lang="en-IE" dirty="0"/>
+              <a:t>Unit testing has been performed using PyTest.</a:t>
+            </a:r>
+          </a:p>
+          <a:p>
+            <a:r>
+              <a:rPr lang="en-IE" dirty="0"/>
+              <a:t>Integration of PyTest in GitHub action using python application.</a:t>
+            </a:r>
+          </a:p>
+          <a:p>
+            <a:r>
+              <a:rPr lang="en-IN" dirty="0">
+                <a:solidFill>
+                  <a:srgbClr val="24292F"/>
+                </a:solidFill>
+                <a:latin typeface="-apple-system"/>
+              </a:rPr>
+              <a:t>Details provided in the Git Wiki link in our repository. Click </a:t>
+            </a:r>
+            <a:r>
+              <a:rPr lang="en-IN">
+                <a:solidFill>
+                  <a:srgbClr val="24292F"/>
+                </a:solidFill>
+                <a:latin typeface="-apple-system"/>
+                <a:hlinkClick r:id="rId2"/>
+              </a:rPr>
+              <a:t>here</a:t>
+            </a:r>
+            <a:r>
+              <a:rPr lang="en-IN">
+                <a:solidFill>
+                  <a:srgbClr val="24292F"/>
+                </a:solidFill>
+                <a:latin typeface="-apple-system"/>
+              </a:rPr>
+              <a:t>.-</a:t>
+            </a:r>
+            <a:endParaRPr lang="en-IN" dirty="0">
+              <a:solidFill>
+                <a:srgbClr val="24292F"/>
+              </a:solidFill>
+              <a:latin typeface="-apple-system"/>
+            </a:endParaRPr>
+          </a:p>
+          <a:p>
+            <a:pPr algn="just"/>
+            <a:endParaRPr lang="en-US" dirty="0"/>
+          </a:p>
+          <a:p>
+            <a:endParaRPr lang="en-IE" dirty="0"/>
+          </a:p>
+        </p:txBody>
+      </p:sp>
+      <p:sp>
+        <p:nvSpPr>
+          <p:cNvPr id="4" name="Title 1">
+            <a:extLst>
+              <a:ext uri="{FF2B5EF4-FFF2-40B4-BE49-F238E27FC236}">
+                <a16:creationId xmlns:a16="http://schemas.microsoft.com/office/drawing/2014/main" id="{FCE4FA1B-AECD-41C7-9705-D28E86BF5E04}"/>
+              </a:ext>
+            </a:extLst>
+          </p:cNvPr>
+          <p:cNvSpPr txBox="1">
+            <a:spLocks/>
+          </p:cNvSpPr>
+          <p:nvPr/>
+        </p:nvSpPr>
+        <p:spPr>
+          <a:xfrm>
+            <a:off x="838200" y="467925"/>
             <a:ext cx="10515600" cy="1119961"/>
           </a:xfrm>
+          <a:prstGeom prst="rect">
+            <a:avLst/>
+          </a:prstGeom>
           <a:effectLst>
             <a:outerShdw blurRad="50800" dist="38100" dir="5400000" algn="t" rotWithShape="0">
               <a:prstClr val="black">
@@ -4512,417 +4707,133 @@
           </a:fontRef>
         </p:style>
         <p:txBody>
-          <a:bodyPr/>
-          <a:lstStyle/>
+          <a:bodyPr vert="horz" lIns="91440" tIns="45720" rIns="91440" bIns="45720" rtlCol="0" anchor="ctr">
+            <a:normAutofit/>
+          </a:bodyPr>
+          <a:lstStyle>
+            <a:lvl1pPr algn="l" defTabSz="914400" rtl="0" eaLnBrk="1" latinLnBrk="0" hangingPunct="1">
+              <a:lnSpc>
+                <a:spcPct val="90000"/>
+              </a:lnSpc>
+              <a:spcBef>
+                <a:spcPct val="0"/>
+              </a:spcBef>
+              <a:buNone/>
+              <a:defRPr sz="4400" kern="1200">
+                <a:solidFill>
+                  <a:schemeClr val="lt1"/>
+                </a:solidFill>
+                <a:latin typeface="+mn-lt"/>
+                <a:ea typeface="+mn-ea"/>
+                <a:cs typeface="+mn-cs"/>
+              </a:defRPr>
+            </a:lvl1pPr>
+            <a:lvl2pPr>
+              <a:defRPr>
+                <a:solidFill>
+                  <a:schemeClr val="lt1"/>
+                </a:solidFill>
+                <a:latin typeface="+mn-lt"/>
+                <a:ea typeface="+mn-ea"/>
+                <a:cs typeface="+mn-cs"/>
+              </a:defRPr>
+            </a:lvl2pPr>
+            <a:lvl3pPr>
+              <a:defRPr>
+                <a:solidFill>
+                  <a:schemeClr val="lt1"/>
+                </a:solidFill>
+                <a:latin typeface="+mn-lt"/>
+                <a:ea typeface="+mn-ea"/>
+                <a:cs typeface="+mn-cs"/>
+              </a:defRPr>
+            </a:lvl3pPr>
+            <a:lvl4pPr>
+              <a:defRPr>
+                <a:solidFill>
+                  <a:schemeClr val="lt1"/>
+                </a:solidFill>
+                <a:latin typeface="+mn-lt"/>
+                <a:ea typeface="+mn-ea"/>
+                <a:cs typeface="+mn-cs"/>
+              </a:defRPr>
+            </a:lvl4pPr>
+            <a:lvl5pPr>
+              <a:defRPr>
+                <a:solidFill>
+                  <a:schemeClr val="lt1"/>
+                </a:solidFill>
+                <a:latin typeface="+mn-lt"/>
+                <a:ea typeface="+mn-ea"/>
+                <a:cs typeface="+mn-cs"/>
+              </a:defRPr>
+            </a:lvl5pPr>
+            <a:lvl6pPr>
+              <a:defRPr>
+                <a:solidFill>
+                  <a:schemeClr val="lt1"/>
+                </a:solidFill>
+                <a:latin typeface="+mn-lt"/>
+                <a:ea typeface="+mn-ea"/>
+                <a:cs typeface="+mn-cs"/>
+              </a:defRPr>
+            </a:lvl6pPr>
+            <a:lvl7pPr>
+              <a:defRPr>
+                <a:solidFill>
+                  <a:schemeClr val="lt1"/>
+                </a:solidFill>
+                <a:latin typeface="+mn-lt"/>
+                <a:ea typeface="+mn-ea"/>
+                <a:cs typeface="+mn-cs"/>
+              </a:defRPr>
+            </a:lvl7pPr>
+            <a:lvl8pPr>
+              <a:defRPr>
+                <a:solidFill>
+                  <a:schemeClr val="lt1"/>
+                </a:solidFill>
+                <a:latin typeface="+mn-lt"/>
+                <a:ea typeface="+mn-ea"/>
+                <a:cs typeface="+mn-cs"/>
+              </a:defRPr>
+            </a:lvl8pPr>
+            <a:lvl9pPr>
+              <a:defRPr>
+                <a:solidFill>
+                  <a:schemeClr val="lt1"/>
+                </a:solidFill>
+                <a:latin typeface="+mn-lt"/>
+                <a:ea typeface="+mn-ea"/>
+                <a:cs typeface="+mn-cs"/>
+              </a:defRPr>
+            </a:lvl9pPr>
+          </a:lstStyle>
           <a:p>
             <a:pPr algn="ctr"/>
             <a:r>
               <a:rPr lang="en-IN" b="1" dirty="0"/>
-              <a:t>5. Sphinx Tool for Auto Documentation</a:t>
-            </a:r>
-          </a:p>
-        </p:txBody>
-      </p:sp>
-      <p:sp>
-        <p:nvSpPr>
-          <p:cNvPr id="3" name="Content Placeholder 2">
-            <a:extLst>
-              <a:ext uri="{FF2B5EF4-FFF2-40B4-BE49-F238E27FC236}">
-                <a16:creationId xmlns:a16="http://schemas.microsoft.com/office/drawing/2014/main" id="{D3F11377-6BB3-4E47-B174-861CD150A86B}"/>
-              </a:ext>
-            </a:extLst>
-          </p:cNvPr>
-          <p:cNvSpPr>
-            <a:spLocks noGrp="1"/>
-          </p:cNvSpPr>
-          <p:nvPr>
-            <p:ph idx="1"/>
-          </p:nvPr>
-        </p:nvSpPr>
-        <p:spPr>
-          <a:xfrm>
-            <a:off x="838200" y="2836599"/>
-            <a:ext cx="10143062" cy="3154279"/>
-          </a:xfrm>
-        </p:spPr>
-        <p:txBody>
-          <a:bodyPr>
-            <a:normAutofit fontScale="92500" lnSpcReduction="20000"/>
-          </a:bodyPr>
-          <a:lstStyle/>
-          <a:p>
-            <a:pPr algn="just"/>
-            <a:r>
-              <a:rPr lang="en-US" dirty="0"/>
-              <a:t>An Open-source third party Tool used for auto documentation.</a:t>
-            </a:r>
-          </a:p>
-          <a:p>
-            <a:pPr algn="just"/>
-            <a:r>
-              <a:rPr lang="en-IN" b="0" i="0" dirty="0">
+              <a:t>2</a:t>
+            </a:r>
+            <a:r>
+              <a:rPr lang="en-IN" b="1" dirty="0">
                 <a:solidFill>
-                  <a:srgbClr val="24292F"/>
+                  <a:schemeClr val="lt1"/>
                 </a:solidFill>
-                <a:effectLst/>
-                <a:latin typeface="-apple-system"/>
+                <a:latin typeface="+mn-lt"/>
+                <a:ea typeface="+mn-ea"/>
+                <a:cs typeface="+mn-cs"/>
               </a:rPr>
-              <a:t>Sphinx is a documentation generator written in python language.</a:t>
-            </a:r>
-          </a:p>
-          <a:p>
-            <a:pPr algn="just"/>
-            <a:r>
-              <a:rPr lang="en-IN" dirty="0">
-                <a:solidFill>
-                  <a:srgbClr val="24292F"/>
-                </a:solidFill>
-                <a:latin typeface="-apple-system"/>
-              </a:rPr>
-              <a:t>Implementation of Sphinx tool by creating YAML file executed using “GitHub Actions”.</a:t>
-            </a:r>
-          </a:p>
-          <a:p>
-            <a:pPr algn="just"/>
-            <a:r>
-              <a:rPr lang="en-IN" dirty="0">
-                <a:solidFill>
-                  <a:srgbClr val="24292F"/>
-                </a:solidFill>
-                <a:latin typeface="-apple-system"/>
-              </a:rPr>
-              <a:t>Themes available in the URL below : </a:t>
-            </a:r>
-          </a:p>
-          <a:p>
-            <a:pPr marL="0" indent="0" algn="ctr">
-              <a:buNone/>
-            </a:pPr>
-            <a:r>
-              <a:rPr lang="en-IN" dirty="0">
-                <a:solidFill>
-                  <a:srgbClr val="24292F"/>
-                </a:solidFill>
-                <a:latin typeface="-apple-system"/>
-                <a:hlinkClick r:id="rId2"/>
-              </a:rPr>
-              <a:t>https://www.sphinx-doc.org/en/master/usage/theming.html</a:t>
-            </a:r>
-            <a:endParaRPr lang="en-IN" dirty="0">
-              <a:solidFill>
-                <a:srgbClr val="24292F"/>
-              </a:solidFill>
-              <a:latin typeface="-apple-system"/>
-            </a:endParaRPr>
-          </a:p>
-          <a:p>
-            <a:pPr algn="just"/>
-            <a:r>
-              <a:rPr lang="en-IN" dirty="0">
-                <a:solidFill>
-                  <a:srgbClr val="24292F"/>
-                </a:solidFill>
-                <a:latin typeface="-apple-system"/>
-              </a:rPr>
-              <a:t>Details provided in the Git Wiki link in our repository. Click </a:t>
-            </a:r>
-            <a:r>
-              <a:rPr lang="en-IN" dirty="0">
-                <a:solidFill>
-                  <a:srgbClr val="24292F"/>
-                </a:solidFill>
-                <a:latin typeface="-apple-system"/>
-                <a:hlinkClick r:id="rId3"/>
-              </a:rPr>
-              <a:t>here</a:t>
-            </a:r>
-            <a:r>
-              <a:rPr lang="en-IN" dirty="0">
-                <a:solidFill>
-                  <a:srgbClr val="24292F"/>
-                </a:solidFill>
-                <a:latin typeface="-apple-system"/>
-              </a:rPr>
-              <a:t>.</a:t>
-            </a:r>
-          </a:p>
-          <a:p>
-            <a:pPr algn="just"/>
-            <a:r>
-              <a:rPr lang="en-IN" dirty="0">
-                <a:solidFill>
-                  <a:srgbClr val="24292F"/>
-                </a:solidFill>
-                <a:latin typeface="-apple-system"/>
-              </a:rPr>
-              <a:t>Branch created for auto documentation – ‘</a:t>
-            </a:r>
-            <a:r>
-              <a:rPr lang="en-IN" dirty="0" err="1">
-                <a:solidFill>
-                  <a:srgbClr val="24292F"/>
-                </a:solidFill>
-                <a:latin typeface="-apple-system"/>
-              </a:rPr>
-              <a:t>gh</a:t>
-            </a:r>
-            <a:r>
-              <a:rPr lang="en-IN" dirty="0">
-                <a:solidFill>
-                  <a:srgbClr val="24292F"/>
-                </a:solidFill>
-                <a:latin typeface="-apple-system"/>
-              </a:rPr>
-              <a:t>-pages’ (Default).</a:t>
-            </a:r>
-          </a:p>
-          <a:p>
-            <a:pPr algn="just"/>
-            <a:endParaRPr lang="en-IN" dirty="0"/>
-          </a:p>
-        </p:txBody>
-      </p:sp>
-      <p:sp>
-        <p:nvSpPr>
-          <p:cNvPr id="4" name="Rectangle 3">
-            <a:extLst>
-              <a:ext uri="{FF2B5EF4-FFF2-40B4-BE49-F238E27FC236}">
-                <a16:creationId xmlns:a16="http://schemas.microsoft.com/office/drawing/2014/main" id="{8D973F9E-231E-4F4E-BF92-D9C84C7AB5A7}"/>
-              </a:ext>
-            </a:extLst>
-          </p:cNvPr>
-          <p:cNvSpPr/>
-          <p:nvPr/>
-        </p:nvSpPr>
-        <p:spPr>
-          <a:xfrm>
-            <a:off x="0" y="6067425"/>
-            <a:ext cx="9305925" cy="790575"/>
-          </a:xfrm>
-          <a:prstGeom prst="rect">
-            <a:avLst/>
-          </a:prstGeom>
-          <a:scene3d>
-            <a:camera prst="orthographicFront"/>
-            <a:lightRig rig="threePt" dir="t"/>
-          </a:scene3d>
-          <a:sp3d>
-            <a:bevelT w="114300" prst="hardEdge"/>
-          </a:sp3d>
-        </p:spPr>
-        <p:style>
-          <a:lnRef idx="2">
-            <a:schemeClr val="accent1">
-              <a:shade val="50000"/>
-            </a:schemeClr>
-          </a:lnRef>
-          <a:fillRef idx="1">
-            <a:schemeClr val="accent1"/>
-          </a:fillRef>
-          <a:effectRef idx="0">
-            <a:schemeClr val="accent1"/>
-          </a:effectRef>
-          <a:fontRef idx="minor">
-            <a:schemeClr val="lt1"/>
-          </a:fontRef>
-        </p:style>
-        <p:txBody>
-          <a:bodyPr rtlCol="0" anchor="ctr"/>
-          <a:lstStyle/>
-          <a:p>
-            <a:pPr algn="ctr"/>
-            <a:r>
-              <a:rPr lang="en-IN" sz="2000" b="1" dirty="0"/>
-              <a:t>WEDNESDAY’S WICKED ADVENTURES</a:t>
-            </a:r>
-          </a:p>
-        </p:txBody>
-      </p:sp>
-      <p:sp>
-        <p:nvSpPr>
-          <p:cNvPr id="5" name="Rectangle 4">
-            <a:extLst>
-              <a:ext uri="{FF2B5EF4-FFF2-40B4-BE49-F238E27FC236}">
-                <a16:creationId xmlns:a16="http://schemas.microsoft.com/office/drawing/2014/main" id="{ADD2B0B5-489C-4527-87A1-6AE32256E8B1}"/>
-              </a:ext>
-            </a:extLst>
-          </p:cNvPr>
-          <p:cNvSpPr/>
-          <p:nvPr/>
-        </p:nvSpPr>
-        <p:spPr>
-          <a:xfrm>
-            <a:off x="11363325" y="6067425"/>
-            <a:ext cx="828675" cy="790575"/>
-          </a:xfrm>
-          <a:prstGeom prst="rect">
-            <a:avLst/>
-          </a:prstGeom>
-          <a:scene3d>
-            <a:camera prst="orthographicFront"/>
-            <a:lightRig rig="threePt" dir="t"/>
-          </a:scene3d>
-          <a:sp3d>
-            <a:bevelT w="114300" prst="hardEdge"/>
-          </a:sp3d>
-        </p:spPr>
-        <p:style>
-          <a:lnRef idx="2">
-            <a:schemeClr val="accent1">
-              <a:shade val="50000"/>
-            </a:schemeClr>
-          </a:lnRef>
-          <a:fillRef idx="1">
-            <a:schemeClr val="accent1"/>
-          </a:fillRef>
-          <a:effectRef idx="0">
-            <a:schemeClr val="accent1"/>
-          </a:effectRef>
-          <a:fontRef idx="minor">
-            <a:schemeClr val="lt1"/>
-          </a:fontRef>
-        </p:style>
-        <p:txBody>
-          <a:bodyPr rtlCol="0" anchor="ctr"/>
-          <a:lstStyle/>
-          <a:p>
-            <a:pPr algn="ctr"/>
-            <a:endParaRPr lang="en-IN"/>
-          </a:p>
-        </p:txBody>
-      </p:sp>
-      <p:sp>
-        <p:nvSpPr>
-          <p:cNvPr id="6" name="Rectangle 5">
-            <a:extLst>
-              <a:ext uri="{FF2B5EF4-FFF2-40B4-BE49-F238E27FC236}">
-                <a16:creationId xmlns:a16="http://schemas.microsoft.com/office/drawing/2014/main" id="{8F298F8F-A536-48DC-9BA2-D0C59AC19A33}"/>
-              </a:ext>
-            </a:extLst>
-          </p:cNvPr>
-          <p:cNvSpPr/>
-          <p:nvPr/>
-        </p:nvSpPr>
-        <p:spPr>
-          <a:xfrm>
-            <a:off x="9305925" y="6067424"/>
-            <a:ext cx="2057400" cy="790575"/>
-          </a:xfrm>
-          <a:prstGeom prst="rect">
-            <a:avLst/>
-          </a:prstGeom>
-          <a:scene3d>
-            <a:camera prst="orthographicFront"/>
-            <a:lightRig rig="threePt" dir="t"/>
-          </a:scene3d>
-          <a:sp3d>
-            <a:bevelT w="114300" prst="hardEdge"/>
-          </a:sp3d>
-        </p:spPr>
-        <p:style>
-          <a:lnRef idx="2">
-            <a:schemeClr val="accent1">
-              <a:shade val="50000"/>
-            </a:schemeClr>
-          </a:lnRef>
-          <a:fillRef idx="1">
-            <a:schemeClr val="accent1"/>
-          </a:fillRef>
-          <a:effectRef idx="0">
-            <a:schemeClr val="accent1"/>
-          </a:effectRef>
-          <a:fontRef idx="minor">
-            <a:schemeClr val="lt1"/>
-          </a:fontRef>
-        </p:style>
-        <p:txBody>
-          <a:bodyPr rtlCol="0" anchor="ctr"/>
-          <a:lstStyle/>
-          <a:p>
-            <a:pPr algn="ctr"/>
-            <a:r>
-              <a:rPr lang="en-IN" sz="2000" b="1" dirty="0"/>
-              <a:t>APRIL 2022</a:t>
-            </a:r>
-          </a:p>
-        </p:txBody>
-      </p:sp>
-      <p:sp>
-        <p:nvSpPr>
-          <p:cNvPr id="8" name="Slide Number Placeholder 11">
-            <a:extLst>
-              <a:ext uri="{FF2B5EF4-FFF2-40B4-BE49-F238E27FC236}">
-                <a16:creationId xmlns:a16="http://schemas.microsoft.com/office/drawing/2014/main" id="{66E5E76B-63DE-49C5-B59F-65367A92139F}"/>
-              </a:ext>
-            </a:extLst>
-          </p:cNvPr>
-          <p:cNvSpPr>
-            <a:spLocks noGrp="1"/>
-          </p:cNvSpPr>
-          <p:nvPr>
-            <p:ph type="sldNum" sz="quarter" idx="12"/>
-          </p:nvPr>
-        </p:nvSpPr>
-        <p:spPr>
-          <a:xfrm>
-            <a:off x="11563349" y="6280148"/>
-            <a:ext cx="428625" cy="365125"/>
-          </a:xfrm>
-        </p:spPr>
-        <p:txBody>
-          <a:bodyPr/>
-          <a:lstStyle/>
-          <a:p>
-            <a:fld id="{F37EE007-93F6-4DD3-A485-65881C8FA8D0}" type="slidenum">
-              <a:rPr lang="en-IN" sz="2000" b="1" smtClean="0">
-                <a:solidFill>
-                  <a:schemeClr val="bg1"/>
-                </a:solidFill>
-              </a:rPr>
-              <a:t>10</a:t>
-            </a:fld>
-            <a:endParaRPr lang="en-IN" sz="2000" b="1" dirty="0">
-              <a:solidFill>
-                <a:schemeClr val="bg1"/>
-              </a:solidFill>
-            </a:endParaRPr>
-          </a:p>
-        </p:txBody>
-      </p:sp>
-      <p:pic>
-        <p:nvPicPr>
-          <p:cNvPr id="9" name="Picture 8">
-            <a:extLst>
-              <a:ext uri="{FF2B5EF4-FFF2-40B4-BE49-F238E27FC236}">
-                <a16:creationId xmlns:a16="http://schemas.microsoft.com/office/drawing/2014/main" id="{FE2ECC11-E713-46DD-A8C9-F2FE792FD345}"/>
-              </a:ext>
-            </a:extLst>
-          </p:cNvPr>
-          <p:cNvPicPr>
-            <a:picLocks noChangeAspect="1"/>
-          </p:cNvPicPr>
-          <p:nvPr/>
-        </p:nvPicPr>
-        <p:blipFill>
-          <a:blip r:embed="rId4"/>
-          <a:stretch>
-            <a:fillRect/>
-          </a:stretch>
-        </p:blipFill>
-        <p:spPr>
-          <a:xfrm>
-            <a:off x="3013010" y="1523359"/>
-            <a:ext cx="5793442" cy="1274966"/>
-          </a:xfrm>
-          <a:prstGeom prst="rect">
-            <a:avLst/>
-          </a:prstGeom>
-        </p:spPr>
-      </p:pic>
+              <a:t>. Pytest for unit testing</a:t>
+            </a:r>
+            <a:endParaRPr lang="en-IN" b="1" dirty="0"/>
+          </a:p>
+        </p:txBody>
+      </p:sp>
     </p:spTree>
     <p:extLst>
       <p:ext uri="{BB962C8B-B14F-4D97-AF65-F5344CB8AC3E}">
-        <p14:creationId xmlns:p14="http://schemas.microsoft.com/office/powerpoint/2010/main" val="2108658942"/>
+        <p14:creationId xmlns:p14="http://schemas.microsoft.com/office/powerpoint/2010/main" val="1818624087"/>
       </p:ext>
     </p:extLst>
   </p:cSld>
@@ -4966,6 +4877,10 @@
           </p:nvPr>
         </p:nvSpPr>
         <p:spPr>
+          <a:xfrm>
+            <a:off x="838200" y="403398"/>
+            <a:ext cx="10515600" cy="1119961"/>
+          </a:xfrm>
           <a:effectLst>
             <a:outerShdw blurRad="50800" dist="38100" dir="5400000" algn="t" rotWithShape="0">
               <a:prstClr val="black">
@@ -4989,22 +4904,13 @@
           </a:fontRef>
         </p:style>
         <p:txBody>
-          <a:bodyPr vert="horz" lIns="91440" tIns="45720" rIns="91440" bIns="45720" rtlCol="0" anchor="ctr">
-            <a:normAutofit/>
-          </a:bodyPr>
+          <a:bodyPr/>
           <a:lstStyle/>
           <a:p>
             <a:pPr algn="ctr"/>
             <a:r>
-              <a:rPr lang="en-IN" b="1" dirty="0">
-                <a:solidFill>
-                  <a:schemeClr val="lt1"/>
-                </a:solidFill>
-                <a:latin typeface="+mn-lt"/>
-                <a:ea typeface="+mn-ea"/>
-                <a:cs typeface="+mn-cs"/>
-              </a:rPr>
-              <a:t>Git Wiki for User guides and Instructions</a:t>
+              <a:rPr lang="en-IN" b="1" dirty="0"/>
+              <a:t>5. Sphinx Tool for Auto Documentation</a:t>
             </a:r>
           </a:p>
         </p:txBody>
@@ -5027,21 +4933,143 @@
         </p:nvSpPr>
         <p:spPr>
           <a:xfrm>
-            <a:off x="838201" y="1838325"/>
-            <a:ext cx="6286500" cy="1462623"/>
+            <a:off x="838200" y="2836599"/>
+            <a:ext cx="10143062" cy="3154279"/>
           </a:xfrm>
         </p:spPr>
         <p:txBody>
           <a:bodyPr>
-            <a:normAutofit/>
+            <a:normAutofit fontScale="92500" lnSpcReduction="20000"/>
           </a:bodyPr>
           <a:lstStyle/>
           <a:p>
             <a:pPr algn="just"/>
             <a:r>
               <a:rPr lang="en-US" dirty="0"/>
-              <a:t>Platform provided by Git for adding documentation for the projects hosted in the GitHub repository.</a:t>
-            </a:r>
+              <a:t>An Open-source third party Tool used for auto documentation.</a:t>
+            </a:r>
+          </a:p>
+          <a:p>
+            <a:pPr algn="just"/>
+            <a:r>
+              <a:rPr lang="en-IN" b="0" i="0" dirty="0">
+                <a:solidFill>
+                  <a:srgbClr val="24292F"/>
+                </a:solidFill>
+                <a:effectLst/>
+                <a:latin typeface="-apple-system"/>
+              </a:rPr>
+              <a:t>Sphinx is a documentation generator written in python language.</a:t>
+            </a:r>
+          </a:p>
+          <a:p>
+            <a:pPr algn="just"/>
+            <a:r>
+              <a:rPr lang="en-IN" dirty="0">
+                <a:solidFill>
+                  <a:srgbClr val="24292F"/>
+                </a:solidFill>
+                <a:latin typeface="-apple-system"/>
+              </a:rPr>
+              <a:t>Implementation of Sphinx tool by creating YAML file executed using “GitHub Actions”.</a:t>
+            </a:r>
+          </a:p>
+          <a:p>
+            <a:pPr algn="just"/>
+            <a:r>
+              <a:rPr lang="en-IN" dirty="0">
+                <a:solidFill>
+                  <a:srgbClr val="24292F"/>
+                </a:solidFill>
+                <a:latin typeface="-apple-system"/>
+              </a:rPr>
+              <a:t>Themes available in the URL below : </a:t>
+            </a:r>
+          </a:p>
+          <a:p>
+            <a:pPr marL="0" indent="0" algn="ctr">
+              <a:buNone/>
+            </a:pPr>
+            <a:r>
+              <a:rPr lang="en-IN" dirty="0">
+                <a:solidFill>
+                  <a:srgbClr val="24292F"/>
+                </a:solidFill>
+                <a:latin typeface="-apple-system"/>
+                <a:hlinkClick r:id="rId2"/>
+              </a:rPr>
+              <a:t>https://www.sphinx-doc.org/en/master/usage/theming.html</a:t>
+            </a:r>
+            <a:endParaRPr lang="en-IN" dirty="0">
+              <a:solidFill>
+                <a:srgbClr val="24292F"/>
+              </a:solidFill>
+              <a:latin typeface="-apple-system"/>
+            </a:endParaRPr>
+          </a:p>
+          <a:p>
+            <a:pPr algn="just"/>
+            <a:r>
+              <a:rPr lang="en-IN" dirty="0">
+                <a:solidFill>
+                  <a:srgbClr val="24292F"/>
+                </a:solidFill>
+                <a:latin typeface="-apple-system"/>
+              </a:rPr>
+              <a:t>Details provided in the Git Wiki link in our repository. Click </a:t>
+            </a:r>
+            <a:r>
+              <a:rPr lang="en-IN" dirty="0">
+                <a:solidFill>
+                  <a:srgbClr val="24292F"/>
+                </a:solidFill>
+                <a:latin typeface="-apple-system"/>
+                <a:hlinkClick r:id="rId3"/>
+              </a:rPr>
+              <a:t>here</a:t>
+            </a:r>
+            <a:r>
+              <a:rPr lang="en-IN" dirty="0">
+                <a:solidFill>
+                  <a:srgbClr val="24292F"/>
+                </a:solidFill>
+                <a:latin typeface="-apple-system"/>
+              </a:rPr>
+              <a:t>.</a:t>
+            </a:r>
+          </a:p>
+          <a:p>
+            <a:pPr algn="just"/>
+            <a:r>
+              <a:rPr lang="en-IN" dirty="0">
+                <a:solidFill>
+                  <a:srgbClr val="24292F"/>
+                </a:solidFill>
+                <a:latin typeface="-apple-system"/>
+              </a:rPr>
+              <a:t>Branch created for auto documentation – ‘</a:t>
+            </a:r>
+            <a:r>
+              <a:rPr lang="en-IN" dirty="0" err="1">
+                <a:solidFill>
+                  <a:srgbClr val="24292F"/>
+                </a:solidFill>
+                <a:latin typeface="-apple-system"/>
+              </a:rPr>
+              <a:t>gh</a:t>
+            </a:r>
+            <a:r>
+              <a:rPr lang="en-IN" dirty="0">
+                <a:solidFill>
+                  <a:srgbClr val="24292F"/>
+                </a:solidFill>
+                <a:latin typeface="-apple-system"/>
+              </a:rPr>
+              <a:t>-pages’ (Default).</a:t>
+            </a:r>
+          </a:p>
+          <a:p>
+            <a:pPr algn="just"/>
             <a:endParaRPr lang="en-IN" dirty="0"/>
           </a:p>
         </p:txBody>
@@ -5244,6 +5272,370 @@
                 </a:solidFill>
               </a:rPr>
               <a:t>11</a:t>
+            </a:fld>
+            <a:endParaRPr lang="en-IN" sz="2000" b="1" dirty="0">
+              <a:solidFill>
+                <a:schemeClr val="bg1"/>
+              </a:solidFill>
+            </a:endParaRPr>
+          </a:p>
+        </p:txBody>
+      </p:sp>
+      <p:pic>
+        <p:nvPicPr>
+          <p:cNvPr id="9" name="Picture 8">
+            <a:extLst>
+              <a:ext uri="{FF2B5EF4-FFF2-40B4-BE49-F238E27FC236}">
+                <a16:creationId xmlns:a16="http://schemas.microsoft.com/office/drawing/2014/main" id="{FE2ECC11-E713-46DD-A8C9-F2FE792FD345}"/>
+              </a:ext>
+            </a:extLst>
+          </p:cNvPr>
+          <p:cNvPicPr>
+            <a:picLocks noChangeAspect="1"/>
+          </p:cNvPicPr>
+          <p:nvPr/>
+        </p:nvPicPr>
+        <p:blipFill>
+          <a:blip r:embed="rId4"/>
+          <a:stretch>
+            <a:fillRect/>
+          </a:stretch>
+        </p:blipFill>
+        <p:spPr>
+          <a:xfrm>
+            <a:off x="3013010" y="1523359"/>
+            <a:ext cx="5793442" cy="1274966"/>
+          </a:xfrm>
+          <a:prstGeom prst="rect">
+            <a:avLst/>
+          </a:prstGeom>
+        </p:spPr>
+      </p:pic>
+    </p:spTree>
+    <p:extLst>
+      <p:ext uri="{BB962C8B-B14F-4D97-AF65-F5344CB8AC3E}">
+        <p14:creationId xmlns:p14="http://schemas.microsoft.com/office/powerpoint/2010/main" val="2108658942"/>
+      </p:ext>
+    </p:extLst>
+  </p:cSld>
+  <p:clrMapOvr>
+    <a:masterClrMapping/>
+  </p:clrMapOvr>
+</p:sld>
+</file>
+
+<file path=ppt/slides/slide12.xml><?xml version="1.0" encoding="utf-8"?>
+<p:sld xmlns:a="http://schemas.openxmlformats.org/drawingml/2006/main" xmlns:r="http://schemas.openxmlformats.org/officeDocument/2006/relationships" xmlns:p="http://schemas.openxmlformats.org/presentationml/2006/main">
+  <p:cSld>
+    <p:spTree>
+      <p:nvGrpSpPr>
+        <p:cNvPr id="1" name=""/>
+        <p:cNvGrpSpPr/>
+        <p:nvPr/>
+      </p:nvGrpSpPr>
+      <p:grpSpPr>
+        <a:xfrm>
+          <a:off x="0" y="0"/>
+          <a:ext cx="0" cy="0"/>
+          <a:chOff x="0" y="0"/>
+          <a:chExt cx="0" cy="0"/>
+        </a:xfrm>
+      </p:grpSpPr>
+      <p:sp>
+        <p:nvSpPr>
+          <p:cNvPr id="2" name="Title 1">
+            <a:extLst>
+              <a:ext uri="{FF2B5EF4-FFF2-40B4-BE49-F238E27FC236}">
+                <a16:creationId xmlns:a16="http://schemas.microsoft.com/office/drawing/2014/main" id="{C0666519-3484-48F3-927E-47679DE94711}"/>
+              </a:ext>
+            </a:extLst>
+          </p:cNvPr>
+          <p:cNvSpPr>
+            <a:spLocks noGrp="1"/>
+          </p:cNvSpPr>
+          <p:nvPr>
+            <p:ph type="title"/>
+          </p:nvPr>
+        </p:nvSpPr>
+        <p:spPr>
+          <a:effectLst>
+            <a:outerShdw blurRad="50800" dist="38100" dir="5400000" algn="t" rotWithShape="0">
+              <a:prstClr val="black">
+                <a:alpha val="40000"/>
+              </a:prstClr>
+            </a:outerShdw>
+          </a:effectLst>
+        </p:spPr>
+        <p:style>
+          <a:lnRef idx="3">
+            <a:schemeClr val="lt1"/>
+          </a:lnRef>
+          <a:fillRef idx="1">
+            <a:schemeClr val="accent5"/>
+          </a:fillRef>
+          <a:effectRef idx="1">
+            <a:schemeClr val="accent5"/>
+          </a:effectRef>
+          <a:fontRef idx="minor">
+            <a:schemeClr val="lt1"/>
+          </a:fontRef>
+        </p:style>
+        <p:txBody>
+          <a:bodyPr vert="horz" lIns="91440" tIns="45720" rIns="91440" bIns="45720" rtlCol="0" anchor="ctr">
+            <a:normAutofit/>
+          </a:bodyPr>
+          <a:lstStyle/>
+          <a:p>
+            <a:pPr algn="ctr"/>
+            <a:r>
+              <a:rPr lang="en-IN" b="1" dirty="0">
+                <a:solidFill>
+                  <a:schemeClr val="lt1"/>
+                </a:solidFill>
+                <a:latin typeface="+mn-lt"/>
+                <a:ea typeface="+mn-ea"/>
+                <a:cs typeface="+mn-cs"/>
+              </a:rPr>
+              <a:t>Git Wiki for User guides and Instructions</a:t>
+            </a:r>
+          </a:p>
+        </p:txBody>
+      </p:sp>
+      <p:sp>
+        <p:nvSpPr>
+          <p:cNvPr id="3" name="Content Placeholder 2">
+            <a:extLst>
+              <a:ext uri="{FF2B5EF4-FFF2-40B4-BE49-F238E27FC236}">
+                <a16:creationId xmlns:a16="http://schemas.microsoft.com/office/drawing/2014/main" id="{D3F11377-6BB3-4E47-B174-861CD150A86B}"/>
+              </a:ext>
+            </a:extLst>
+          </p:cNvPr>
+          <p:cNvSpPr>
+            <a:spLocks noGrp="1"/>
+          </p:cNvSpPr>
+          <p:nvPr>
+            <p:ph idx="1"/>
+          </p:nvPr>
+        </p:nvSpPr>
+        <p:spPr>
+          <a:xfrm>
+            <a:off x="838201" y="1838325"/>
+            <a:ext cx="6286500" cy="1462623"/>
+          </a:xfrm>
+        </p:spPr>
+        <p:txBody>
+          <a:bodyPr>
+            <a:normAutofit/>
+          </a:bodyPr>
+          <a:lstStyle/>
+          <a:p>
+            <a:pPr algn="just"/>
+            <a:r>
+              <a:rPr lang="en-US" dirty="0"/>
+              <a:t>Platform provided by Git for adding documentation for the projects hosted in the GitHub repository.</a:t>
+            </a:r>
+            <a:endParaRPr lang="en-IN" dirty="0"/>
+          </a:p>
+        </p:txBody>
+      </p:sp>
+      <p:sp>
+        <p:nvSpPr>
+          <p:cNvPr id="4" name="Rectangle 3">
+            <a:extLst>
+              <a:ext uri="{FF2B5EF4-FFF2-40B4-BE49-F238E27FC236}">
+                <a16:creationId xmlns:a16="http://schemas.microsoft.com/office/drawing/2014/main" id="{8D973F9E-231E-4F4E-BF92-D9C84C7AB5A7}"/>
+              </a:ext>
+            </a:extLst>
+          </p:cNvPr>
+          <p:cNvSpPr/>
+          <p:nvPr/>
+        </p:nvSpPr>
+        <p:spPr>
+          <a:xfrm>
+            <a:off x="0" y="6067425"/>
+            <a:ext cx="9305925" cy="790575"/>
+          </a:xfrm>
+          <a:prstGeom prst="rect">
+            <a:avLst/>
+          </a:prstGeom>
+          <a:scene3d>
+            <a:camera prst="orthographicFront"/>
+            <a:lightRig rig="threePt" dir="t"/>
+          </a:scene3d>
+          <a:sp3d>
+            <a:bevelT w="114300" prst="hardEdge"/>
+          </a:sp3d>
+        </p:spPr>
+        <p:style>
+          <a:lnRef idx="2">
+            <a:schemeClr val="accent1">
+              <a:shade val="50000"/>
+            </a:schemeClr>
+          </a:lnRef>
+          <a:fillRef idx="1">
+            <a:schemeClr val="accent1"/>
+          </a:fillRef>
+          <a:effectRef idx="0">
+            <a:schemeClr val="accent1"/>
+          </a:effectRef>
+          <a:fontRef idx="minor">
+            <a:schemeClr val="lt1"/>
+          </a:fontRef>
+        </p:style>
+        <p:txBody>
+          <a:bodyPr rtlCol="0" anchor="ctr"/>
+          <a:lstStyle/>
+          <a:p>
+            <a:pPr algn="ctr"/>
+            <a:r>
+              <a:rPr lang="en-IN" sz="2000" b="1" dirty="0"/>
+              <a:t>WEDNESDAY’S WICKED ADVENTURES</a:t>
+            </a:r>
+          </a:p>
+        </p:txBody>
+      </p:sp>
+      <p:sp>
+        <p:nvSpPr>
+          <p:cNvPr id="5" name="Rectangle 4">
+            <a:extLst>
+              <a:ext uri="{FF2B5EF4-FFF2-40B4-BE49-F238E27FC236}">
+                <a16:creationId xmlns:a16="http://schemas.microsoft.com/office/drawing/2014/main" id="{ADD2B0B5-489C-4527-87A1-6AE32256E8B1}"/>
+              </a:ext>
+            </a:extLst>
+          </p:cNvPr>
+          <p:cNvSpPr/>
+          <p:nvPr/>
+        </p:nvSpPr>
+        <p:spPr>
+          <a:xfrm>
+            <a:off x="11363325" y="6067425"/>
+            <a:ext cx="828675" cy="790575"/>
+          </a:xfrm>
+          <a:prstGeom prst="rect">
+            <a:avLst/>
+          </a:prstGeom>
+          <a:scene3d>
+            <a:camera prst="orthographicFront"/>
+            <a:lightRig rig="threePt" dir="t"/>
+          </a:scene3d>
+          <a:sp3d>
+            <a:bevelT w="114300" prst="hardEdge"/>
+          </a:sp3d>
+        </p:spPr>
+        <p:style>
+          <a:lnRef idx="2">
+            <a:schemeClr val="accent1">
+              <a:shade val="50000"/>
+            </a:schemeClr>
+          </a:lnRef>
+          <a:fillRef idx="1">
+            <a:schemeClr val="accent1"/>
+          </a:fillRef>
+          <a:effectRef idx="0">
+            <a:schemeClr val="accent1"/>
+          </a:effectRef>
+          <a:fontRef idx="minor">
+            <a:schemeClr val="lt1"/>
+          </a:fontRef>
+        </p:style>
+        <p:txBody>
+          <a:bodyPr rtlCol="0" anchor="ctr"/>
+          <a:lstStyle/>
+          <a:p>
+            <a:pPr algn="ctr"/>
+            <a:endParaRPr lang="en-IN"/>
+          </a:p>
+        </p:txBody>
+      </p:sp>
+      <p:sp>
+        <p:nvSpPr>
+          <p:cNvPr id="6" name="Rectangle 5">
+            <a:extLst>
+              <a:ext uri="{FF2B5EF4-FFF2-40B4-BE49-F238E27FC236}">
+                <a16:creationId xmlns:a16="http://schemas.microsoft.com/office/drawing/2014/main" id="{8F298F8F-A536-48DC-9BA2-D0C59AC19A33}"/>
+              </a:ext>
+            </a:extLst>
+          </p:cNvPr>
+          <p:cNvSpPr/>
+          <p:nvPr/>
+        </p:nvSpPr>
+        <p:spPr>
+          <a:xfrm>
+            <a:off x="9305925" y="6067424"/>
+            <a:ext cx="2057400" cy="790575"/>
+          </a:xfrm>
+          <a:prstGeom prst="rect">
+            <a:avLst/>
+          </a:prstGeom>
+          <a:scene3d>
+            <a:camera prst="orthographicFront"/>
+            <a:lightRig rig="threePt" dir="t"/>
+          </a:scene3d>
+          <a:sp3d>
+            <a:bevelT w="114300" prst="hardEdge"/>
+          </a:sp3d>
+        </p:spPr>
+        <p:style>
+          <a:lnRef idx="2">
+            <a:schemeClr val="accent1">
+              <a:shade val="50000"/>
+            </a:schemeClr>
+          </a:lnRef>
+          <a:fillRef idx="1">
+            <a:schemeClr val="accent1"/>
+          </a:fillRef>
+          <a:effectRef idx="0">
+            <a:schemeClr val="accent1"/>
+          </a:effectRef>
+          <a:fontRef idx="minor">
+            <a:schemeClr val="lt1"/>
+          </a:fontRef>
+        </p:style>
+        <p:txBody>
+          <a:bodyPr rtlCol="0" anchor="ctr"/>
+          <a:lstStyle/>
+          <a:p>
+            <a:pPr algn="ctr"/>
+            <a:r>
+              <a:rPr lang="en-IN" sz="2000" b="1" dirty="0"/>
+              <a:t>APRIL 2022</a:t>
+            </a:r>
+          </a:p>
+        </p:txBody>
+      </p:sp>
+      <p:sp>
+        <p:nvSpPr>
+          <p:cNvPr id="8" name="Slide Number Placeholder 11">
+            <a:extLst>
+              <a:ext uri="{FF2B5EF4-FFF2-40B4-BE49-F238E27FC236}">
+                <a16:creationId xmlns:a16="http://schemas.microsoft.com/office/drawing/2014/main" id="{66E5E76B-63DE-49C5-B59F-65367A92139F}"/>
+              </a:ext>
+            </a:extLst>
+          </p:cNvPr>
+          <p:cNvSpPr>
+            <a:spLocks noGrp="1"/>
+          </p:cNvSpPr>
+          <p:nvPr>
+            <p:ph type="sldNum" sz="quarter" idx="12"/>
+          </p:nvPr>
+        </p:nvSpPr>
+        <p:spPr>
+          <a:xfrm>
+            <a:off x="11563349" y="6280148"/>
+            <a:ext cx="428625" cy="365125"/>
+          </a:xfrm>
+        </p:spPr>
+        <p:txBody>
+          <a:bodyPr/>
+          <a:lstStyle/>
+          <a:p>
+            <a:fld id="{F37EE007-93F6-4DD3-A485-65881C8FA8D0}" type="slidenum">
+              <a:rPr lang="en-IN" sz="2000" b="1" smtClean="0">
+                <a:solidFill>
+                  <a:schemeClr val="bg1"/>
+                </a:solidFill>
+              </a:rPr>
+              <a:t>12</a:t>
             </a:fld>
             <a:endParaRPr lang="en-IN" sz="2000" b="1" dirty="0">
               <a:solidFill>
@@ -5281,7 +5673,7 @@
           <a:graphicData uri="http://schemas.openxmlformats.org/presentationml/2006/ole">
             <mc:AlternateContent xmlns:mc="http://schemas.openxmlformats.org/markup-compatibility/2006">
               <mc:Choice xmlns:v="urn:schemas-microsoft-com:vml" Requires="v">
-                <p:oleObj spid="_x0000_s3085" name="Bitmap Image" r:id="rId3" imgW="5753160" imgH="1973520" progId="Paint.Picture">
+                <p:oleObj spid="_x0000_s3091" name="Bitmap Image" r:id="rId3" imgW="5753160" imgH="1973520" progId="Paint.Picture">
                   <p:embed/>
                 </p:oleObj>
               </mc:Choice>
@@ -5553,296 +5945,6 @@
 </p:sld>
 </file>
 
-<file path=ppt/slides/slide12.xml><?xml version="1.0" encoding="utf-8"?>
-<p:sld xmlns:a="http://schemas.openxmlformats.org/drawingml/2006/main" xmlns:r="http://schemas.openxmlformats.org/officeDocument/2006/relationships" xmlns:p="http://schemas.openxmlformats.org/presentationml/2006/main">
-  <p:cSld>
-    <p:spTree>
-      <p:nvGrpSpPr>
-        <p:cNvPr id="1" name=""/>
-        <p:cNvGrpSpPr/>
-        <p:nvPr/>
-      </p:nvGrpSpPr>
-      <p:grpSpPr>
-        <a:xfrm>
-          <a:off x="0" y="0"/>
-          <a:ext cx="0" cy="0"/>
-          <a:chOff x="0" y="0"/>
-          <a:chExt cx="0" cy="0"/>
-        </a:xfrm>
-      </p:grpSpPr>
-      <p:sp>
-        <p:nvSpPr>
-          <p:cNvPr id="2" name="Title 1">
-            <a:extLst>
-              <a:ext uri="{FF2B5EF4-FFF2-40B4-BE49-F238E27FC236}">
-                <a16:creationId xmlns:a16="http://schemas.microsoft.com/office/drawing/2014/main" id="{C0666519-3484-48F3-927E-47679DE94711}"/>
-              </a:ext>
-            </a:extLst>
-          </p:cNvPr>
-          <p:cNvSpPr>
-            <a:spLocks noGrp="1"/>
-          </p:cNvSpPr>
-          <p:nvPr>
-            <p:ph type="title"/>
-          </p:nvPr>
-        </p:nvSpPr>
-        <p:spPr/>
-        <p:txBody>
-          <a:bodyPr/>
-          <a:lstStyle/>
-          <a:p>
-            <a:r>
-              <a:rPr lang="en-IN" b="1" dirty="0"/>
-              <a:t>4. CONCLUSION</a:t>
-            </a:r>
-          </a:p>
-        </p:txBody>
-      </p:sp>
-      <p:sp>
-        <p:nvSpPr>
-          <p:cNvPr id="3" name="Content Placeholder 2">
-            <a:extLst>
-              <a:ext uri="{FF2B5EF4-FFF2-40B4-BE49-F238E27FC236}">
-                <a16:creationId xmlns:a16="http://schemas.microsoft.com/office/drawing/2014/main" id="{D3F11377-6BB3-4E47-B174-861CD150A86B}"/>
-              </a:ext>
-            </a:extLst>
-          </p:cNvPr>
-          <p:cNvSpPr>
-            <a:spLocks noGrp="1"/>
-          </p:cNvSpPr>
-          <p:nvPr>
-            <p:ph idx="1"/>
-          </p:nvPr>
-        </p:nvSpPr>
-        <p:spPr/>
-        <p:txBody>
-          <a:bodyPr/>
-          <a:lstStyle/>
-          <a:p>
-            <a:endParaRPr lang="en-IN"/>
-          </a:p>
-        </p:txBody>
-      </p:sp>
-      <p:sp>
-        <p:nvSpPr>
-          <p:cNvPr id="4" name="Rectangle 3">
-            <a:extLst>
-              <a:ext uri="{FF2B5EF4-FFF2-40B4-BE49-F238E27FC236}">
-                <a16:creationId xmlns:a16="http://schemas.microsoft.com/office/drawing/2014/main" id="{8D973F9E-231E-4F4E-BF92-D9C84C7AB5A7}"/>
-              </a:ext>
-            </a:extLst>
-          </p:cNvPr>
-          <p:cNvSpPr/>
-          <p:nvPr/>
-        </p:nvSpPr>
-        <p:spPr>
-          <a:xfrm>
-            <a:off x="0" y="6067425"/>
-            <a:ext cx="9305925" cy="790575"/>
-          </a:xfrm>
-          <a:prstGeom prst="rect">
-            <a:avLst/>
-          </a:prstGeom>
-          <a:scene3d>
-            <a:camera prst="orthographicFront"/>
-            <a:lightRig rig="threePt" dir="t"/>
-          </a:scene3d>
-          <a:sp3d>
-            <a:bevelT w="114300" prst="hardEdge"/>
-          </a:sp3d>
-        </p:spPr>
-        <p:style>
-          <a:lnRef idx="2">
-            <a:schemeClr val="accent1">
-              <a:shade val="50000"/>
-            </a:schemeClr>
-          </a:lnRef>
-          <a:fillRef idx="1">
-            <a:schemeClr val="accent1"/>
-          </a:fillRef>
-          <a:effectRef idx="0">
-            <a:schemeClr val="accent1"/>
-          </a:effectRef>
-          <a:fontRef idx="minor">
-            <a:schemeClr val="lt1"/>
-          </a:fontRef>
-        </p:style>
-        <p:txBody>
-          <a:bodyPr rtlCol="0" anchor="ctr"/>
-          <a:lstStyle/>
-          <a:p>
-            <a:pPr algn="ctr"/>
-            <a:r>
-              <a:rPr lang="en-IN" sz="2000" b="1" dirty="0"/>
-              <a:t>WEDNESDAY’S WICKED ADVENTURES</a:t>
-            </a:r>
-          </a:p>
-        </p:txBody>
-      </p:sp>
-      <p:sp>
-        <p:nvSpPr>
-          <p:cNvPr id="5" name="Rectangle 4">
-            <a:extLst>
-              <a:ext uri="{FF2B5EF4-FFF2-40B4-BE49-F238E27FC236}">
-                <a16:creationId xmlns:a16="http://schemas.microsoft.com/office/drawing/2014/main" id="{ADD2B0B5-489C-4527-87A1-6AE32256E8B1}"/>
-              </a:ext>
-            </a:extLst>
-          </p:cNvPr>
-          <p:cNvSpPr/>
-          <p:nvPr/>
-        </p:nvSpPr>
-        <p:spPr>
-          <a:xfrm>
-            <a:off x="11363325" y="6067425"/>
-            <a:ext cx="828675" cy="790575"/>
-          </a:xfrm>
-          <a:prstGeom prst="rect">
-            <a:avLst/>
-          </a:prstGeom>
-          <a:scene3d>
-            <a:camera prst="orthographicFront"/>
-            <a:lightRig rig="threePt" dir="t"/>
-          </a:scene3d>
-          <a:sp3d>
-            <a:bevelT w="114300" prst="hardEdge"/>
-          </a:sp3d>
-        </p:spPr>
-        <p:style>
-          <a:lnRef idx="2">
-            <a:schemeClr val="accent1">
-              <a:shade val="50000"/>
-            </a:schemeClr>
-          </a:lnRef>
-          <a:fillRef idx="1">
-            <a:schemeClr val="accent1"/>
-          </a:fillRef>
-          <a:effectRef idx="0">
-            <a:schemeClr val="accent1"/>
-          </a:effectRef>
-          <a:fontRef idx="minor">
-            <a:schemeClr val="lt1"/>
-          </a:fontRef>
-        </p:style>
-        <p:txBody>
-          <a:bodyPr rtlCol="0" anchor="ctr"/>
-          <a:lstStyle/>
-          <a:p>
-            <a:pPr algn="ctr"/>
-            <a:endParaRPr lang="en-IN"/>
-          </a:p>
-        </p:txBody>
-      </p:sp>
-      <p:sp>
-        <p:nvSpPr>
-          <p:cNvPr id="6" name="Rectangle 5">
-            <a:extLst>
-              <a:ext uri="{FF2B5EF4-FFF2-40B4-BE49-F238E27FC236}">
-                <a16:creationId xmlns:a16="http://schemas.microsoft.com/office/drawing/2014/main" id="{8F298F8F-A536-48DC-9BA2-D0C59AC19A33}"/>
-              </a:ext>
-            </a:extLst>
-          </p:cNvPr>
-          <p:cNvSpPr/>
-          <p:nvPr/>
-        </p:nvSpPr>
-        <p:spPr>
-          <a:xfrm>
-            <a:off x="9305925" y="6067424"/>
-            <a:ext cx="2057400" cy="790575"/>
-          </a:xfrm>
-          <a:prstGeom prst="rect">
-            <a:avLst/>
-          </a:prstGeom>
-          <a:scene3d>
-            <a:camera prst="orthographicFront"/>
-            <a:lightRig rig="threePt" dir="t"/>
-          </a:scene3d>
-          <a:sp3d>
-            <a:bevelT w="114300" prst="hardEdge"/>
-          </a:sp3d>
-        </p:spPr>
-        <p:style>
-          <a:lnRef idx="2">
-            <a:schemeClr val="accent1">
-              <a:shade val="50000"/>
-            </a:schemeClr>
-          </a:lnRef>
-          <a:fillRef idx="1">
-            <a:schemeClr val="accent1"/>
-          </a:fillRef>
-          <a:effectRef idx="0">
-            <a:schemeClr val="accent1"/>
-          </a:effectRef>
-          <a:fontRef idx="minor">
-            <a:schemeClr val="lt1"/>
-          </a:fontRef>
-        </p:style>
-        <p:txBody>
-          <a:bodyPr rtlCol="0" anchor="ctr"/>
-          <a:lstStyle/>
-          <a:p>
-            <a:pPr algn="ctr"/>
-            <a:r>
-              <a:rPr lang="en-IN" sz="2000" b="1" dirty="0"/>
-              <a:t>APRIL 2022</a:t>
-            </a:r>
-          </a:p>
-        </p:txBody>
-      </p:sp>
-      <p:sp>
-        <p:nvSpPr>
-          <p:cNvPr id="8" name="Slide Number Placeholder 11">
-            <a:extLst>
-              <a:ext uri="{FF2B5EF4-FFF2-40B4-BE49-F238E27FC236}">
-                <a16:creationId xmlns:a16="http://schemas.microsoft.com/office/drawing/2014/main" id="{66E5E76B-63DE-49C5-B59F-65367A92139F}"/>
-              </a:ext>
-            </a:extLst>
-          </p:cNvPr>
-          <p:cNvSpPr>
-            <a:spLocks noGrp="1"/>
-          </p:cNvSpPr>
-          <p:nvPr>
-            <p:ph type="sldNum" sz="quarter" idx="12"/>
-          </p:nvPr>
-        </p:nvSpPr>
-        <p:spPr>
-          <a:xfrm>
-            <a:off x="11563349" y="6280148"/>
-            <a:ext cx="428625" cy="365125"/>
-          </a:xfrm>
-        </p:spPr>
-        <p:txBody>
-          <a:bodyPr/>
-          <a:lstStyle/>
-          <a:p>
-            <a:fld id="{F37EE007-93F6-4DD3-A485-65881C8FA8D0}" type="slidenum">
-              <a:rPr lang="en-IN" sz="2000" b="1" smtClean="0">
-                <a:solidFill>
-                  <a:schemeClr val="bg1"/>
-                </a:solidFill>
-              </a:rPr>
-              <a:t>12</a:t>
-            </a:fld>
-            <a:endParaRPr lang="en-IN" sz="2000" b="1" dirty="0">
-              <a:solidFill>
-                <a:schemeClr val="bg1"/>
-              </a:solidFill>
-            </a:endParaRPr>
-          </a:p>
-        </p:txBody>
-      </p:sp>
-    </p:spTree>
-    <p:extLst>
-      <p:ext uri="{BB962C8B-B14F-4D97-AF65-F5344CB8AC3E}">
-        <p14:creationId xmlns:p14="http://schemas.microsoft.com/office/powerpoint/2010/main" val="4193434119"/>
-      </p:ext>
-    </p:extLst>
-  </p:cSld>
-  <p:clrMapOvr>
-    <a:masterClrMapping/>
-  </p:clrMapOvr>
-</p:sld>
-</file>
-
 <file path=ppt/slides/slide13.xml><?xml version="1.0" encoding="utf-8"?>
 <p:sld xmlns:a="http://schemas.openxmlformats.org/drawingml/2006/main" xmlns:r="http://schemas.openxmlformats.org/officeDocument/2006/relationships" xmlns:p="http://schemas.openxmlformats.org/presentationml/2006/main">
   <p:cSld>
@@ -5862,6 +5964,59 @@
       </p:grpSpPr>
       <p:sp>
         <p:nvSpPr>
+          <p:cNvPr id="2" name="Title 1">
+            <a:extLst>
+              <a:ext uri="{FF2B5EF4-FFF2-40B4-BE49-F238E27FC236}">
+                <a16:creationId xmlns:a16="http://schemas.microsoft.com/office/drawing/2014/main" id="{C0666519-3484-48F3-927E-47679DE94711}"/>
+              </a:ext>
+            </a:extLst>
+          </p:cNvPr>
+          <p:cNvSpPr>
+            <a:spLocks noGrp="1"/>
+          </p:cNvSpPr>
+          <p:nvPr>
+            <p:ph type="title"/>
+          </p:nvPr>
+        </p:nvSpPr>
+        <p:spPr/>
+        <p:txBody>
+          <a:bodyPr/>
+          <a:lstStyle/>
+          <a:p>
+            <a:r>
+              <a:rPr lang="en-IN" b="1" dirty="0"/>
+              <a:t>4. CONCLUSION</a:t>
+            </a:r>
+          </a:p>
+        </p:txBody>
+      </p:sp>
+      <p:sp>
+        <p:nvSpPr>
+          <p:cNvPr id="3" name="Content Placeholder 2">
+            <a:extLst>
+              <a:ext uri="{FF2B5EF4-FFF2-40B4-BE49-F238E27FC236}">
+                <a16:creationId xmlns:a16="http://schemas.microsoft.com/office/drawing/2014/main" id="{D3F11377-6BB3-4E47-B174-861CD150A86B}"/>
+              </a:ext>
+            </a:extLst>
+          </p:cNvPr>
+          <p:cNvSpPr>
+            <a:spLocks noGrp="1"/>
+          </p:cNvSpPr>
+          <p:nvPr>
+            <p:ph idx="1"/>
+          </p:nvPr>
+        </p:nvSpPr>
+        <p:spPr/>
+        <p:txBody>
+          <a:bodyPr/>
+          <a:lstStyle/>
+          <a:p>
+            <a:endParaRPr lang="en-IN"/>
+          </a:p>
+        </p:txBody>
+      </p:sp>
+      <p:sp>
+        <p:nvSpPr>
           <p:cNvPr id="4" name="Rectangle 3">
             <a:extLst>
               <a:ext uri="{FF2B5EF4-FFF2-40B4-BE49-F238E27FC236}">
@@ -6067,57 +6222,10 @@
           </a:p>
         </p:txBody>
       </p:sp>
-      <p:pic>
-        <p:nvPicPr>
-          <p:cNvPr id="2050" name="Picture 2" descr="See the source image">
-            <a:extLst>
-              <a:ext uri="{FF2B5EF4-FFF2-40B4-BE49-F238E27FC236}">
-                <a16:creationId xmlns:a16="http://schemas.microsoft.com/office/drawing/2014/main" id="{B5B67862-A69F-498B-B814-F7947A0A1E0A}"/>
-              </a:ext>
-            </a:extLst>
-          </p:cNvPr>
-          <p:cNvPicPr>
-            <a:picLocks noChangeAspect="1" noChangeArrowheads="1"/>
-          </p:cNvPicPr>
-          <p:nvPr/>
-        </p:nvPicPr>
-        <p:blipFill>
-          <a:blip r:embed="rId2">
-            <a:extLst>
-              <a:ext uri="{28A0092B-C50C-407E-A947-70E740481C1C}">
-                <a14:useLocalDpi xmlns:a14="http://schemas.microsoft.com/office/drawing/2010/main" val="0"/>
-              </a:ext>
-            </a:extLst>
-          </a:blip>
-          <a:srcRect/>
-          <a:stretch>
-            <a:fillRect/>
-          </a:stretch>
-        </p:blipFill>
-        <p:spPr bwMode="auto">
-          <a:xfrm>
-            <a:off x="0" y="0"/>
-            <a:ext cx="12192000" cy="6067421"/>
-          </a:xfrm>
-          <a:prstGeom prst="rect">
-            <a:avLst/>
-          </a:prstGeom>
-          <a:noFill/>
-          <a:extLst>
-            <a:ext uri="{909E8E84-426E-40DD-AFC4-6F175D3DCCD1}">
-              <a14:hiddenFill xmlns:a14="http://schemas.microsoft.com/office/drawing/2010/main">
-                <a:solidFill>
-                  <a:srgbClr val="FFFFFF"/>
-                </a:solidFill>
-              </a14:hiddenFill>
-            </a:ext>
-          </a:extLst>
-        </p:spPr>
-      </p:pic>
     </p:spTree>
     <p:extLst>
       <p:ext uri="{BB962C8B-B14F-4D97-AF65-F5344CB8AC3E}">
-        <p14:creationId xmlns:p14="http://schemas.microsoft.com/office/powerpoint/2010/main" val="2087571555"/>
+        <p14:creationId xmlns:p14="http://schemas.microsoft.com/office/powerpoint/2010/main" val="4193434119"/>
       </p:ext>
     </p:extLst>
   </p:cSld>
@@ -6342,6 +6450,290 @@
                 </a:solidFill>
               </a:rPr>
               <a:t>14</a:t>
+            </a:fld>
+            <a:endParaRPr lang="en-IN" sz="2000" b="1" dirty="0">
+              <a:solidFill>
+                <a:schemeClr val="bg1"/>
+              </a:solidFill>
+            </a:endParaRPr>
+          </a:p>
+        </p:txBody>
+      </p:sp>
+      <p:pic>
+        <p:nvPicPr>
+          <p:cNvPr id="2050" name="Picture 2" descr="See the source image">
+            <a:extLst>
+              <a:ext uri="{FF2B5EF4-FFF2-40B4-BE49-F238E27FC236}">
+                <a16:creationId xmlns:a16="http://schemas.microsoft.com/office/drawing/2014/main" id="{B5B67862-A69F-498B-B814-F7947A0A1E0A}"/>
+              </a:ext>
+            </a:extLst>
+          </p:cNvPr>
+          <p:cNvPicPr>
+            <a:picLocks noChangeAspect="1" noChangeArrowheads="1"/>
+          </p:cNvPicPr>
+          <p:nvPr/>
+        </p:nvPicPr>
+        <p:blipFill>
+          <a:blip r:embed="rId2">
+            <a:extLst>
+              <a:ext uri="{28A0092B-C50C-407E-A947-70E740481C1C}">
+                <a14:useLocalDpi xmlns:a14="http://schemas.microsoft.com/office/drawing/2010/main" val="0"/>
+              </a:ext>
+            </a:extLst>
+          </a:blip>
+          <a:srcRect/>
+          <a:stretch>
+            <a:fillRect/>
+          </a:stretch>
+        </p:blipFill>
+        <p:spPr bwMode="auto">
+          <a:xfrm>
+            <a:off x="0" y="0"/>
+            <a:ext cx="12192000" cy="6067421"/>
+          </a:xfrm>
+          <a:prstGeom prst="rect">
+            <a:avLst/>
+          </a:prstGeom>
+          <a:noFill/>
+          <a:extLst>
+            <a:ext uri="{909E8E84-426E-40DD-AFC4-6F175D3DCCD1}">
+              <a14:hiddenFill xmlns:a14="http://schemas.microsoft.com/office/drawing/2010/main">
+                <a:solidFill>
+                  <a:srgbClr val="FFFFFF"/>
+                </a:solidFill>
+              </a14:hiddenFill>
+            </a:ext>
+          </a:extLst>
+        </p:spPr>
+      </p:pic>
+    </p:spTree>
+    <p:extLst>
+      <p:ext uri="{BB962C8B-B14F-4D97-AF65-F5344CB8AC3E}">
+        <p14:creationId xmlns:p14="http://schemas.microsoft.com/office/powerpoint/2010/main" val="2087571555"/>
+      </p:ext>
+    </p:extLst>
+  </p:cSld>
+  <p:clrMapOvr>
+    <a:masterClrMapping/>
+  </p:clrMapOvr>
+</p:sld>
+</file>
+
+<file path=ppt/slides/slide15.xml><?xml version="1.0" encoding="utf-8"?>
+<p:sld xmlns:a="http://schemas.openxmlformats.org/drawingml/2006/main" xmlns:r="http://schemas.openxmlformats.org/officeDocument/2006/relationships" xmlns:p="http://schemas.openxmlformats.org/presentationml/2006/main">
+  <p:cSld>
+    <p:spTree>
+      <p:nvGrpSpPr>
+        <p:cNvPr id="1" name=""/>
+        <p:cNvGrpSpPr/>
+        <p:nvPr/>
+      </p:nvGrpSpPr>
+      <p:grpSpPr>
+        <a:xfrm>
+          <a:off x="0" y="0"/>
+          <a:ext cx="0" cy="0"/>
+          <a:chOff x="0" y="0"/>
+          <a:chExt cx="0" cy="0"/>
+        </a:xfrm>
+      </p:grpSpPr>
+      <p:sp>
+        <p:nvSpPr>
+          <p:cNvPr id="4" name="Rectangle 3">
+            <a:extLst>
+              <a:ext uri="{FF2B5EF4-FFF2-40B4-BE49-F238E27FC236}">
+                <a16:creationId xmlns:a16="http://schemas.microsoft.com/office/drawing/2014/main" id="{8D973F9E-231E-4F4E-BF92-D9C84C7AB5A7}"/>
+              </a:ext>
+            </a:extLst>
+          </p:cNvPr>
+          <p:cNvSpPr/>
+          <p:nvPr/>
+        </p:nvSpPr>
+        <p:spPr>
+          <a:xfrm>
+            <a:off x="0" y="6067425"/>
+            <a:ext cx="9305925" cy="790575"/>
+          </a:xfrm>
+          <a:prstGeom prst="rect">
+            <a:avLst/>
+          </a:prstGeom>
+          <a:scene3d>
+            <a:camera prst="orthographicFront"/>
+            <a:lightRig rig="threePt" dir="t"/>
+          </a:scene3d>
+          <a:sp3d>
+            <a:bevelT w="114300" prst="hardEdge"/>
+          </a:sp3d>
+        </p:spPr>
+        <p:style>
+          <a:lnRef idx="2">
+            <a:schemeClr val="accent1">
+              <a:shade val="50000"/>
+            </a:schemeClr>
+          </a:lnRef>
+          <a:fillRef idx="1">
+            <a:schemeClr val="accent1"/>
+          </a:fillRef>
+          <a:effectRef idx="0">
+            <a:schemeClr val="accent1"/>
+          </a:effectRef>
+          <a:fontRef idx="minor">
+            <a:schemeClr val="lt1"/>
+          </a:fontRef>
+        </p:style>
+        <p:txBody>
+          <a:bodyPr rtlCol="0" anchor="ctr"/>
+          <a:lstStyle/>
+          <a:p>
+            <a:pPr algn="ctr"/>
+            <a:r>
+              <a:rPr lang="en-IN" sz="2000" b="1" dirty="0"/>
+              <a:t>WEDNESDAY’S WICKED ADVENTURES</a:t>
+            </a:r>
+          </a:p>
+        </p:txBody>
+      </p:sp>
+      <p:sp>
+        <p:nvSpPr>
+          <p:cNvPr id="5" name="Rectangle 4">
+            <a:extLst>
+              <a:ext uri="{FF2B5EF4-FFF2-40B4-BE49-F238E27FC236}">
+                <a16:creationId xmlns:a16="http://schemas.microsoft.com/office/drawing/2014/main" id="{ADD2B0B5-489C-4527-87A1-6AE32256E8B1}"/>
+              </a:ext>
+            </a:extLst>
+          </p:cNvPr>
+          <p:cNvSpPr/>
+          <p:nvPr/>
+        </p:nvSpPr>
+        <p:spPr>
+          <a:xfrm>
+            <a:off x="11363325" y="6067425"/>
+            <a:ext cx="828675" cy="790575"/>
+          </a:xfrm>
+          <a:prstGeom prst="rect">
+            <a:avLst/>
+          </a:prstGeom>
+          <a:scene3d>
+            <a:camera prst="orthographicFront"/>
+            <a:lightRig rig="threePt" dir="t"/>
+          </a:scene3d>
+          <a:sp3d>
+            <a:bevelT w="114300" prst="hardEdge"/>
+          </a:sp3d>
+        </p:spPr>
+        <p:style>
+          <a:lnRef idx="2">
+            <a:schemeClr val="accent1">
+              <a:shade val="50000"/>
+            </a:schemeClr>
+          </a:lnRef>
+          <a:fillRef idx="1">
+            <a:schemeClr val="accent1"/>
+          </a:fillRef>
+          <a:effectRef idx="0">
+            <a:schemeClr val="accent1"/>
+          </a:effectRef>
+          <a:fontRef idx="minor">
+            <a:schemeClr val="lt1"/>
+          </a:fontRef>
+        </p:style>
+        <p:txBody>
+          <a:bodyPr rtlCol="0" anchor="ctr"/>
+          <a:lstStyle/>
+          <a:p>
+            <a:pPr algn="ctr"/>
+            <a:endParaRPr lang="en-IN"/>
+          </a:p>
+        </p:txBody>
+      </p:sp>
+      <p:sp>
+        <p:nvSpPr>
+          <p:cNvPr id="6" name="Rectangle 5">
+            <a:extLst>
+              <a:ext uri="{FF2B5EF4-FFF2-40B4-BE49-F238E27FC236}">
+                <a16:creationId xmlns:a16="http://schemas.microsoft.com/office/drawing/2014/main" id="{8F298F8F-A536-48DC-9BA2-D0C59AC19A33}"/>
+              </a:ext>
+            </a:extLst>
+          </p:cNvPr>
+          <p:cNvSpPr/>
+          <p:nvPr/>
+        </p:nvSpPr>
+        <p:spPr>
+          <a:xfrm>
+            <a:off x="9305925" y="6067424"/>
+            <a:ext cx="2057400" cy="790575"/>
+          </a:xfrm>
+          <a:prstGeom prst="rect">
+            <a:avLst/>
+          </a:prstGeom>
+          <a:scene3d>
+            <a:camera prst="orthographicFront"/>
+            <a:lightRig rig="threePt" dir="t"/>
+          </a:scene3d>
+          <a:sp3d>
+            <a:bevelT w="114300" prst="hardEdge"/>
+          </a:sp3d>
+        </p:spPr>
+        <p:style>
+          <a:lnRef idx="2">
+            <a:schemeClr val="accent1">
+              <a:shade val="50000"/>
+            </a:schemeClr>
+          </a:lnRef>
+          <a:fillRef idx="1">
+            <a:schemeClr val="accent1"/>
+          </a:fillRef>
+          <a:effectRef idx="0">
+            <a:schemeClr val="accent1"/>
+          </a:effectRef>
+          <a:fontRef idx="minor">
+            <a:schemeClr val="lt1"/>
+          </a:fontRef>
+        </p:style>
+        <p:txBody>
+          <a:bodyPr rtlCol="0" anchor="ctr"/>
+          <a:lstStyle/>
+          <a:p>
+            <a:pPr algn="ctr"/>
+            <a:r>
+              <a:rPr lang="en-IN" sz="2000" b="1" dirty="0"/>
+              <a:t>APRIL 2022</a:t>
+            </a:r>
+          </a:p>
+        </p:txBody>
+      </p:sp>
+      <p:sp>
+        <p:nvSpPr>
+          <p:cNvPr id="8" name="Slide Number Placeholder 11">
+            <a:extLst>
+              <a:ext uri="{FF2B5EF4-FFF2-40B4-BE49-F238E27FC236}">
+                <a16:creationId xmlns:a16="http://schemas.microsoft.com/office/drawing/2014/main" id="{66E5E76B-63DE-49C5-B59F-65367A92139F}"/>
+              </a:ext>
+            </a:extLst>
+          </p:cNvPr>
+          <p:cNvSpPr>
+            <a:spLocks noGrp="1"/>
+          </p:cNvSpPr>
+          <p:nvPr>
+            <p:ph type="sldNum" sz="quarter" idx="12"/>
+          </p:nvPr>
+        </p:nvSpPr>
+        <p:spPr>
+          <a:xfrm>
+            <a:off x="11563349" y="6280148"/>
+            <a:ext cx="428625" cy="365125"/>
+          </a:xfrm>
+        </p:spPr>
+        <p:txBody>
+          <a:bodyPr/>
+          <a:lstStyle/>
+          <a:p>
+            <a:fld id="{F37EE007-93F6-4DD3-A485-65881C8FA8D0}" type="slidenum">
+              <a:rPr lang="en-IN" sz="2000" b="1" smtClean="0">
+                <a:solidFill>
+                  <a:schemeClr val="bg1"/>
+                </a:solidFill>
+              </a:rPr>
+              <a:t>15</a:t>
             </a:fld>
             <a:endParaRPr lang="en-IN" sz="2000" b="1" dirty="0">
               <a:solidFill>
@@ -9544,7 +9936,7 @@
           <a:graphicData uri="http://schemas.openxmlformats.org/presentationml/2006/ole">
             <mc:AlternateContent xmlns:mc="http://schemas.openxmlformats.org/markup-compatibility/2006">
               <mc:Choice xmlns:v="urn:schemas-microsoft-com:vml" Requires="v">
-                <p:oleObj spid="_x0000_s1073" name="Bitmap Image" r:id="rId4" imgW="4267080" imgH="4389120" progId="Paint.Picture">
+                <p:oleObj spid="_x0000_s1079" name="Bitmap Image" r:id="rId4" imgW="4267080" imgH="4389120" progId="Paint.Picture">
                   <p:embed/>
                 </p:oleObj>
               </mc:Choice>
@@ -10008,7 +10400,7 @@
           <a:graphicData uri="http://schemas.openxmlformats.org/presentationml/2006/ole">
             <mc:AlternateContent xmlns:mc="http://schemas.openxmlformats.org/markup-compatibility/2006">
               <mc:Choice xmlns:v="urn:schemas-microsoft-com:vml" Requires="v">
-                <p:oleObj spid="_x0000_s2070" name="Bitmap Image" r:id="rId3" imgW="2209680" imgH="3916800" progId="Paint.Picture">
+                <p:oleObj spid="_x0000_s2076" name="Bitmap Image" r:id="rId3" imgW="2209680" imgH="3916800" progId="Paint.Picture">
                   <p:embed/>
                 </p:oleObj>
               </mc:Choice>

</xml_diff>

<commit_message>
Updated the presentation with Abstract page removed
</commit_message>
<xml_diff>
--- a/Wicked Adventures.pptx
+++ b/Wicked Adventures.pptx
@@ -5,24 +5,23 @@
     <p:sldMasterId id="2147483648" r:id="rId1"/>
   </p:sldMasterIdLst>
   <p:notesMasterIdLst>
-    <p:notesMasterId r:id="rId17"/>
+    <p:notesMasterId r:id="rId16"/>
   </p:notesMasterIdLst>
   <p:sldIdLst>
     <p:sldId id="258" r:id="rId2"/>
-    <p:sldId id="259" r:id="rId3"/>
-    <p:sldId id="260" r:id="rId4"/>
-    <p:sldId id="261" r:id="rId5"/>
-    <p:sldId id="266" r:id="rId6"/>
-    <p:sldId id="272" r:id="rId7"/>
-    <p:sldId id="268" r:id="rId8"/>
-    <p:sldId id="262" r:id="rId9"/>
-    <p:sldId id="269" r:id="rId10"/>
-    <p:sldId id="273" r:id="rId11"/>
-    <p:sldId id="265" r:id="rId12"/>
-    <p:sldId id="270" r:id="rId13"/>
-    <p:sldId id="267" r:id="rId14"/>
-    <p:sldId id="264" r:id="rId15"/>
-    <p:sldId id="263" r:id="rId16"/>
+    <p:sldId id="260" r:id="rId3"/>
+    <p:sldId id="261" r:id="rId4"/>
+    <p:sldId id="266" r:id="rId5"/>
+    <p:sldId id="272" r:id="rId6"/>
+    <p:sldId id="268" r:id="rId7"/>
+    <p:sldId id="262" r:id="rId8"/>
+    <p:sldId id="269" r:id="rId9"/>
+    <p:sldId id="273" r:id="rId10"/>
+    <p:sldId id="265" r:id="rId11"/>
+    <p:sldId id="270" r:id="rId12"/>
+    <p:sldId id="267" r:id="rId13"/>
+    <p:sldId id="264" r:id="rId14"/>
+    <p:sldId id="263" r:id="rId15"/>
   </p:sldIdLst>
   <p:sldSz cx="12192000" cy="6858000"/>
   <p:notesSz cx="6858000" cy="9144000"/>
@@ -4474,7 +4473,7 @@
           <p:cNvPr id="2" name="Title 1">
             <a:extLst>
               <a:ext uri="{FF2B5EF4-FFF2-40B4-BE49-F238E27FC236}">
-                <a16:creationId xmlns:a16="http://schemas.microsoft.com/office/drawing/2014/main" id="{FED447EA-CAB5-4B9D-8BA6-B4AFD140C0A9}"/>
+                <a16:creationId xmlns:a16="http://schemas.microsoft.com/office/drawing/2014/main" id="{C0666519-3484-48F3-927E-47679DE94711}"/>
               </a:ext>
             </a:extLst>
           </p:cNvPr>
@@ -4485,205 +4484,11 @@
             <p:ph type="title"/>
           </p:nvPr>
         </p:nvSpPr>
-        <p:spPr/>
-        <p:txBody>
-          <a:bodyPr/>
-          <a:lstStyle/>
-          <a:p>
-            <a:r>
-              <a:rPr lang="en-IN" b="1" dirty="0" err="1">
-                <a:solidFill>
-                  <a:schemeClr val="lt1"/>
-                </a:solidFill>
-                <a:latin typeface="+mn-lt"/>
-                <a:ea typeface="+mn-ea"/>
-                <a:cs typeface="+mn-cs"/>
-              </a:rPr>
-              <a:t>ytest</a:t>
-            </a:r>
-            <a:r>
-              <a:rPr lang="en-IN" b="1" dirty="0">
-                <a:solidFill>
-                  <a:schemeClr val="lt1"/>
-                </a:solidFill>
-                <a:latin typeface="+mn-lt"/>
-                <a:ea typeface="+mn-ea"/>
-                <a:cs typeface="+mn-cs"/>
-              </a:rPr>
-              <a:t> for unit </a:t>
-            </a:r>
-            <a:r>
-              <a:rPr lang="en-IN" b="1" dirty="0" err="1">
-                <a:solidFill>
-                  <a:schemeClr val="lt1"/>
-                </a:solidFill>
-                <a:latin typeface="+mn-lt"/>
-                <a:ea typeface="+mn-ea"/>
-                <a:cs typeface="+mn-cs"/>
-              </a:rPr>
-              <a:t>testingest</a:t>
-            </a:r>
-            <a:r>
-              <a:rPr lang="en-IN" b="1" dirty="0">
-                <a:solidFill>
-                  <a:schemeClr val="lt1"/>
-                </a:solidFill>
-                <a:latin typeface="+mn-lt"/>
-                <a:ea typeface="+mn-ea"/>
-                <a:cs typeface="+mn-cs"/>
-              </a:rPr>
-              <a:t> for unit </a:t>
-            </a:r>
-            <a:r>
-              <a:rPr lang="en-IN" b="1" dirty="0" err="1">
-                <a:solidFill>
-                  <a:schemeClr val="lt1"/>
-                </a:solidFill>
-                <a:latin typeface="+mn-lt"/>
-                <a:ea typeface="+mn-ea"/>
-                <a:cs typeface="+mn-cs"/>
-              </a:rPr>
-              <a:t>testingor</a:t>
-            </a:r>
-            <a:r>
-              <a:rPr lang="en-IN" b="1" dirty="0">
-                <a:solidFill>
-                  <a:schemeClr val="lt1"/>
-                </a:solidFill>
-                <a:latin typeface="+mn-lt"/>
-                <a:ea typeface="+mn-ea"/>
-                <a:cs typeface="+mn-cs"/>
-              </a:rPr>
-              <a:t> unit testing</a:t>
-            </a:r>
-            <a:endParaRPr lang="en-IE" dirty="0"/>
-          </a:p>
-        </p:txBody>
-      </p:sp>
-      <p:sp>
-        <p:nvSpPr>
-          <p:cNvPr id="3" name="Content Placeholder 2">
-            <a:extLst>
-              <a:ext uri="{FF2B5EF4-FFF2-40B4-BE49-F238E27FC236}">
-                <a16:creationId xmlns:a16="http://schemas.microsoft.com/office/drawing/2014/main" id="{B8C2C50D-E651-47FD-8B7C-D05DDE3A937A}"/>
-              </a:ext>
-            </a:extLst>
-          </p:cNvPr>
-          <p:cNvSpPr>
-            <a:spLocks noGrp="1"/>
-          </p:cNvSpPr>
-          <p:nvPr>
-            <p:ph idx="1"/>
-          </p:nvPr>
-        </p:nvSpPr>
-        <p:spPr/>
-        <p:txBody>
-          <a:bodyPr/>
-          <a:lstStyle/>
-          <a:p>
-            <a:r>
-              <a:rPr lang="en-US" dirty="0"/>
-              <a:t>PyTest is a testing framework that allows users to write test scripts in Python.</a:t>
-            </a:r>
-          </a:p>
-          <a:p>
-            <a:r>
-              <a:rPr lang="en-US" dirty="0"/>
-              <a:t>It helps with the development of tests ranging from </a:t>
-            </a:r>
-            <a:br>
-              <a:rPr lang="en-US" dirty="0"/>
-            </a:br>
-            <a:r>
-              <a:rPr lang="en-US" dirty="0"/>
-              <a:t>simple unit tests to large functional tests.</a:t>
-            </a:r>
-          </a:p>
-          <a:p>
-            <a:r>
-              <a:rPr lang="en-IE" dirty="0"/>
-              <a:t>Pytest is very easy, open source and run the test in parallel manner.</a:t>
-            </a:r>
-          </a:p>
-          <a:p>
-            <a:r>
-              <a:rPr lang="en-IE" dirty="0"/>
-              <a:t>Unit testing has been performed using PyTest.</a:t>
-            </a:r>
-          </a:p>
-          <a:p>
-            <a:r>
-              <a:rPr lang="en-IE" dirty="0"/>
-              <a:t>Integration of PyTest in GitHub action using python application.</a:t>
-            </a:r>
-          </a:p>
-          <a:p>
-            <a:r>
-              <a:rPr lang="en-IN" dirty="0">
-                <a:solidFill>
-                  <a:srgbClr val="24292F"/>
-                </a:solidFill>
-                <a:latin typeface="-apple-system"/>
-              </a:rPr>
-              <a:t>Details provided in the Git Wiki link in our repository. Click </a:t>
-            </a:r>
-            <a:r>
-              <a:rPr lang="en-IN">
-                <a:solidFill>
-                  <a:srgbClr val="24292F"/>
-                </a:solidFill>
-                <a:latin typeface="-apple-system"/>
-                <a:hlinkClick r:id="rId2"/>
-              </a:rPr>
-              <a:t>here</a:t>
-            </a:r>
-            <a:r>
-              <a:rPr lang="en-IN">
-                <a:solidFill>
-                  <a:srgbClr val="24292F"/>
-                </a:solidFill>
-                <a:latin typeface="-apple-system"/>
-              </a:rPr>
-              <a:t>.-</a:t>
-            </a:r>
-            <a:endParaRPr lang="en-IN" dirty="0">
-              <a:solidFill>
-                <a:srgbClr val="24292F"/>
-              </a:solidFill>
-              <a:latin typeface="-apple-system"/>
-            </a:endParaRPr>
-          </a:p>
-          <a:p>
-            <a:pPr algn="just"/>
-            <a:endParaRPr lang="en-US" dirty="0"/>
-          </a:p>
-          <a:p>
-            <a:endParaRPr lang="en-IE" dirty="0"/>
-          </a:p>
-        </p:txBody>
-      </p:sp>
-      <p:sp>
-        <p:nvSpPr>
-          <p:cNvPr id="4" name="Title 1">
-            <a:extLst>
-              <a:ext uri="{FF2B5EF4-FFF2-40B4-BE49-F238E27FC236}">
-                <a16:creationId xmlns:a16="http://schemas.microsoft.com/office/drawing/2014/main" id="{FCE4FA1B-AECD-41C7-9705-D28E86BF5E04}"/>
-              </a:ext>
-            </a:extLst>
-          </p:cNvPr>
-          <p:cNvSpPr txBox="1">
-            <a:spLocks/>
-          </p:cNvSpPr>
-          <p:nvPr/>
-        </p:nvSpPr>
-        <p:spPr>
-          <a:xfrm>
-            <a:off x="838200" y="467925"/>
+        <p:spPr>
+          <a:xfrm>
+            <a:off x="838200" y="403398"/>
             <a:ext cx="10515600" cy="1119961"/>
           </a:xfrm>
-          <a:prstGeom prst="rect">
-            <a:avLst/>
-          </a:prstGeom>
           <a:effectLst>
             <a:outerShdw blurRad="50800" dist="38100" dir="5400000" algn="t" rotWithShape="0">
               <a:prstClr val="black">
@@ -4707,133 +4512,435 @@
           </a:fontRef>
         </p:style>
         <p:txBody>
-          <a:bodyPr vert="horz" lIns="91440" tIns="45720" rIns="91440" bIns="45720" rtlCol="0" anchor="ctr">
-            <a:normAutofit/>
+          <a:bodyPr/>
+          <a:lstStyle/>
+          <a:p>
+            <a:pPr algn="ctr"/>
+            <a:r>
+              <a:rPr lang="en-IN" b="1" dirty="0"/>
+              <a:t>5. Sphinx Tool for Auto Documentation</a:t>
+            </a:r>
+          </a:p>
+        </p:txBody>
+      </p:sp>
+      <p:sp>
+        <p:nvSpPr>
+          <p:cNvPr id="3" name="Content Placeholder 2">
+            <a:extLst>
+              <a:ext uri="{FF2B5EF4-FFF2-40B4-BE49-F238E27FC236}">
+                <a16:creationId xmlns:a16="http://schemas.microsoft.com/office/drawing/2014/main" id="{D3F11377-6BB3-4E47-B174-861CD150A86B}"/>
+              </a:ext>
+            </a:extLst>
+          </p:cNvPr>
+          <p:cNvSpPr>
+            <a:spLocks noGrp="1"/>
+          </p:cNvSpPr>
+          <p:nvPr>
+            <p:ph idx="1"/>
+          </p:nvPr>
+        </p:nvSpPr>
+        <p:spPr>
+          <a:xfrm>
+            <a:off x="838200" y="2836599"/>
+            <a:ext cx="10143062" cy="3154279"/>
+          </a:xfrm>
+        </p:spPr>
+        <p:txBody>
+          <a:bodyPr>
+            <a:normAutofit fontScale="92500" lnSpcReduction="20000"/>
           </a:bodyPr>
-          <a:lstStyle>
-            <a:lvl1pPr algn="l" defTabSz="914400" rtl="0" eaLnBrk="1" latinLnBrk="0" hangingPunct="1">
-              <a:lnSpc>
-                <a:spcPct val="90000"/>
-              </a:lnSpc>
-              <a:spcBef>
-                <a:spcPct val="0"/>
-              </a:spcBef>
+          <a:lstStyle/>
+          <a:p>
+            <a:pPr algn="just"/>
+            <a:r>
+              <a:rPr lang="en-US" dirty="0"/>
+              <a:t>An Open-source third party Tool used for auto documentation.</a:t>
+            </a:r>
+          </a:p>
+          <a:p>
+            <a:pPr algn="just"/>
+            <a:r>
+              <a:rPr lang="en-IN" b="0" i="0" dirty="0">
+                <a:solidFill>
+                  <a:srgbClr val="24292F"/>
+                </a:solidFill>
+                <a:effectLst/>
+                <a:latin typeface="-apple-system"/>
+              </a:rPr>
+              <a:t>A documentation generator written in python language.</a:t>
+            </a:r>
+          </a:p>
+          <a:p>
+            <a:pPr algn="just"/>
+            <a:r>
+              <a:rPr lang="en-IN" dirty="0">
+                <a:solidFill>
+                  <a:srgbClr val="24292F"/>
+                </a:solidFill>
+                <a:latin typeface="-apple-system"/>
+              </a:rPr>
+              <a:t>Implementation of Sphinx tool by creating YAML </a:t>
+            </a:r>
+            <a:r>
+              <a:rPr lang="en-IN">
+                <a:solidFill>
+                  <a:srgbClr val="24292F"/>
+                </a:solidFill>
+                <a:latin typeface="-apple-system"/>
+              </a:rPr>
+              <a:t>file using </a:t>
+            </a:r>
+            <a:r>
+              <a:rPr lang="en-IN" dirty="0">
+                <a:solidFill>
+                  <a:srgbClr val="24292F"/>
+                </a:solidFill>
+                <a:latin typeface="-apple-system"/>
+              </a:rPr>
+              <a:t>“GitHub Actions”.</a:t>
+            </a:r>
+          </a:p>
+          <a:p>
+            <a:pPr algn="just"/>
+            <a:r>
+              <a:rPr lang="en-IN" dirty="0">
+                <a:solidFill>
+                  <a:srgbClr val="24292F"/>
+                </a:solidFill>
+                <a:latin typeface="-apple-system"/>
+              </a:rPr>
+              <a:t>Themes available in the URL below : </a:t>
+            </a:r>
+          </a:p>
+          <a:p>
+            <a:pPr marL="0" indent="0" algn="ctr">
               <a:buNone/>
-              <a:defRPr sz="4400" kern="1200">
+            </a:pPr>
+            <a:r>
+              <a:rPr lang="en-IN" dirty="0">
                 <a:solidFill>
-                  <a:schemeClr val="lt1"/>
+                  <a:srgbClr val="24292F"/>
                 </a:solidFill>
-                <a:latin typeface="+mn-lt"/>
-                <a:ea typeface="+mn-ea"/>
-                <a:cs typeface="+mn-cs"/>
-              </a:defRPr>
-            </a:lvl1pPr>
-            <a:lvl2pPr>
-              <a:defRPr>
+                <a:latin typeface="-apple-system"/>
+                <a:hlinkClick r:id="rId2"/>
+              </a:rPr>
+              <a:t>https://www.sphinx-doc.org/en/master/usage/theming.html</a:t>
+            </a:r>
+            <a:endParaRPr lang="en-IN" dirty="0">
+              <a:solidFill>
+                <a:srgbClr val="24292F"/>
+              </a:solidFill>
+              <a:latin typeface="-apple-system"/>
+            </a:endParaRPr>
+          </a:p>
+          <a:p>
+            <a:pPr algn="just"/>
+            <a:r>
+              <a:rPr lang="en-IN" dirty="0">
                 <a:solidFill>
-                  <a:schemeClr val="lt1"/>
+                  <a:srgbClr val="24292F"/>
                 </a:solidFill>
-                <a:latin typeface="+mn-lt"/>
-                <a:ea typeface="+mn-ea"/>
-                <a:cs typeface="+mn-cs"/>
-              </a:defRPr>
-            </a:lvl2pPr>
-            <a:lvl3pPr>
-              <a:defRPr>
+                <a:latin typeface="-apple-system"/>
+              </a:rPr>
+              <a:t>Details provided in the Git Wiki link in our repository. Click </a:t>
+            </a:r>
+            <a:r>
+              <a:rPr lang="en-IN" dirty="0">
                 <a:solidFill>
-                  <a:schemeClr val="lt1"/>
+                  <a:srgbClr val="24292F"/>
                 </a:solidFill>
-                <a:latin typeface="+mn-lt"/>
-                <a:ea typeface="+mn-ea"/>
-                <a:cs typeface="+mn-cs"/>
-              </a:defRPr>
-            </a:lvl3pPr>
-            <a:lvl4pPr>
-              <a:defRPr>
+                <a:latin typeface="-apple-system"/>
+                <a:hlinkClick r:id="rId3"/>
+              </a:rPr>
+              <a:t>here</a:t>
+            </a:r>
+            <a:r>
+              <a:rPr lang="en-IN" dirty="0">
                 <a:solidFill>
-                  <a:schemeClr val="lt1"/>
+                  <a:srgbClr val="24292F"/>
                 </a:solidFill>
-                <a:latin typeface="+mn-lt"/>
-                <a:ea typeface="+mn-ea"/>
-                <a:cs typeface="+mn-cs"/>
-              </a:defRPr>
-            </a:lvl4pPr>
-            <a:lvl5pPr>
-              <a:defRPr>
+                <a:latin typeface="-apple-system"/>
+              </a:rPr>
+              <a:t>.</a:t>
+            </a:r>
+          </a:p>
+          <a:p>
+            <a:pPr algn="just"/>
+            <a:r>
+              <a:rPr lang="en-IN" dirty="0">
                 <a:solidFill>
-                  <a:schemeClr val="lt1"/>
+                  <a:srgbClr val="24292F"/>
                 </a:solidFill>
-                <a:latin typeface="+mn-lt"/>
-                <a:ea typeface="+mn-ea"/>
-                <a:cs typeface="+mn-cs"/>
-              </a:defRPr>
-            </a:lvl5pPr>
-            <a:lvl6pPr>
-              <a:defRPr>
+                <a:latin typeface="-apple-system"/>
+              </a:rPr>
+              <a:t>Branch created for auto documentation – ‘</a:t>
+            </a:r>
+            <a:r>
+              <a:rPr lang="en-IN" dirty="0" err="1">
                 <a:solidFill>
-                  <a:schemeClr val="lt1"/>
+                  <a:srgbClr val="24292F"/>
                 </a:solidFill>
-                <a:latin typeface="+mn-lt"/>
-                <a:ea typeface="+mn-ea"/>
-                <a:cs typeface="+mn-cs"/>
-              </a:defRPr>
-            </a:lvl6pPr>
-            <a:lvl7pPr>
-              <a:defRPr>
+                <a:latin typeface="-apple-system"/>
+              </a:rPr>
+              <a:t>gh</a:t>
+            </a:r>
+            <a:r>
+              <a:rPr lang="en-IN" dirty="0">
                 <a:solidFill>
-                  <a:schemeClr val="lt1"/>
+                  <a:srgbClr val="24292F"/>
                 </a:solidFill>
-                <a:latin typeface="+mn-lt"/>
-                <a:ea typeface="+mn-ea"/>
-                <a:cs typeface="+mn-cs"/>
-              </a:defRPr>
-            </a:lvl7pPr>
-            <a:lvl8pPr>
-              <a:defRPr>
+                <a:latin typeface="-apple-system"/>
+              </a:rPr>
+              <a:t>-pages’ (Default).</a:t>
+            </a:r>
+          </a:p>
+          <a:p>
+            <a:pPr algn="just"/>
+            <a:endParaRPr lang="en-IN" dirty="0"/>
+          </a:p>
+        </p:txBody>
+      </p:sp>
+      <p:sp>
+        <p:nvSpPr>
+          <p:cNvPr id="4" name="Rectangle 3">
+            <a:extLst>
+              <a:ext uri="{FF2B5EF4-FFF2-40B4-BE49-F238E27FC236}">
+                <a16:creationId xmlns:a16="http://schemas.microsoft.com/office/drawing/2014/main" id="{8D973F9E-231E-4F4E-BF92-D9C84C7AB5A7}"/>
+              </a:ext>
+            </a:extLst>
+          </p:cNvPr>
+          <p:cNvSpPr/>
+          <p:nvPr/>
+        </p:nvSpPr>
+        <p:spPr>
+          <a:xfrm>
+            <a:off x="0" y="6067425"/>
+            <a:ext cx="9305925" cy="790575"/>
+          </a:xfrm>
+          <a:prstGeom prst="rect">
+            <a:avLst/>
+          </a:prstGeom>
+          <a:scene3d>
+            <a:camera prst="orthographicFront"/>
+            <a:lightRig rig="threePt" dir="t"/>
+          </a:scene3d>
+          <a:sp3d>
+            <a:bevelT w="114300" prst="hardEdge"/>
+          </a:sp3d>
+        </p:spPr>
+        <p:style>
+          <a:lnRef idx="2">
+            <a:schemeClr val="accent1">
+              <a:shade val="50000"/>
+            </a:schemeClr>
+          </a:lnRef>
+          <a:fillRef idx="1">
+            <a:schemeClr val="accent1"/>
+          </a:fillRef>
+          <a:effectRef idx="0">
+            <a:schemeClr val="accent1"/>
+          </a:effectRef>
+          <a:fontRef idx="minor">
+            <a:schemeClr val="lt1"/>
+          </a:fontRef>
+        </p:style>
+        <p:txBody>
+          <a:bodyPr rtlCol="0" anchor="ctr"/>
+          <a:lstStyle/>
+          <a:p>
+            <a:pPr algn="ctr"/>
+            <a:r>
+              <a:rPr lang="en-IN" sz="2000" b="1" dirty="0"/>
+              <a:t>WEDNESDAY’S WICKED ADVENTURES</a:t>
+            </a:r>
+          </a:p>
+        </p:txBody>
+      </p:sp>
+      <p:sp>
+        <p:nvSpPr>
+          <p:cNvPr id="5" name="Rectangle 4">
+            <a:extLst>
+              <a:ext uri="{FF2B5EF4-FFF2-40B4-BE49-F238E27FC236}">
+                <a16:creationId xmlns:a16="http://schemas.microsoft.com/office/drawing/2014/main" id="{ADD2B0B5-489C-4527-87A1-6AE32256E8B1}"/>
+              </a:ext>
+            </a:extLst>
+          </p:cNvPr>
+          <p:cNvSpPr/>
+          <p:nvPr/>
+        </p:nvSpPr>
+        <p:spPr>
+          <a:xfrm>
+            <a:off x="11363325" y="6067425"/>
+            <a:ext cx="828675" cy="790575"/>
+          </a:xfrm>
+          <a:prstGeom prst="rect">
+            <a:avLst/>
+          </a:prstGeom>
+          <a:scene3d>
+            <a:camera prst="orthographicFront"/>
+            <a:lightRig rig="threePt" dir="t"/>
+          </a:scene3d>
+          <a:sp3d>
+            <a:bevelT w="114300" prst="hardEdge"/>
+          </a:sp3d>
+        </p:spPr>
+        <p:style>
+          <a:lnRef idx="2">
+            <a:schemeClr val="accent1">
+              <a:shade val="50000"/>
+            </a:schemeClr>
+          </a:lnRef>
+          <a:fillRef idx="1">
+            <a:schemeClr val="accent1"/>
+          </a:fillRef>
+          <a:effectRef idx="0">
+            <a:schemeClr val="accent1"/>
+          </a:effectRef>
+          <a:fontRef idx="minor">
+            <a:schemeClr val="lt1"/>
+          </a:fontRef>
+        </p:style>
+        <p:txBody>
+          <a:bodyPr rtlCol="0" anchor="ctr"/>
+          <a:lstStyle/>
+          <a:p>
+            <a:pPr algn="ctr"/>
+            <a:endParaRPr lang="en-IN"/>
+          </a:p>
+        </p:txBody>
+      </p:sp>
+      <p:sp>
+        <p:nvSpPr>
+          <p:cNvPr id="6" name="Rectangle 5">
+            <a:extLst>
+              <a:ext uri="{FF2B5EF4-FFF2-40B4-BE49-F238E27FC236}">
+                <a16:creationId xmlns:a16="http://schemas.microsoft.com/office/drawing/2014/main" id="{8F298F8F-A536-48DC-9BA2-D0C59AC19A33}"/>
+              </a:ext>
+            </a:extLst>
+          </p:cNvPr>
+          <p:cNvSpPr/>
+          <p:nvPr/>
+        </p:nvSpPr>
+        <p:spPr>
+          <a:xfrm>
+            <a:off x="9305925" y="6067424"/>
+            <a:ext cx="2057400" cy="790575"/>
+          </a:xfrm>
+          <a:prstGeom prst="rect">
+            <a:avLst/>
+          </a:prstGeom>
+          <a:scene3d>
+            <a:camera prst="orthographicFront"/>
+            <a:lightRig rig="threePt" dir="t"/>
+          </a:scene3d>
+          <a:sp3d>
+            <a:bevelT w="114300" prst="hardEdge"/>
+          </a:sp3d>
+        </p:spPr>
+        <p:style>
+          <a:lnRef idx="2">
+            <a:schemeClr val="accent1">
+              <a:shade val="50000"/>
+            </a:schemeClr>
+          </a:lnRef>
+          <a:fillRef idx="1">
+            <a:schemeClr val="accent1"/>
+          </a:fillRef>
+          <a:effectRef idx="0">
+            <a:schemeClr val="accent1"/>
+          </a:effectRef>
+          <a:fontRef idx="minor">
+            <a:schemeClr val="lt1"/>
+          </a:fontRef>
+        </p:style>
+        <p:txBody>
+          <a:bodyPr rtlCol="0" anchor="ctr"/>
+          <a:lstStyle/>
+          <a:p>
+            <a:pPr algn="ctr"/>
+            <a:r>
+              <a:rPr lang="en-IN" sz="2000" b="1" dirty="0"/>
+              <a:t>APRIL 2022</a:t>
+            </a:r>
+          </a:p>
+        </p:txBody>
+      </p:sp>
+      <p:sp>
+        <p:nvSpPr>
+          <p:cNvPr id="8" name="Slide Number Placeholder 11">
+            <a:extLst>
+              <a:ext uri="{FF2B5EF4-FFF2-40B4-BE49-F238E27FC236}">
+                <a16:creationId xmlns:a16="http://schemas.microsoft.com/office/drawing/2014/main" id="{66E5E76B-63DE-49C5-B59F-65367A92139F}"/>
+              </a:ext>
+            </a:extLst>
+          </p:cNvPr>
+          <p:cNvSpPr>
+            <a:spLocks noGrp="1"/>
+          </p:cNvSpPr>
+          <p:nvPr>
+            <p:ph type="sldNum" sz="quarter" idx="12"/>
+          </p:nvPr>
+        </p:nvSpPr>
+        <p:spPr>
+          <a:xfrm>
+            <a:off x="11563349" y="6280148"/>
+            <a:ext cx="428625" cy="365125"/>
+          </a:xfrm>
+        </p:spPr>
+        <p:txBody>
+          <a:bodyPr/>
+          <a:lstStyle/>
+          <a:p>
+            <a:fld id="{F37EE007-93F6-4DD3-A485-65881C8FA8D0}" type="slidenum">
+              <a:rPr lang="en-IN" sz="2000" b="1" smtClean="0">
                 <a:solidFill>
-                  <a:schemeClr val="lt1"/>
+                  <a:schemeClr val="bg1"/>
                 </a:solidFill>
-                <a:latin typeface="+mn-lt"/>
-                <a:ea typeface="+mn-ea"/>
-                <a:cs typeface="+mn-cs"/>
-              </a:defRPr>
-            </a:lvl8pPr>
-            <a:lvl9pPr>
-              <a:defRPr>
-                <a:solidFill>
-                  <a:schemeClr val="lt1"/>
-                </a:solidFill>
-                <a:latin typeface="+mn-lt"/>
-                <a:ea typeface="+mn-ea"/>
-                <a:cs typeface="+mn-cs"/>
-              </a:defRPr>
-            </a:lvl9pPr>
-          </a:lstStyle>
-          <a:p>
-            <a:pPr algn="ctr"/>
-            <a:r>
-              <a:rPr lang="en-IN" b="1" dirty="0"/>
-              <a:t>2</a:t>
-            </a:r>
-            <a:r>
-              <a:rPr lang="en-IN" b="1" dirty="0">
-                <a:solidFill>
-                  <a:schemeClr val="lt1"/>
-                </a:solidFill>
-                <a:latin typeface="+mn-lt"/>
-                <a:ea typeface="+mn-ea"/>
-                <a:cs typeface="+mn-cs"/>
               </a:rPr>
-              <a:t>. Pytest for unit testing</a:t>
-            </a:r>
-            <a:endParaRPr lang="en-IN" b="1" dirty="0"/>
-          </a:p>
-        </p:txBody>
-      </p:sp>
+              <a:t>10</a:t>
+            </a:fld>
+            <a:endParaRPr lang="en-IN" sz="2000" b="1" dirty="0">
+              <a:solidFill>
+                <a:schemeClr val="bg1"/>
+              </a:solidFill>
+            </a:endParaRPr>
+          </a:p>
+        </p:txBody>
+      </p:sp>
+      <p:pic>
+        <p:nvPicPr>
+          <p:cNvPr id="9" name="Picture 8">
+            <a:extLst>
+              <a:ext uri="{FF2B5EF4-FFF2-40B4-BE49-F238E27FC236}">
+                <a16:creationId xmlns:a16="http://schemas.microsoft.com/office/drawing/2014/main" id="{FE2ECC11-E713-46DD-A8C9-F2FE792FD345}"/>
+              </a:ext>
+            </a:extLst>
+          </p:cNvPr>
+          <p:cNvPicPr>
+            <a:picLocks noChangeAspect="1"/>
+          </p:cNvPicPr>
+          <p:nvPr/>
+        </p:nvPicPr>
+        <p:blipFill>
+          <a:blip r:embed="rId4"/>
+          <a:stretch>
+            <a:fillRect/>
+          </a:stretch>
+        </p:blipFill>
+        <p:spPr>
+          <a:xfrm>
+            <a:off x="3013010" y="1523359"/>
+            <a:ext cx="5793442" cy="1274966"/>
+          </a:xfrm>
+          <a:prstGeom prst="rect">
+            <a:avLst/>
+          </a:prstGeom>
+        </p:spPr>
+      </p:pic>
     </p:spTree>
     <p:extLst>
       <p:ext uri="{BB962C8B-B14F-4D97-AF65-F5344CB8AC3E}">
-        <p14:creationId xmlns:p14="http://schemas.microsoft.com/office/powerpoint/2010/main" val="1818624087"/>
+        <p14:creationId xmlns:p14="http://schemas.microsoft.com/office/powerpoint/2010/main" val="2108658942"/>
       </p:ext>
     </p:extLst>
   </p:cSld>
@@ -4877,10 +4984,6 @@
           </p:nvPr>
         </p:nvSpPr>
         <p:spPr>
-          <a:xfrm>
-            <a:off x="838200" y="403398"/>
-            <a:ext cx="10515600" cy="1119961"/>
-          </a:xfrm>
           <a:effectLst>
             <a:outerShdw blurRad="50800" dist="38100" dir="5400000" algn="t" rotWithShape="0">
               <a:prstClr val="black">
@@ -4904,13 +5007,22 @@
           </a:fontRef>
         </p:style>
         <p:txBody>
-          <a:bodyPr/>
+          <a:bodyPr vert="horz" lIns="91440" tIns="45720" rIns="91440" bIns="45720" rtlCol="0" anchor="ctr">
+            <a:normAutofit/>
+          </a:bodyPr>
           <a:lstStyle/>
           <a:p>
             <a:pPr algn="ctr"/>
             <a:r>
-              <a:rPr lang="en-IN" b="1" dirty="0"/>
-              <a:t>5. Sphinx Tool for Auto Documentation</a:t>
+              <a:rPr lang="en-IN" b="1" dirty="0">
+                <a:solidFill>
+                  <a:schemeClr val="lt1"/>
+                </a:solidFill>
+                <a:latin typeface="+mn-lt"/>
+                <a:ea typeface="+mn-ea"/>
+                <a:cs typeface="+mn-cs"/>
+              </a:rPr>
+              <a:t>Git Wiki for User guides and Instructions</a:t>
             </a:r>
           </a:p>
         </p:txBody>
@@ -4933,143 +5045,21 @@
         </p:nvSpPr>
         <p:spPr>
           <a:xfrm>
-            <a:off x="838200" y="2836599"/>
-            <a:ext cx="10143062" cy="3154279"/>
+            <a:off x="838201" y="1838325"/>
+            <a:ext cx="6286500" cy="1462623"/>
           </a:xfrm>
         </p:spPr>
         <p:txBody>
           <a:bodyPr>
-            <a:normAutofit fontScale="92500" lnSpcReduction="20000"/>
+            <a:normAutofit/>
           </a:bodyPr>
           <a:lstStyle/>
           <a:p>
             <a:pPr algn="just"/>
             <a:r>
               <a:rPr lang="en-US" dirty="0"/>
-              <a:t>An Open-source third party Tool used for auto documentation.</a:t>
-            </a:r>
-          </a:p>
-          <a:p>
-            <a:pPr algn="just"/>
-            <a:r>
-              <a:rPr lang="en-IN" b="0" i="0" dirty="0">
-                <a:solidFill>
-                  <a:srgbClr val="24292F"/>
-                </a:solidFill>
-                <a:effectLst/>
-                <a:latin typeface="-apple-system"/>
-              </a:rPr>
-              <a:t>Sphinx is a documentation generator written in python language.</a:t>
-            </a:r>
-          </a:p>
-          <a:p>
-            <a:pPr algn="just"/>
-            <a:r>
-              <a:rPr lang="en-IN" dirty="0">
-                <a:solidFill>
-                  <a:srgbClr val="24292F"/>
-                </a:solidFill>
-                <a:latin typeface="-apple-system"/>
-              </a:rPr>
-              <a:t>Implementation of Sphinx tool by creating YAML file executed using “GitHub Actions”.</a:t>
-            </a:r>
-          </a:p>
-          <a:p>
-            <a:pPr algn="just"/>
-            <a:r>
-              <a:rPr lang="en-IN" dirty="0">
-                <a:solidFill>
-                  <a:srgbClr val="24292F"/>
-                </a:solidFill>
-                <a:latin typeface="-apple-system"/>
-              </a:rPr>
-              <a:t>Themes available in the URL below : </a:t>
-            </a:r>
-          </a:p>
-          <a:p>
-            <a:pPr marL="0" indent="0" algn="ctr">
-              <a:buNone/>
-            </a:pPr>
-            <a:r>
-              <a:rPr lang="en-IN" dirty="0">
-                <a:solidFill>
-                  <a:srgbClr val="24292F"/>
-                </a:solidFill>
-                <a:latin typeface="-apple-system"/>
-                <a:hlinkClick r:id="rId2"/>
-              </a:rPr>
-              <a:t>https://www.sphinx-doc.org/en/master/usage/theming.html</a:t>
-            </a:r>
-            <a:endParaRPr lang="en-IN" dirty="0">
-              <a:solidFill>
-                <a:srgbClr val="24292F"/>
-              </a:solidFill>
-              <a:latin typeface="-apple-system"/>
-            </a:endParaRPr>
-          </a:p>
-          <a:p>
-            <a:pPr algn="just"/>
-            <a:r>
-              <a:rPr lang="en-IN" dirty="0">
-                <a:solidFill>
-                  <a:srgbClr val="24292F"/>
-                </a:solidFill>
-                <a:latin typeface="-apple-system"/>
-              </a:rPr>
-              <a:t>Details provided in the Git Wiki link in our repository. Click </a:t>
-            </a:r>
-            <a:r>
-              <a:rPr lang="en-IN" dirty="0">
-                <a:solidFill>
-                  <a:srgbClr val="24292F"/>
-                </a:solidFill>
-                <a:latin typeface="-apple-system"/>
-                <a:hlinkClick r:id="rId3"/>
-              </a:rPr>
-              <a:t>here</a:t>
-            </a:r>
-            <a:r>
-              <a:rPr lang="en-IN" dirty="0">
-                <a:solidFill>
-                  <a:srgbClr val="24292F"/>
-                </a:solidFill>
-                <a:latin typeface="-apple-system"/>
-              </a:rPr>
-              <a:t>.</a:t>
-            </a:r>
-          </a:p>
-          <a:p>
-            <a:pPr algn="just"/>
-            <a:r>
-              <a:rPr lang="en-IN" dirty="0">
-                <a:solidFill>
-                  <a:srgbClr val="24292F"/>
-                </a:solidFill>
-                <a:latin typeface="-apple-system"/>
-              </a:rPr>
-              <a:t>Branch created for auto documentation – ‘</a:t>
-            </a:r>
-            <a:r>
-              <a:rPr lang="en-IN" dirty="0" err="1">
-                <a:solidFill>
-                  <a:srgbClr val="24292F"/>
-                </a:solidFill>
-                <a:latin typeface="-apple-system"/>
-              </a:rPr>
-              <a:t>gh</a:t>
-            </a:r>
-            <a:r>
-              <a:rPr lang="en-IN" dirty="0">
-                <a:solidFill>
-                  <a:srgbClr val="24292F"/>
-                </a:solidFill>
-                <a:latin typeface="-apple-system"/>
-              </a:rPr>
-              <a:t>-pages’ (Default).</a:t>
-            </a:r>
-          </a:p>
-          <a:p>
-            <a:pPr algn="just"/>
+              <a:t>Platform provided by Git for adding documentation for the projects hosted in the GitHub repository.</a:t>
+            </a:r>
             <a:endParaRPr lang="en-IN" dirty="0"/>
           </a:p>
         </p:txBody>
@@ -5272,370 +5262,6 @@
                 </a:solidFill>
               </a:rPr>
               <a:t>11</a:t>
-            </a:fld>
-            <a:endParaRPr lang="en-IN" sz="2000" b="1" dirty="0">
-              <a:solidFill>
-                <a:schemeClr val="bg1"/>
-              </a:solidFill>
-            </a:endParaRPr>
-          </a:p>
-        </p:txBody>
-      </p:sp>
-      <p:pic>
-        <p:nvPicPr>
-          <p:cNvPr id="9" name="Picture 8">
-            <a:extLst>
-              <a:ext uri="{FF2B5EF4-FFF2-40B4-BE49-F238E27FC236}">
-                <a16:creationId xmlns:a16="http://schemas.microsoft.com/office/drawing/2014/main" id="{FE2ECC11-E713-46DD-A8C9-F2FE792FD345}"/>
-              </a:ext>
-            </a:extLst>
-          </p:cNvPr>
-          <p:cNvPicPr>
-            <a:picLocks noChangeAspect="1"/>
-          </p:cNvPicPr>
-          <p:nvPr/>
-        </p:nvPicPr>
-        <p:blipFill>
-          <a:blip r:embed="rId4"/>
-          <a:stretch>
-            <a:fillRect/>
-          </a:stretch>
-        </p:blipFill>
-        <p:spPr>
-          <a:xfrm>
-            <a:off x="3013010" y="1523359"/>
-            <a:ext cx="5793442" cy="1274966"/>
-          </a:xfrm>
-          <a:prstGeom prst="rect">
-            <a:avLst/>
-          </a:prstGeom>
-        </p:spPr>
-      </p:pic>
-    </p:spTree>
-    <p:extLst>
-      <p:ext uri="{BB962C8B-B14F-4D97-AF65-F5344CB8AC3E}">
-        <p14:creationId xmlns:p14="http://schemas.microsoft.com/office/powerpoint/2010/main" val="2108658942"/>
-      </p:ext>
-    </p:extLst>
-  </p:cSld>
-  <p:clrMapOvr>
-    <a:masterClrMapping/>
-  </p:clrMapOvr>
-</p:sld>
-</file>
-
-<file path=ppt/slides/slide12.xml><?xml version="1.0" encoding="utf-8"?>
-<p:sld xmlns:a="http://schemas.openxmlformats.org/drawingml/2006/main" xmlns:r="http://schemas.openxmlformats.org/officeDocument/2006/relationships" xmlns:p="http://schemas.openxmlformats.org/presentationml/2006/main">
-  <p:cSld>
-    <p:spTree>
-      <p:nvGrpSpPr>
-        <p:cNvPr id="1" name=""/>
-        <p:cNvGrpSpPr/>
-        <p:nvPr/>
-      </p:nvGrpSpPr>
-      <p:grpSpPr>
-        <a:xfrm>
-          <a:off x="0" y="0"/>
-          <a:ext cx="0" cy="0"/>
-          <a:chOff x="0" y="0"/>
-          <a:chExt cx="0" cy="0"/>
-        </a:xfrm>
-      </p:grpSpPr>
-      <p:sp>
-        <p:nvSpPr>
-          <p:cNvPr id="2" name="Title 1">
-            <a:extLst>
-              <a:ext uri="{FF2B5EF4-FFF2-40B4-BE49-F238E27FC236}">
-                <a16:creationId xmlns:a16="http://schemas.microsoft.com/office/drawing/2014/main" id="{C0666519-3484-48F3-927E-47679DE94711}"/>
-              </a:ext>
-            </a:extLst>
-          </p:cNvPr>
-          <p:cNvSpPr>
-            <a:spLocks noGrp="1"/>
-          </p:cNvSpPr>
-          <p:nvPr>
-            <p:ph type="title"/>
-          </p:nvPr>
-        </p:nvSpPr>
-        <p:spPr>
-          <a:effectLst>
-            <a:outerShdw blurRad="50800" dist="38100" dir="5400000" algn="t" rotWithShape="0">
-              <a:prstClr val="black">
-                <a:alpha val="40000"/>
-              </a:prstClr>
-            </a:outerShdw>
-          </a:effectLst>
-        </p:spPr>
-        <p:style>
-          <a:lnRef idx="3">
-            <a:schemeClr val="lt1"/>
-          </a:lnRef>
-          <a:fillRef idx="1">
-            <a:schemeClr val="accent5"/>
-          </a:fillRef>
-          <a:effectRef idx="1">
-            <a:schemeClr val="accent5"/>
-          </a:effectRef>
-          <a:fontRef idx="minor">
-            <a:schemeClr val="lt1"/>
-          </a:fontRef>
-        </p:style>
-        <p:txBody>
-          <a:bodyPr vert="horz" lIns="91440" tIns="45720" rIns="91440" bIns="45720" rtlCol="0" anchor="ctr">
-            <a:normAutofit/>
-          </a:bodyPr>
-          <a:lstStyle/>
-          <a:p>
-            <a:pPr algn="ctr"/>
-            <a:r>
-              <a:rPr lang="en-IN" b="1" dirty="0">
-                <a:solidFill>
-                  <a:schemeClr val="lt1"/>
-                </a:solidFill>
-                <a:latin typeface="+mn-lt"/>
-                <a:ea typeface="+mn-ea"/>
-                <a:cs typeface="+mn-cs"/>
-              </a:rPr>
-              <a:t>Git Wiki for User guides and Instructions</a:t>
-            </a:r>
-          </a:p>
-        </p:txBody>
-      </p:sp>
-      <p:sp>
-        <p:nvSpPr>
-          <p:cNvPr id="3" name="Content Placeholder 2">
-            <a:extLst>
-              <a:ext uri="{FF2B5EF4-FFF2-40B4-BE49-F238E27FC236}">
-                <a16:creationId xmlns:a16="http://schemas.microsoft.com/office/drawing/2014/main" id="{D3F11377-6BB3-4E47-B174-861CD150A86B}"/>
-              </a:ext>
-            </a:extLst>
-          </p:cNvPr>
-          <p:cNvSpPr>
-            <a:spLocks noGrp="1"/>
-          </p:cNvSpPr>
-          <p:nvPr>
-            <p:ph idx="1"/>
-          </p:nvPr>
-        </p:nvSpPr>
-        <p:spPr>
-          <a:xfrm>
-            <a:off x="838201" y="1838325"/>
-            <a:ext cx="6286500" cy="1462623"/>
-          </a:xfrm>
-        </p:spPr>
-        <p:txBody>
-          <a:bodyPr>
-            <a:normAutofit/>
-          </a:bodyPr>
-          <a:lstStyle/>
-          <a:p>
-            <a:pPr algn="just"/>
-            <a:r>
-              <a:rPr lang="en-US" dirty="0"/>
-              <a:t>Platform provided by Git for adding documentation for the projects hosted in the GitHub repository.</a:t>
-            </a:r>
-            <a:endParaRPr lang="en-IN" dirty="0"/>
-          </a:p>
-        </p:txBody>
-      </p:sp>
-      <p:sp>
-        <p:nvSpPr>
-          <p:cNvPr id="4" name="Rectangle 3">
-            <a:extLst>
-              <a:ext uri="{FF2B5EF4-FFF2-40B4-BE49-F238E27FC236}">
-                <a16:creationId xmlns:a16="http://schemas.microsoft.com/office/drawing/2014/main" id="{8D973F9E-231E-4F4E-BF92-D9C84C7AB5A7}"/>
-              </a:ext>
-            </a:extLst>
-          </p:cNvPr>
-          <p:cNvSpPr/>
-          <p:nvPr/>
-        </p:nvSpPr>
-        <p:spPr>
-          <a:xfrm>
-            <a:off x="0" y="6067425"/>
-            <a:ext cx="9305925" cy="790575"/>
-          </a:xfrm>
-          <a:prstGeom prst="rect">
-            <a:avLst/>
-          </a:prstGeom>
-          <a:scene3d>
-            <a:camera prst="orthographicFront"/>
-            <a:lightRig rig="threePt" dir="t"/>
-          </a:scene3d>
-          <a:sp3d>
-            <a:bevelT w="114300" prst="hardEdge"/>
-          </a:sp3d>
-        </p:spPr>
-        <p:style>
-          <a:lnRef idx="2">
-            <a:schemeClr val="accent1">
-              <a:shade val="50000"/>
-            </a:schemeClr>
-          </a:lnRef>
-          <a:fillRef idx="1">
-            <a:schemeClr val="accent1"/>
-          </a:fillRef>
-          <a:effectRef idx="0">
-            <a:schemeClr val="accent1"/>
-          </a:effectRef>
-          <a:fontRef idx="minor">
-            <a:schemeClr val="lt1"/>
-          </a:fontRef>
-        </p:style>
-        <p:txBody>
-          <a:bodyPr rtlCol="0" anchor="ctr"/>
-          <a:lstStyle/>
-          <a:p>
-            <a:pPr algn="ctr"/>
-            <a:r>
-              <a:rPr lang="en-IN" sz="2000" b="1" dirty="0"/>
-              <a:t>WEDNESDAY’S WICKED ADVENTURES</a:t>
-            </a:r>
-          </a:p>
-        </p:txBody>
-      </p:sp>
-      <p:sp>
-        <p:nvSpPr>
-          <p:cNvPr id="5" name="Rectangle 4">
-            <a:extLst>
-              <a:ext uri="{FF2B5EF4-FFF2-40B4-BE49-F238E27FC236}">
-                <a16:creationId xmlns:a16="http://schemas.microsoft.com/office/drawing/2014/main" id="{ADD2B0B5-489C-4527-87A1-6AE32256E8B1}"/>
-              </a:ext>
-            </a:extLst>
-          </p:cNvPr>
-          <p:cNvSpPr/>
-          <p:nvPr/>
-        </p:nvSpPr>
-        <p:spPr>
-          <a:xfrm>
-            <a:off x="11363325" y="6067425"/>
-            <a:ext cx="828675" cy="790575"/>
-          </a:xfrm>
-          <a:prstGeom prst="rect">
-            <a:avLst/>
-          </a:prstGeom>
-          <a:scene3d>
-            <a:camera prst="orthographicFront"/>
-            <a:lightRig rig="threePt" dir="t"/>
-          </a:scene3d>
-          <a:sp3d>
-            <a:bevelT w="114300" prst="hardEdge"/>
-          </a:sp3d>
-        </p:spPr>
-        <p:style>
-          <a:lnRef idx="2">
-            <a:schemeClr val="accent1">
-              <a:shade val="50000"/>
-            </a:schemeClr>
-          </a:lnRef>
-          <a:fillRef idx="1">
-            <a:schemeClr val="accent1"/>
-          </a:fillRef>
-          <a:effectRef idx="0">
-            <a:schemeClr val="accent1"/>
-          </a:effectRef>
-          <a:fontRef idx="minor">
-            <a:schemeClr val="lt1"/>
-          </a:fontRef>
-        </p:style>
-        <p:txBody>
-          <a:bodyPr rtlCol="0" anchor="ctr"/>
-          <a:lstStyle/>
-          <a:p>
-            <a:pPr algn="ctr"/>
-            <a:endParaRPr lang="en-IN"/>
-          </a:p>
-        </p:txBody>
-      </p:sp>
-      <p:sp>
-        <p:nvSpPr>
-          <p:cNvPr id="6" name="Rectangle 5">
-            <a:extLst>
-              <a:ext uri="{FF2B5EF4-FFF2-40B4-BE49-F238E27FC236}">
-                <a16:creationId xmlns:a16="http://schemas.microsoft.com/office/drawing/2014/main" id="{8F298F8F-A536-48DC-9BA2-D0C59AC19A33}"/>
-              </a:ext>
-            </a:extLst>
-          </p:cNvPr>
-          <p:cNvSpPr/>
-          <p:nvPr/>
-        </p:nvSpPr>
-        <p:spPr>
-          <a:xfrm>
-            <a:off x="9305925" y="6067424"/>
-            <a:ext cx="2057400" cy="790575"/>
-          </a:xfrm>
-          <a:prstGeom prst="rect">
-            <a:avLst/>
-          </a:prstGeom>
-          <a:scene3d>
-            <a:camera prst="orthographicFront"/>
-            <a:lightRig rig="threePt" dir="t"/>
-          </a:scene3d>
-          <a:sp3d>
-            <a:bevelT w="114300" prst="hardEdge"/>
-          </a:sp3d>
-        </p:spPr>
-        <p:style>
-          <a:lnRef idx="2">
-            <a:schemeClr val="accent1">
-              <a:shade val="50000"/>
-            </a:schemeClr>
-          </a:lnRef>
-          <a:fillRef idx="1">
-            <a:schemeClr val="accent1"/>
-          </a:fillRef>
-          <a:effectRef idx="0">
-            <a:schemeClr val="accent1"/>
-          </a:effectRef>
-          <a:fontRef idx="minor">
-            <a:schemeClr val="lt1"/>
-          </a:fontRef>
-        </p:style>
-        <p:txBody>
-          <a:bodyPr rtlCol="0" anchor="ctr"/>
-          <a:lstStyle/>
-          <a:p>
-            <a:pPr algn="ctr"/>
-            <a:r>
-              <a:rPr lang="en-IN" sz="2000" b="1" dirty="0"/>
-              <a:t>APRIL 2022</a:t>
-            </a:r>
-          </a:p>
-        </p:txBody>
-      </p:sp>
-      <p:sp>
-        <p:nvSpPr>
-          <p:cNvPr id="8" name="Slide Number Placeholder 11">
-            <a:extLst>
-              <a:ext uri="{FF2B5EF4-FFF2-40B4-BE49-F238E27FC236}">
-                <a16:creationId xmlns:a16="http://schemas.microsoft.com/office/drawing/2014/main" id="{66E5E76B-63DE-49C5-B59F-65367A92139F}"/>
-              </a:ext>
-            </a:extLst>
-          </p:cNvPr>
-          <p:cNvSpPr>
-            <a:spLocks noGrp="1"/>
-          </p:cNvSpPr>
-          <p:nvPr>
-            <p:ph type="sldNum" sz="quarter" idx="12"/>
-          </p:nvPr>
-        </p:nvSpPr>
-        <p:spPr>
-          <a:xfrm>
-            <a:off x="11563349" y="6280148"/>
-            <a:ext cx="428625" cy="365125"/>
-          </a:xfrm>
-        </p:spPr>
-        <p:txBody>
-          <a:bodyPr/>
-          <a:lstStyle/>
-          <a:p>
-            <a:fld id="{F37EE007-93F6-4DD3-A485-65881C8FA8D0}" type="slidenum">
-              <a:rPr lang="en-IN" sz="2000" b="1" smtClean="0">
-                <a:solidFill>
-                  <a:schemeClr val="bg1"/>
-                </a:solidFill>
-              </a:rPr>
-              <a:t>12</a:t>
             </a:fld>
             <a:endParaRPr lang="en-IN" sz="2000" b="1" dirty="0">
               <a:solidFill>
@@ -5673,7 +5299,7 @@
           <a:graphicData uri="http://schemas.openxmlformats.org/presentationml/2006/ole">
             <mc:AlternateContent xmlns:mc="http://schemas.openxmlformats.org/markup-compatibility/2006">
               <mc:Choice xmlns:v="urn:schemas-microsoft-com:vml" Requires="v">
-                <p:oleObj spid="_x0000_s3091" name="Bitmap Image" r:id="rId3" imgW="5753160" imgH="1973520" progId="Paint.Picture">
+                <p:oleObj spid="_x0000_s3094" name="Bitmap Image" r:id="rId3" imgW="5753160" imgH="1973520" progId="Paint.Picture">
                   <p:embed/>
                 </p:oleObj>
               </mc:Choice>
@@ -5945,6 +5571,296 @@
 </p:sld>
 </file>
 
+<file path=ppt/slides/slide12.xml><?xml version="1.0" encoding="utf-8"?>
+<p:sld xmlns:a="http://schemas.openxmlformats.org/drawingml/2006/main" xmlns:r="http://schemas.openxmlformats.org/officeDocument/2006/relationships" xmlns:p="http://schemas.openxmlformats.org/presentationml/2006/main">
+  <p:cSld>
+    <p:spTree>
+      <p:nvGrpSpPr>
+        <p:cNvPr id="1" name=""/>
+        <p:cNvGrpSpPr/>
+        <p:nvPr/>
+      </p:nvGrpSpPr>
+      <p:grpSpPr>
+        <a:xfrm>
+          <a:off x="0" y="0"/>
+          <a:ext cx="0" cy="0"/>
+          <a:chOff x="0" y="0"/>
+          <a:chExt cx="0" cy="0"/>
+        </a:xfrm>
+      </p:grpSpPr>
+      <p:sp>
+        <p:nvSpPr>
+          <p:cNvPr id="2" name="Title 1">
+            <a:extLst>
+              <a:ext uri="{FF2B5EF4-FFF2-40B4-BE49-F238E27FC236}">
+                <a16:creationId xmlns:a16="http://schemas.microsoft.com/office/drawing/2014/main" id="{C0666519-3484-48F3-927E-47679DE94711}"/>
+              </a:ext>
+            </a:extLst>
+          </p:cNvPr>
+          <p:cNvSpPr>
+            <a:spLocks noGrp="1"/>
+          </p:cNvSpPr>
+          <p:nvPr>
+            <p:ph type="title"/>
+          </p:nvPr>
+        </p:nvSpPr>
+        <p:spPr/>
+        <p:txBody>
+          <a:bodyPr/>
+          <a:lstStyle/>
+          <a:p>
+            <a:r>
+              <a:rPr lang="en-IN" b="1" dirty="0"/>
+              <a:t>4. CONCLUSION</a:t>
+            </a:r>
+          </a:p>
+        </p:txBody>
+      </p:sp>
+      <p:sp>
+        <p:nvSpPr>
+          <p:cNvPr id="3" name="Content Placeholder 2">
+            <a:extLst>
+              <a:ext uri="{FF2B5EF4-FFF2-40B4-BE49-F238E27FC236}">
+                <a16:creationId xmlns:a16="http://schemas.microsoft.com/office/drawing/2014/main" id="{D3F11377-6BB3-4E47-B174-861CD150A86B}"/>
+              </a:ext>
+            </a:extLst>
+          </p:cNvPr>
+          <p:cNvSpPr>
+            <a:spLocks noGrp="1"/>
+          </p:cNvSpPr>
+          <p:nvPr>
+            <p:ph idx="1"/>
+          </p:nvPr>
+        </p:nvSpPr>
+        <p:spPr/>
+        <p:txBody>
+          <a:bodyPr/>
+          <a:lstStyle/>
+          <a:p>
+            <a:endParaRPr lang="en-IN"/>
+          </a:p>
+        </p:txBody>
+      </p:sp>
+      <p:sp>
+        <p:nvSpPr>
+          <p:cNvPr id="4" name="Rectangle 3">
+            <a:extLst>
+              <a:ext uri="{FF2B5EF4-FFF2-40B4-BE49-F238E27FC236}">
+                <a16:creationId xmlns:a16="http://schemas.microsoft.com/office/drawing/2014/main" id="{8D973F9E-231E-4F4E-BF92-D9C84C7AB5A7}"/>
+              </a:ext>
+            </a:extLst>
+          </p:cNvPr>
+          <p:cNvSpPr/>
+          <p:nvPr/>
+        </p:nvSpPr>
+        <p:spPr>
+          <a:xfrm>
+            <a:off x="0" y="6067425"/>
+            <a:ext cx="9305925" cy="790575"/>
+          </a:xfrm>
+          <a:prstGeom prst="rect">
+            <a:avLst/>
+          </a:prstGeom>
+          <a:scene3d>
+            <a:camera prst="orthographicFront"/>
+            <a:lightRig rig="threePt" dir="t"/>
+          </a:scene3d>
+          <a:sp3d>
+            <a:bevelT w="114300" prst="hardEdge"/>
+          </a:sp3d>
+        </p:spPr>
+        <p:style>
+          <a:lnRef idx="2">
+            <a:schemeClr val="accent1">
+              <a:shade val="50000"/>
+            </a:schemeClr>
+          </a:lnRef>
+          <a:fillRef idx="1">
+            <a:schemeClr val="accent1"/>
+          </a:fillRef>
+          <a:effectRef idx="0">
+            <a:schemeClr val="accent1"/>
+          </a:effectRef>
+          <a:fontRef idx="minor">
+            <a:schemeClr val="lt1"/>
+          </a:fontRef>
+        </p:style>
+        <p:txBody>
+          <a:bodyPr rtlCol="0" anchor="ctr"/>
+          <a:lstStyle/>
+          <a:p>
+            <a:pPr algn="ctr"/>
+            <a:r>
+              <a:rPr lang="en-IN" sz="2000" b="1" dirty="0"/>
+              <a:t>WEDNESDAY’S WICKED ADVENTURES</a:t>
+            </a:r>
+          </a:p>
+        </p:txBody>
+      </p:sp>
+      <p:sp>
+        <p:nvSpPr>
+          <p:cNvPr id="5" name="Rectangle 4">
+            <a:extLst>
+              <a:ext uri="{FF2B5EF4-FFF2-40B4-BE49-F238E27FC236}">
+                <a16:creationId xmlns:a16="http://schemas.microsoft.com/office/drawing/2014/main" id="{ADD2B0B5-489C-4527-87A1-6AE32256E8B1}"/>
+              </a:ext>
+            </a:extLst>
+          </p:cNvPr>
+          <p:cNvSpPr/>
+          <p:nvPr/>
+        </p:nvSpPr>
+        <p:spPr>
+          <a:xfrm>
+            <a:off x="11363325" y="6067425"/>
+            <a:ext cx="828675" cy="790575"/>
+          </a:xfrm>
+          <a:prstGeom prst="rect">
+            <a:avLst/>
+          </a:prstGeom>
+          <a:scene3d>
+            <a:camera prst="orthographicFront"/>
+            <a:lightRig rig="threePt" dir="t"/>
+          </a:scene3d>
+          <a:sp3d>
+            <a:bevelT w="114300" prst="hardEdge"/>
+          </a:sp3d>
+        </p:spPr>
+        <p:style>
+          <a:lnRef idx="2">
+            <a:schemeClr val="accent1">
+              <a:shade val="50000"/>
+            </a:schemeClr>
+          </a:lnRef>
+          <a:fillRef idx="1">
+            <a:schemeClr val="accent1"/>
+          </a:fillRef>
+          <a:effectRef idx="0">
+            <a:schemeClr val="accent1"/>
+          </a:effectRef>
+          <a:fontRef idx="minor">
+            <a:schemeClr val="lt1"/>
+          </a:fontRef>
+        </p:style>
+        <p:txBody>
+          <a:bodyPr rtlCol="0" anchor="ctr"/>
+          <a:lstStyle/>
+          <a:p>
+            <a:pPr algn="ctr"/>
+            <a:endParaRPr lang="en-IN"/>
+          </a:p>
+        </p:txBody>
+      </p:sp>
+      <p:sp>
+        <p:nvSpPr>
+          <p:cNvPr id="6" name="Rectangle 5">
+            <a:extLst>
+              <a:ext uri="{FF2B5EF4-FFF2-40B4-BE49-F238E27FC236}">
+                <a16:creationId xmlns:a16="http://schemas.microsoft.com/office/drawing/2014/main" id="{8F298F8F-A536-48DC-9BA2-D0C59AC19A33}"/>
+              </a:ext>
+            </a:extLst>
+          </p:cNvPr>
+          <p:cNvSpPr/>
+          <p:nvPr/>
+        </p:nvSpPr>
+        <p:spPr>
+          <a:xfrm>
+            <a:off x="9305925" y="6067424"/>
+            <a:ext cx="2057400" cy="790575"/>
+          </a:xfrm>
+          <a:prstGeom prst="rect">
+            <a:avLst/>
+          </a:prstGeom>
+          <a:scene3d>
+            <a:camera prst="orthographicFront"/>
+            <a:lightRig rig="threePt" dir="t"/>
+          </a:scene3d>
+          <a:sp3d>
+            <a:bevelT w="114300" prst="hardEdge"/>
+          </a:sp3d>
+        </p:spPr>
+        <p:style>
+          <a:lnRef idx="2">
+            <a:schemeClr val="accent1">
+              <a:shade val="50000"/>
+            </a:schemeClr>
+          </a:lnRef>
+          <a:fillRef idx="1">
+            <a:schemeClr val="accent1"/>
+          </a:fillRef>
+          <a:effectRef idx="0">
+            <a:schemeClr val="accent1"/>
+          </a:effectRef>
+          <a:fontRef idx="minor">
+            <a:schemeClr val="lt1"/>
+          </a:fontRef>
+        </p:style>
+        <p:txBody>
+          <a:bodyPr rtlCol="0" anchor="ctr"/>
+          <a:lstStyle/>
+          <a:p>
+            <a:pPr algn="ctr"/>
+            <a:r>
+              <a:rPr lang="en-IN" sz="2000" b="1" dirty="0"/>
+              <a:t>APRIL 2022</a:t>
+            </a:r>
+          </a:p>
+        </p:txBody>
+      </p:sp>
+      <p:sp>
+        <p:nvSpPr>
+          <p:cNvPr id="8" name="Slide Number Placeholder 11">
+            <a:extLst>
+              <a:ext uri="{FF2B5EF4-FFF2-40B4-BE49-F238E27FC236}">
+                <a16:creationId xmlns:a16="http://schemas.microsoft.com/office/drawing/2014/main" id="{66E5E76B-63DE-49C5-B59F-65367A92139F}"/>
+              </a:ext>
+            </a:extLst>
+          </p:cNvPr>
+          <p:cNvSpPr>
+            <a:spLocks noGrp="1"/>
+          </p:cNvSpPr>
+          <p:nvPr>
+            <p:ph type="sldNum" sz="quarter" idx="12"/>
+          </p:nvPr>
+        </p:nvSpPr>
+        <p:spPr>
+          <a:xfrm>
+            <a:off x="11563349" y="6280148"/>
+            <a:ext cx="428625" cy="365125"/>
+          </a:xfrm>
+        </p:spPr>
+        <p:txBody>
+          <a:bodyPr/>
+          <a:lstStyle/>
+          <a:p>
+            <a:fld id="{F37EE007-93F6-4DD3-A485-65881C8FA8D0}" type="slidenum">
+              <a:rPr lang="en-IN" sz="2000" b="1" smtClean="0">
+                <a:solidFill>
+                  <a:schemeClr val="bg1"/>
+                </a:solidFill>
+              </a:rPr>
+              <a:t>12</a:t>
+            </a:fld>
+            <a:endParaRPr lang="en-IN" sz="2000" b="1" dirty="0">
+              <a:solidFill>
+                <a:schemeClr val="bg1"/>
+              </a:solidFill>
+            </a:endParaRPr>
+          </a:p>
+        </p:txBody>
+      </p:sp>
+    </p:spTree>
+    <p:extLst>
+      <p:ext uri="{BB962C8B-B14F-4D97-AF65-F5344CB8AC3E}">
+        <p14:creationId xmlns:p14="http://schemas.microsoft.com/office/powerpoint/2010/main" val="4193434119"/>
+      </p:ext>
+    </p:extLst>
+  </p:cSld>
+  <p:clrMapOvr>
+    <a:masterClrMapping/>
+  </p:clrMapOvr>
+</p:sld>
+</file>
+
 <file path=ppt/slides/slide13.xml><?xml version="1.0" encoding="utf-8"?>
 <p:sld xmlns:a="http://schemas.openxmlformats.org/drawingml/2006/main" xmlns:r="http://schemas.openxmlformats.org/officeDocument/2006/relationships" xmlns:p="http://schemas.openxmlformats.org/presentationml/2006/main">
   <p:cSld>
@@ -5964,59 +5880,6 @@
       </p:grpSpPr>
       <p:sp>
         <p:nvSpPr>
-          <p:cNvPr id="2" name="Title 1">
-            <a:extLst>
-              <a:ext uri="{FF2B5EF4-FFF2-40B4-BE49-F238E27FC236}">
-                <a16:creationId xmlns:a16="http://schemas.microsoft.com/office/drawing/2014/main" id="{C0666519-3484-48F3-927E-47679DE94711}"/>
-              </a:ext>
-            </a:extLst>
-          </p:cNvPr>
-          <p:cNvSpPr>
-            <a:spLocks noGrp="1"/>
-          </p:cNvSpPr>
-          <p:nvPr>
-            <p:ph type="title"/>
-          </p:nvPr>
-        </p:nvSpPr>
-        <p:spPr/>
-        <p:txBody>
-          <a:bodyPr/>
-          <a:lstStyle/>
-          <a:p>
-            <a:r>
-              <a:rPr lang="en-IN" b="1" dirty="0"/>
-              <a:t>4. CONCLUSION</a:t>
-            </a:r>
-          </a:p>
-        </p:txBody>
-      </p:sp>
-      <p:sp>
-        <p:nvSpPr>
-          <p:cNvPr id="3" name="Content Placeholder 2">
-            <a:extLst>
-              <a:ext uri="{FF2B5EF4-FFF2-40B4-BE49-F238E27FC236}">
-                <a16:creationId xmlns:a16="http://schemas.microsoft.com/office/drawing/2014/main" id="{D3F11377-6BB3-4E47-B174-861CD150A86B}"/>
-              </a:ext>
-            </a:extLst>
-          </p:cNvPr>
-          <p:cNvSpPr>
-            <a:spLocks noGrp="1"/>
-          </p:cNvSpPr>
-          <p:nvPr>
-            <p:ph idx="1"/>
-          </p:nvPr>
-        </p:nvSpPr>
-        <p:spPr/>
-        <p:txBody>
-          <a:bodyPr/>
-          <a:lstStyle/>
-          <a:p>
-            <a:endParaRPr lang="en-IN"/>
-          </a:p>
-        </p:txBody>
-      </p:sp>
-      <p:sp>
-        <p:nvSpPr>
           <p:cNvPr id="4" name="Rectangle 3">
             <a:extLst>
               <a:ext uri="{FF2B5EF4-FFF2-40B4-BE49-F238E27FC236}">
@@ -6222,10 +6085,57 @@
           </a:p>
         </p:txBody>
       </p:sp>
+      <p:pic>
+        <p:nvPicPr>
+          <p:cNvPr id="2050" name="Picture 2" descr="See the source image">
+            <a:extLst>
+              <a:ext uri="{FF2B5EF4-FFF2-40B4-BE49-F238E27FC236}">
+                <a16:creationId xmlns:a16="http://schemas.microsoft.com/office/drawing/2014/main" id="{B5B67862-A69F-498B-B814-F7947A0A1E0A}"/>
+              </a:ext>
+            </a:extLst>
+          </p:cNvPr>
+          <p:cNvPicPr>
+            <a:picLocks noChangeAspect="1" noChangeArrowheads="1"/>
+          </p:cNvPicPr>
+          <p:nvPr/>
+        </p:nvPicPr>
+        <p:blipFill>
+          <a:blip r:embed="rId2">
+            <a:extLst>
+              <a:ext uri="{28A0092B-C50C-407E-A947-70E740481C1C}">
+                <a14:useLocalDpi xmlns:a14="http://schemas.microsoft.com/office/drawing/2010/main" val="0"/>
+              </a:ext>
+            </a:extLst>
+          </a:blip>
+          <a:srcRect/>
+          <a:stretch>
+            <a:fillRect/>
+          </a:stretch>
+        </p:blipFill>
+        <p:spPr bwMode="auto">
+          <a:xfrm>
+            <a:off x="0" y="0"/>
+            <a:ext cx="12192000" cy="6067421"/>
+          </a:xfrm>
+          <a:prstGeom prst="rect">
+            <a:avLst/>
+          </a:prstGeom>
+          <a:noFill/>
+          <a:extLst>
+            <a:ext uri="{909E8E84-426E-40DD-AFC4-6F175D3DCCD1}">
+              <a14:hiddenFill xmlns:a14="http://schemas.microsoft.com/office/drawing/2010/main">
+                <a:solidFill>
+                  <a:srgbClr val="FFFFFF"/>
+                </a:solidFill>
+              </a14:hiddenFill>
+            </a:ext>
+          </a:extLst>
+        </p:spPr>
+      </p:pic>
     </p:spTree>
     <p:extLst>
       <p:ext uri="{BB962C8B-B14F-4D97-AF65-F5344CB8AC3E}">
-        <p14:creationId xmlns:p14="http://schemas.microsoft.com/office/powerpoint/2010/main" val="4193434119"/>
+        <p14:creationId xmlns:p14="http://schemas.microsoft.com/office/powerpoint/2010/main" val="2087571555"/>
       </p:ext>
     </p:extLst>
   </p:cSld>
@@ -6450,290 +6360,6 @@
                 </a:solidFill>
               </a:rPr>
               <a:t>14</a:t>
-            </a:fld>
-            <a:endParaRPr lang="en-IN" sz="2000" b="1" dirty="0">
-              <a:solidFill>
-                <a:schemeClr val="bg1"/>
-              </a:solidFill>
-            </a:endParaRPr>
-          </a:p>
-        </p:txBody>
-      </p:sp>
-      <p:pic>
-        <p:nvPicPr>
-          <p:cNvPr id="2050" name="Picture 2" descr="See the source image">
-            <a:extLst>
-              <a:ext uri="{FF2B5EF4-FFF2-40B4-BE49-F238E27FC236}">
-                <a16:creationId xmlns:a16="http://schemas.microsoft.com/office/drawing/2014/main" id="{B5B67862-A69F-498B-B814-F7947A0A1E0A}"/>
-              </a:ext>
-            </a:extLst>
-          </p:cNvPr>
-          <p:cNvPicPr>
-            <a:picLocks noChangeAspect="1" noChangeArrowheads="1"/>
-          </p:cNvPicPr>
-          <p:nvPr/>
-        </p:nvPicPr>
-        <p:blipFill>
-          <a:blip r:embed="rId2">
-            <a:extLst>
-              <a:ext uri="{28A0092B-C50C-407E-A947-70E740481C1C}">
-                <a14:useLocalDpi xmlns:a14="http://schemas.microsoft.com/office/drawing/2010/main" val="0"/>
-              </a:ext>
-            </a:extLst>
-          </a:blip>
-          <a:srcRect/>
-          <a:stretch>
-            <a:fillRect/>
-          </a:stretch>
-        </p:blipFill>
-        <p:spPr bwMode="auto">
-          <a:xfrm>
-            <a:off x="0" y="0"/>
-            <a:ext cx="12192000" cy="6067421"/>
-          </a:xfrm>
-          <a:prstGeom prst="rect">
-            <a:avLst/>
-          </a:prstGeom>
-          <a:noFill/>
-          <a:extLst>
-            <a:ext uri="{909E8E84-426E-40DD-AFC4-6F175D3DCCD1}">
-              <a14:hiddenFill xmlns:a14="http://schemas.microsoft.com/office/drawing/2010/main">
-                <a:solidFill>
-                  <a:srgbClr val="FFFFFF"/>
-                </a:solidFill>
-              </a14:hiddenFill>
-            </a:ext>
-          </a:extLst>
-        </p:spPr>
-      </p:pic>
-    </p:spTree>
-    <p:extLst>
-      <p:ext uri="{BB962C8B-B14F-4D97-AF65-F5344CB8AC3E}">
-        <p14:creationId xmlns:p14="http://schemas.microsoft.com/office/powerpoint/2010/main" val="2087571555"/>
-      </p:ext>
-    </p:extLst>
-  </p:cSld>
-  <p:clrMapOvr>
-    <a:masterClrMapping/>
-  </p:clrMapOvr>
-</p:sld>
-</file>
-
-<file path=ppt/slides/slide15.xml><?xml version="1.0" encoding="utf-8"?>
-<p:sld xmlns:a="http://schemas.openxmlformats.org/drawingml/2006/main" xmlns:r="http://schemas.openxmlformats.org/officeDocument/2006/relationships" xmlns:p="http://schemas.openxmlformats.org/presentationml/2006/main">
-  <p:cSld>
-    <p:spTree>
-      <p:nvGrpSpPr>
-        <p:cNvPr id="1" name=""/>
-        <p:cNvGrpSpPr/>
-        <p:nvPr/>
-      </p:nvGrpSpPr>
-      <p:grpSpPr>
-        <a:xfrm>
-          <a:off x="0" y="0"/>
-          <a:ext cx="0" cy="0"/>
-          <a:chOff x="0" y="0"/>
-          <a:chExt cx="0" cy="0"/>
-        </a:xfrm>
-      </p:grpSpPr>
-      <p:sp>
-        <p:nvSpPr>
-          <p:cNvPr id="4" name="Rectangle 3">
-            <a:extLst>
-              <a:ext uri="{FF2B5EF4-FFF2-40B4-BE49-F238E27FC236}">
-                <a16:creationId xmlns:a16="http://schemas.microsoft.com/office/drawing/2014/main" id="{8D973F9E-231E-4F4E-BF92-D9C84C7AB5A7}"/>
-              </a:ext>
-            </a:extLst>
-          </p:cNvPr>
-          <p:cNvSpPr/>
-          <p:nvPr/>
-        </p:nvSpPr>
-        <p:spPr>
-          <a:xfrm>
-            <a:off x="0" y="6067425"/>
-            <a:ext cx="9305925" cy="790575"/>
-          </a:xfrm>
-          <a:prstGeom prst="rect">
-            <a:avLst/>
-          </a:prstGeom>
-          <a:scene3d>
-            <a:camera prst="orthographicFront"/>
-            <a:lightRig rig="threePt" dir="t"/>
-          </a:scene3d>
-          <a:sp3d>
-            <a:bevelT w="114300" prst="hardEdge"/>
-          </a:sp3d>
-        </p:spPr>
-        <p:style>
-          <a:lnRef idx="2">
-            <a:schemeClr val="accent1">
-              <a:shade val="50000"/>
-            </a:schemeClr>
-          </a:lnRef>
-          <a:fillRef idx="1">
-            <a:schemeClr val="accent1"/>
-          </a:fillRef>
-          <a:effectRef idx="0">
-            <a:schemeClr val="accent1"/>
-          </a:effectRef>
-          <a:fontRef idx="minor">
-            <a:schemeClr val="lt1"/>
-          </a:fontRef>
-        </p:style>
-        <p:txBody>
-          <a:bodyPr rtlCol="0" anchor="ctr"/>
-          <a:lstStyle/>
-          <a:p>
-            <a:pPr algn="ctr"/>
-            <a:r>
-              <a:rPr lang="en-IN" sz="2000" b="1" dirty="0"/>
-              <a:t>WEDNESDAY’S WICKED ADVENTURES</a:t>
-            </a:r>
-          </a:p>
-        </p:txBody>
-      </p:sp>
-      <p:sp>
-        <p:nvSpPr>
-          <p:cNvPr id="5" name="Rectangle 4">
-            <a:extLst>
-              <a:ext uri="{FF2B5EF4-FFF2-40B4-BE49-F238E27FC236}">
-                <a16:creationId xmlns:a16="http://schemas.microsoft.com/office/drawing/2014/main" id="{ADD2B0B5-489C-4527-87A1-6AE32256E8B1}"/>
-              </a:ext>
-            </a:extLst>
-          </p:cNvPr>
-          <p:cNvSpPr/>
-          <p:nvPr/>
-        </p:nvSpPr>
-        <p:spPr>
-          <a:xfrm>
-            <a:off x="11363325" y="6067425"/>
-            <a:ext cx="828675" cy="790575"/>
-          </a:xfrm>
-          <a:prstGeom prst="rect">
-            <a:avLst/>
-          </a:prstGeom>
-          <a:scene3d>
-            <a:camera prst="orthographicFront"/>
-            <a:lightRig rig="threePt" dir="t"/>
-          </a:scene3d>
-          <a:sp3d>
-            <a:bevelT w="114300" prst="hardEdge"/>
-          </a:sp3d>
-        </p:spPr>
-        <p:style>
-          <a:lnRef idx="2">
-            <a:schemeClr val="accent1">
-              <a:shade val="50000"/>
-            </a:schemeClr>
-          </a:lnRef>
-          <a:fillRef idx="1">
-            <a:schemeClr val="accent1"/>
-          </a:fillRef>
-          <a:effectRef idx="0">
-            <a:schemeClr val="accent1"/>
-          </a:effectRef>
-          <a:fontRef idx="minor">
-            <a:schemeClr val="lt1"/>
-          </a:fontRef>
-        </p:style>
-        <p:txBody>
-          <a:bodyPr rtlCol="0" anchor="ctr"/>
-          <a:lstStyle/>
-          <a:p>
-            <a:pPr algn="ctr"/>
-            <a:endParaRPr lang="en-IN"/>
-          </a:p>
-        </p:txBody>
-      </p:sp>
-      <p:sp>
-        <p:nvSpPr>
-          <p:cNvPr id="6" name="Rectangle 5">
-            <a:extLst>
-              <a:ext uri="{FF2B5EF4-FFF2-40B4-BE49-F238E27FC236}">
-                <a16:creationId xmlns:a16="http://schemas.microsoft.com/office/drawing/2014/main" id="{8F298F8F-A536-48DC-9BA2-D0C59AC19A33}"/>
-              </a:ext>
-            </a:extLst>
-          </p:cNvPr>
-          <p:cNvSpPr/>
-          <p:nvPr/>
-        </p:nvSpPr>
-        <p:spPr>
-          <a:xfrm>
-            <a:off x="9305925" y="6067424"/>
-            <a:ext cx="2057400" cy="790575"/>
-          </a:xfrm>
-          <a:prstGeom prst="rect">
-            <a:avLst/>
-          </a:prstGeom>
-          <a:scene3d>
-            <a:camera prst="orthographicFront"/>
-            <a:lightRig rig="threePt" dir="t"/>
-          </a:scene3d>
-          <a:sp3d>
-            <a:bevelT w="114300" prst="hardEdge"/>
-          </a:sp3d>
-        </p:spPr>
-        <p:style>
-          <a:lnRef idx="2">
-            <a:schemeClr val="accent1">
-              <a:shade val="50000"/>
-            </a:schemeClr>
-          </a:lnRef>
-          <a:fillRef idx="1">
-            <a:schemeClr val="accent1"/>
-          </a:fillRef>
-          <a:effectRef idx="0">
-            <a:schemeClr val="accent1"/>
-          </a:effectRef>
-          <a:fontRef idx="minor">
-            <a:schemeClr val="lt1"/>
-          </a:fontRef>
-        </p:style>
-        <p:txBody>
-          <a:bodyPr rtlCol="0" anchor="ctr"/>
-          <a:lstStyle/>
-          <a:p>
-            <a:pPr algn="ctr"/>
-            <a:r>
-              <a:rPr lang="en-IN" sz="2000" b="1" dirty="0"/>
-              <a:t>APRIL 2022</a:t>
-            </a:r>
-          </a:p>
-        </p:txBody>
-      </p:sp>
-      <p:sp>
-        <p:nvSpPr>
-          <p:cNvPr id="8" name="Slide Number Placeholder 11">
-            <a:extLst>
-              <a:ext uri="{FF2B5EF4-FFF2-40B4-BE49-F238E27FC236}">
-                <a16:creationId xmlns:a16="http://schemas.microsoft.com/office/drawing/2014/main" id="{66E5E76B-63DE-49C5-B59F-65367A92139F}"/>
-              </a:ext>
-            </a:extLst>
-          </p:cNvPr>
-          <p:cNvSpPr>
-            <a:spLocks noGrp="1"/>
-          </p:cNvSpPr>
-          <p:nvPr>
-            <p:ph type="sldNum" sz="quarter" idx="12"/>
-          </p:nvPr>
-        </p:nvSpPr>
-        <p:spPr>
-          <a:xfrm>
-            <a:off x="11563349" y="6280148"/>
-            <a:ext cx="428625" cy="365125"/>
-          </a:xfrm>
-        </p:spPr>
-        <p:txBody>
-          <a:bodyPr/>
-          <a:lstStyle/>
-          <a:p>
-            <a:fld id="{F37EE007-93F6-4DD3-A485-65881C8FA8D0}" type="slidenum">
-              <a:rPr lang="en-IN" sz="2000" b="1" smtClean="0">
-                <a:solidFill>
-                  <a:schemeClr val="bg1"/>
-                </a:solidFill>
-              </a:rPr>
-              <a:t>15</a:t>
             </a:fld>
             <a:endParaRPr lang="en-IN" sz="2000" b="1" dirty="0">
               <a:solidFill>
@@ -6843,7 +6469,7 @@
           <a:p>
             <a:r>
               <a:rPr lang="en-IN" b="1" dirty="0"/>
-              <a:t>1. ABSTRACT</a:t>
+              <a:t>2. INTRODUCTION</a:t>
             </a:r>
           </a:p>
         </p:txBody>
@@ -6869,7 +6495,7 @@
           <a:bodyPr/>
           <a:lstStyle/>
           <a:p>
-            <a:endParaRPr lang="en-IN"/>
+            <a:endParaRPr lang="en-IN" dirty="0"/>
           </a:p>
         </p:txBody>
       </p:sp>
@@ -7083,7 +6709,7 @@
     </p:spTree>
     <p:extLst>
       <p:ext uri="{BB962C8B-B14F-4D97-AF65-F5344CB8AC3E}">
-        <p14:creationId xmlns:p14="http://schemas.microsoft.com/office/powerpoint/2010/main" val="4293705200"/>
+        <p14:creationId xmlns:p14="http://schemas.microsoft.com/office/powerpoint/2010/main" val="2624110905"/>
       </p:ext>
     </p:extLst>
   </p:cSld>
@@ -7126,14 +6752,46 @@
             <p:ph type="title"/>
           </p:nvPr>
         </p:nvSpPr>
-        <p:spPr/>
-        <p:txBody>
-          <a:bodyPr/>
-          <a:lstStyle/>
-          <a:p>
-            <a:r>
-              <a:rPr lang="en-IN" b="1" dirty="0"/>
-              <a:t>2. INTRODUCTION</a:t>
+        <p:spPr>
+          <a:effectLst>
+            <a:outerShdw blurRad="50800" dist="38100" dir="5400000" algn="t" rotWithShape="0">
+              <a:prstClr val="black">
+                <a:alpha val="40000"/>
+              </a:prstClr>
+            </a:outerShdw>
+          </a:effectLst>
+        </p:spPr>
+        <p:style>
+          <a:lnRef idx="3">
+            <a:schemeClr val="lt1"/>
+          </a:lnRef>
+          <a:fillRef idx="1">
+            <a:schemeClr val="accent5"/>
+          </a:fillRef>
+          <a:effectRef idx="1">
+            <a:schemeClr val="accent5"/>
+          </a:effectRef>
+          <a:fontRef idx="minor">
+            <a:schemeClr val="lt1"/>
+          </a:fontRef>
+        </p:style>
+        <p:txBody>
+          <a:bodyPr vert="horz" lIns="91440" tIns="45720" rIns="91440" bIns="45720" rtlCol="0" anchor="ctr">
+            <a:normAutofit/>
+          </a:bodyPr>
+          <a:lstStyle/>
+          <a:p>
+            <a:pPr algn="ctr"/>
+            <a:r>
+              <a:rPr lang="en-IN" b="1" dirty="0">
+                <a:solidFill>
+                  <a:schemeClr val="lt1"/>
+                </a:solidFill>
+                <a:latin typeface="+mn-lt"/>
+                <a:ea typeface="+mn-ea"/>
+                <a:cs typeface="+mn-cs"/>
+              </a:rPr>
+              <a:t>APPLICATION</a:t>
             </a:r>
           </a:p>
         </p:txBody>
@@ -7159,7 +6817,7 @@
           <a:bodyPr/>
           <a:lstStyle/>
           <a:p>
-            <a:endParaRPr lang="en-IN" dirty="0"/>
+            <a:endParaRPr lang="en-IN"/>
           </a:p>
         </p:txBody>
       </p:sp>
@@ -7373,7 +7031,7 @@
     </p:spTree>
     <p:extLst>
       <p:ext uri="{BB962C8B-B14F-4D97-AF65-F5344CB8AC3E}">
-        <p14:creationId xmlns:p14="http://schemas.microsoft.com/office/powerpoint/2010/main" val="2624110905"/>
+        <p14:creationId xmlns:p14="http://schemas.microsoft.com/office/powerpoint/2010/main" val="3414791241"/>
       </p:ext>
     </p:extLst>
   </p:cSld>
@@ -7417,6 +7075,10 @@
           </p:nvPr>
         </p:nvSpPr>
         <p:spPr>
+          <a:xfrm>
+            <a:off x="838200" y="346464"/>
+            <a:ext cx="10515600" cy="1325563"/>
+          </a:xfrm>
           <a:effectLst>
             <a:outerShdw blurRad="50800" dist="38100" dir="5400000" algn="t" rotWithShape="0">
               <a:prstClr val="black">
@@ -7455,7 +7117,7 @@
                 <a:ea typeface="+mn-ea"/>
                 <a:cs typeface="+mn-cs"/>
               </a:rPr>
-              <a:t>APPLICATION</a:t>
+              <a:t>Flask web framework</a:t>
             </a:r>
           </a:p>
         </p:txBody>
@@ -7476,12 +7138,47 @@
             <p:ph idx="1"/>
           </p:nvPr>
         </p:nvSpPr>
-        <p:spPr/>
-        <p:txBody>
-          <a:bodyPr/>
-          <a:lstStyle/>
-          <a:p>
-            <a:endParaRPr lang="en-IN"/>
+        <p:spPr>
+          <a:xfrm>
+            <a:off x="838200" y="1825625"/>
+            <a:ext cx="10515600" cy="2065240"/>
+          </a:xfrm>
+        </p:spPr>
+        <p:txBody>
+          <a:bodyPr>
+            <a:normAutofit fontScale="92500" lnSpcReduction="10000"/>
+          </a:bodyPr>
+          <a:lstStyle/>
+          <a:p>
+            <a:pPr algn="just"/>
+            <a:r>
+              <a:rPr lang="en-US" dirty="0"/>
+              <a:t>HTML – Standard Mark up Language used for creating web documents.</a:t>
+            </a:r>
+          </a:p>
+          <a:p>
+            <a:pPr algn="just"/>
+            <a:r>
+              <a:rPr lang="en-US" dirty="0"/>
+              <a:t>CSS – Describes the presentation properties of the web document written in HTML format. Includes Layouts, fonts, colors, etc.</a:t>
+            </a:r>
+          </a:p>
+          <a:p>
+            <a:pPr algn="just"/>
+            <a:r>
+              <a:rPr lang="en-US" dirty="0"/>
+              <a:t>Website builder tool partly used for easy webpage creation with better design, looks and functionality - </a:t>
+            </a:r>
+            <a:r>
+              <a:rPr lang="en-US" dirty="0" err="1">
+                <a:hlinkClick r:id="rId2"/>
+              </a:rPr>
+              <a:t>nicepages</a:t>
+            </a:r>
+            <a:r>
+              <a:rPr lang="en-US" dirty="0"/>
+              <a:t>.</a:t>
+            </a:r>
           </a:p>
         </p:txBody>
       </p:sp>
@@ -7683,367 +7380,6 @@
                 </a:solidFill>
               </a:rPr>
               <a:t>4</a:t>
-            </a:fld>
-            <a:endParaRPr lang="en-IN" sz="2000" b="1" dirty="0">
-              <a:solidFill>
-                <a:schemeClr val="bg1"/>
-              </a:solidFill>
-            </a:endParaRPr>
-          </a:p>
-        </p:txBody>
-      </p:sp>
-    </p:spTree>
-    <p:extLst>
-      <p:ext uri="{BB962C8B-B14F-4D97-AF65-F5344CB8AC3E}">
-        <p14:creationId xmlns:p14="http://schemas.microsoft.com/office/powerpoint/2010/main" val="3414791241"/>
-      </p:ext>
-    </p:extLst>
-  </p:cSld>
-  <p:clrMapOvr>
-    <a:masterClrMapping/>
-  </p:clrMapOvr>
-</p:sld>
-</file>
-
-<file path=ppt/slides/slide5.xml><?xml version="1.0" encoding="utf-8"?>
-<p:sld xmlns:a="http://schemas.openxmlformats.org/drawingml/2006/main" xmlns:r="http://schemas.openxmlformats.org/officeDocument/2006/relationships" xmlns:p="http://schemas.openxmlformats.org/presentationml/2006/main">
-  <p:cSld>
-    <p:spTree>
-      <p:nvGrpSpPr>
-        <p:cNvPr id="1" name=""/>
-        <p:cNvGrpSpPr/>
-        <p:nvPr/>
-      </p:nvGrpSpPr>
-      <p:grpSpPr>
-        <a:xfrm>
-          <a:off x="0" y="0"/>
-          <a:ext cx="0" cy="0"/>
-          <a:chOff x="0" y="0"/>
-          <a:chExt cx="0" cy="0"/>
-        </a:xfrm>
-      </p:grpSpPr>
-      <p:sp>
-        <p:nvSpPr>
-          <p:cNvPr id="2" name="Title 1">
-            <a:extLst>
-              <a:ext uri="{FF2B5EF4-FFF2-40B4-BE49-F238E27FC236}">
-                <a16:creationId xmlns:a16="http://schemas.microsoft.com/office/drawing/2014/main" id="{C0666519-3484-48F3-927E-47679DE94711}"/>
-              </a:ext>
-            </a:extLst>
-          </p:cNvPr>
-          <p:cNvSpPr>
-            <a:spLocks noGrp="1"/>
-          </p:cNvSpPr>
-          <p:nvPr>
-            <p:ph type="title"/>
-          </p:nvPr>
-        </p:nvSpPr>
-        <p:spPr>
-          <a:xfrm>
-            <a:off x="838200" y="346464"/>
-            <a:ext cx="10515600" cy="1325563"/>
-          </a:xfrm>
-          <a:effectLst>
-            <a:outerShdw blurRad="50800" dist="38100" dir="5400000" algn="t" rotWithShape="0">
-              <a:prstClr val="black">
-                <a:alpha val="40000"/>
-              </a:prstClr>
-            </a:outerShdw>
-          </a:effectLst>
-        </p:spPr>
-        <p:style>
-          <a:lnRef idx="3">
-            <a:schemeClr val="lt1"/>
-          </a:lnRef>
-          <a:fillRef idx="1">
-            <a:schemeClr val="accent5"/>
-          </a:fillRef>
-          <a:effectRef idx="1">
-            <a:schemeClr val="accent5"/>
-          </a:effectRef>
-          <a:fontRef idx="minor">
-            <a:schemeClr val="lt1"/>
-          </a:fontRef>
-        </p:style>
-        <p:txBody>
-          <a:bodyPr vert="horz" lIns="91440" tIns="45720" rIns="91440" bIns="45720" rtlCol="0" anchor="ctr">
-            <a:normAutofit/>
-          </a:bodyPr>
-          <a:lstStyle/>
-          <a:p>
-            <a:pPr algn="ctr"/>
-            <a:r>
-              <a:rPr lang="en-IN" b="1" dirty="0">
-                <a:solidFill>
-                  <a:schemeClr val="lt1"/>
-                </a:solidFill>
-                <a:latin typeface="+mn-lt"/>
-                <a:ea typeface="+mn-ea"/>
-                <a:cs typeface="+mn-cs"/>
-              </a:rPr>
-              <a:t>Flask web framework</a:t>
-            </a:r>
-          </a:p>
-        </p:txBody>
-      </p:sp>
-      <p:sp>
-        <p:nvSpPr>
-          <p:cNvPr id="3" name="Content Placeholder 2">
-            <a:extLst>
-              <a:ext uri="{FF2B5EF4-FFF2-40B4-BE49-F238E27FC236}">
-                <a16:creationId xmlns:a16="http://schemas.microsoft.com/office/drawing/2014/main" id="{D3F11377-6BB3-4E47-B174-861CD150A86B}"/>
-              </a:ext>
-            </a:extLst>
-          </p:cNvPr>
-          <p:cNvSpPr>
-            <a:spLocks noGrp="1"/>
-          </p:cNvSpPr>
-          <p:nvPr>
-            <p:ph idx="1"/>
-          </p:nvPr>
-        </p:nvSpPr>
-        <p:spPr>
-          <a:xfrm>
-            <a:off x="838200" y="1825625"/>
-            <a:ext cx="10515600" cy="2065240"/>
-          </a:xfrm>
-        </p:spPr>
-        <p:txBody>
-          <a:bodyPr>
-            <a:normAutofit fontScale="92500" lnSpcReduction="10000"/>
-          </a:bodyPr>
-          <a:lstStyle/>
-          <a:p>
-            <a:pPr algn="just"/>
-            <a:r>
-              <a:rPr lang="en-US" dirty="0"/>
-              <a:t>HTML – Standard Mark up Language used for creating web documents.</a:t>
-            </a:r>
-          </a:p>
-          <a:p>
-            <a:pPr algn="just"/>
-            <a:r>
-              <a:rPr lang="en-US" dirty="0"/>
-              <a:t>CSS – Describes the presentation properties of the web document written in HTML format. Includes Layouts, fonts, colors, etc.</a:t>
-            </a:r>
-          </a:p>
-          <a:p>
-            <a:pPr algn="just"/>
-            <a:r>
-              <a:rPr lang="en-US" dirty="0"/>
-              <a:t>Website builder tool partly used for easy webpage creation with better design, looks and functionality - </a:t>
-            </a:r>
-            <a:r>
-              <a:rPr lang="en-US" dirty="0" err="1">
-                <a:hlinkClick r:id="rId2"/>
-              </a:rPr>
-              <a:t>nicepages</a:t>
-            </a:r>
-            <a:r>
-              <a:rPr lang="en-US" dirty="0"/>
-              <a:t>.</a:t>
-            </a:r>
-          </a:p>
-        </p:txBody>
-      </p:sp>
-      <p:sp>
-        <p:nvSpPr>
-          <p:cNvPr id="4" name="Rectangle 3">
-            <a:extLst>
-              <a:ext uri="{FF2B5EF4-FFF2-40B4-BE49-F238E27FC236}">
-                <a16:creationId xmlns:a16="http://schemas.microsoft.com/office/drawing/2014/main" id="{8D973F9E-231E-4F4E-BF92-D9C84C7AB5A7}"/>
-              </a:ext>
-            </a:extLst>
-          </p:cNvPr>
-          <p:cNvSpPr/>
-          <p:nvPr/>
-        </p:nvSpPr>
-        <p:spPr>
-          <a:xfrm>
-            <a:off x="0" y="6067425"/>
-            <a:ext cx="9305925" cy="790575"/>
-          </a:xfrm>
-          <a:prstGeom prst="rect">
-            <a:avLst/>
-          </a:prstGeom>
-          <a:scene3d>
-            <a:camera prst="orthographicFront"/>
-            <a:lightRig rig="threePt" dir="t"/>
-          </a:scene3d>
-          <a:sp3d>
-            <a:bevelT w="114300" prst="hardEdge"/>
-          </a:sp3d>
-        </p:spPr>
-        <p:style>
-          <a:lnRef idx="2">
-            <a:schemeClr val="accent1">
-              <a:shade val="50000"/>
-            </a:schemeClr>
-          </a:lnRef>
-          <a:fillRef idx="1">
-            <a:schemeClr val="accent1"/>
-          </a:fillRef>
-          <a:effectRef idx="0">
-            <a:schemeClr val="accent1"/>
-          </a:effectRef>
-          <a:fontRef idx="minor">
-            <a:schemeClr val="lt1"/>
-          </a:fontRef>
-        </p:style>
-        <p:txBody>
-          <a:bodyPr rtlCol="0" anchor="ctr"/>
-          <a:lstStyle/>
-          <a:p>
-            <a:pPr algn="ctr"/>
-            <a:r>
-              <a:rPr lang="en-IN" sz="2000" b="1" dirty="0"/>
-              <a:t>WEDNESDAY’S WICKED ADVENTURES</a:t>
-            </a:r>
-          </a:p>
-        </p:txBody>
-      </p:sp>
-      <p:sp>
-        <p:nvSpPr>
-          <p:cNvPr id="5" name="Rectangle 4">
-            <a:extLst>
-              <a:ext uri="{FF2B5EF4-FFF2-40B4-BE49-F238E27FC236}">
-                <a16:creationId xmlns:a16="http://schemas.microsoft.com/office/drawing/2014/main" id="{ADD2B0B5-489C-4527-87A1-6AE32256E8B1}"/>
-              </a:ext>
-            </a:extLst>
-          </p:cNvPr>
-          <p:cNvSpPr/>
-          <p:nvPr/>
-        </p:nvSpPr>
-        <p:spPr>
-          <a:xfrm>
-            <a:off x="11363325" y="6067425"/>
-            <a:ext cx="828675" cy="790575"/>
-          </a:xfrm>
-          <a:prstGeom prst="rect">
-            <a:avLst/>
-          </a:prstGeom>
-          <a:scene3d>
-            <a:camera prst="orthographicFront"/>
-            <a:lightRig rig="threePt" dir="t"/>
-          </a:scene3d>
-          <a:sp3d>
-            <a:bevelT w="114300" prst="hardEdge"/>
-          </a:sp3d>
-        </p:spPr>
-        <p:style>
-          <a:lnRef idx="2">
-            <a:schemeClr val="accent1">
-              <a:shade val="50000"/>
-            </a:schemeClr>
-          </a:lnRef>
-          <a:fillRef idx="1">
-            <a:schemeClr val="accent1"/>
-          </a:fillRef>
-          <a:effectRef idx="0">
-            <a:schemeClr val="accent1"/>
-          </a:effectRef>
-          <a:fontRef idx="minor">
-            <a:schemeClr val="lt1"/>
-          </a:fontRef>
-        </p:style>
-        <p:txBody>
-          <a:bodyPr rtlCol="0" anchor="ctr"/>
-          <a:lstStyle/>
-          <a:p>
-            <a:pPr algn="ctr"/>
-            <a:endParaRPr lang="en-IN"/>
-          </a:p>
-        </p:txBody>
-      </p:sp>
-      <p:sp>
-        <p:nvSpPr>
-          <p:cNvPr id="6" name="Rectangle 5">
-            <a:extLst>
-              <a:ext uri="{FF2B5EF4-FFF2-40B4-BE49-F238E27FC236}">
-                <a16:creationId xmlns:a16="http://schemas.microsoft.com/office/drawing/2014/main" id="{8F298F8F-A536-48DC-9BA2-D0C59AC19A33}"/>
-              </a:ext>
-            </a:extLst>
-          </p:cNvPr>
-          <p:cNvSpPr/>
-          <p:nvPr/>
-        </p:nvSpPr>
-        <p:spPr>
-          <a:xfrm>
-            <a:off x="9305925" y="6067424"/>
-            <a:ext cx="2057400" cy="790575"/>
-          </a:xfrm>
-          <a:prstGeom prst="rect">
-            <a:avLst/>
-          </a:prstGeom>
-          <a:scene3d>
-            <a:camera prst="orthographicFront"/>
-            <a:lightRig rig="threePt" dir="t"/>
-          </a:scene3d>
-          <a:sp3d>
-            <a:bevelT w="114300" prst="hardEdge"/>
-          </a:sp3d>
-        </p:spPr>
-        <p:style>
-          <a:lnRef idx="2">
-            <a:schemeClr val="accent1">
-              <a:shade val="50000"/>
-            </a:schemeClr>
-          </a:lnRef>
-          <a:fillRef idx="1">
-            <a:schemeClr val="accent1"/>
-          </a:fillRef>
-          <a:effectRef idx="0">
-            <a:schemeClr val="accent1"/>
-          </a:effectRef>
-          <a:fontRef idx="minor">
-            <a:schemeClr val="lt1"/>
-          </a:fontRef>
-        </p:style>
-        <p:txBody>
-          <a:bodyPr rtlCol="0" anchor="ctr"/>
-          <a:lstStyle/>
-          <a:p>
-            <a:pPr algn="ctr"/>
-            <a:r>
-              <a:rPr lang="en-IN" sz="2000" b="1" dirty="0"/>
-              <a:t>APRIL 2022</a:t>
-            </a:r>
-          </a:p>
-        </p:txBody>
-      </p:sp>
-      <p:sp>
-        <p:nvSpPr>
-          <p:cNvPr id="8" name="Slide Number Placeholder 11">
-            <a:extLst>
-              <a:ext uri="{FF2B5EF4-FFF2-40B4-BE49-F238E27FC236}">
-                <a16:creationId xmlns:a16="http://schemas.microsoft.com/office/drawing/2014/main" id="{66E5E76B-63DE-49C5-B59F-65367A92139F}"/>
-              </a:ext>
-            </a:extLst>
-          </p:cNvPr>
-          <p:cNvSpPr>
-            <a:spLocks noGrp="1"/>
-          </p:cNvSpPr>
-          <p:nvPr>
-            <p:ph type="sldNum" sz="quarter" idx="12"/>
-          </p:nvPr>
-        </p:nvSpPr>
-        <p:spPr>
-          <a:xfrm>
-            <a:off x="11563349" y="6280148"/>
-            <a:ext cx="428625" cy="365125"/>
-          </a:xfrm>
-        </p:spPr>
-        <p:txBody>
-          <a:bodyPr/>
-          <a:lstStyle/>
-          <a:p>
-            <a:fld id="{F37EE007-93F6-4DD3-A485-65881C8FA8D0}" type="slidenum">
-              <a:rPr lang="en-IN" sz="2000" b="1" smtClean="0">
-                <a:solidFill>
-                  <a:schemeClr val="bg1"/>
-                </a:solidFill>
-              </a:rPr>
-              <a:t>5</a:t>
             </a:fld>
             <a:endParaRPr lang="en-IN" sz="2000" b="1" dirty="0">
               <a:solidFill>
@@ -8315,7 +7651,7 @@
 </p:sld>
 </file>
 
-<file path=ppt/slides/slide6.xml><?xml version="1.0" encoding="utf-8"?>
+<file path=ppt/slides/slide5.xml><?xml version="1.0" encoding="utf-8"?>
 <p:sld xmlns:a="http://schemas.openxmlformats.org/drawingml/2006/main" xmlns:r="http://schemas.openxmlformats.org/officeDocument/2006/relationships" xmlns:p="http://schemas.openxmlformats.org/presentationml/2006/main">
   <p:cSld>
     <p:spTree>
@@ -8649,7 +7985,7 @@
                   <a:schemeClr val="bg1"/>
                 </a:solidFill>
               </a:rPr>
-              <a:t>6</a:t>
+              <a:t>5</a:t>
             </a:fld>
             <a:endParaRPr lang="en-IN" sz="2000" b="1" dirty="0">
               <a:solidFill>
@@ -8943,7 +8279,7 @@
 </p:sld>
 </file>
 
-<file path=ppt/slides/slide7.xml><?xml version="1.0" encoding="utf-8"?>
+<file path=ppt/slides/slide6.xml><?xml version="1.0" encoding="utf-8"?>
 <p:sld xmlns:a="http://schemas.openxmlformats.org/drawingml/2006/main" xmlns:r="http://schemas.openxmlformats.org/officeDocument/2006/relationships" xmlns:p="http://schemas.openxmlformats.org/presentationml/2006/main">
   <p:cSld>
     <p:spTree>
@@ -9270,7 +8606,7 @@
                   <a:schemeClr val="bg1"/>
                 </a:solidFill>
               </a:rPr>
-              <a:t>7</a:t>
+              <a:t>6</a:t>
             </a:fld>
             <a:endParaRPr lang="en-IN" sz="2000" b="1" dirty="0">
               <a:solidFill>
@@ -9544,7 +8880,7 @@
 </p:sld>
 </file>
 
-<file path=ppt/slides/slide8.xml><?xml version="1.0" encoding="utf-8"?>
+<file path=ppt/slides/slide7.xml><?xml version="1.0" encoding="utf-8"?>
 <p:sld xmlns:a="http://schemas.openxmlformats.org/drawingml/2006/main" xmlns:r="http://schemas.openxmlformats.org/officeDocument/2006/relationships" xmlns:p="http://schemas.openxmlformats.org/presentationml/2006/main">
   <p:cSld>
     <p:spTree>
@@ -9898,7 +9234,7 @@
                   <a:schemeClr val="bg1"/>
                 </a:solidFill>
               </a:rPr>
-              <a:t>8</a:t>
+              <a:t>7</a:t>
             </a:fld>
             <a:endParaRPr lang="en-IN" sz="2000" b="1" dirty="0">
               <a:solidFill>
@@ -9936,7 +9272,7 @@
           <a:graphicData uri="http://schemas.openxmlformats.org/presentationml/2006/ole">
             <mc:AlternateContent xmlns:mc="http://schemas.openxmlformats.org/markup-compatibility/2006">
               <mc:Choice xmlns:v="urn:schemas-microsoft-com:vml" Requires="v">
-                <p:oleObj spid="_x0000_s1079" name="Bitmap Image" r:id="rId4" imgW="4267080" imgH="4389120" progId="Paint.Picture">
+                <p:oleObj spid="_x0000_s1082" name="Bitmap Image" r:id="rId4" imgW="4267080" imgH="4389120" progId="Paint.Picture">
                   <p:embed/>
                 </p:oleObj>
               </mc:Choice>
@@ -9989,7 +9325,7 @@
 </p:sld>
 </file>
 
-<file path=ppt/slides/slide9.xml><?xml version="1.0" encoding="utf-8"?>
+<file path=ppt/slides/slide8.xml><?xml version="1.0" encoding="utf-8"?>
 <p:sld xmlns:a="http://schemas.openxmlformats.org/drawingml/2006/main" xmlns:r="http://schemas.openxmlformats.org/officeDocument/2006/relationships" xmlns:p="http://schemas.openxmlformats.org/presentationml/2006/main">
   <p:cSld>
     <p:spTree>
@@ -10362,7 +9698,7 @@
                   <a:schemeClr val="bg1"/>
                 </a:solidFill>
               </a:rPr>
-              <a:t>9</a:t>
+              <a:t>8</a:t>
             </a:fld>
             <a:endParaRPr lang="en-IN" sz="2000" b="1" dirty="0">
               <a:solidFill>
@@ -10400,7 +9736,7 @@
           <a:graphicData uri="http://schemas.openxmlformats.org/presentationml/2006/ole">
             <mc:AlternateContent xmlns:mc="http://schemas.openxmlformats.org/markup-compatibility/2006">
               <mc:Choice xmlns:v="urn:schemas-microsoft-com:vml" Requires="v">
-                <p:oleObj spid="_x0000_s2076" name="Bitmap Image" r:id="rId3" imgW="2209680" imgH="3916800" progId="Paint.Picture">
+                <p:oleObj spid="_x0000_s2079" name="Bitmap Image" r:id="rId3" imgW="2209680" imgH="3916800" progId="Paint.Picture">
                   <p:embed/>
                 </p:oleObj>
               </mc:Choice>
@@ -10444,6 +9780,397 @@
     <p:extLst>
       <p:ext uri="{BB962C8B-B14F-4D97-AF65-F5344CB8AC3E}">
         <p14:creationId xmlns:p14="http://schemas.microsoft.com/office/powerpoint/2010/main" val="3945409788"/>
+      </p:ext>
+    </p:extLst>
+  </p:cSld>
+  <p:clrMapOvr>
+    <a:masterClrMapping/>
+  </p:clrMapOvr>
+</p:sld>
+</file>
+
+<file path=ppt/slides/slide9.xml><?xml version="1.0" encoding="utf-8"?>
+<p:sld xmlns:a="http://schemas.openxmlformats.org/drawingml/2006/main" xmlns:r="http://schemas.openxmlformats.org/officeDocument/2006/relationships" xmlns:p="http://schemas.openxmlformats.org/presentationml/2006/main">
+  <p:cSld>
+    <p:spTree>
+      <p:nvGrpSpPr>
+        <p:cNvPr id="1" name=""/>
+        <p:cNvGrpSpPr/>
+        <p:nvPr/>
+      </p:nvGrpSpPr>
+      <p:grpSpPr>
+        <a:xfrm>
+          <a:off x="0" y="0"/>
+          <a:ext cx="0" cy="0"/>
+          <a:chOff x="0" y="0"/>
+          <a:chExt cx="0" cy="0"/>
+        </a:xfrm>
+      </p:grpSpPr>
+      <p:sp>
+        <p:nvSpPr>
+          <p:cNvPr id="2" name="Title 1">
+            <a:extLst>
+              <a:ext uri="{FF2B5EF4-FFF2-40B4-BE49-F238E27FC236}">
+                <a16:creationId xmlns:a16="http://schemas.microsoft.com/office/drawing/2014/main" id="{FED447EA-CAB5-4B9D-8BA6-B4AFD140C0A9}"/>
+              </a:ext>
+            </a:extLst>
+          </p:cNvPr>
+          <p:cNvSpPr>
+            <a:spLocks noGrp="1"/>
+          </p:cNvSpPr>
+          <p:nvPr>
+            <p:ph type="title"/>
+          </p:nvPr>
+        </p:nvSpPr>
+        <p:spPr/>
+        <p:txBody>
+          <a:bodyPr/>
+          <a:lstStyle/>
+          <a:p>
+            <a:r>
+              <a:rPr lang="en-IN" b="1" dirty="0" err="1">
+                <a:solidFill>
+                  <a:schemeClr val="lt1"/>
+                </a:solidFill>
+                <a:latin typeface="+mn-lt"/>
+                <a:ea typeface="+mn-ea"/>
+                <a:cs typeface="+mn-cs"/>
+              </a:rPr>
+              <a:t>ytest</a:t>
+            </a:r>
+            <a:r>
+              <a:rPr lang="en-IN" b="1" dirty="0">
+                <a:solidFill>
+                  <a:schemeClr val="lt1"/>
+                </a:solidFill>
+                <a:latin typeface="+mn-lt"/>
+                <a:ea typeface="+mn-ea"/>
+                <a:cs typeface="+mn-cs"/>
+              </a:rPr>
+              <a:t> for unit </a:t>
+            </a:r>
+            <a:r>
+              <a:rPr lang="en-IN" b="1" dirty="0" err="1">
+                <a:solidFill>
+                  <a:schemeClr val="lt1"/>
+                </a:solidFill>
+                <a:latin typeface="+mn-lt"/>
+                <a:ea typeface="+mn-ea"/>
+                <a:cs typeface="+mn-cs"/>
+              </a:rPr>
+              <a:t>testingest</a:t>
+            </a:r>
+            <a:r>
+              <a:rPr lang="en-IN" b="1" dirty="0">
+                <a:solidFill>
+                  <a:schemeClr val="lt1"/>
+                </a:solidFill>
+                <a:latin typeface="+mn-lt"/>
+                <a:ea typeface="+mn-ea"/>
+                <a:cs typeface="+mn-cs"/>
+              </a:rPr>
+              <a:t> for unit </a:t>
+            </a:r>
+            <a:r>
+              <a:rPr lang="en-IN" b="1" dirty="0" err="1">
+                <a:solidFill>
+                  <a:schemeClr val="lt1"/>
+                </a:solidFill>
+                <a:latin typeface="+mn-lt"/>
+                <a:ea typeface="+mn-ea"/>
+                <a:cs typeface="+mn-cs"/>
+              </a:rPr>
+              <a:t>testingor</a:t>
+            </a:r>
+            <a:r>
+              <a:rPr lang="en-IN" b="1" dirty="0">
+                <a:solidFill>
+                  <a:schemeClr val="lt1"/>
+                </a:solidFill>
+                <a:latin typeface="+mn-lt"/>
+                <a:ea typeface="+mn-ea"/>
+                <a:cs typeface="+mn-cs"/>
+              </a:rPr>
+              <a:t> unit testing</a:t>
+            </a:r>
+            <a:endParaRPr lang="en-IE" dirty="0"/>
+          </a:p>
+        </p:txBody>
+      </p:sp>
+      <p:sp>
+        <p:nvSpPr>
+          <p:cNvPr id="3" name="Content Placeholder 2">
+            <a:extLst>
+              <a:ext uri="{FF2B5EF4-FFF2-40B4-BE49-F238E27FC236}">
+                <a16:creationId xmlns:a16="http://schemas.microsoft.com/office/drawing/2014/main" id="{B8C2C50D-E651-47FD-8B7C-D05DDE3A937A}"/>
+              </a:ext>
+            </a:extLst>
+          </p:cNvPr>
+          <p:cNvSpPr>
+            <a:spLocks noGrp="1"/>
+          </p:cNvSpPr>
+          <p:nvPr>
+            <p:ph idx="1"/>
+          </p:nvPr>
+        </p:nvSpPr>
+        <p:spPr/>
+        <p:txBody>
+          <a:bodyPr/>
+          <a:lstStyle/>
+          <a:p>
+            <a:r>
+              <a:rPr lang="en-US" dirty="0"/>
+              <a:t>PyTest is a testing framework that allows users to write test scripts in Python.</a:t>
+            </a:r>
+          </a:p>
+          <a:p>
+            <a:r>
+              <a:rPr lang="en-US" dirty="0"/>
+              <a:t>It helps with the development of tests ranging from </a:t>
+            </a:r>
+            <a:br>
+              <a:rPr lang="en-US" dirty="0"/>
+            </a:br>
+            <a:r>
+              <a:rPr lang="en-US" dirty="0"/>
+              <a:t>simple unit tests to large functional tests.</a:t>
+            </a:r>
+          </a:p>
+          <a:p>
+            <a:r>
+              <a:rPr lang="en-IE" dirty="0"/>
+              <a:t>Pytest is very easy, open source and run the test in parallel manner.</a:t>
+            </a:r>
+          </a:p>
+          <a:p>
+            <a:r>
+              <a:rPr lang="en-IE" dirty="0"/>
+              <a:t>Unit testing has been performed using PyTest.</a:t>
+            </a:r>
+          </a:p>
+          <a:p>
+            <a:r>
+              <a:rPr lang="en-IE" dirty="0"/>
+              <a:t>Integration of PyTest in GitHub action using python application.</a:t>
+            </a:r>
+          </a:p>
+          <a:p>
+            <a:r>
+              <a:rPr lang="en-IN" dirty="0">
+                <a:solidFill>
+                  <a:srgbClr val="24292F"/>
+                </a:solidFill>
+                <a:latin typeface="-apple-system"/>
+              </a:rPr>
+              <a:t>Details provided in the Git Wiki link in our repository. Click </a:t>
+            </a:r>
+            <a:r>
+              <a:rPr lang="en-IN">
+                <a:solidFill>
+                  <a:srgbClr val="24292F"/>
+                </a:solidFill>
+                <a:latin typeface="-apple-system"/>
+                <a:hlinkClick r:id="rId2"/>
+              </a:rPr>
+              <a:t>here</a:t>
+            </a:r>
+            <a:r>
+              <a:rPr lang="en-IN">
+                <a:solidFill>
+                  <a:srgbClr val="24292F"/>
+                </a:solidFill>
+                <a:latin typeface="-apple-system"/>
+              </a:rPr>
+              <a:t>.-</a:t>
+            </a:r>
+            <a:endParaRPr lang="en-IN" dirty="0">
+              <a:solidFill>
+                <a:srgbClr val="24292F"/>
+              </a:solidFill>
+              <a:latin typeface="-apple-system"/>
+            </a:endParaRPr>
+          </a:p>
+          <a:p>
+            <a:pPr algn="just"/>
+            <a:endParaRPr lang="en-US" dirty="0"/>
+          </a:p>
+          <a:p>
+            <a:endParaRPr lang="en-IE" dirty="0"/>
+          </a:p>
+        </p:txBody>
+      </p:sp>
+      <p:sp>
+        <p:nvSpPr>
+          <p:cNvPr id="4" name="Title 1">
+            <a:extLst>
+              <a:ext uri="{FF2B5EF4-FFF2-40B4-BE49-F238E27FC236}">
+                <a16:creationId xmlns:a16="http://schemas.microsoft.com/office/drawing/2014/main" id="{FCE4FA1B-AECD-41C7-9705-D28E86BF5E04}"/>
+              </a:ext>
+            </a:extLst>
+          </p:cNvPr>
+          <p:cNvSpPr txBox="1">
+            <a:spLocks/>
+          </p:cNvSpPr>
+          <p:nvPr/>
+        </p:nvSpPr>
+        <p:spPr>
+          <a:xfrm>
+            <a:off x="838200" y="467925"/>
+            <a:ext cx="10515600" cy="1119961"/>
+          </a:xfrm>
+          <a:prstGeom prst="rect">
+            <a:avLst/>
+          </a:prstGeom>
+          <a:effectLst>
+            <a:outerShdw blurRad="50800" dist="38100" dir="5400000" algn="t" rotWithShape="0">
+              <a:prstClr val="black">
+                <a:alpha val="40000"/>
+              </a:prstClr>
+            </a:outerShdw>
+          </a:effectLst>
+        </p:spPr>
+        <p:style>
+          <a:lnRef idx="3">
+            <a:schemeClr val="lt1"/>
+          </a:lnRef>
+          <a:fillRef idx="1">
+            <a:schemeClr val="accent5"/>
+          </a:fillRef>
+          <a:effectRef idx="1">
+            <a:schemeClr val="accent5"/>
+          </a:effectRef>
+          <a:fontRef idx="minor">
+            <a:schemeClr val="lt1"/>
+          </a:fontRef>
+        </p:style>
+        <p:txBody>
+          <a:bodyPr vert="horz" lIns="91440" tIns="45720" rIns="91440" bIns="45720" rtlCol="0" anchor="ctr">
+            <a:normAutofit/>
+          </a:bodyPr>
+          <a:lstStyle>
+            <a:lvl1pPr algn="l" defTabSz="914400" rtl="0" eaLnBrk="1" latinLnBrk="0" hangingPunct="1">
+              <a:lnSpc>
+                <a:spcPct val="90000"/>
+              </a:lnSpc>
+              <a:spcBef>
+                <a:spcPct val="0"/>
+              </a:spcBef>
+              <a:buNone/>
+              <a:defRPr sz="4400" kern="1200">
+                <a:solidFill>
+                  <a:schemeClr val="lt1"/>
+                </a:solidFill>
+                <a:latin typeface="+mn-lt"/>
+                <a:ea typeface="+mn-ea"/>
+                <a:cs typeface="+mn-cs"/>
+              </a:defRPr>
+            </a:lvl1pPr>
+            <a:lvl2pPr>
+              <a:defRPr>
+                <a:solidFill>
+                  <a:schemeClr val="lt1"/>
+                </a:solidFill>
+                <a:latin typeface="+mn-lt"/>
+                <a:ea typeface="+mn-ea"/>
+                <a:cs typeface="+mn-cs"/>
+              </a:defRPr>
+            </a:lvl2pPr>
+            <a:lvl3pPr>
+              <a:defRPr>
+                <a:solidFill>
+                  <a:schemeClr val="lt1"/>
+                </a:solidFill>
+                <a:latin typeface="+mn-lt"/>
+                <a:ea typeface="+mn-ea"/>
+                <a:cs typeface="+mn-cs"/>
+              </a:defRPr>
+            </a:lvl3pPr>
+            <a:lvl4pPr>
+              <a:defRPr>
+                <a:solidFill>
+                  <a:schemeClr val="lt1"/>
+                </a:solidFill>
+                <a:latin typeface="+mn-lt"/>
+                <a:ea typeface="+mn-ea"/>
+                <a:cs typeface="+mn-cs"/>
+              </a:defRPr>
+            </a:lvl4pPr>
+            <a:lvl5pPr>
+              <a:defRPr>
+                <a:solidFill>
+                  <a:schemeClr val="lt1"/>
+                </a:solidFill>
+                <a:latin typeface="+mn-lt"/>
+                <a:ea typeface="+mn-ea"/>
+                <a:cs typeface="+mn-cs"/>
+              </a:defRPr>
+            </a:lvl5pPr>
+            <a:lvl6pPr>
+              <a:defRPr>
+                <a:solidFill>
+                  <a:schemeClr val="lt1"/>
+                </a:solidFill>
+                <a:latin typeface="+mn-lt"/>
+                <a:ea typeface="+mn-ea"/>
+                <a:cs typeface="+mn-cs"/>
+              </a:defRPr>
+            </a:lvl6pPr>
+            <a:lvl7pPr>
+              <a:defRPr>
+                <a:solidFill>
+                  <a:schemeClr val="lt1"/>
+                </a:solidFill>
+                <a:latin typeface="+mn-lt"/>
+                <a:ea typeface="+mn-ea"/>
+                <a:cs typeface="+mn-cs"/>
+              </a:defRPr>
+            </a:lvl7pPr>
+            <a:lvl8pPr>
+              <a:defRPr>
+                <a:solidFill>
+                  <a:schemeClr val="lt1"/>
+                </a:solidFill>
+                <a:latin typeface="+mn-lt"/>
+                <a:ea typeface="+mn-ea"/>
+                <a:cs typeface="+mn-cs"/>
+              </a:defRPr>
+            </a:lvl8pPr>
+            <a:lvl9pPr>
+              <a:defRPr>
+                <a:solidFill>
+                  <a:schemeClr val="lt1"/>
+                </a:solidFill>
+                <a:latin typeface="+mn-lt"/>
+                <a:ea typeface="+mn-ea"/>
+                <a:cs typeface="+mn-cs"/>
+              </a:defRPr>
+            </a:lvl9pPr>
+          </a:lstStyle>
+          <a:p>
+            <a:pPr algn="ctr"/>
+            <a:r>
+              <a:rPr lang="en-IN" b="1" dirty="0"/>
+              <a:t>2</a:t>
+            </a:r>
+            <a:r>
+              <a:rPr lang="en-IN" b="1" dirty="0">
+                <a:solidFill>
+                  <a:schemeClr val="lt1"/>
+                </a:solidFill>
+                <a:latin typeface="+mn-lt"/>
+                <a:ea typeface="+mn-ea"/>
+                <a:cs typeface="+mn-cs"/>
+              </a:rPr>
+              <a:t>. Pytest for unit testing</a:t>
+            </a:r>
+            <a:endParaRPr lang="en-IN" b="1" dirty="0"/>
+          </a:p>
+        </p:txBody>
+      </p:sp>
+    </p:spTree>
+    <p:extLst>
+      <p:ext uri="{BB962C8B-B14F-4D97-AF65-F5344CB8AC3E}">
+        <p14:creationId xmlns:p14="http://schemas.microsoft.com/office/powerpoint/2010/main" val="1818624087"/>
       </p:ext>
     </p:extLst>
   </p:cSld>

</xml_diff>

<commit_message>
Updated presentation with Introduction page
</commit_message>
<xml_diff>
--- a/Wicked Adventures.pptx
+++ b/Wicked Adventures.pptx
@@ -4518,7 +4518,7 @@
             <a:pPr algn="ctr"/>
             <a:r>
               <a:rPr lang="en-IN" b="1" dirty="0"/>
-              <a:t>5. Sphinx Tool for Auto Documentation</a:t>
+              <a:t>5. SPHINX TOOL - AUTO DOCUMENTATION</a:t>
             </a:r>
           </a:p>
         </p:txBody>
@@ -4579,25 +4579,7 @@
                 </a:solidFill>
                 <a:latin typeface="-apple-system"/>
               </a:rPr>
-              <a:t>Implementation of Sphinx tool by creating YAML </a:t>
-            </a:r>
-            <a:r>
-              <a:rPr lang="en-IN">
-                <a:solidFill>
-                  <a:srgbClr val="24292F"/>
-                </a:solidFill>
-                <a:latin typeface="-apple-system"/>
-              </a:rPr>
-              <a:t>file using </a:t>
-            </a:r>
-            <a:r>
-              <a:rPr lang="en-IN" dirty="0">
-                <a:solidFill>
-                  <a:srgbClr val="24292F"/>
-                </a:solidFill>
-                <a:latin typeface="-apple-system"/>
-              </a:rPr>
-              <a:t>“GitHub Actions”.</a:t>
+              <a:t>Implementation of Sphinx tool by creating YAML file using “GitHub Actions”.</a:t>
             </a:r>
           </a:p>
           <a:p>
@@ -5022,7 +5004,7 @@
                 <a:ea typeface="+mn-ea"/>
                 <a:cs typeface="+mn-cs"/>
               </a:rPr>
-              <a:t>Git Wiki for User guides and Instructions</a:t>
+              <a:t>GIT WIKI - USER GUIDES &amp; INSTRUCTIONS</a:t>
             </a:r>
           </a:p>
         </p:txBody>
@@ -5299,7 +5281,7 @@
           <a:graphicData uri="http://schemas.openxmlformats.org/presentationml/2006/ole">
             <mc:AlternateContent xmlns:mc="http://schemas.openxmlformats.org/markup-compatibility/2006">
               <mc:Choice xmlns:v="urn:schemas-microsoft-com:vml" Requires="v">
-                <p:oleObj spid="_x0000_s3094" name="Bitmap Image" r:id="rId3" imgW="5753160" imgH="1973520" progId="Paint.Picture">
+                <p:oleObj spid="_x0000_s3117" name="Bitmap Image" r:id="rId3" imgW="5753160" imgH="1973520" progId="Paint.Picture">
                   <p:embed/>
                 </p:oleObj>
               </mc:Choice>
@@ -6462,40 +6444,47 @@
             <p:ph type="title"/>
           </p:nvPr>
         </p:nvSpPr>
-        <p:spPr/>
-        <p:txBody>
-          <a:bodyPr/>
-          <a:lstStyle/>
-          <a:p>
-            <a:r>
-              <a:rPr lang="en-IN" b="1" dirty="0"/>
-              <a:t>2. INTRODUCTION</a:t>
-            </a:r>
-          </a:p>
-        </p:txBody>
-      </p:sp>
-      <p:sp>
-        <p:nvSpPr>
-          <p:cNvPr id="3" name="Content Placeholder 2">
-            <a:extLst>
-              <a:ext uri="{FF2B5EF4-FFF2-40B4-BE49-F238E27FC236}">
-                <a16:creationId xmlns:a16="http://schemas.microsoft.com/office/drawing/2014/main" id="{D3F11377-6BB3-4E47-B174-861CD150A86B}"/>
-              </a:ext>
-            </a:extLst>
-          </p:cNvPr>
-          <p:cNvSpPr>
-            <a:spLocks noGrp="1"/>
-          </p:cNvSpPr>
-          <p:nvPr>
-            <p:ph idx="1"/>
-          </p:nvPr>
-        </p:nvSpPr>
-        <p:spPr/>
-        <p:txBody>
-          <a:bodyPr/>
-          <a:lstStyle/>
-          <a:p>
-            <a:endParaRPr lang="en-IN" dirty="0"/>
+        <p:spPr>
+          <a:effectLst>
+            <a:outerShdw blurRad="50800" dist="38100" dir="5400000" algn="t" rotWithShape="0">
+              <a:prstClr val="black">
+                <a:alpha val="40000"/>
+              </a:prstClr>
+            </a:outerShdw>
+          </a:effectLst>
+        </p:spPr>
+        <p:style>
+          <a:lnRef idx="3">
+            <a:schemeClr val="lt1"/>
+          </a:lnRef>
+          <a:fillRef idx="1">
+            <a:schemeClr val="accent5"/>
+          </a:fillRef>
+          <a:effectRef idx="1">
+            <a:schemeClr val="accent5"/>
+          </a:effectRef>
+          <a:fontRef idx="minor">
+            <a:schemeClr val="lt1"/>
+          </a:fontRef>
+        </p:style>
+        <p:txBody>
+          <a:bodyPr vert="horz" lIns="91440" tIns="45720" rIns="91440" bIns="45720" rtlCol="0" anchor="ctr">
+            <a:normAutofit/>
+          </a:bodyPr>
+          <a:lstStyle/>
+          <a:p>
+            <a:pPr algn="ctr"/>
+            <a:r>
+              <a:rPr lang="en-IN" b="1" dirty="0">
+                <a:solidFill>
+                  <a:schemeClr val="lt1"/>
+                </a:solidFill>
+                <a:latin typeface="+mn-lt"/>
+                <a:ea typeface="+mn-ea"/>
+                <a:cs typeface="+mn-cs"/>
+              </a:rPr>
+              <a:t>INTRODUCTION</a:t>
+            </a:r>
           </a:p>
         </p:txBody>
       </p:sp>
@@ -6703,6 +6692,287 @@
                 <a:schemeClr val="bg1"/>
               </a:solidFill>
             </a:endParaRPr>
+          </a:p>
+        </p:txBody>
+      </p:sp>
+      <p:pic>
+        <p:nvPicPr>
+          <p:cNvPr id="11" name="Picture 10">
+            <a:extLst>
+              <a:ext uri="{FF2B5EF4-FFF2-40B4-BE49-F238E27FC236}">
+                <a16:creationId xmlns:a16="http://schemas.microsoft.com/office/drawing/2014/main" id="{6B00AA92-4FE7-4B77-A0BB-6D1B9F0AC709}"/>
+              </a:ext>
+            </a:extLst>
+          </p:cNvPr>
+          <p:cNvPicPr>
+            <a:picLocks noChangeAspect="1"/>
+          </p:cNvPicPr>
+          <p:nvPr/>
+        </p:nvPicPr>
+        <p:blipFill>
+          <a:blip r:embed="rId2"/>
+          <a:stretch>
+            <a:fillRect/>
+          </a:stretch>
+        </p:blipFill>
+        <p:spPr>
+          <a:xfrm>
+            <a:off x="4595356" y="2459460"/>
+            <a:ext cx="6758444" cy="3512713"/>
+          </a:xfrm>
+          <a:prstGeom prst="rect">
+            <a:avLst/>
+          </a:prstGeom>
+          <a:ln>
+            <a:solidFill>
+              <a:schemeClr val="accent1"/>
+            </a:solidFill>
+          </a:ln>
+        </p:spPr>
+      </p:pic>
+      <p:sp>
+        <p:nvSpPr>
+          <p:cNvPr id="12" name="Content Placeholder 2">
+            <a:extLst>
+              <a:ext uri="{FF2B5EF4-FFF2-40B4-BE49-F238E27FC236}">
+                <a16:creationId xmlns:a16="http://schemas.microsoft.com/office/drawing/2014/main" id="{A961325A-1C9E-417E-B56D-DD331185FB69}"/>
+              </a:ext>
+            </a:extLst>
+          </p:cNvPr>
+          <p:cNvSpPr>
+            <a:spLocks noGrp="1"/>
+          </p:cNvSpPr>
+          <p:nvPr>
+            <p:ph idx="1"/>
+          </p:nvPr>
+        </p:nvSpPr>
+        <p:spPr>
+          <a:xfrm>
+            <a:off x="838200" y="1825626"/>
+            <a:ext cx="10515600" cy="565150"/>
+          </a:xfrm>
+        </p:spPr>
+        <p:txBody>
+          <a:bodyPr/>
+          <a:lstStyle/>
+          <a:p>
+            <a:r>
+              <a:rPr lang="en-US" dirty="0"/>
+              <a:t>Web Application for Project – Wednesday’s Wicked Adventures.</a:t>
+            </a:r>
+            <a:endParaRPr lang="en-IN" dirty="0"/>
+          </a:p>
+        </p:txBody>
+      </p:sp>
+      <p:sp>
+        <p:nvSpPr>
+          <p:cNvPr id="13" name="Content Placeholder 2">
+            <a:extLst>
+              <a:ext uri="{FF2B5EF4-FFF2-40B4-BE49-F238E27FC236}">
+                <a16:creationId xmlns:a16="http://schemas.microsoft.com/office/drawing/2014/main" id="{63E7B1FD-848E-4BF0-A69A-80FFE56DD1C5}"/>
+              </a:ext>
+            </a:extLst>
+          </p:cNvPr>
+          <p:cNvSpPr txBox="1">
+            <a:spLocks/>
+          </p:cNvSpPr>
+          <p:nvPr/>
+        </p:nvSpPr>
+        <p:spPr>
+          <a:xfrm>
+            <a:off x="847725" y="2459459"/>
+            <a:ext cx="3747631" cy="3512712"/>
+          </a:xfrm>
+          <a:prstGeom prst="rect">
+            <a:avLst/>
+          </a:prstGeom>
+        </p:spPr>
+        <p:txBody>
+          <a:bodyPr vert="horz" lIns="91440" tIns="45720" rIns="91440" bIns="45720" rtlCol="0">
+            <a:normAutofit lnSpcReduction="10000"/>
+          </a:bodyPr>
+          <a:lstStyle>
+            <a:lvl1pPr marL="228600" indent="-228600" algn="l" defTabSz="914400" rtl="0" eaLnBrk="1" latinLnBrk="0" hangingPunct="1">
+              <a:lnSpc>
+                <a:spcPct val="90000"/>
+              </a:lnSpc>
+              <a:spcBef>
+                <a:spcPts val="1000"/>
+              </a:spcBef>
+              <a:buFont typeface="Arial" panose="020B0604020202020204" pitchFamily="34" charset="0"/>
+              <a:buChar char="•"/>
+              <a:defRPr sz="2800" kern="1200">
+                <a:solidFill>
+                  <a:schemeClr val="tx1"/>
+                </a:solidFill>
+                <a:latin typeface="+mn-lt"/>
+                <a:ea typeface="+mn-ea"/>
+                <a:cs typeface="+mn-cs"/>
+              </a:defRPr>
+            </a:lvl1pPr>
+            <a:lvl2pPr marL="685800" indent="-228600" algn="l" defTabSz="914400" rtl="0" eaLnBrk="1" latinLnBrk="0" hangingPunct="1">
+              <a:lnSpc>
+                <a:spcPct val="90000"/>
+              </a:lnSpc>
+              <a:spcBef>
+                <a:spcPts val="500"/>
+              </a:spcBef>
+              <a:buFont typeface="Arial" panose="020B0604020202020204" pitchFamily="34" charset="0"/>
+              <a:buChar char="•"/>
+              <a:defRPr sz="2400" kern="1200">
+                <a:solidFill>
+                  <a:schemeClr val="tx1"/>
+                </a:solidFill>
+                <a:latin typeface="+mn-lt"/>
+                <a:ea typeface="+mn-ea"/>
+                <a:cs typeface="+mn-cs"/>
+              </a:defRPr>
+            </a:lvl2pPr>
+            <a:lvl3pPr marL="1143000" indent="-228600" algn="l" defTabSz="914400" rtl="0" eaLnBrk="1" latinLnBrk="0" hangingPunct="1">
+              <a:lnSpc>
+                <a:spcPct val="90000"/>
+              </a:lnSpc>
+              <a:spcBef>
+                <a:spcPts val="500"/>
+              </a:spcBef>
+              <a:buFont typeface="Arial" panose="020B0604020202020204" pitchFamily="34" charset="0"/>
+              <a:buChar char="•"/>
+              <a:defRPr sz="2000" kern="1200">
+                <a:solidFill>
+                  <a:schemeClr val="tx1"/>
+                </a:solidFill>
+                <a:latin typeface="+mn-lt"/>
+                <a:ea typeface="+mn-ea"/>
+                <a:cs typeface="+mn-cs"/>
+              </a:defRPr>
+            </a:lvl3pPr>
+            <a:lvl4pPr marL="1600200" indent="-228600" algn="l" defTabSz="914400" rtl="0" eaLnBrk="1" latinLnBrk="0" hangingPunct="1">
+              <a:lnSpc>
+                <a:spcPct val="90000"/>
+              </a:lnSpc>
+              <a:spcBef>
+                <a:spcPts val="500"/>
+              </a:spcBef>
+              <a:buFont typeface="Arial" panose="020B0604020202020204" pitchFamily="34" charset="0"/>
+              <a:buChar char="•"/>
+              <a:defRPr sz="1800" kern="1200">
+                <a:solidFill>
+                  <a:schemeClr val="tx1"/>
+                </a:solidFill>
+                <a:latin typeface="+mn-lt"/>
+                <a:ea typeface="+mn-ea"/>
+                <a:cs typeface="+mn-cs"/>
+              </a:defRPr>
+            </a:lvl4pPr>
+            <a:lvl5pPr marL="2057400" indent="-228600" algn="l" defTabSz="914400" rtl="0" eaLnBrk="1" latinLnBrk="0" hangingPunct="1">
+              <a:lnSpc>
+                <a:spcPct val="90000"/>
+              </a:lnSpc>
+              <a:spcBef>
+                <a:spcPts val="500"/>
+              </a:spcBef>
+              <a:buFont typeface="Arial" panose="020B0604020202020204" pitchFamily="34" charset="0"/>
+              <a:buChar char="•"/>
+              <a:defRPr sz="1800" kern="1200">
+                <a:solidFill>
+                  <a:schemeClr val="tx1"/>
+                </a:solidFill>
+                <a:latin typeface="+mn-lt"/>
+                <a:ea typeface="+mn-ea"/>
+                <a:cs typeface="+mn-cs"/>
+              </a:defRPr>
+            </a:lvl5pPr>
+            <a:lvl6pPr marL="2514600" indent="-228600" algn="l" defTabSz="914400" rtl="0" eaLnBrk="1" latinLnBrk="0" hangingPunct="1">
+              <a:lnSpc>
+                <a:spcPct val="90000"/>
+              </a:lnSpc>
+              <a:spcBef>
+                <a:spcPts val="500"/>
+              </a:spcBef>
+              <a:buFont typeface="Arial" panose="020B0604020202020204" pitchFamily="34" charset="0"/>
+              <a:buChar char="•"/>
+              <a:defRPr sz="1800" kern="1200">
+                <a:solidFill>
+                  <a:schemeClr val="tx1"/>
+                </a:solidFill>
+                <a:latin typeface="+mn-lt"/>
+                <a:ea typeface="+mn-ea"/>
+                <a:cs typeface="+mn-cs"/>
+              </a:defRPr>
+            </a:lvl6pPr>
+            <a:lvl7pPr marL="2971800" indent="-228600" algn="l" defTabSz="914400" rtl="0" eaLnBrk="1" latinLnBrk="0" hangingPunct="1">
+              <a:lnSpc>
+                <a:spcPct val="90000"/>
+              </a:lnSpc>
+              <a:spcBef>
+                <a:spcPts val="500"/>
+              </a:spcBef>
+              <a:buFont typeface="Arial" panose="020B0604020202020204" pitchFamily="34" charset="0"/>
+              <a:buChar char="•"/>
+              <a:defRPr sz="1800" kern="1200">
+                <a:solidFill>
+                  <a:schemeClr val="tx1"/>
+                </a:solidFill>
+                <a:latin typeface="+mn-lt"/>
+                <a:ea typeface="+mn-ea"/>
+                <a:cs typeface="+mn-cs"/>
+              </a:defRPr>
+            </a:lvl7pPr>
+            <a:lvl8pPr marL="3429000" indent="-228600" algn="l" defTabSz="914400" rtl="0" eaLnBrk="1" latinLnBrk="0" hangingPunct="1">
+              <a:lnSpc>
+                <a:spcPct val="90000"/>
+              </a:lnSpc>
+              <a:spcBef>
+                <a:spcPts val="500"/>
+              </a:spcBef>
+              <a:buFont typeface="Arial" panose="020B0604020202020204" pitchFamily="34" charset="0"/>
+              <a:buChar char="•"/>
+              <a:defRPr sz="1800" kern="1200">
+                <a:solidFill>
+                  <a:schemeClr val="tx1"/>
+                </a:solidFill>
+                <a:latin typeface="+mn-lt"/>
+                <a:ea typeface="+mn-ea"/>
+                <a:cs typeface="+mn-cs"/>
+              </a:defRPr>
+            </a:lvl8pPr>
+            <a:lvl9pPr marL="3886200" indent="-228600" algn="l" defTabSz="914400" rtl="0" eaLnBrk="1" latinLnBrk="0" hangingPunct="1">
+              <a:lnSpc>
+                <a:spcPct val="90000"/>
+              </a:lnSpc>
+              <a:spcBef>
+                <a:spcPts val="500"/>
+              </a:spcBef>
+              <a:buFont typeface="Arial" panose="020B0604020202020204" pitchFamily="34" charset="0"/>
+              <a:buChar char="•"/>
+              <a:defRPr sz="1800" kern="1200">
+                <a:solidFill>
+                  <a:schemeClr val="tx1"/>
+                </a:solidFill>
+                <a:latin typeface="+mn-lt"/>
+                <a:ea typeface="+mn-ea"/>
+                <a:cs typeface="+mn-cs"/>
+              </a:defRPr>
+            </a:lvl9pPr>
+          </a:lstStyle>
+          <a:p>
+            <a:r>
+              <a:rPr lang="en-US" dirty="0"/>
+              <a:t>Online booking system for an adventure theme park.</a:t>
+            </a:r>
+          </a:p>
+          <a:p>
+            <a:r>
+              <a:rPr lang="en-US" dirty="0"/>
+              <a:t>Customers needs to register and signup for booking.</a:t>
+            </a:r>
+          </a:p>
+          <a:p>
+            <a:r>
+              <a:rPr lang="en-US" dirty="0"/>
+              <a:t>Web application created in DevOps workflow.</a:t>
+            </a:r>
+            <a:endParaRPr lang="en-IN" dirty="0"/>
           </a:p>
         </p:txBody>
       </p:sp>
@@ -6817,7 +7087,7 @@
           <a:bodyPr/>
           <a:lstStyle/>
           <a:p>
-            <a:endParaRPr lang="en-IN"/>
+            <a:endParaRPr lang="en-IN" dirty="0"/>
           </a:p>
         </p:txBody>
       </p:sp>
@@ -8351,7 +8621,7 @@
                 <a:ea typeface="+mn-ea"/>
                 <a:cs typeface="+mn-cs"/>
               </a:rPr>
-              <a:t>Database</a:t>
+              <a:t>DATABASE</a:t>
             </a:r>
           </a:p>
         </p:txBody>
@@ -8384,24 +8654,28 @@
           </a:bodyPr>
           <a:lstStyle/>
           <a:p>
+            <a:pPr algn="just"/>
             <a:r>
               <a:rPr lang="en-US" dirty="0"/>
               <a:t>Database used – MySQL.</a:t>
             </a:r>
           </a:p>
           <a:p>
+            <a:pPr algn="just"/>
             <a:r>
               <a:rPr lang="en-US" dirty="0"/>
               <a:t>Initial development and testing done in Local DB.</a:t>
             </a:r>
           </a:p>
           <a:p>
+            <a:pPr algn="just"/>
             <a:r>
               <a:rPr lang="en-US" dirty="0"/>
               <a:t>Database used to store the customer data and connect the Front-end (HTML) for access.</a:t>
             </a:r>
           </a:p>
           <a:p>
+            <a:pPr algn="just"/>
             <a:r>
               <a:rPr lang="en-US" dirty="0"/>
               <a:t>Third party tools used to develop and run the queries including SQL workbench.</a:t>
@@ -8844,12 +9118,14 @@
             </a:lvl9pPr>
           </a:lstStyle>
           <a:p>
+            <a:pPr algn="just"/>
             <a:r>
               <a:rPr lang="en-US" dirty="0"/>
               <a:t>Pre-requisites – Installation of MySQL Server.</a:t>
             </a:r>
           </a:p>
           <a:p>
+            <a:pPr algn="just"/>
             <a:r>
               <a:rPr lang="en-US" dirty="0"/>
               <a:t>Higher environment testing done in free and open-source MySQL hosting website configured by : </a:t>
@@ -9272,7 +9548,7 @@
           <a:graphicData uri="http://schemas.openxmlformats.org/presentationml/2006/ole">
             <mc:AlternateContent xmlns:mc="http://schemas.openxmlformats.org/markup-compatibility/2006">
               <mc:Choice xmlns:v="urn:schemas-microsoft-com:vml" Requires="v">
-                <p:oleObj spid="_x0000_s1082" name="Bitmap Image" r:id="rId4" imgW="4267080" imgH="4389120" progId="Paint.Picture">
+                <p:oleObj spid="_x0000_s1105" name="Bitmap Image" r:id="rId4" imgW="4267080" imgH="4389120" progId="Paint.Picture">
                   <p:embed/>
                 </p:oleObj>
               </mc:Choice>
@@ -9397,7 +9673,7 @@
                 <a:ea typeface="+mn-ea"/>
                 <a:cs typeface="+mn-cs"/>
               </a:rPr>
-              <a:t>Tools Implemented with GitHub Actions</a:t>
+              <a:t>TOOLS USED IN GITHUB ACTIONS</a:t>
             </a:r>
           </a:p>
         </p:txBody>
@@ -9736,7 +10012,7 @@
           <a:graphicData uri="http://schemas.openxmlformats.org/presentationml/2006/ole">
             <mc:AlternateContent xmlns:mc="http://schemas.openxmlformats.org/markup-compatibility/2006">
               <mc:Choice xmlns:v="urn:schemas-microsoft-com:vml" Requires="v">
-                <p:oleObj spid="_x0000_s2079" name="Bitmap Image" r:id="rId3" imgW="2209680" imgH="3916800" progId="Paint.Picture">
+                <p:oleObj spid="_x0000_s2102" name="Bitmap Image" r:id="rId3" imgW="2209680" imgH="3916800" progId="Paint.Picture">
                   <p:embed/>
                 </p:oleObj>
               </mc:Choice>

</xml_diff>

<commit_message>
Presentation file heading format change
</commit_message>
<xml_diff>
--- a/Wicked Adventures.pptx
+++ b/Wicked Adventures.pptx
@@ -4874,14 +4874,14 @@
           <a:lstStyle/>
           <a:p>
             <a:fld id="{F37EE007-93F6-4DD3-A485-65881C8FA8D0}" type="slidenum">
-              <a:rPr lang="en-IN" sz="2000" b="1" smtClean="0">
+              <a:rPr lang="en-IN" sz="1800" b="1" smtClean="0">
                 <a:solidFill>
                   <a:schemeClr val="bg1"/>
                 </a:solidFill>
               </a:rPr>
               <a:t>10</a:t>
             </a:fld>
-            <a:endParaRPr lang="en-IN" sz="2000" b="1" dirty="0">
+            <a:endParaRPr lang="en-IN" sz="1800" b="1" dirty="0">
               <a:solidFill>
                 <a:schemeClr val="bg1"/>
               </a:solidFill>
@@ -5238,14 +5238,14 @@
           <a:lstStyle/>
           <a:p>
             <a:fld id="{F37EE007-93F6-4DD3-A485-65881C8FA8D0}" type="slidenum">
-              <a:rPr lang="en-IN" sz="2000" b="1" smtClean="0">
+              <a:rPr lang="en-IN" sz="1800" b="1" smtClean="0">
                 <a:solidFill>
                   <a:schemeClr val="bg1"/>
                 </a:solidFill>
               </a:rPr>
               <a:t>11</a:t>
             </a:fld>
-            <a:endParaRPr lang="en-IN" sz="2000" b="1" dirty="0">
+            <a:endParaRPr lang="en-IN" sz="1800" b="1" dirty="0">
               <a:solidFill>
                 <a:schemeClr val="bg1"/>
               </a:solidFill>
@@ -5281,7 +5281,7 @@
           <a:graphicData uri="http://schemas.openxmlformats.org/presentationml/2006/ole">
             <mc:AlternateContent xmlns:mc="http://schemas.openxmlformats.org/markup-compatibility/2006">
               <mc:Choice xmlns:v="urn:schemas-microsoft-com:vml" Requires="v">
-                <p:oleObj spid="_x0000_s3117" name="Bitmap Image" r:id="rId3" imgW="5753160" imgH="1973520" progId="Paint.Picture">
+                <p:oleObj spid="_x0000_s3131" name="Bitmap Image" r:id="rId3" imgW="5753160" imgH="1973520" progId="Paint.Picture">
                   <p:embed/>
                 </p:oleObj>
               </mc:Choice>
@@ -5815,14 +5815,14 @@
           <a:lstStyle/>
           <a:p>
             <a:fld id="{F37EE007-93F6-4DD3-A485-65881C8FA8D0}" type="slidenum">
-              <a:rPr lang="en-IN" sz="2000" b="1" smtClean="0">
+              <a:rPr lang="en-IN" sz="1800" b="1" smtClean="0">
                 <a:solidFill>
                   <a:schemeClr val="bg1"/>
                 </a:solidFill>
               </a:rPr>
               <a:t>12</a:t>
             </a:fld>
-            <a:endParaRPr lang="en-IN" sz="2000" b="1" dirty="0">
+            <a:endParaRPr lang="en-IN" sz="1800" b="1" dirty="0">
               <a:solidFill>
                 <a:schemeClr val="bg1"/>
               </a:solidFill>
@@ -6052,14 +6052,14 @@
           <a:lstStyle/>
           <a:p>
             <a:fld id="{F37EE007-93F6-4DD3-A485-65881C8FA8D0}" type="slidenum">
-              <a:rPr lang="en-IN" sz="2000" b="1" smtClean="0">
+              <a:rPr lang="en-IN" sz="1800" b="1" smtClean="0">
                 <a:solidFill>
                   <a:schemeClr val="bg1"/>
                 </a:solidFill>
               </a:rPr>
               <a:t>13</a:t>
             </a:fld>
-            <a:endParaRPr lang="en-IN" sz="2000" b="1" dirty="0">
+            <a:endParaRPr lang="en-IN" sz="1800" b="1" dirty="0">
               <a:solidFill>
                 <a:schemeClr val="bg1"/>
               </a:solidFill>
@@ -6336,14 +6336,14 @@
           <a:lstStyle/>
           <a:p>
             <a:fld id="{F37EE007-93F6-4DD3-A485-65881C8FA8D0}" type="slidenum">
-              <a:rPr lang="en-IN" sz="2000" b="1" smtClean="0">
+              <a:rPr lang="en-IN" sz="1800" b="1" smtClean="0">
                 <a:solidFill>
                   <a:schemeClr val="bg1"/>
                 </a:solidFill>
               </a:rPr>
               <a:t>14</a:t>
             </a:fld>
-            <a:endParaRPr lang="en-IN" sz="2000" b="1" dirty="0">
+            <a:endParaRPr lang="en-IN" sz="1800" b="1" dirty="0">
               <a:solidFill>
                 <a:schemeClr val="bg1"/>
               </a:solidFill>
@@ -9548,7 +9548,7 @@
           <a:graphicData uri="http://schemas.openxmlformats.org/presentationml/2006/ole">
             <mc:AlternateContent xmlns:mc="http://schemas.openxmlformats.org/markup-compatibility/2006">
               <mc:Choice xmlns:v="urn:schemas-microsoft-com:vml" Requires="v">
-                <p:oleObj spid="_x0000_s1105" name="Bitmap Image" r:id="rId4" imgW="4267080" imgH="4389120" progId="Paint.Picture">
+                <p:oleObj spid="_x0000_s1119" name="Bitmap Image" r:id="rId4" imgW="4267080" imgH="4389120" progId="Paint.Picture">
                   <p:embed/>
                 </p:oleObj>
               </mc:Choice>
@@ -10012,7 +10012,7 @@
           <a:graphicData uri="http://schemas.openxmlformats.org/presentationml/2006/ole">
             <mc:AlternateContent xmlns:mc="http://schemas.openxmlformats.org/markup-compatibility/2006">
               <mc:Choice xmlns:v="urn:schemas-microsoft-com:vml" Requires="v">
-                <p:oleObj spid="_x0000_s2102" name="Bitmap Image" r:id="rId3" imgW="2209680" imgH="3916800" progId="Paint.Picture">
+                <p:oleObj spid="_x0000_s2116" name="Bitmap Image" r:id="rId3" imgW="2209680" imgH="3916800" progId="Paint.Picture">
                   <p:embed/>
                 </p:oleObj>
               </mc:Choice>
@@ -10241,7 +10241,7 @@
               <a:t>Details provided in the Git Wiki link in our repository. Click </a:t>
             </a:r>
             <a:r>
-              <a:rPr lang="en-IN">
+              <a:rPr lang="en-IN" dirty="0">
                 <a:solidFill>
                   <a:srgbClr val="24292F"/>
                 </a:solidFill>
@@ -10251,20 +10251,14 @@
               <a:t>here</a:t>
             </a:r>
             <a:r>
-              <a:rPr lang="en-IN">
+              <a:rPr lang="en-IN" dirty="0">
                 <a:solidFill>
                   <a:srgbClr val="24292F"/>
                 </a:solidFill>
                 <a:latin typeface="-apple-system"/>
               </a:rPr>
-              <a:t>.-</a:t>
-            </a:r>
-            <a:endParaRPr lang="en-IN" dirty="0">
-              <a:solidFill>
-                <a:srgbClr val="24292F"/>
-              </a:solidFill>
-              <a:latin typeface="-apple-system"/>
-            </a:endParaRPr>
+              <a:t>.</a:t>
+            </a:r>
           </a:p>
           <a:p>
             <a:pPr algn="just"/>
@@ -10437,9 +10431,216 @@
                 <a:ea typeface="+mn-ea"/>
                 <a:cs typeface="+mn-cs"/>
               </a:rPr>
-              <a:t>. Pytest for unit testing</a:t>
+              <a:t>. PYTEST – UNIT TESTING</a:t>
             </a:r>
             <a:endParaRPr lang="en-IN" b="1" dirty="0"/>
+          </a:p>
+        </p:txBody>
+      </p:sp>
+      <p:sp>
+        <p:nvSpPr>
+          <p:cNvPr id="5" name="Rectangle 4">
+            <a:extLst>
+              <a:ext uri="{FF2B5EF4-FFF2-40B4-BE49-F238E27FC236}">
+                <a16:creationId xmlns:a16="http://schemas.microsoft.com/office/drawing/2014/main" id="{A5735CB3-EFF2-4294-9358-B66E9097731B}"/>
+              </a:ext>
+            </a:extLst>
+          </p:cNvPr>
+          <p:cNvSpPr/>
+          <p:nvPr/>
+        </p:nvSpPr>
+        <p:spPr>
+          <a:xfrm>
+            <a:off x="0" y="6067425"/>
+            <a:ext cx="9305925" cy="790575"/>
+          </a:xfrm>
+          <a:prstGeom prst="rect">
+            <a:avLst/>
+          </a:prstGeom>
+          <a:scene3d>
+            <a:camera prst="orthographicFront"/>
+            <a:lightRig rig="threePt" dir="t"/>
+          </a:scene3d>
+          <a:sp3d>
+            <a:bevelT w="114300" prst="hardEdge"/>
+          </a:sp3d>
+        </p:spPr>
+        <p:style>
+          <a:lnRef idx="2">
+            <a:schemeClr val="accent1">
+              <a:shade val="50000"/>
+            </a:schemeClr>
+          </a:lnRef>
+          <a:fillRef idx="1">
+            <a:schemeClr val="accent1"/>
+          </a:fillRef>
+          <a:effectRef idx="0">
+            <a:schemeClr val="accent1"/>
+          </a:effectRef>
+          <a:fontRef idx="minor">
+            <a:schemeClr val="lt1"/>
+          </a:fontRef>
+        </p:style>
+        <p:txBody>
+          <a:bodyPr rtlCol="0" anchor="ctr"/>
+          <a:lstStyle/>
+          <a:p>
+            <a:pPr algn="ctr"/>
+            <a:r>
+              <a:rPr lang="en-IN" sz="2000" b="1" dirty="0"/>
+              <a:t>WEDNESDAY’S WICKED ADVENTURES</a:t>
+            </a:r>
+          </a:p>
+        </p:txBody>
+      </p:sp>
+      <p:sp>
+        <p:nvSpPr>
+          <p:cNvPr id="6" name="Rectangle 5">
+            <a:extLst>
+              <a:ext uri="{FF2B5EF4-FFF2-40B4-BE49-F238E27FC236}">
+                <a16:creationId xmlns:a16="http://schemas.microsoft.com/office/drawing/2014/main" id="{F14345D9-9892-4B92-9278-8A31183A7CCF}"/>
+              </a:ext>
+            </a:extLst>
+          </p:cNvPr>
+          <p:cNvSpPr/>
+          <p:nvPr/>
+        </p:nvSpPr>
+        <p:spPr>
+          <a:xfrm>
+            <a:off x="11363325" y="6067425"/>
+            <a:ext cx="828675" cy="790575"/>
+          </a:xfrm>
+          <a:prstGeom prst="rect">
+            <a:avLst/>
+          </a:prstGeom>
+          <a:scene3d>
+            <a:camera prst="orthographicFront"/>
+            <a:lightRig rig="threePt" dir="t"/>
+          </a:scene3d>
+          <a:sp3d>
+            <a:bevelT w="114300" prst="hardEdge"/>
+          </a:sp3d>
+        </p:spPr>
+        <p:style>
+          <a:lnRef idx="2">
+            <a:schemeClr val="accent1">
+              <a:shade val="50000"/>
+            </a:schemeClr>
+          </a:lnRef>
+          <a:fillRef idx="1">
+            <a:schemeClr val="accent1"/>
+          </a:fillRef>
+          <a:effectRef idx="0">
+            <a:schemeClr val="accent1"/>
+          </a:effectRef>
+          <a:fontRef idx="minor">
+            <a:schemeClr val="lt1"/>
+          </a:fontRef>
+        </p:style>
+        <p:txBody>
+          <a:bodyPr rtlCol="0" anchor="ctr"/>
+          <a:lstStyle/>
+          <a:p>
+            <a:pPr algn="ctr"/>
+            <a:endParaRPr lang="en-IN"/>
+          </a:p>
+        </p:txBody>
+      </p:sp>
+      <p:sp>
+        <p:nvSpPr>
+          <p:cNvPr id="7" name="Rectangle 6">
+            <a:extLst>
+              <a:ext uri="{FF2B5EF4-FFF2-40B4-BE49-F238E27FC236}">
+                <a16:creationId xmlns:a16="http://schemas.microsoft.com/office/drawing/2014/main" id="{8181087D-DD49-49AE-95D9-420C4E4FDA6F}"/>
+              </a:ext>
+            </a:extLst>
+          </p:cNvPr>
+          <p:cNvSpPr/>
+          <p:nvPr/>
+        </p:nvSpPr>
+        <p:spPr>
+          <a:xfrm>
+            <a:off x="9305925" y="6067424"/>
+            <a:ext cx="2057400" cy="790575"/>
+          </a:xfrm>
+          <a:prstGeom prst="rect">
+            <a:avLst/>
+          </a:prstGeom>
+          <a:scene3d>
+            <a:camera prst="orthographicFront"/>
+            <a:lightRig rig="threePt" dir="t"/>
+          </a:scene3d>
+          <a:sp3d>
+            <a:bevelT w="114300" prst="hardEdge"/>
+          </a:sp3d>
+        </p:spPr>
+        <p:style>
+          <a:lnRef idx="2">
+            <a:schemeClr val="accent1">
+              <a:shade val="50000"/>
+            </a:schemeClr>
+          </a:lnRef>
+          <a:fillRef idx="1">
+            <a:schemeClr val="accent1"/>
+          </a:fillRef>
+          <a:effectRef idx="0">
+            <a:schemeClr val="accent1"/>
+          </a:effectRef>
+          <a:fontRef idx="minor">
+            <a:schemeClr val="lt1"/>
+          </a:fontRef>
+        </p:style>
+        <p:txBody>
+          <a:bodyPr rtlCol="0" anchor="ctr"/>
+          <a:lstStyle/>
+          <a:p>
+            <a:pPr algn="ctr"/>
+            <a:r>
+              <a:rPr lang="en-IN" sz="2000" b="1" dirty="0"/>
+              <a:t>APRIL 2022</a:t>
+            </a:r>
+          </a:p>
+        </p:txBody>
+      </p:sp>
+      <p:sp>
+        <p:nvSpPr>
+          <p:cNvPr id="8" name="Slide Number Placeholder 11">
+            <a:extLst>
+              <a:ext uri="{FF2B5EF4-FFF2-40B4-BE49-F238E27FC236}">
+                <a16:creationId xmlns:a16="http://schemas.microsoft.com/office/drawing/2014/main" id="{3A49B4D6-43AE-4DAB-AF72-D53FA9B65599}"/>
+              </a:ext>
+            </a:extLst>
+          </p:cNvPr>
+          <p:cNvSpPr>
+            <a:spLocks noGrp="1"/>
+          </p:cNvSpPr>
+          <p:nvPr>
+            <p:ph type="sldNum" sz="quarter" idx="12"/>
+          </p:nvPr>
+        </p:nvSpPr>
+        <p:spPr>
+          <a:xfrm>
+            <a:off x="11563349" y="6280148"/>
+            <a:ext cx="428625" cy="365125"/>
+          </a:xfrm>
+        </p:spPr>
+        <p:txBody>
+          <a:bodyPr/>
+          <a:lstStyle/>
+          <a:p>
+            <a:fld id="{F37EE007-93F6-4DD3-A485-65881C8FA8D0}" type="slidenum">
+              <a:rPr lang="en-IN" sz="1800" b="1" smtClean="0">
+                <a:solidFill>
+                  <a:schemeClr val="bg1"/>
+                </a:solidFill>
+              </a:rPr>
+              <a:t>9</a:t>
+            </a:fld>
+            <a:endParaRPr lang="en-IN" sz="1800" b="1" dirty="0">
+              <a:solidFill>
+                <a:schemeClr val="bg1"/>
+              </a:solidFill>
+            </a:endParaRPr>
           </a:p>
         </p:txBody>
       </p:sp>

</xml_diff>

<commit_message>
Github workflow updated, ppt updated, app.py updated, script.js updated
</commit_message>
<xml_diff>
--- a/Wicked Adventures.pptx
+++ b/Wicked Adventures.pptx
@@ -5,7 +5,7 @@
     <p:sldMasterId id="2147483648" r:id="rId1"/>
   </p:sldMasterIdLst>
   <p:notesMasterIdLst>
-    <p:notesMasterId r:id="rId16"/>
+    <p:notesMasterId r:id="rId20"/>
   </p:notesMasterIdLst>
   <p:sldIdLst>
     <p:sldId id="258" r:id="rId2"/>
@@ -16,12 +16,16 @@
     <p:sldId id="268" r:id="rId7"/>
     <p:sldId id="262" r:id="rId8"/>
     <p:sldId id="269" r:id="rId9"/>
-    <p:sldId id="273" r:id="rId10"/>
-    <p:sldId id="265" r:id="rId11"/>
-    <p:sldId id="270" r:id="rId12"/>
-    <p:sldId id="267" r:id="rId13"/>
-    <p:sldId id="264" r:id="rId14"/>
-    <p:sldId id="263" r:id="rId15"/>
+    <p:sldId id="274" r:id="rId10"/>
+    <p:sldId id="275" r:id="rId11"/>
+    <p:sldId id="276" r:id="rId12"/>
+    <p:sldId id="277" r:id="rId13"/>
+    <p:sldId id="273" r:id="rId14"/>
+    <p:sldId id="265" r:id="rId15"/>
+    <p:sldId id="270" r:id="rId16"/>
+    <p:sldId id="267" r:id="rId17"/>
+    <p:sldId id="264" r:id="rId18"/>
+    <p:sldId id="263" r:id="rId19"/>
   </p:sldIdLst>
   <p:sldSz cx="12192000" cy="6858000"/>
   <p:notesSz cx="6858000" cy="9144000"/>
@@ -4485,10 +4489,6 @@
           </p:nvPr>
         </p:nvSpPr>
         <p:spPr>
-          <a:xfrm>
-            <a:off x="838200" y="403398"/>
-            <a:ext cx="10515600" cy="1119961"/>
-          </a:xfrm>
           <a:effectLst>
             <a:outerShdw blurRad="50800" dist="38100" dir="5400000" algn="t" rotWithShape="0">
               <a:prstClr val="black">
@@ -4512,13 +4512,22 @@
           </a:fontRef>
         </p:style>
         <p:txBody>
-          <a:bodyPr/>
+          <a:bodyPr vert="horz" lIns="91440" tIns="45720" rIns="91440" bIns="45720" rtlCol="0" anchor="ctr">
+            <a:normAutofit/>
+          </a:bodyPr>
           <a:lstStyle/>
           <a:p>
             <a:pPr algn="ctr"/>
             <a:r>
-              <a:rPr lang="en-IN" b="1" dirty="0"/>
-              <a:t>5. SPHINX TOOL - AUTO DOCUMENTATION</a:t>
+              <a:rPr lang="en-IN" b="1" dirty="0">
+                <a:solidFill>
+                  <a:schemeClr val="lt1"/>
+                </a:solidFill>
+                <a:latin typeface="+mn-lt"/>
+                <a:ea typeface="+mn-ea"/>
+                <a:cs typeface="+mn-cs"/>
+              </a:rPr>
+              <a:t>Docker</a:t>
             </a:r>
           </a:p>
         </p:txBody>
@@ -4541,144 +4550,274 @@
         </p:nvSpPr>
         <p:spPr>
           <a:xfrm>
-            <a:off x="838200" y="2836599"/>
-            <a:ext cx="10143062" cy="3154279"/>
+            <a:off x="847726" y="1858962"/>
+            <a:ext cx="10515599" cy="4070350"/>
           </a:xfrm>
         </p:spPr>
         <p:txBody>
           <a:bodyPr>
-            <a:normAutofit fontScale="92500" lnSpcReduction="20000"/>
+            <a:noAutofit/>
           </a:bodyPr>
           <a:lstStyle/>
           <a:p>
-            <a:pPr algn="just"/>
-            <a:r>
-              <a:rPr lang="en-US" dirty="0"/>
-              <a:t>An Open-source third party Tool used for auto documentation.</a:t>
-            </a:r>
-          </a:p>
-          <a:p>
-            <a:pPr algn="just"/>
-            <a:r>
-              <a:rPr lang="en-IN" b="0" i="0" dirty="0">
-                <a:solidFill>
-                  <a:srgbClr val="24292F"/>
-                </a:solidFill>
-                <a:effectLst/>
-                <a:latin typeface="-apple-system"/>
-              </a:rPr>
-              <a:t>A documentation generator written in python language.</a:t>
-            </a:r>
-          </a:p>
-          <a:p>
-            <a:pPr algn="just"/>
-            <a:r>
-              <a:rPr lang="en-IN" dirty="0">
-                <a:solidFill>
-                  <a:srgbClr val="24292F"/>
-                </a:solidFill>
-                <a:latin typeface="-apple-system"/>
-              </a:rPr>
-              <a:t>Implementation of Sphinx tool by creating YAML file using “GitHub Actions”.</a:t>
-            </a:r>
-          </a:p>
-          <a:p>
-            <a:pPr algn="just"/>
-            <a:r>
-              <a:rPr lang="en-IN" dirty="0">
-                <a:solidFill>
-                  <a:srgbClr val="24292F"/>
-                </a:solidFill>
-                <a:latin typeface="-apple-system"/>
-              </a:rPr>
-              <a:t>Themes available in the URL below : </a:t>
-            </a:r>
-          </a:p>
-          <a:p>
-            <a:pPr marL="0" indent="0" algn="ctr">
+            <a:pPr marL="0" indent="0">
               <a:buNone/>
             </a:pPr>
             <a:r>
-              <a:rPr lang="en-IN" dirty="0">
-                <a:solidFill>
-                  <a:srgbClr val="24292F"/>
-                </a:solidFill>
-                <a:latin typeface="-apple-system"/>
-                <a:hlinkClick r:id="rId2"/>
+              <a:rPr lang="en-IN" sz="2600" i="0" u="sng" dirty="0">
+                <a:solidFill>
+                  <a:schemeClr val="tx1">
+                    <a:lumMod val="85000"/>
+                    <a:lumOff val="15000"/>
+                  </a:schemeClr>
+                </a:solidFill>
+                <a:effectLst/>
               </a:rPr>
-              <a:t>https://www.sphinx-doc.org/en/master/usage/theming.html</a:t>
-            </a:r>
-            <a:endParaRPr lang="en-IN" dirty="0">
+              <a:t>Why Docker:</a:t>
+            </a:r>
+          </a:p>
+          <a:p>
+            <a:pPr marL="514350" indent="-514350">
+              <a:buFont typeface="+mj-lt"/>
+              <a:buAutoNum type="arabicParenR"/>
+            </a:pPr>
+            <a:r>
+              <a:rPr lang="en-IN" sz="2400" b="0" i="0" dirty="0">
+                <a:solidFill>
+                  <a:schemeClr val="tx1">
+                    <a:lumMod val="85000"/>
+                    <a:lumOff val="15000"/>
+                  </a:schemeClr>
+                </a:solidFill>
+                <a:effectLst/>
+              </a:rPr>
+              <a:t>Gives us a Rapid Deployment</a:t>
+            </a:r>
+            <a:endParaRPr lang="en-IN" sz="2400" dirty="0">
               <a:solidFill>
-                <a:srgbClr val="24292F"/>
+                <a:schemeClr val="tx1">
+                  <a:lumMod val="85000"/>
+                  <a:lumOff val="15000"/>
+                </a:schemeClr>
               </a:solidFill>
-              <a:latin typeface="-apple-system"/>
             </a:endParaRPr>
           </a:p>
           <a:p>
-            <a:pPr algn="just"/>
-            <a:r>
-              <a:rPr lang="en-IN" dirty="0">
-                <a:solidFill>
-                  <a:srgbClr val="24292F"/>
-                </a:solidFill>
-                <a:latin typeface="-apple-system"/>
+            <a:pPr marL="514350" indent="-514350">
+              <a:buFont typeface="+mj-lt"/>
+              <a:buAutoNum type="arabicParenR"/>
+            </a:pPr>
+            <a:r>
+              <a:rPr lang="en-IN" sz="2400" b="0" i="0" dirty="0">
+                <a:solidFill>
+                  <a:schemeClr val="tx1">
+                    <a:lumMod val="85000"/>
+                    <a:lumOff val="15000"/>
+                  </a:schemeClr>
+                </a:solidFill>
+                <a:effectLst/>
               </a:rPr>
-              <a:t>Details provided in the Git Wiki link in our repository. Click </a:t>
-            </a:r>
-            <a:r>
-              <a:rPr lang="en-IN" dirty="0">
-                <a:solidFill>
-                  <a:srgbClr val="24292F"/>
-                </a:solidFill>
-                <a:latin typeface="-apple-system"/>
-                <a:hlinkClick r:id="rId3"/>
+              <a:t>Its configuration is Simple and Faster</a:t>
+            </a:r>
+          </a:p>
+          <a:p>
+            <a:pPr marL="514350" indent="-514350">
+              <a:buFont typeface="+mj-lt"/>
+              <a:buAutoNum type="arabicParenR"/>
+            </a:pPr>
+            <a:r>
+              <a:rPr lang="en-IN" sz="2400" dirty="0">
+                <a:solidFill>
+                  <a:schemeClr val="tx1">
+                    <a:lumMod val="85000"/>
+                    <a:lumOff val="15000"/>
+                  </a:schemeClr>
+                </a:solidFill>
               </a:rPr>
-              <a:t>here</a:t>
-            </a:r>
-            <a:r>
-              <a:rPr lang="en-IN" dirty="0">
-                <a:solidFill>
-                  <a:srgbClr val="24292F"/>
-                </a:solidFill>
-                <a:latin typeface="-apple-system"/>
+              <a:t>Provides a security for application deployment</a:t>
+            </a:r>
+          </a:p>
+          <a:p>
+            <a:pPr marL="514350" indent="-514350">
+              <a:buFont typeface="+mj-lt"/>
+              <a:buAutoNum type="arabicParenR"/>
+            </a:pPr>
+            <a:r>
+              <a:rPr lang="en-IN" sz="2400" b="0" i="0" dirty="0">
+                <a:solidFill>
+                  <a:schemeClr val="tx1">
+                    <a:lumMod val="85000"/>
+                    <a:lumOff val="15000"/>
+                  </a:schemeClr>
+                </a:solidFill>
+                <a:effectLst/>
               </a:rPr>
-              <a:t>.</a:t>
-            </a:r>
-          </a:p>
-          <a:p>
-            <a:pPr algn="just"/>
-            <a:r>
-              <a:rPr lang="en-IN" dirty="0">
-                <a:solidFill>
-                  <a:srgbClr val="24292F"/>
-                </a:solidFill>
-                <a:latin typeface="-apple-system"/>
+              <a:t>CI Efficiency is plus point</a:t>
+            </a:r>
+          </a:p>
+          <a:p>
+            <a:pPr marL="0" indent="0">
+              <a:buNone/>
+            </a:pPr>
+            <a:r>
+              <a:rPr lang="en-IN" sz="2600" u="sng" dirty="0">
+                <a:solidFill>
+                  <a:schemeClr val="tx1">
+                    <a:lumMod val="85000"/>
+                    <a:lumOff val="15000"/>
+                  </a:schemeClr>
+                </a:solidFill>
               </a:rPr>
-              <a:t>Branch created for auto documentation – ‘</a:t>
-            </a:r>
-            <a:r>
-              <a:rPr lang="en-IN" dirty="0" err="1">
-                <a:solidFill>
-                  <a:srgbClr val="24292F"/>
-                </a:solidFill>
-                <a:latin typeface="-apple-system"/>
+              <a:t>Why not other tools:</a:t>
+            </a:r>
+          </a:p>
+          <a:p>
+            <a:pPr marL="514350" indent="-514350">
+              <a:buAutoNum type="arabicParenR"/>
+            </a:pPr>
+            <a:r>
+              <a:rPr lang="en-IN" sz="2400" dirty="0">
+                <a:solidFill>
+                  <a:schemeClr val="tx1">
+                    <a:lumMod val="85000"/>
+                    <a:lumOff val="15000"/>
+                  </a:schemeClr>
+                </a:solidFill>
               </a:rPr>
-              <a:t>gh</a:t>
-            </a:r>
-            <a:r>
-              <a:rPr lang="en-IN" dirty="0">
-                <a:solidFill>
-                  <a:srgbClr val="24292F"/>
-                </a:solidFill>
-                <a:latin typeface="-apple-system"/>
+              <a:t>Less portable containers in </a:t>
+            </a:r>
+            <a:r>
+              <a:rPr lang="en-IN" sz="2400" b="0" i="0" dirty="0">
+                <a:solidFill>
+                  <a:schemeClr val="tx1">
+                    <a:lumMod val="85000"/>
+                    <a:lumOff val="15000"/>
+                  </a:schemeClr>
+                </a:solidFill>
+                <a:effectLst/>
               </a:rPr>
-              <a:t>-pages’ (Default).</a:t>
-            </a:r>
-          </a:p>
-          <a:p>
-            <a:pPr algn="just"/>
-            <a:endParaRPr lang="en-IN" dirty="0"/>
+              <a:t>LXC container,</a:t>
+            </a:r>
+          </a:p>
+          <a:p>
+            <a:pPr marL="514350" indent="-514350">
+              <a:buAutoNum type="arabicParenR"/>
+            </a:pPr>
+            <a:r>
+              <a:rPr lang="en-IN" sz="2400" b="0" i="0" dirty="0">
+                <a:solidFill>
+                  <a:schemeClr val="tx1">
+                    <a:lumMod val="85000"/>
+                    <a:lumOff val="15000"/>
+                  </a:schemeClr>
+                </a:solidFill>
+                <a:effectLst/>
+              </a:rPr>
+              <a:t>No </a:t>
+            </a:r>
+            <a:r>
+              <a:rPr lang="en-IN" sz="2400" b="0" i="0" dirty="0" err="1">
+                <a:solidFill>
+                  <a:schemeClr val="tx1">
+                    <a:lumMod val="85000"/>
+                    <a:lumOff val="15000"/>
+                  </a:schemeClr>
+                </a:solidFill>
+                <a:effectLst/>
+              </a:rPr>
+              <a:t>kubernetes</a:t>
+            </a:r>
+            <a:r>
+              <a:rPr lang="en-IN" sz="2400" b="0" i="0" dirty="0">
+                <a:solidFill>
+                  <a:schemeClr val="tx1">
+                    <a:lumMod val="85000"/>
+                    <a:lumOff val="15000"/>
+                  </a:schemeClr>
+                </a:solidFill>
+                <a:effectLst/>
+              </a:rPr>
+              <a:t> integration</a:t>
+            </a:r>
+            <a:r>
+              <a:rPr lang="en-IN" sz="2400" dirty="0">
+                <a:solidFill>
+                  <a:schemeClr val="tx1">
+                    <a:lumMod val="85000"/>
+                    <a:lumOff val="15000"/>
+                  </a:schemeClr>
+                </a:solidFill>
+              </a:rPr>
+              <a:t> is available in </a:t>
+            </a:r>
+            <a:r>
+              <a:rPr lang="en-IN" sz="2400" dirty="0" err="1">
+                <a:solidFill>
+                  <a:schemeClr val="tx1">
+                    <a:lumMod val="85000"/>
+                    <a:lumOff val="15000"/>
+                  </a:schemeClr>
+                </a:solidFill>
+              </a:rPr>
+              <a:t>OpenVZ</a:t>
+            </a:r>
+            <a:endParaRPr lang="en-IN" sz="2400" dirty="0">
+              <a:solidFill>
+                <a:schemeClr val="tx1">
+                  <a:lumMod val="85000"/>
+                  <a:lumOff val="15000"/>
+                </a:schemeClr>
+              </a:solidFill>
+            </a:endParaRPr>
+          </a:p>
+          <a:p>
+            <a:pPr marL="514350" indent="-514350">
+              <a:buAutoNum type="arabicParenR"/>
+            </a:pPr>
+            <a:r>
+              <a:rPr lang="en-US" sz="2400" b="0" i="0" dirty="0">
+                <a:solidFill>
+                  <a:schemeClr val="tx1">
+                    <a:lumMod val="85000"/>
+                    <a:lumOff val="15000"/>
+                  </a:schemeClr>
+                </a:solidFill>
+                <a:effectLst/>
+              </a:rPr>
+              <a:t>require the Mesos framework to run the container in </a:t>
+            </a:r>
+            <a:r>
+              <a:rPr lang="en-IN" sz="2400" b="0" i="0" dirty="0">
+                <a:solidFill>
+                  <a:schemeClr val="tx1">
+                    <a:lumMod val="85000"/>
+                    <a:lumOff val="15000"/>
+                  </a:schemeClr>
+                </a:solidFill>
+                <a:effectLst/>
+              </a:rPr>
+              <a:t>Mesos </a:t>
+            </a:r>
+            <a:r>
+              <a:rPr lang="en-IN" sz="2400" b="0" i="0" dirty="0" err="1">
+                <a:solidFill>
+                  <a:schemeClr val="tx1">
+                    <a:lumMod val="85000"/>
+                    <a:lumOff val="15000"/>
+                  </a:schemeClr>
+                </a:solidFill>
+                <a:effectLst/>
+              </a:rPr>
+              <a:t>containerizer</a:t>
+            </a:r>
+            <a:endParaRPr lang="en-US" sz="2400" dirty="0">
+              <a:solidFill>
+                <a:schemeClr val="tx1">
+                  <a:lumMod val="85000"/>
+                  <a:lumOff val="15000"/>
+                </a:schemeClr>
+              </a:solidFill>
+            </a:endParaRPr>
           </a:p>
         </p:txBody>
       </p:sp>
@@ -4874,14 +5013,14 @@
           <a:lstStyle/>
           <a:p>
             <a:fld id="{F37EE007-93F6-4DD3-A485-65881C8FA8D0}" type="slidenum">
-              <a:rPr lang="en-IN" sz="1800" b="1" smtClean="0">
+              <a:rPr lang="en-IN" sz="2000" b="1" smtClean="0">
                 <a:solidFill>
                   <a:schemeClr val="bg1"/>
                 </a:solidFill>
               </a:rPr>
               <a:t>10</a:t>
             </a:fld>
-            <a:endParaRPr lang="en-IN" sz="1800" b="1" dirty="0">
+            <a:endParaRPr lang="en-IN" sz="2000" b="1" dirty="0">
               <a:solidFill>
                 <a:schemeClr val="bg1"/>
               </a:solidFill>
@@ -4889,40 +5028,10 @@
           </a:p>
         </p:txBody>
       </p:sp>
-      <p:pic>
-        <p:nvPicPr>
-          <p:cNvPr id="9" name="Picture 8">
-            <a:extLst>
-              <a:ext uri="{FF2B5EF4-FFF2-40B4-BE49-F238E27FC236}">
-                <a16:creationId xmlns:a16="http://schemas.microsoft.com/office/drawing/2014/main" id="{FE2ECC11-E713-46DD-A8C9-F2FE792FD345}"/>
-              </a:ext>
-            </a:extLst>
-          </p:cNvPr>
-          <p:cNvPicPr>
-            <a:picLocks noChangeAspect="1"/>
-          </p:cNvPicPr>
-          <p:nvPr/>
-        </p:nvPicPr>
-        <p:blipFill>
-          <a:blip r:embed="rId4"/>
-          <a:stretch>
-            <a:fillRect/>
-          </a:stretch>
-        </p:blipFill>
-        <p:spPr>
-          <a:xfrm>
-            <a:off x="3013010" y="1523359"/>
-            <a:ext cx="5793442" cy="1274966"/>
-          </a:xfrm>
-          <a:prstGeom prst="rect">
-            <a:avLst/>
-          </a:prstGeom>
-        </p:spPr>
-      </p:pic>
     </p:spTree>
     <p:extLst>
       <p:ext uri="{BB962C8B-B14F-4D97-AF65-F5344CB8AC3E}">
-        <p14:creationId xmlns:p14="http://schemas.microsoft.com/office/powerpoint/2010/main" val="2108658942"/>
+        <p14:creationId xmlns:p14="http://schemas.microsoft.com/office/powerpoint/2010/main" val="4159131850"/>
       </p:ext>
     </p:extLst>
   </p:cSld>
@@ -4949,6 +5058,36 @@
           <a:chExt cx="0" cy="0"/>
         </a:xfrm>
       </p:grpSpPr>
+      <p:pic>
+        <p:nvPicPr>
+          <p:cNvPr id="10" name="Picture 9">
+            <a:extLst>
+              <a:ext uri="{FF2B5EF4-FFF2-40B4-BE49-F238E27FC236}">
+                <a16:creationId xmlns:a16="http://schemas.microsoft.com/office/drawing/2014/main" id="{2C25C640-7F28-4678-AB09-51BBFEBD7020}"/>
+              </a:ext>
+            </a:extLst>
+          </p:cNvPr>
+          <p:cNvPicPr>
+            <a:picLocks noChangeAspect="1"/>
+          </p:cNvPicPr>
+          <p:nvPr/>
+        </p:nvPicPr>
+        <p:blipFill>
+          <a:blip r:embed="rId2"/>
+          <a:stretch>
+            <a:fillRect/>
+          </a:stretch>
+        </p:blipFill>
+        <p:spPr>
+          <a:xfrm>
+            <a:off x="9896503" y="3657036"/>
+            <a:ext cx="1438806" cy="1466608"/>
+          </a:xfrm>
+          <a:prstGeom prst="rect">
+            <a:avLst/>
+          </a:prstGeom>
+        </p:spPr>
+      </p:pic>
       <p:sp>
         <p:nvSpPr>
           <p:cNvPr id="2" name="Title 1">
@@ -5004,7 +5143,7 @@
                 <a:ea typeface="+mn-ea"/>
                 <a:cs typeface="+mn-cs"/>
               </a:rPr>
-              <a:t>GIT WIKI - USER GUIDES &amp; INSTRUCTIONS</a:t>
+              <a:t>AWS EKS</a:t>
             </a:r>
           </a:p>
         </p:txBody>
@@ -5027,22 +5166,91 @@
         </p:nvSpPr>
         <p:spPr>
           <a:xfrm>
-            <a:off x="838201" y="1838325"/>
-            <a:ext cx="6286500" cy="1462623"/>
+            <a:off x="847726" y="1858962"/>
+            <a:ext cx="10506073" cy="4070350"/>
           </a:xfrm>
         </p:spPr>
         <p:txBody>
           <a:bodyPr>
-            <a:normAutofit/>
+            <a:noAutofit/>
           </a:bodyPr>
           <a:lstStyle/>
           <a:p>
-            <a:pPr algn="just"/>
-            <a:r>
-              <a:rPr lang="en-US" dirty="0"/>
-              <a:t>Platform provided by Git for adding documentation for the projects hosted in the GitHub repository.</a:t>
-            </a:r>
-            <a:endParaRPr lang="en-IN" dirty="0"/>
+            <a:r>
+              <a:rPr lang="en-US" sz="2600" b="0" i="0" dirty="0">
+                <a:solidFill>
+                  <a:srgbClr val="333333"/>
+                </a:solidFill>
+                <a:effectLst/>
+              </a:rPr>
+              <a:t>Amazon Elastic Kubernetes Service (Amazon EKS) is a managed container service to run and scale Kubernetes applications in the cloud or on-premises.</a:t>
+            </a:r>
+          </a:p>
+          <a:p>
+            <a:r>
+              <a:rPr lang="en-US" sz="2600" b="0" i="0" dirty="0">
+                <a:solidFill>
+                  <a:srgbClr val="333333"/>
+                </a:solidFill>
+                <a:effectLst/>
+              </a:rPr>
+              <a:t>Create applications that automatically scale up and down and run in a highly available configuration across multiple Availability Zones (AZs) with out-of-the-box networking and security integrations.</a:t>
+            </a:r>
+          </a:p>
+          <a:p>
+            <a:pPr marL="0" indent="0">
+              <a:buNone/>
+            </a:pPr>
+            <a:r>
+              <a:rPr lang="en-US" sz="2600" dirty="0">
+                <a:solidFill>
+                  <a:srgbClr val="333333"/>
+                </a:solidFill>
+              </a:rPr>
+              <a:t>                                                                                                        </a:t>
+            </a:r>
+          </a:p>
+          <a:p>
+            <a:pPr marL="0" indent="0">
+              <a:buNone/>
+            </a:pPr>
+            <a:r>
+              <a:rPr lang="en-US" sz="2600" u="sng" dirty="0">
+                <a:solidFill>
+                  <a:srgbClr val="333333"/>
+                </a:solidFill>
+              </a:rPr>
+              <a:t>Why AWS EKS:</a:t>
+            </a:r>
+            <a:endParaRPr lang="en-US" sz="2400" u="sng" dirty="0">
+              <a:solidFill>
+                <a:srgbClr val="333333"/>
+              </a:solidFill>
+            </a:endParaRPr>
+          </a:p>
+          <a:p>
+            <a:pPr marL="514350" indent="-514350">
+              <a:buFont typeface="+mj-lt"/>
+              <a:buAutoNum type="arabicPeriod"/>
+            </a:pPr>
+            <a:r>
+              <a:rPr lang="en-US" sz="2400" b="0" i="0" dirty="0">
+                <a:solidFill>
+                  <a:srgbClr val="333333"/>
+                </a:solidFill>
+                <a:effectLst/>
+              </a:rPr>
+              <a:t>advantage of  the performance, scale, reliability, and availability of AWS infrastructure.                                                                                                  </a:t>
+            </a:r>
+            <a:r>
+              <a:rPr lang="en-US" sz="2000" dirty="0">
+                <a:solidFill>
+                  <a:srgbClr val="333333"/>
+                </a:solidFill>
+              </a:rPr>
+              <a:t>..continued</a:t>
+            </a:r>
+            <a:endParaRPr lang="en-US" sz="2400" dirty="0"/>
           </a:p>
         </p:txBody>
       </p:sp>
@@ -5238,12 +5446,1850 @@
           <a:lstStyle/>
           <a:p>
             <a:fld id="{F37EE007-93F6-4DD3-A485-65881C8FA8D0}" type="slidenum">
-              <a:rPr lang="en-IN" sz="1800" b="1" smtClean="0">
+              <a:rPr lang="en-IN" sz="2000" b="1" smtClean="0">
                 <a:solidFill>
                   <a:schemeClr val="bg1"/>
                 </a:solidFill>
               </a:rPr>
               <a:t>11</a:t>
+            </a:fld>
+            <a:endParaRPr lang="en-IN" sz="2000" b="1" dirty="0">
+              <a:solidFill>
+                <a:schemeClr val="bg1"/>
+              </a:solidFill>
+            </a:endParaRPr>
+          </a:p>
+        </p:txBody>
+      </p:sp>
+    </p:spTree>
+    <p:extLst>
+      <p:ext uri="{BB962C8B-B14F-4D97-AF65-F5344CB8AC3E}">
+        <p14:creationId xmlns:p14="http://schemas.microsoft.com/office/powerpoint/2010/main" val="3095886194"/>
+      </p:ext>
+    </p:extLst>
+  </p:cSld>
+  <p:clrMapOvr>
+    <a:masterClrMapping/>
+  </p:clrMapOvr>
+</p:sld>
+</file>
+
+<file path=ppt/slides/slide12.xml><?xml version="1.0" encoding="utf-8"?>
+<p:sld xmlns:a="http://schemas.openxmlformats.org/drawingml/2006/main" xmlns:r="http://schemas.openxmlformats.org/officeDocument/2006/relationships" xmlns:p="http://schemas.openxmlformats.org/presentationml/2006/main">
+  <p:cSld>
+    <p:spTree>
+      <p:nvGrpSpPr>
+        <p:cNvPr id="1" name=""/>
+        <p:cNvGrpSpPr/>
+        <p:nvPr/>
+      </p:nvGrpSpPr>
+      <p:grpSpPr>
+        <a:xfrm>
+          <a:off x="0" y="0"/>
+          <a:ext cx="0" cy="0"/>
+          <a:chOff x="0" y="0"/>
+          <a:chExt cx="0" cy="0"/>
+        </a:xfrm>
+      </p:grpSpPr>
+      <p:sp>
+        <p:nvSpPr>
+          <p:cNvPr id="2" name="Title 1">
+            <a:extLst>
+              <a:ext uri="{FF2B5EF4-FFF2-40B4-BE49-F238E27FC236}">
+                <a16:creationId xmlns:a16="http://schemas.microsoft.com/office/drawing/2014/main" id="{C0666519-3484-48F3-927E-47679DE94711}"/>
+              </a:ext>
+            </a:extLst>
+          </p:cNvPr>
+          <p:cNvSpPr>
+            <a:spLocks noGrp="1"/>
+          </p:cNvSpPr>
+          <p:nvPr>
+            <p:ph type="title"/>
+          </p:nvPr>
+        </p:nvSpPr>
+        <p:spPr>
+          <a:effectLst>
+            <a:outerShdw blurRad="50800" dist="38100" dir="5400000" algn="t" rotWithShape="0">
+              <a:prstClr val="black">
+                <a:alpha val="40000"/>
+              </a:prstClr>
+            </a:outerShdw>
+          </a:effectLst>
+        </p:spPr>
+        <p:style>
+          <a:lnRef idx="3">
+            <a:schemeClr val="lt1"/>
+          </a:lnRef>
+          <a:fillRef idx="1">
+            <a:schemeClr val="accent5"/>
+          </a:fillRef>
+          <a:effectRef idx="1">
+            <a:schemeClr val="accent5"/>
+          </a:effectRef>
+          <a:fontRef idx="minor">
+            <a:schemeClr val="lt1"/>
+          </a:fontRef>
+        </p:style>
+        <p:txBody>
+          <a:bodyPr vert="horz" lIns="91440" tIns="45720" rIns="91440" bIns="45720" rtlCol="0" anchor="ctr">
+            <a:normAutofit/>
+          </a:bodyPr>
+          <a:lstStyle/>
+          <a:p>
+            <a:pPr algn="ctr"/>
+            <a:r>
+              <a:rPr lang="en-IN" b="1" dirty="0">
+                <a:solidFill>
+                  <a:schemeClr val="lt1"/>
+                </a:solidFill>
+                <a:latin typeface="+mn-lt"/>
+                <a:ea typeface="+mn-ea"/>
+                <a:cs typeface="+mn-cs"/>
+              </a:rPr>
+              <a:t>AWS EKS</a:t>
+            </a:r>
+          </a:p>
+        </p:txBody>
+      </p:sp>
+      <p:sp>
+        <p:nvSpPr>
+          <p:cNvPr id="3" name="Content Placeholder 2">
+            <a:extLst>
+              <a:ext uri="{FF2B5EF4-FFF2-40B4-BE49-F238E27FC236}">
+                <a16:creationId xmlns:a16="http://schemas.microsoft.com/office/drawing/2014/main" id="{D3F11377-6BB3-4E47-B174-861CD150A86B}"/>
+              </a:ext>
+            </a:extLst>
+          </p:cNvPr>
+          <p:cNvSpPr>
+            <a:spLocks noGrp="1"/>
+          </p:cNvSpPr>
+          <p:nvPr>
+            <p:ph idx="1"/>
+          </p:nvPr>
+        </p:nvSpPr>
+        <p:spPr>
+          <a:xfrm>
+            <a:off x="847726" y="1858962"/>
+            <a:ext cx="10515599" cy="4070350"/>
+          </a:xfrm>
+        </p:spPr>
+        <p:txBody>
+          <a:bodyPr>
+            <a:noAutofit/>
+          </a:bodyPr>
+          <a:lstStyle/>
+          <a:p>
+            <a:pPr marL="0" indent="0">
+              <a:buNone/>
+            </a:pPr>
+            <a:r>
+              <a:rPr lang="en-US" sz="2400" b="0" i="0" dirty="0">
+                <a:solidFill>
+                  <a:srgbClr val="333333"/>
+                </a:solidFill>
+                <a:effectLst/>
+              </a:rPr>
+              <a:t>2.  Integrations with AWS networking and security services, such as application load balancers (ALBs) for load distribution</a:t>
+            </a:r>
+          </a:p>
+          <a:p>
+            <a:pPr marL="0" indent="0">
+              <a:buNone/>
+            </a:pPr>
+            <a:r>
+              <a:rPr lang="en-US" sz="2400" b="0" i="0" dirty="0">
+                <a:solidFill>
+                  <a:srgbClr val="333333"/>
+                </a:solidFill>
+                <a:effectLst/>
+              </a:rPr>
+              <a:t>3.  Amazon EKS lets you create, update, scale, and terminate nodes for your cluster with a single command.</a:t>
+            </a:r>
+            <a:endParaRPr lang="en-US" sz="2400" dirty="0"/>
+          </a:p>
+          <a:p>
+            <a:pPr marL="0" indent="0">
+              <a:buNone/>
+            </a:pPr>
+            <a:r>
+              <a:rPr lang="en-IN" sz="2600" b="0" i="0" u="sng" dirty="0">
+                <a:solidFill>
+                  <a:srgbClr val="444444"/>
+                </a:solidFill>
+                <a:effectLst/>
+              </a:rPr>
+              <a:t>Why not other tools:</a:t>
+            </a:r>
+          </a:p>
+          <a:p>
+            <a:pPr marL="342900" indent="-342900">
+              <a:buFont typeface="+mj-lt"/>
+              <a:buAutoNum type="arabicPeriod"/>
+            </a:pPr>
+            <a:r>
+              <a:rPr lang="en-US" sz="2400" b="0" i="0" dirty="0">
+                <a:solidFill>
+                  <a:schemeClr val="tx1">
+                    <a:lumMod val="85000"/>
+                    <a:lumOff val="15000"/>
+                  </a:schemeClr>
+                </a:solidFill>
+                <a:effectLst/>
+              </a:rPr>
+              <a:t>GKE will only match the EKS 99.95% SLA if you use Regional Clusters, which costs $0.10 per cluster per hour which is costlier than EKS</a:t>
+            </a:r>
+          </a:p>
+          <a:p>
+            <a:pPr marL="342900" indent="-342900">
+              <a:buFont typeface="+mj-lt"/>
+              <a:buAutoNum type="arabicPeriod"/>
+            </a:pPr>
+            <a:r>
+              <a:rPr lang="en-US" sz="2400" b="0" i="0" dirty="0">
+                <a:solidFill>
+                  <a:schemeClr val="tx1">
+                    <a:lumMod val="85000"/>
+                    <a:lumOff val="15000"/>
+                  </a:schemeClr>
+                </a:solidFill>
+                <a:effectLst/>
+              </a:rPr>
+              <a:t>Only one zonal cluster is free in GKE</a:t>
+            </a:r>
+          </a:p>
+          <a:p>
+            <a:pPr marL="342900" indent="-342900">
+              <a:buFont typeface="+mj-lt"/>
+              <a:buAutoNum type="arabicPeriod"/>
+            </a:pPr>
+            <a:r>
+              <a:rPr lang="en-US" sz="2400" b="0" i="0" dirty="0">
+                <a:solidFill>
+                  <a:schemeClr val="tx1">
+                    <a:lumMod val="85000"/>
+                    <a:lumOff val="15000"/>
+                  </a:schemeClr>
+                </a:solidFill>
+                <a:effectLst/>
+              </a:rPr>
+              <a:t>The network policies need to enabled when creating the cluster and cannot be enabled on an existing cluster in AKS</a:t>
+            </a:r>
+            <a:endParaRPr lang="en-US" sz="2400" dirty="0">
+              <a:solidFill>
+                <a:schemeClr val="tx1">
+                  <a:lumMod val="85000"/>
+                  <a:lumOff val="15000"/>
+                </a:schemeClr>
+              </a:solidFill>
+            </a:endParaRPr>
+          </a:p>
+        </p:txBody>
+      </p:sp>
+      <p:sp>
+        <p:nvSpPr>
+          <p:cNvPr id="4" name="Rectangle 3">
+            <a:extLst>
+              <a:ext uri="{FF2B5EF4-FFF2-40B4-BE49-F238E27FC236}">
+                <a16:creationId xmlns:a16="http://schemas.microsoft.com/office/drawing/2014/main" id="{8D973F9E-231E-4F4E-BF92-D9C84C7AB5A7}"/>
+              </a:ext>
+            </a:extLst>
+          </p:cNvPr>
+          <p:cNvSpPr/>
+          <p:nvPr/>
+        </p:nvSpPr>
+        <p:spPr>
+          <a:xfrm>
+            <a:off x="0" y="6067425"/>
+            <a:ext cx="9305925" cy="790575"/>
+          </a:xfrm>
+          <a:prstGeom prst="rect">
+            <a:avLst/>
+          </a:prstGeom>
+          <a:scene3d>
+            <a:camera prst="orthographicFront"/>
+            <a:lightRig rig="threePt" dir="t"/>
+          </a:scene3d>
+          <a:sp3d>
+            <a:bevelT w="114300" prst="hardEdge"/>
+          </a:sp3d>
+        </p:spPr>
+        <p:style>
+          <a:lnRef idx="2">
+            <a:schemeClr val="accent1">
+              <a:shade val="50000"/>
+            </a:schemeClr>
+          </a:lnRef>
+          <a:fillRef idx="1">
+            <a:schemeClr val="accent1"/>
+          </a:fillRef>
+          <a:effectRef idx="0">
+            <a:schemeClr val="accent1"/>
+          </a:effectRef>
+          <a:fontRef idx="minor">
+            <a:schemeClr val="lt1"/>
+          </a:fontRef>
+        </p:style>
+        <p:txBody>
+          <a:bodyPr rtlCol="0" anchor="ctr"/>
+          <a:lstStyle/>
+          <a:p>
+            <a:pPr algn="ctr"/>
+            <a:r>
+              <a:rPr lang="en-IN" sz="2000" b="1" dirty="0"/>
+              <a:t>WEDNESDAY’S WICKED ADVENTURES</a:t>
+            </a:r>
+          </a:p>
+        </p:txBody>
+      </p:sp>
+      <p:sp>
+        <p:nvSpPr>
+          <p:cNvPr id="5" name="Rectangle 4">
+            <a:extLst>
+              <a:ext uri="{FF2B5EF4-FFF2-40B4-BE49-F238E27FC236}">
+                <a16:creationId xmlns:a16="http://schemas.microsoft.com/office/drawing/2014/main" id="{ADD2B0B5-489C-4527-87A1-6AE32256E8B1}"/>
+              </a:ext>
+            </a:extLst>
+          </p:cNvPr>
+          <p:cNvSpPr/>
+          <p:nvPr/>
+        </p:nvSpPr>
+        <p:spPr>
+          <a:xfrm>
+            <a:off x="11363325" y="6067425"/>
+            <a:ext cx="828675" cy="790575"/>
+          </a:xfrm>
+          <a:prstGeom prst="rect">
+            <a:avLst/>
+          </a:prstGeom>
+          <a:scene3d>
+            <a:camera prst="orthographicFront"/>
+            <a:lightRig rig="threePt" dir="t"/>
+          </a:scene3d>
+          <a:sp3d>
+            <a:bevelT w="114300" prst="hardEdge"/>
+          </a:sp3d>
+        </p:spPr>
+        <p:style>
+          <a:lnRef idx="2">
+            <a:schemeClr val="accent1">
+              <a:shade val="50000"/>
+            </a:schemeClr>
+          </a:lnRef>
+          <a:fillRef idx="1">
+            <a:schemeClr val="accent1"/>
+          </a:fillRef>
+          <a:effectRef idx="0">
+            <a:schemeClr val="accent1"/>
+          </a:effectRef>
+          <a:fontRef idx="minor">
+            <a:schemeClr val="lt1"/>
+          </a:fontRef>
+        </p:style>
+        <p:txBody>
+          <a:bodyPr rtlCol="0" anchor="ctr"/>
+          <a:lstStyle/>
+          <a:p>
+            <a:pPr algn="ctr"/>
+            <a:endParaRPr lang="en-IN"/>
+          </a:p>
+        </p:txBody>
+      </p:sp>
+      <p:sp>
+        <p:nvSpPr>
+          <p:cNvPr id="6" name="Rectangle 5">
+            <a:extLst>
+              <a:ext uri="{FF2B5EF4-FFF2-40B4-BE49-F238E27FC236}">
+                <a16:creationId xmlns:a16="http://schemas.microsoft.com/office/drawing/2014/main" id="{8F298F8F-A536-48DC-9BA2-D0C59AC19A33}"/>
+              </a:ext>
+            </a:extLst>
+          </p:cNvPr>
+          <p:cNvSpPr/>
+          <p:nvPr/>
+        </p:nvSpPr>
+        <p:spPr>
+          <a:xfrm>
+            <a:off x="9305925" y="6067424"/>
+            <a:ext cx="2057400" cy="790575"/>
+          </a:xfrm>
+          <a:prstGeom prst="rect">
+            <a:avLst/>
+          </a:prstGeom>
+          <a:scene3d>
+            <a:camera prst="orthographicFront"/>
+            <a:lightRig rig="threePt" dir="t"/>
+          </a:scene3d>
+          <a:sp3d>
+            <a:bevelT w="114300" prst="hardEdge"/>
+          </a:sp3d>
+        </p:spPr>
+        <p:style>
+          <a:lnRef idx="2">
+            <a:schemeClr val="accent1">
+              <a:shade val="50000"/>
+            </a:schemeClr>
+          </a:lnRef>
+          <a:fillRef idx="1">
+            <a:schemeClr val="accent1"/>
+          </a:fillRef>
+          <a:effectRef idx="0">
+            <a:schemeClr val="accent1"/>
+          </a:effectRef>
+          <a:fontRef idx="minor">
+            <a:schemeClr val="lt1"/>
+          </a:fontRef>
+        </p:style>
+        <p:txBody>
+          <a:bodyPr rtlCol="0" anchor="ctr"/>
+          <a:lstStyle/>
+          <a:p>
+            <a:pPr algn="ctr"/>
+            <a:r>
+              <a:rPr lang="en-IN" sz="2000" b="1" dirty="0"/>
+              <a:t>APRIL 2022</a:t>
+            </a:r>
+          </a:p>
+        </p:txBody>
+      </p:sp>
+      <p:sp>
+        <p:nvSpPr>
+          <p:cNvPr id="8" name="Slide Number Placeholder 11">
+            <a:extLst>
+              <a:ext uri="{FF2B5EF4-FFF2-40B4-BE49-F238E27FC236}">
+                <a16:creationId xmlns:a16="http://schemas.microsoft.com/office/drawing/2014/main" id="{66E5E76B-63DE-49C5-B59F-65367A92139F}"/>
+              </a:ext>
+            </a:extLst>
+          </p:cNvPr>
+          <p:cNvSpPr>
+            <a:spLocks noGrp="1"/>
+          </p:cNvSpPr>
+          <p:nvPr>
+            <p:ph type="sldNum" sz="quarter" idx="12"/>
+          </p:nvPr>
+        </p:nvSpPr>
+        <p:spPr>
+          <a:xfrm>
+            <a:off x="11563349" y="6280148"/>
+            <a:ext cx="428625" cy="365125"/>
+          </a:xfrm>
+        </p:spPr>
+        <p:txBody>
+          <a:bodyPr/>
+          <a:lstStyle/>
+          <a:p>
+            <a:fld id="{F37EE007-93F6-4DD3-A485-65881C8FA8D0}" type="slidenum">
+              <a:rPr lang="en-IN" sz="2000" b="1" smtClean="0">
+                <a:solidFill>
+                  <a:schemeClr val="bg1"/>
+                </a:solidFill>
+              </a:rPr>
+              <a:t>12</a:t>
+            </a:fld>
+            <a:endParaRPr lang="en-IN" sz="2000" b="1" dirty="0">
+              <a:solidFill>
+                <a:schemeClr val="bg1"/>
+              </a:solidFill>
+            </a:endParaRPr>
+          </a:p>
+        </p:txBody>
+      </p:sp>
+    </p:spTree>
+    <p:extLst>
+      <p:ext uri="{BB962C8B-B14F-4D97-AF65-F5344CB8AC3E}">
+        <p14:creationId xmlns:p14="http://schemas.microsoft.com/office/powerpoint/2010/main" val="4180576491"/>
+      </p:ext>
+    </p:extLst>
+  </p:cSld>
+  <p:clrMapOvr>
+    <a:masterClrMapping/>
+  </p:clrMapOvr>
+</p:sld>
+</file>
+
+<file path=ppt/slides/slide13.xml><?xml version="1.0" encoding="utf-8"?>
+<p:sld xmlns:a="http://schemas.openxmlformats.org/drawingml/2006/main" xmlns:r="http://schemas.openxmlformats.org/officeDocument/2006/relationships" xmlns:p="http://schemas.openxmlformats.org/presentationml/2006/main">
+  <p:cSld>
+    <p:spTree>
+      <p:nvGrpSpPr>
+        <p:cNvPr id="1" name=""/>
+        <p:cNvGrpSpPr/>
+        <p:nvPr/>
+      </p:nvGrpSpPr>
+      <p:grpSpPr>
+        <a:xfrm>
+          <a:off x="0" y="0"/>
+          <a:ext cx="0" cy="0"/>
+          <a:chOff x="0" y="0"/>
+          <a:chExt cx="0" cy="0"/>
+        </a:xfrm>
+      </p:grpSpPr>
+      <p:sp>
+        <p:nvSpPr>
+          <p:cNvPr id="2" name="Title 1">
+            <a:extLst>
+              <a:ext uri="{FF2B5EF4-FFF2-40B4-BE49-F238E27FC236}">
+                <a16:creationId xmlns:a16="http://schemas.microsoft.com/office/drawing/2014/main" id="{FED447EA-CAB5-4B9D-8BA6-B4AFD140C0A9}"/>
+              </a:ext>
+            </a:extLst>
+          </p:cNvPr>
+          <p:cNvSpPr>
+            <a:spLocks noGrp="1"/>
+          </p:cNvSpPr>
+          <p:nvPr>
+            <p:ph type="title"/>
+          </p:nvPr>
+        </p:nvSpPr>
+        <p:spPr/>
+        <p:txBody>
+          <a:bodyPr/>
+          <a:lstStyle/>
+          <a:p>
+            <a:r>
+              <a:rPr lang="en-IN" b="1" dirty="0" err="1">
+                <a:solidFill>
+                  <a:schemeClr val="lt1"/>
+                </a:solidFill>
+                <a:latin typeface="+mn-lt"/>
+                <a:ea typeface="+mn-ea"/>
+                <a:cs typeface="+mn-cs"/>
+              </a:rPr>
+              <a:t>ytest</a:t>
+            </a:r>
+            <a:r>
+              <a:rPr lang="en-IN" b="1" dirty="0">
+                <a:solidFill>
+                  <a:schemeClr val="lt1"/>
+                </a:solidFill>
+                <a:latin typeface="+mn-lt"/>
+                <a:ea typeface="+mn-ea"/>
+                <a:cs typeface="+mn-cs"/>
+              </a:rPr>
+              <a:t> for unit </a:t>
+            </a:r>
+            <a:r>
+              <a:rPr lang="en-IN" b="1" dirty="0" err="1">
+                <a:solidFill>
+                  <a:schemeClr val="lt1"/>
+                </a:solidFill>
+                <a:latin typeface="+mn-lt"/>
+                <a:ea typeface="+mn-ea"/>
+                <a:cs typeface="+mn-cs"/>
+              </a:rPr>
+              <a:t>testingest</a:t>
+            </a:r>
+            <a:r>
+              <a:rPr lang="en-IN" b="1" dirty="0">
+                <a:solidFill>
+                  <a:schemeClr val="lt1"/>
+                </a:solidFill>
+                <a:latin typeface="+mn-lt"/>
+                <a:ea typeface="+mn-ea"/>
+                <a:cs typeface="+mn-cs"/>
+              </a:rPr>
+              <a:t> for unit </a:t>
+            </a:r>
+            <a:r>
+              <a:rPr lang="en-IN" b="1" dirty="0" err="1">
+                <a:solidFill>
+                  <a:schemeClr val="lt1"/>
+                </a:solidFill>
+                <a:latin typeface="+mn-lt"/>
+                <a:ea typeface="+mn-ea"/>
+                <a:cs typeface="+mn-cs"/>
+              </a:rPr>
+              <a:t>testingor</a:t>
+            </a:r>
+            <a:r>
+              <a:rPr lang="en-IN" b="1" dirty="0">
+                <a:solidFill>
+                  <a:schemeClr val="lt1"/>
+                </a:solidFill>
+                <a:latin typeface="+mn-lt"/>
+                <a:ea typeface="+mn-ea"/>
+                <a:cs typeface="+mn-cs"/>
+              </a:rPr>
+              <a:t> unit testing</a:t>
+            </a:r>
+            <a:endParaRPr lang="en-IE" dirty="0"/>
+          </a:p>
+        </p:txBody>
+      </p:sp>
+      <p:sp>
+        <p:nvSpPr>
+          <p:cNvPr id="3" name="Content Placeholder 2">
+            <a:extLst>
+              <a:ext uri="{FF2B5EF4-FFF2-40B4-BE49-F238E27FC236}">
+                <a16:creationId xmlns:a16="http://schemas.microsoft.com/office/drawing/2014/main" id="{B8C2C50D-E651-47FD-8B7C-D05DDE3A937A}"/>
+              </a:ext>
+            </a:extLst>
+          </p:cNvPr>
+          <p:cNvSpPr>
+            <a:spLocks noGrp="1"/>
+          </p:cNvSpPr>
+          <p:nvPr>
+            <p:ph idx="1"/>
+          </p:nvPr>
+        </p:nvSpPr>
+        <p:spPr/>
+        <p:txBody>
+          <a:bodyPr/>
+          <a:lstStyle/>
+          <a:p>
+            <a:r>
+              <a:rPr lang="en-US" dirty="0"/>
+              <a:t>PyTest is a testing framework that allows users to write test scripts in Python.</a:t>
+            </a:r>
+          </a:p>
+          <a:p>
+            <a:r>
+              <a:rPr lang="en-US" dirty="0"/>
+              <a:t>It helps with the development of tests ranging from </a:t>
+            </a:r>
+            <a:br>
+              <a:rPr lang="en-US" dirty="0"/>
+            </a:br>
+            <a:r>
+              <a:rPr lang="en-US" dirty="0"/>
+              <a:t>simple unit tests to large functional tests.</a:t>
+            </a:r>
+          </a:p>
+          <a:p>
+            <a:r>
+              <a:rPr lang="en-IE" dirty="0"/>
+              <a:t>Pytest is very easy, open source and run the test in parallel manner.</a:t>
+            </a:r>
+          </a:p>
+          <a:p>
+            <a:r>
+              <a:rPr lang="en-IE" dirty="0"/>
+              <a:t>Unit testing has been performed using PyTest.</a:t>
+            </a:r>
+          </a:p>
+          <a:p>
+            <a:r>
+              <a:rPr lang="en-IE" dirty="0"/>
+              <a:t>Integration of PyTest in GitHub action using python application.</a:t>
+            </a:r>
+          </a:p>
+          <a:p>
+            <a:r>
+              <a:rPr lang="en-IN" dirty="0">
+                <a:solidFill>
+                  <a:srgbClr val="24292F"/>
+                </a:solidFill>
+                <a:latin typeface="-apple-system"/>
+              </a:rPr>
+              <a:t>Details provided in the Git Wiki link in our repository. Click </a:t>
+            </a:r>
+            <a:r>
+              <a:rPr lang="en-IN" dirty="0">
+                <a:solidFill>
+                  <a:srgbClr val="24292F"/>
+                </a:solidFill>
+                <a:latin typeface="-apple-system"/>
+                <a:hlinkClick r:id="rId2"/>
+              </a:rPr>
+              <a:t>here</a:t>
+            </a:r>
+            <a:r>
+              <a:rPr lang="en-IN" dirty="0">
+                <a:solidFill>
+                  <a:srgbClr val="24292F"/>
+                </a:solidFill>
+                <a:latin typeface="-apple-system"/>
+              </a:rPr>
+              <a:t>.</a:t>
+            </a:r>
+          </a:p>
+          <a:p>
+            <a:pPr algn="just"/>
+            <a:endParaRPr lang="en-US" dirty="0"/>
+          </a:p>
+          <a:p>
+            <a:endParaRPr lang="en-IE" dirty="0"/>
+          </a:p>
+        </p:txBody>
+      </p:sp>
+      <p:sp>
+        <p:nvSpPr>
+          <p:cNvPr id="4" name="Title 1">
+            <a:extLst>
+              <a:ext uri="{FF2B5EF4-FFF2-40B4-BE49-F238E27FC236}">
+                <a16:creationId xmlns:a16="http://schemas.microsoft.com/office/drawing/2014/main" id="{FCE4FA1B-AECD-41C7-9705-D28E86BF5E04}"/>
+              </a:ext>
+            </a:extLst>
+          </p:cNvPr>
+          <p:cNvSpPr txBox="1">
+            <a:spLocks/>
+          </p:cNvSpPr>
+          <p:nvPr/>
+        </p:nvSpPr>
+        <p:spPr>
+          <a:xfrm>
+            <a:off x="838200" y="467925"/>
+            <a:ext cx="10515600" cy="1119961"/>
+          </a:xfrm>
+          <a:prstGeom prst="rect">
+            <a:avLst/>
+          </a:prstGeom>
+          <a:effectLst>
+            <a:outerShdw blurRad="50800" dist="38100" dir="5400000" algn="t" rotWithShape="0">
+              <a:prstClr val="black">
+                <a:alpha val="40000"/>
+              </a:prstClr>
+            </a:outerShdw>
+          </a:effectLst>
+        </p:spPr>
+        <p:style>
+          <a:lnRef idx="3">
+            <a:schemeClr val="lt1"/>
+          </a:lnRef>
+          <a:fillRef idx="1">
+            <a:schemeClr val="accent5"/>
+          </a:fillRef>
+          <a:effectRef idx="1">
+            <a:schemeClr val="accent5"/>
+          </a:effectRef>
+          <a:fontRef idx="minor">
+            <a:schemeClr val="lt1"/>
+          </a:fontRef>
+        </p:style>
+        <p:txBody>
+          <a:bodyPr vert="horz" lIns="91440" tIns="45720" rIns="91440" bIns="45720" rtlCol="0" anchor="ctr">
+            <a:normAutofit/>
+          </a:bodyPr>
+          <a:lstStyle>
+            <a:lvl1pPr algn="l" defTabSz="914400" rtl="0" eaLnBrk="1" latinLnBrk="0" hangingPunct="1">
+              <a:lnSpc>
+                <a:spcPct val="90000"/>
+              </a:lnSpc>
+              <a:spcBef>
+                <a:spcPct val="0"/>
+              </a:spcBef>
+              <a:buNone/>
+              <a:defRPr sz="4400" kern="1200">
+                <a:solidFill>
+                  <a:schemeClr val="lt1"/>
+                </a:solidFill>
+                <a:latin typeface="+mn-lt"/>
+                <a:ea typeface="+mn-ea"/>
+                <a:cs typeface="+mn-cs"/>
+              </a:defRPr>
+            </a:lvl1pPr>
+            <a:lvl2pPr>
+              <a:defRPr>
+                <a:solidFill>
+                  <a:schemeClr val="lt1"/>
+                </a:solidFill>
+                <a:latin typeface="+mn-lt"/>
+                <a:ea typeface="+mn-ea"/>
+                <a:cs typeface="+mn-cs"/>
+              </a:defRPr>
+            </a:lvl2pPr>
+            <a:lvl3pPr>
+              <a:defRPr>
+                <a:solidFill>
+                  <a:schemeClr val="lt1"/>
+                </a:solidFill>
+                <a:latin typeface="+mn-lt"/>
+                <a:ea typeface="+mn-ea"/>
+                <a:cs typeface="+mn-cs"/>
+              </a:defRPr>
+            </a:lvl3pPr>
+            <a:lvl4pPr>
+              <a:defRPr>
+                <a:solidFill>
+                  <a:schemeClr val="lt1"/>
+                </a:solidFill>
+                <a:latin typeface="+mn-lt"/>
+                <a:ea typeface="+mn-ea"/>
+                <a:cs typeface="+mn-cs"/>
+              </a:defRPr>
+            </a:lvl4pPr>
+            <a:lvl5pPr>
+              <a:defRPr>
+                <a:solidFill>
+                  <a:schemeClr val="lt1"/>
+                </a:solidFill>
+                <a:latin typeface="+mn-lt"/>
+                <a:ea typeface="+mn-ea"/>
+                <a:cs typeface="+mn-cs"/>
+              </a:defRPr>
+            </a:lvl5pPr>
+            <a:lvl6pPr>
+              <a:defRPr>
+                <a:solidFill>
+                  <a:schemeClr val="lt1"/>
+                </a:solidFill>
+                <a:latin typeface="+mn-lt"/>
+                <a:ea typeface="+mn-ea"/>
+                <a:cs typeface="+mn-cs"/>
+              </a:defRPr>
+            </a:lvl6pPr>
+            <a:lvl7pPr>
+              <a:defRPr>
+                <a:solidFill>
+                  <a:schemeClr val="lt1"/>
+                </a:solidFill>
+                <a:latin typeface="+mn-lt"/>
+                <a:ea typeface="+mn-ea"/>
+                <a:cs typeface="+mn-cs"/>
+              </a:defRPr>
+            </a:lvl7pPr>
+            <a:lvl8pPr>
+              <a:defRPr>
+                <a:solidFill>
+                  <a:schemeClr val="lt1"/>
+                </a:solidFill>
+                <a:latin typeface="+mn-lt"/>
+                <a:ea typeface="+mn-ea"/>
+                <a:cs typeface="+mn-cs"/>
+              </a:defRPr>
+            </a:lvl8pPr>
+            <a:lvl9pPr>
+              <a:defRPr>
+                <a:solidFill>
+                  <a:schemeClr val="lt1"/>
+                </a:solidFill>
+                <a:latin typeface="+mn-lt"/>
+                <a:ea typeface="+mn-ea"/>
+                <a:cs typeface="+mn-cs"/>
+              </a:defRPr>
+            </a:lvl9pPr>
+          </a:lstStyle>
+          <a:p>
+            <a:pPr algn="ctr"/>
+            <a:r>
+              <a:rPr lang="en-IN" b="1" dirty="0"/>
+              <a:t>2</a:t>
+            </a:r>
+            <a:r>
+              <a:rPr lang="en-IN" b="1" dirty="0">
+                <a:solidFill>
+                  <a:schemeClr val="lt1"/>
+                </a:solidFill>
+                <a:latin typeface="+mn-lt"/>
+                <a:ea typeface="+mn-ea"/>
+                <a:cs typeface="+mn-cs"/>
+              </a:rPr>
+              <a:t>. PYTEST – UNIT TESTING</a:t>
+            </a:r>
+            <a:endParaRPr lang="en-IN" b="1" dirty="0"/>
+          </a:p>
+        </p:txBody>
+      </p:sp>
+      <p:sp>
+        <p:nvSpPr>
+          <p:cNvPr id="5" name="Rectangle 4">
+            <a:extLst>
+              <a:ext uri="{FF2B5EF4-FFF2-40B4-BE49-F238E27FC236}">
+                <a16:creationId xmlns:a16="http://schemas.microsoft.com/office/drawing/2014/main" id="{A5735CB3-EFF2-4294-9358-B66E9097731B}"/>
+              </a:ext>
+            </a:extLst>
+          </p:cNvPr>
+          <p:cNvSpPr/>
+          <p:nvPr/>
+        </p:nvSpPr>
+        <p:spPr>
+          <a:xfrm>
+            <a:off x="0" y="6067425"/>
+            <a:ext cx="9305925" cy="790575"/>
+          </a:xfrm>
+          <a:prstGeom prst="rect">
+            <a:avLst/>
+          </a:prstGeom>
+          <a:scene3d>
+            <a:camera prst="orthographicFront"/>
+            <a:lightRig rig="threePt" dir="t"/>
+          </a:scene3d>
+          <a:sp3d>
+            <a:bevelT w="114300" prst="hardEdge"/>
+          </a:sp3d>
+        </p:spPr>
+        <p:style>
+          <a:lnRef idx="2">
+            <a:schemeClr val="accent1">
+              <a:shade val="50000"/>
+            </a:schemeClr>
+          </a:lnRef>
+          <a:fillRef idx="1">
+            <a:schemeClr val="accent1"/>
+          </a:fillRef>
+          <a:effectRef idx="0">
+            <a:schemeClr val="accent1"/>
+          </a:effectRef>
+          <a:fontRef idx="minor">
+            <a:schemeClr val="lt1"/>
+          </a:fontRef>
+        </p:style>
+        <p:txBody>
+          <a:bodyPr rtlCol="0" anchor="ctr"/>
+          <a:lstStyle/>
+          <a:p>
+            <a:pPr algn="ctr"/>
+            <a:r>
+              <a:rPr lang="en-IN" sz="2000" b="1" dirty="0"/>
+              <a:t>WEDNESDAY’S WICKED ADVENTURES</a:t>
+            </a:r>
+          </a:p>
+        </p:txBody>
+      </p:sp>
+      <p:sp>
+        <p:nvSpPr>
+          <p:cNvPr id="6" name="Rectangle 5">
+            <a:extLst>
+              <a:ext uri="{FF2B5EF4-FFF2-40B4-BE49-F238E27FC236}">
+                <a16:creationId xmlns:a16="http://schemas.microsoft.com/office/drawing/2014/main" id="{F14345D9-9892-4B92-9278-8A31183A7CCF}"/>
+              </a:ext>
+            </a:extLst>
+          </p:cNvPr>
+          <p:cNvSpPr/>
+          <p:nvPr/>
+        </p:nvSpPr>
+        <p:spPr>
+          <a:xfrm>
+            <a:off x="11363325" y="6067425"/>
+            <a:ext cx="828675" cy="790575"/>
+          </a:xfrm>
+          <a:prstGeom prst="rect">
+            <a:avLst/>
+          </a:prstGeom>
+          <a:scene3d>
+            <a:camera prst="orthographicFront"/>
+            <a:lightRig rig="threePt" dir="t"/>
+          </a:scene3d>
+          <a:sp3d>
+            <a:bevelT w="114300" prst="hardEdge"/>
+          </a:sp3d>
+        </p:spPr>
+        <p:style>
+          <a:lnRef idx="2">
+            <a:schemeClr val="accent1">
+              <a:shade val="50000"/>
+            </a:schemeClr>
+          </a:lnRef>
+          <a:fillRef idx="1">
+            <a:schemeClr val="accent1"/>
+          </a:fillRef>
+          <a:effectRef idx="0">
+            <a:schemeClr val="accent1"/>
+          </a:effectRef>
+          <a:fontRef idx="minor">
+            <a:schemeClr val="lt1"/>
+          </a:fontRef>
+        </p:style>
+        <p:txBody>
+          <a:bodyPr rtlCol="0" anchor="ctr"/>
+          <a:lstStyle/>
+          <a:p>
+            <a:pPr algn="ctr"/>
+            <a:endParaRPr lang="en-IN"/>
+          </a:p>
+        </p:txBody>
+      </p:sp>
+      <p:sp>
+        <p:nvSpPr>
+          <p:cNvPr id="7" name="Rectangle 6">
+            <a:extLst>
+              <a:ext uri="{FF2B5EF4-FFF2-40B4-BE49-F238E27FC236}">
+                <a16:creationId xmlns:a16="http://schemas.microsoft.com/office/drawing/2014/main" id="{8181087D-DD49-49AE-95D9-420C4E4FDA6F}"/>
+              </a:ext>
+            </a:extLst>
+          </p:cNvPr>
+          <p:cNvSpPr/>
+          <p:nvPr/>
+        </p:nvSpPr>
+        <p:spPr>
+          <a:xfrm>
+            <a:off x="9305925" y="6067424"/>
+            <a:ext cx="2057400" cy="790575"/>
+          </a:xfrm>
+          <a:prstGeom prst="rect">
+            <a:avLst/>
+          </a:prstGeom>
+          <a:scene3d>
+            <a:camera prst="orthographicFront"/>
+            <a:lightRig rig="threePt" dir="t"/>
+          </a:scene3d>
+          <a:sp3d>
+            <a:bevelT w="114300" prst="hardEdge"/>
+          </a:sp3d>
+        </p:spPr>
+        <p:style>
+          <a:lnRef idx="2">
+            <a:schemeClr val="accent1">
+              <a:shade val="50000"/>
+            </a:schemeClr>
+          </a:lnRef>
+          <a:fillRef idx="1">
+            <a:schemeClr val="accent1"/>
+          </a:fillRef>
+          <a:effectRef idx="0">
+            <a:schemeClr val="accent1"/>
+          </a:effectRef>
+          <a:fontRef idx="minor">
+            <a:schemeClr val="lt1"/>
+          </a:fontRef>
+        </p:style>
+        <p:txBody>
+          <a:bodyPr rtlCol="0" anchor="ctr"/>
+          <a:lstStyle/>
+          <a:p>
+            <a:pPr algn="ctr"/>
+            <a:r>
+              <a:rPr lang="en-IN" sz="2000" b="1" dirty="0"/>
+              <a:t>APRIL 2022</a:t>
+            </a:r>
+          </a:p>
+        </p:txBody>
+      </p:sp>
+      <p:sp>
+        <p:nvSpPr>
+          <p:cNvPr id="8" name="Slide Number Placeholder 11">
+            <a:extLst>
+              <a:ext uri="{FF2B5EF4-FFF2-40B4-BE49-F238E27FC236}">
+                <a16:creationId xmlns:a16="http://schemas.microsoft.com/office/drawing/2014/main" id="{3A49B4D6-43AE-4DAB-AF72-D53FA9B65599}"/>
+              </a:ext>
+            </a:extLst>
+          </p:cNvPr>
+          <p:cNvSpPr>
+            <a:spLocks noGrp="1"/>
+          </p:cNvSpPr>
+          <p:nvPr>
+            <p:ph type="sldNum" sz="quarter" idx="12"/>
+          </p:nvPr>
+        </p:nvSpPr>
+        <p:spPr>
+          <a:xfrm>
+            <a:off x="11563349" y="6280148"/>
+            <a:ext cx="428625" cy="365125"/>
+          </a:xfrm>
+        </p:spPr>
+        <p:txBody>
+          <a:bodyPr/>
+          <a:lstStyle/>
+          <a:p>
+            <a:fld id="{F37EE007-93F6-4DD3-A485-65881C8FA8D0}" type="slidenum">
+              <a:rPr lang="en-IN" sz="1800" b="1" smtClean="0">
+                <a:solidFill>
+                  <a:schemeClr val="bg1"/>
+                </a:solidFill>
+              </a:rPr>
+              <a:t>13</a:t>
+            </a:fld>
+            <a:endParaRPr lang="en-IN" sz="1800" b="1" dirty="0">
+              <a:solidFill>
+                <a:schemeClr val="bg1"/>
+              </a:solidFill>
+            </a:endParaRPr>
+          </a:p>
+        </p:txBody>
+      </p:sp>
+    </p:spTree>
+    <p:extLst>
+      <p:ext uri="{BB962C8B-B14F-4D97-AF65-F5344CB8AC3E}">
+        <p14:creationId xmlns:p14="http://schemas.microsoft.com/office/powerpoint/2010/main" val="1818624087"/>
+      </p:ext>
+    </p:extLst>
+  </p:cSld>
+  <p:clrMapOvr>
+    <a:masterClrMapping/>
+  </p:clrMapOvr>
+</p:sld>
+</file>
+
+<file path=ppt/slides/slide14.xml><?xml version="1.0" encoding="utf-8"?>
+<p:sld xmlns:a="http://schemas.openxmlformats.org/drawingml/2006/main" xmlns:r="http://schemas.openxmlformats.org/officeDocument/2006/relationships" xmlns:p="http://schemas.openxmlformats.org/presentationml/2006/main">
+  <p:cSld>
+    <p:spTree>
+      <p:nvGrpSpPr>
+        <p:cNvPr id="1" name=""/>
+        <p:cNvGrpSpPr/>
+        <p:nvPr/>
+      </p:nvGrpSpPr>
+      <p:grpSpPr>
+        <a:xfrm>
+          <a:off x="0" y="0"/>
+          <a:ext cx="0" cy="0"/>
+          <a:chOff x="0" y="0"/>
+          <a:chExt cx="0" cy="0"/>
+        </a:xfrm>
+      </p:grpSpPr>
+      <p:sp>
+        <p:nvSpPr>
+          <p:cNvPr id="2" name="Title 1">
+            <a:extLst>
+              <a:ext uri="{FF2B5EF4-FFF2-40B4-BE49-F238E27FC236}">
+                <a16:creationId xmlns:a16="http://schemas.microsoft.com/office/drawing/2014/main" id="{C0666519-3484-48F3-927E-47679DE94711}"/>
+              </a:ext>
+            </a:extLst>
+          </p:cNvPr>
+          <p:cNvSpPr>
+            <a:spLocks noGrp="1"/>
+          </p:cNvSpPr>
+          <p:nvPr>
+            <p:ph type="title"/>
+          </p:nvPr>
+        </p:nvSpPr>
+        <p:spPr>
+          <a:xfrm>
+            <a:off x="838200" y="403398"/>
+            <a:ext cx="10515600" cy="1119961"/>
+          </a:xfrm>
+          <a:effectLst>
+            <a:outerShdw blurRad="50800" dist="38100" dir="5400000" algn="t" rotWithShape="0">
+              <a:prstClr val="black">
+                <a:alpha val="40000"/>
+              </a:prstClr>
+            </a:outerShdw>
+          </a:effectLst>
+        </p:spPr>
+        <p:style>
+          <a:lnRef idx="3">
+            <a:schemeClr val="lt1"/>
+          </a:lnRef>
+          <a:fillRef idx="1">
+            <a:schemeClr val="accent5"/>
+          </a:fillRef>
+          <a:effectRef idx="1">
+            <a:schemeClr val="accent5"/>
+          </a:effectRef>
+          <a:fontRef idx="minor">
+            <a:schemeClr val="lt1"/>
+          </a:fontRef>
+        </p:style>
+        <p:txBody>
+          <a:bodyPr/>
+          <a:lstStyle/>
+          <a:p>
+            <a:pPr algn="ctr"/>
+            <a:r>
+              <a:rPr lang="en-IN" b="1" dirty="0"/>
+              <a:t>5. SPHINX TOOL - AUTO DOCUMENTATION</a:t>
+            </a:r>
+          </a:p>
+        </p:txBody>
+      </p:sp>
+      <p:sp>
+        <p:nvSpPr>
+          <p:cNvPr id="3" name="Content Placeholder 2">
+            <a:extLst>
+              <a:ext uri="{FF2B5EF4-FFF2-40B4-BE49-F238E27FC236}">
+                <a16:creationId xmlns:a16="http://schemas.microsoft.com/office/drawing/2014/main" id="{D3F11377-6BB3-4E47-B174-861CD150A86B}"/>
+              </a:ext>
+            </a:extLst>
+          </p:cNvPr>
+          <p:cNvSpPr>
+            <a:spLocks noGrp="1"/>
+          </p:cNvSpPr>
+          <p:nvPr>
+            <p:ph idx="1"/>
+          </p:nvPr>
+        </p:nvSpPr>
+        <p:spPr>
+          <a:xfrm>
+            <a:off x="838200" y="2836599"/>
+            <a:ext cx="10143062" cy="3154279"/>
+          </a:xfrm>
+        </p:spPr>
+        <p:txBody>
+          <a:bodyPr>
+            <a:normAutofit fontScale="92500" lnSpcReduction="20000"/>
+          </a:bodyPr>
+          <a:lstStyle/>
+          <a:p>
+            <a:pPr algn="just"/>
+            <a:r>
+              <a:rPr lang="en-US" dirty="0"/>
+              <a:t>An Open-source third party Tool used for auto documentation.</a:t>
+            </a:r>
+          </a:p>
+          <a:p>
+            <a:pPr algn="just"/>
+            <a:r>
+              <a:rPr lang="en-IN" b="0" i="0" dirty="0">
+                <a:solidFill>
+                  <a:srgbClr val="24292F"/>
+                </a:solidFill>
+                <a:effectLst/>
+                <a:latin typeface="-apple-system"/>
+              </a:rPr>
+              <a:t>A documentation generator written in python language.</a:t>
+            </a:r>
+          </a:p>
+          <a:p>
+            <a:pPr algn="just"/>
+            <a:r>
+              <a:rPr lang="en-IN" dirty="0">
+                <a:solidFill>
+                  <a:srgbClr val="24292F"/>
+                </a:solidFill>
+                <a:latin typeface="-apple-system"/>
+              </a:rPr>
+              <a:t>Implementation of Sphinx tool by creating YAML file using “GitHub Actions”.</a:t>
+            </a:r>
+          </a:p>
+          <a:p>
+            <a:pPr algn="just"/>
+            <a:r>
+              <a:rPr lang="en-IN" dirty="0">
+                <a:solidFill>
+                  <a:srgbClr val="24292F"/>
+                </a:solidFill>
+                <a:latin typeface="-apple-system"/>
+              </a:rPr>
+              <a:t>Themes available in the URL below : </a:t>
+            </a:r>
+          </a:p>
+          <a:p>
+            <a:pPr marL="0" indent="0" algn="ctr">
+              <a:buNone/>
+            </a:pPr>
+            <a:r>
+              <a:rPr lang="en-IN" dirty="0">
+                <a:solidFill>
+                  <a:srgbClr val="24292F"/>
+                </a:solidFill>
+                <a:latin typeface="-apple-system"/>
+                <a:hlinkClick r:id="rId2"/>
+              </a:rPr>
+              <a:t>https://www.sphinx-doc.org/en/master/usage/theming.html</a:t>
+            </a:r>
+            <a:endParaRPr lang="en-IN" dirty="0">
+              <a:solidFill>
+                <a:srgbClr val="24292F"/>
+              </a:solidFill>
+              <a:latin typeface="-apple-system"/>
+            </a:endParaRPr>
+          </a:p>
+          <a:p>
+            <a:pPr algn="just"/>
+            <a:r>
+              <a:rPr lang="en-IN" dirty="0">
+                <a:solidFill>
+                  <a:srgbClr val="24292F"/>
+                </a:solidFill>
+                <a:latin typeface="-apple-system"/>
+              </a:rPr>
+              <a:t>Details provided in the Git Wiki link in our repository. Click </a:t>
+            </a:r>
+            <a:r>
+              <a:rPr lang="en-IN" dirty="0">
+                <a:solidFill>
+                  <a:srgbClr val="24292F"/>
+                </a:solidFill>
+                <a:latin typeface="-apple-system"/>
+                <a:hlinkClick r:id="rId3"/>
+              </a:rPr>
+              <a:t>here</a:t>
+            </a:r>
+            <a:r>
+              <a:rPr lang="en-IN" dirty="0">
+                <a:solidFill>
+                  <a:srgbClr val="24292F"/>
+                </a:solidFill>
+                <a:latin typeface="-apple-system"/>
+              </a:rPr>
+              <a:t>.</a:t>
+            </a:r>
+          </a:p>
+          <a:p>
+            <a:pPr algn="just"/>
+            <a:r>
+              <a:rPr lang="en-IN" dirty="0">
+                <a:solidFill>
+                  <a:srgbClr val="24292F"/>
+                </a:solidFill>
+                <a:latin typeface="-apple-system"/>
+              </a:rPr>
+              <a:t>Branch created for auto documentation – ‘</a:t>
+            </a:r>
+            <a:r>
+              <a:rPr lang="en-IN" dirty="0" err="1">
+                <a:solidFill>
+                  <a:srgbClr val="24292F"/>
+                </a:solidFill>
+                <a:latin typeface="-apple-system"/>
+              </a:rPr>
+              <a:t>gh</a:t>
+            </a:r>
+            <a:r>
+              <a:rPr lang="en-IN" dirty="0">
+                <a:solidFill>
+                  <a:srgbClr val="24292F"/>
+                </a:solidFill>
+                <a:latin typeface="-apple-system"/>
+              </a:rPr>
+              <a:t>-pages’ (Default).</a:t>
+            </a:r>
+          </a:p>
+          <a:p>
+            <a:pPr algn="just"/>
+            <a:endParaRPr lang="en-IN" dirty="0"/>
+          </a:p>
+        </p:txBody>
+      </p:sp>
+      <p:sp>
+        <p:nvSpPr>
+          <p:cNvPr id="4" name="Rectangle 3">
+            <a:extLst>
+              <a:ext uri="{FF2B5EF4-FFF2-40B4-BE49-F238E27FC236}">
+                <a16:creationId xmlns:a16="http://schemas.microsoft.com/office/drawing/2014/main" id="{8D973F9E-231E-4F4E-BF92-D9C84C7AB5A7}"/>
+              </a:ext>
+            </a:extLst>
+          </p:cNvPr>
+          <p:cNvSpPr/>
+          <p:nvPr/>
+        </p:nvSpPr>
+        <p:spPr>
+          <a:xfrm>
+            <a:off x="0" y="6067425"/>
+            <a:ext cx="9305925" cy="790575"/>
+          </a:xfrm>
+          <a:prstGeom prst="rect">
+            <a:avLst/>
+          </a:prstGeom>
+          <a:scene3d>
+            <a:camera prst="orthographicFront"/>
+            <a:lightRig rig="threePt" dir="t"/>
+          </a:scene3d>
+          <a:sp3d>
+            <a:bevelT w="114300" prst="hardEdge"/>
+          </a:sp3d>
+        </p:spPr>
+        <p:style>
+          <a:lnRef idx="2">
+            <a:schemeClr val="accent1">
+              <a:shade val="50000"/>
+            </a:schemeClr>
+          </a:lnRef>
+          <a:fillRef idx="1">
+            <a:schemeClr val="accent1"/>
+          </a:fillRef>
+          <a:effectRef idx="0">
+            <a:schemeClr val="accent1"/>
+          </a:effectRef>
+          <a:fontRef idx="minor">
+            <a:schemeClr val="lt1"/>
+          </a:fontRef>
+        </p:style>
+        <p:txBody>
+          <a:bodyPr rtlCol="0" anchor="ctr"/>
+          <a:lstStyle/>
+          <a:p>
+            <a:pPr algn="ctr"/>
+            <a:r>
+              <a:rPr lang="en-IN" sz="2000" b="1" dirty="0"/>
+              <a:t>WEDNESDAY’S WICKED ADVENTURES</a:t>
+            </a:r>
+          </a:p>
+        </p:txBody>
+      </p:sp>
+      <p:sp>
+        <p:nvSpPr>
+          <p:cNvPr id="5" name="Rectangle 4">
+            <a:extLst>
+              <a:ext uri="{FF2B5EF4-FFF2-40B4-BE49-F238E27FC236}">
+                <a16:creationId xmlns:a16="http://schemas.microsoft.com/office/drawing/2014/main" id="{ADD2B0B5-489C-4527-87A1-6AE32256E8B1}"/>
+              </a:ext>
+            </a:extLst>
+          </p:cNvPr>
+          <p:cNvSpPr/>
+          <p:nvPr/>
+        </p:nvSpPr>
+        <p:spPr>
+          <a:xfrm>
+            <a:off x="11363325" y="6067425"/>
+            <a:ext cx="828675" cy="790575"/>
+          </a:xfrm>
+          <a:prstGeom prst="rect">
+            <a:avLst/>
+          </a:prstGeom>
+          <a:scene3d>
+            <a:camera prst="orthographicFront"/>
+            <a:lightRig rig="threePt" dir="t"/>
+          </a:scene3d>
+          <a:sp3d>
+            <a:bevelT w="114300" prst="hardEdge"/>
+          </a:sp3d>
+        </p:spPr>
+        <p:style>
+          <a:lnRef idx="2">
+            <a:schemeClr val="accent1">
+              <a:shade val="50000"/>
+            </a:schemeClr>
+          </a:lnRef>
+          <a:fillRef idx="1">
+            <a:schemeClr val="accent1"/>
+          </a:fillRef>
+          <a:effectRef idx="0">
+            <a:schemeClr val="accent1"/>
+          </a:effectRef>
+          <a:fontRef idx="minor">
+            <a:schemeClr val="lt1"/>
+          </a:fontRef>
+        </p:style>
+        <p:txBody>
+          <a:bodyPr rtlCol="0" anchor="ctr"/>
+          <a:lstStyle/>
+          <a:p>
+            <a:pPr algn="ctr"/>
+            <a:endParaRPr lang="en-IN"/>
+          </a:p>
+        </p:txBody>
+      </p:sp>
+      <p:sp>
+        <p:nvSpPr>
+          <p:cNvPr id="6" name="Rectangle 5">
+            <a:extLst>
+              <a:ext uri="{FF2B5EF4-FFF2-40B4-BE49-F238E27FC236}">
+                <a16:creationId xmlns:a16="http://schemas.microsoft.com/office/drawing/2014/main" id="{8F298F8F-A536-48DC-9BA2-D0C59AC19A33}"/>
+              </a:ext>
+            </a:extLst>
+          </p:cNvPr>
+          <p:cNvSpPr/>
+          <p:nvPr/>
+        </p:nvSpPr>
+        <p:spPr>
+          <a:xfrm>
+            <a:off x="9305925" y="6067424"/>
+            <a:ext cx="2057400" cy="790575"/>
+          </a:xfrm>
+          <a:prstGeom prst="rect">
+            <a:avLst/>
+          </a:prstGeom>
+          <a:scene3d>
+            <a:camera prst="orthographicFront"/>
+            <a:lightRig rig="threePt" dir="t"/>
+          </a:scene3d>
+          <a:sp3d>
+            <a:bevelT w="114300" prst="hardEdge"/>
+          </a:sp3d>
+        </p:spPr>
+        <p:style>
+          <a:lnRef idx="2">
+            <a:schemeClr val="accent1">
+              <a:shade val="50000"/>
+            </a:schemeClr>
+          </a:lnRef>
+          <a:fillRef idx="1">
+            <a:schemeClr val="accent1"/>
+          </a:fillRef>
+          <a:effectRef idx="0">
+            <a:schemeClr val="accent1"/>
+          </a:effectRef>
+          <a:fontRef idx="minor">
+            <a:schemeClr val="lt1"/>
+          </a:fontRef>
+        </p:style>
+        <p:txBody>
+          <a:bodyPr rtlCol="0" anchor="ctr"/>
+          <a:lstStyle/>
+          <a:p>
+            <a:pPr algn="ctr"/>
+            <a:r>
+              <a:rPr lang="en-IN" sz="2000" b="1" dirty="0"/>
+              <a:t>APRIL 2022</a:t>
+            </a:r>
+          </a:p>
+        </p:txBody>
+      </p:sp>
+      <p:sp>
+        <p:nvSpPr>
+          <p:cNvPr id="8" name="Slide Number Placeholder 11">
+            <a:extLst>
+              <a:ext uri="{FF2B5EF4-FFF2-40B4-BE49-F238E27FC236}">
+                <a16:creationId xmlns:a16="http://schemas.microsoft.com/office/drawing/2014/main" id="{66E5E76B-63DE-49C5-B59F-65367A92139F}"/>
+              </a:ext>
+            </a:extLst>
+          </p:cNvPr>
+          <p:cNvSpPr>
+            <a:spLocks noGrp="1"/>
+          </p:cNvSpPr>
+          <p:nvPr>
+            <p:ph type="sldNum" sz="quarter" idx="12"/>
+          </p:nvPr>
+        </p:nvSpPr>
+        <p:spPr>
+          <a:xfrm>
+            <a:off x="11563349" y="6280148"/>
+            <a:ext cx="428625" cy="365125"/>
+          </a:xfrm>
+        </p:spPr>
+        <p:txBody>
+          <a:bodyPr/>
+          <a:lstStyle/>
+          <a:p>
+            <a:fld id="{F37EE007-93F6-4DD3-A485-65881C8FA8D0}" type="slidenum">
+              <a:rPr lang="en-IN" sz="1800" b="1" smtClean="0">
+                <a:solidFill>
+                  <a:schemeClr val="bg1"/>
+                </a:solidFill>
+              </a:rPr>
+              <a:t>14</a:t>
+            </a:fld>
+            <a:endParaRPr lang="en-IN" sz="1800" b="1" dirty="0">
+              <a:solidFill>
+                <a:schemeClr val="bg1"/>
+              </a:solidFill>
+            </a:endParaRPr>
+          </a:p>
+        </p:txBody>
+      </p:sp>
+      <p:pic>
+        <p:nvPicPr>
+          <p:cNvPr id="9" name="Picture 8">
+            <a:extLst>
+              <a:ext uri="{FF2B5EF4-FFF2-40B4-BE49-F238E27FC236}">
+                <a16:creationId xmlns:a16="http://schemas.microsoft.com/office/drawing/2014/main" id="{FE2ECC11-E713-46DD-A8C9-F2FE792FD345}"/>
+              </a:ext>
+            </a:extLst>
+          </p:cNvPr>
+          <p:cNvPicPr>
+            <a:picLocks noChangeAspect="1"/>
+          </p:cNvPicPr>
+          <p:nvPr/>
+        </p:nvPicPr>
+        <p:blipFill>
+          <a:blip r:embed="rId4"/>
+          <a:stretch>
+            <a:fillRect/>
+          </a:stretch>
+        </p:blipFill>
+        <p:spPr>
+          <a:xfrm>
+            <a:off x="3013010" y="1523359"/>
+            <a:ext cx="5793442" cy="1274966"/>
+          </a:xfrm>
+          <a:prstGeom prst="rect">
+            <a:avLst/>
+          </a:prstGeom>
+        </p:spPr>
+      </p:pic>
+    </p:spTree>
+    <p:extLst>
+      <p:ext uri="{BB962C8B-B14F-4D97-AF65-F5344CB8AC3E}">
+        <p14:creationId xmlns:p14="http://schemas.microsoft.com/office/powerpoint/2010/main" val="2108658942"/>
+      </p:ext>
+    </p:extLst>
+  </p:cSld>
+  <p:clrMapOvr>
+    <a:masterClrMapping/>
+  </p:clrMapOvr>
+</p:sld>
+</file>
+
+<file path=ppt/slides/slide15.xml><?xml version="1.0" encoding="utf-8"?>
+<p:sld xmlns:a="http://schemas.openxmlformats.org/drawingml/2006/main" xmlns:r="http://schemas.openxmlformats.org/officeDocument/2006/relationships" xmlns:p="http://schemas.openxmlformats.org/presentationml/2006/main">
+  <p:cSld>
+    <p:spTree>
+      <p:nvGrpSpPr>
+        <p:cNvPr id="1" name=""/>
+        <p:cNvGrpSpPr/>
+        <p:nvPr/>
+      </p:nvGrpSpPr>
+      <p:grpSpPr>
+        <a:xfrm>
+          <a:off x="0" y="0"/>
+          <a:ext cx="0" cy="0"/>
+          <a:chOff x="0" y="0"/>
+          <a:chExt cx="0" cy="0"/>
+        </a:xfrm>
+      </p:grpSpPr>
+      <p:sp>
+        <p:nvSpPr>
+          <p:cNvPr id="2" name="Title 1">
+            <a:extLst>
+              <a:ext uri="{FF2B5EF4-FFF2-40B4-BE49-F238E27FC236}">
+                <a16:creationId xmlns:a16="http://schemas.microsoft.com/office/drawing/2014/main" id="{C0666519-3484-48F3-927E-47679DE94711}"/>
+              </a:ext>
+            </a:extLst>
+          </p:cNvPr>
+          <p:cNvSpPr>
+            <a:spLocks noGrp="1"/>
+          </p:cNvSpPr>
+          <p:nvPr>
+            <p:ph type="title"/>
+          </p:nvPr>
+        </p:nvSpPr>
+        <p:spPr>
+          <a:effectLst>
+            <a:outerShdw blurRad="50800" dist="38100" dir="5400000" algn="t" rotWithShape="0">
+              <a:prstClr val="black">
+                <a:alpha val="40000"/>
+              </a:prstClr>
+            </a:outerShdw>
+          </a:effectLst>
+        </p:spPr>
+        <p:style>
+          <a:lnRef idx="3">
+            <a:schemeClr val="lt1"/>
+          </a:lnRef>
+          <a:fillRef idx="1">
+            <a:schemeClr val="accent5"/>
+          </a:fillRef>
+          <a:effectRef idx="1">
+            <a:schemeClr val="accent5"/>
+          </a:effectRef>
+          <a:fontRef idx="minor">
+            <a:schemeClr val="lt1"/>
+          </a:fontRef>
+        </p:style>
+        <p:txBody>
+          <a:bodyPr vert="horz" lIns="91440" tIns="45720" rIns="91440" bIns="45720" rtlCol="0" anchor="ctr">
+            <a:normAutofit/>
+          </a:bodyPr>
+          <a:lstStyle/>
+          <a:p>
+            <a:pPr algn="ctr"/>
+            <a:r>
+              <a:rPr lang="en-IN" b="1" dirty="0">
+                <a:solidFill>
+                  <a:schemeClr val="lt1"/>
+                </a:solidFill>
+                <a:latin typeface="+mn-lt"/>
+                <a:ea typeface="+mn-ea"/>
+                <a:cs typeface="+mn-cs"/>
+              </a:rPr>
+              <a:t>GIT WIKI - USER GUIDES &amp; INSTRUCTIONS</a:t>
+            </a:r>
+          </a:p>
+        </p:txBody>
+      </p:sp>
+      <p:sp>
+        <p:nvSpPr>
+          <p:cNvPr id="3" name="Content Placeholder 2">
+            <a:extLst>
+              <a:ext uri="{FF2B5EF4-FFF2-40B4-BE49-F238E27FC236}">
+                <a16:creationId xmlns:a16="http://schemas.microsoft.com/office/drawing/2014/main" id="{D3F11377-6BB3-4E47-B174-861CD150A86B}"/>
+              </a:ext>
+            </a:extLst>
+          </p:cNvPr>
+          <p:cNvSpPr>
+            <a:spLocks noGrp="1"/>
+          </p:cNvSpPr>
+          <p:nvPr>
+            <p:ph idx="1"/>
+          </p:nvPr>
+        </p:nvSpPr>
+        <p:spPr>
+          <a:xfrm>
+            <a:off x="838201" y="1838325"/>
+            <a:ext cx="6286500" cy="1462623"/>
+          </a:xfrm>
+        </p:spPr>
+        <p:txBody>
+          <a:bodyPr>
+            <a:normAutofit/>
+          </a:bodyPr>
+          <a:lstStyle/>
+          <a:p>
+            <a:pPr algn="just"/>
+            <a:r>
+              <a:rPr lang="en-US" dirty="0"/>
+              <a:t>Platform provided by Git for adding documentation for the projects hosted in the GitHub repository.</a:t>
+            </a:r>
+            <a:endParaRPr lang="en-IN" dirty="0"/>
+          </a:p>
+        </p:txBody>
+      </p:sp>
+      <p:sp>
+        <p:nvSpPr>
+          <p:cNvPr id="4" name="Rectangle 3">
+            <a:extLst>
+              <a:ext uri="{FF2B5EF4-FFF2-40B4-BE49-F238E27FC236}">
+                <a16:creationId xmlns:a16="http://schemas.microsoft.com/office/drawing/2014/main" id="{8D973F9E-231E-4F4E-BF92-D9C84C7AB5A7}"/>
+              </a:ext>
+            </a:extLst>
+          </p:cNvPr>
+          <p:cNvSpPr/>
+          <p:nvPr/>
+        </p:nvSpPr>
+        <p:spPr>
+          <a:xfrm>
+            <a:off x="0" y="6067425"/>
+            <a:ext cx="9305925" cy="790575"/>
+          </a:xfrm>
+          <a:prstGeom prst="rect">
+            <a:avLst/>
+          </a:prstGeom>
+          <a:scene3d>
+            <a:camera prst="orthographicFront"/>
+            <a:lightRig rig="threePt" dir="t"/>
+          </a:scene3d>
+          <a:sp3d>
+            <a:bevelT w="114300" prst="hardEdge"/>
+          </a:sp3d>
+        </p:spPr>
+        <p:style>
+          <a:lnRef idx="2">
+            <a:schemeClr val="accent1">
+              <a:shade val="50000"/>
+            </a:schemeClr>
+          </a:lnRef>
+          <a:fillRef idx="1">
+            <a:schemeClr val="accent1"/>
+          </a:fillRef>
+          <a:effectRef idx="0">
+            <a:schemeClr val="accent1"/>
+          </a:effectRef>
+          <a:fontRef idx="minor">
+            <a:schemeClr val="lt1"/>
+          </a:fontRef>
+        </p:style>
+        <p:txBody>
+          <a:bodyPr rtlCol="0" anchor="ctr"/>
+          <a:lstStyle/>
+          <a:p>
+            <a:pPr algn="ctr"/>
+            <a:r>
+              <a:rPr lang="en-IN" sz="2000" b="1" dirty="0"/>
+              <a:t>WEDNESDAY’S WICKED ADVENTURES</a:t>
+            </a:r>
+          </a:p>
+        </p:txBody>
+      </p:sp>
+      <p:sp>
+        <p:nvSpPr>
+          <p:cNvPr id="5" name="Rectangle 4">
+            <a:extLst>
+              <a:ext uri="{FF2B5EF4-FFF2-40B4-BE49-F238E27FC236}">
+                <a16:creationId xmlns:a16="http://schemas.microsoft.com/office/drawing/2014/main" id="{ADD2B0B5-489C-4527-87A1-6AE32256E8B1}"/>
+              </a:ext>
+            </a:extLst>
+          </p:cNvPr>
+          <p:cNvSpPr/>
+          <p:nvPr/>
+        </p:nvSpPr>
+        <p:spPr>
+          <a:xfrm>
+            <a:off x="11363325" y="6067425"/>
+            <a:ext cx="828675" cy="790575"/>
+          </a:xfrm>
+          <a:prstGeom prst="rect">
+            <a:avLst/>
+          </a:prstGeom>
+          <a:scene3d>
+            <a:camera prst="orthographicFront"/>
+            <a:lightRig rig="threePt" dir="t"/>
+          </a:scene3d>
+          <a:sp3d>
+            <a:bevelT w="114300" prst="hardEdge"/>
+          </a:sp3d>
+        </p:spPr>
+        <p:style>
+          <a:lnRef idx="2">
+            <a:schemeClr val="accent1">
+              <a:shade val="50000"/>
+            </a:schemeClr>
+          </a:lnRef>
+          <a:fillRef idx="1">
+            <a:schemeClr val="accent1"/>
+          </a:fillRef>
+          <a:effectRef idx="0">
+            <a:schemeClr val="accent1"/>
+          </a:effectRef>
+          <a:fontRef idx="minor">
+            <a:schemeClr val="lt1"/>
+          </a:fontRef>
+        </p:style>
+        <p:txBody>
+          <a:bodyPr rtlCol="0" anchor="ctr"/>
+          <a:lstStyle/>
+          <a:p>
+            <a:pPr algn="ctr"/>
+            <a:endParaRPr lang="en-IN"/>
+          </a:p>
+        </p:txBody>
+      </p:sp>
+      <p:sp>
+        <p:nvSpPr>
+          <p:cNvPr id="6" name="Rectangle 5">
+            <a:extLst>
+              <a:ext uri="{FF2B5EF4-FFF2-40B4-BE49-F238E27FC236}">
+                <a16:creationId xmlns:a16="http://schemas.microsoft.com/office/drawing/2014/main" id="{8F298F8F-A536-48DC-9BA2-D0C59AC19A33}"/>
+              </a:ext>
+            </a:extLst>
+          </p:cNvPr>
+          <p:cNvSpPr/>
+          <p:nvPr/>
+        </p:nvSpPr>
+        <p:spPr>
+          <a:xfrm>
+            <a:off x="9305925" y="6067424"/>
+            <a:ext cx="2057400" cy="790575"/>
+          </a:xfrm>
+          <a:prstGeom prst="rect">
+            <a:avLst/>
+          </a:prstGeom>
+          <a:scene3d>
+            <a:camera prst="orthographicFront"/>
+            <a:lightRig rig="threePt" dir="t"/>
+          </a:scene3d>
+          <a:sp3d>
+            <a:bevelT w="114300" prst="hardEdge"/>
+          </a:sp3d>
+        </p:spPr>
+        <p:style>
+          <a:lnRef idx="2">
+            <a:schemeClr val="accent1">
+              <a:shade val="50000"/>
+            </a:schemeClr>
+          </a:lnRef>
+          <a:fillRef idx="1">
+            <a:schemeClr val="accent1"/>
+          </a:fillRef>
+          <a:effectRef idx="0">
+            <a:schemeClr val="accent1"/>
+          </a:effectRef>
+          <a:fontRef idx="minor">
+            <a:schemeClr val="lt1"/>
+          </a:fontRef>
+        </p:style>
+        <p:txBody>
+          <a:bodyPr rtlCol="0" anchor="ctr"/>
+          <a:lstStyle/>
+          <a:p>
+            <a:pPr algn="ctr"/>
+            <a:r>
+              <a:rPr lang="en-IN" sz="2000" b="1" dirty="0"/>
+              <a:t>APRIL 2022</a:t>
+            </a:r>
+          </a:p>
+        </p:txBody>
+      </p:sp>
+      <p:sp>
+        <p:nvSpPr>
+          <p:cNvPr id="8" name="Slide Number Placeholder 11">
+            <a:extLst>
+              <a:ext uri="{FF2B5EF4-FFF2-40B4-BE49-F238E27FC236}">
+                <a16:creationId xmlns:a16="http://schemas.microsoft.com/office/drawing/2014/main" id="{66E5E76B-63DE-49C5-B59F-65367A92139F}"/>
+              </a:ext>
+            </a:extLst>
+          </p:cNvPr>
+          <p:cNvSpPr>
+            <a:spLocks noGrp="1"/>
+          </p:cNvSpPr>
+          <p:nvPr>
+            <p:ph type="sldNum" sz="quarter" idx="12"/>
+          </p:nvPr>
+        </p:nvSpPr>
+        <p:spPr>
+          <a:xfrm>
+            <a:off x="11563349" y="6280148"/>
+            <a:ext cx="428625" cy="365125"/>
+          </a:xfrm>
+        </p:spPr>
+        <p:txBody>
+          <a:bodyPr/>
+          <a:lstStyle/>
+          <a:p>
+            <a:fld id="{F37EE007-93F6-4DD3-A485-65881C8FA8D0}" type="slidenum">
+              <a:rPr lang="en-IN" sz="1800" b="1" smtClean="0">
+                <a:solidFill>
+                  <a:schemeClr val="bg1"/>
+                </a:solidFill>
+              </a:rPr>
+              <a:t>15</a:t>
             </a:fld>
             <a:endParaRPr lang="en-IN" sz="1800" b="1" dirty="0">
               <a:solidFill>
@@ -5281,7 +7327,7 @@
           <a:graphicData uri="http://schemas.openxmlformats.org/presentationml/2006/ole">
             <mc:AlternateContent xmlns:mc="http://schemas.openxmlformats.org/markup-compatibility/2006">
               <mc:Choice xmlns:v="urn:schemas-microsoft-com:vml" Requires="v">
-                <p:oleObj spid="_x0000_s3131" name="Bitmap Image" r:id="rId3" imgW="5753160" imgH="1973520" progId="Paint.Picture">
+                <p:oleObj spid="_x0000_s3177" name="Bitmap Image" r:id="rId3" imgW="5753160" imgH="1973520" progId="Paint.Picture">
                   <p:embed/>
                 </p:oleObj>
               </mc:Choice>
@@ -5553,7 +7599,7 @@
 </p:sld>
 </file>
 
-<file path=ppt/slides/slide12.xml><?xml version="1.0" encoding="utf-8"?>
+<file path=ppt/slides/slide16.xml><?xml version="1.0" encoding="utf-8"?>
 <p:sld xmlns:a="http://schemas.openxmlformats.org/drawingml/2006/main" xmlns:r="http://schemas.openxmlformats.org/officeDocument/2006/relationships" xmlns:p="http://schemas.openxmlformats.org/presentationml/2006/main">
   <p:cSld>
     <p:spTree>
@@ -5820,7 +7866,7 @@
                   <a:schemeClr val="bg1"/>
                 </a:solidFill>
               </a:rPr>
-              <a:t>12</a:t>
+              <a:t>16</a:t>
             </a:fld>
             <a:endParaRPr lang="en-IN" sz="1800" b="1" dirty="0">
               <a:solidFill>
@@ -5843,7 +7889,7 @@
 </p:sld>
 </file>
 
-<file path=ppt/slides/slide13.xml><?xml version="1.0" encoding="utf-8"?>
+<file path=ppt/slides/slide17.xml><?xml version="1.0" encoding="utf-8"?>
 <p:sld xmlns:a="http://schemas.openxmlformats.org/drawingml/2006/main" xmlns:r="http://schemas.openxmlformats.org/officeDocument/2006/relationships" xmlns:p="http://schemas.openxmlformats.org/presentationml/2006/main">
   <p:cSld>
     <p:spTree>
@@ -6057,7 +8103,7 @@
                   <a:schemeClr val="bg1"/>
                 </a:solidFill>
               </a:rPr>
-              <a:t>13</a:t>
+              <a:t>17</a:t>
             </a:fld>
             <a:endParaRPr lang="en-IN" sz="1800" b="1" dirty="0">
               <a:solidFill>
@@ -6127,7 +8173,7 @@
 </p:sld>
 </file>
 
-<file path=ppt/slides/slide14.xml><?xml version="1.0" encoding="utf-8"?>
+<file path=ppt/slides/slide18.xml><?xml version="1.0" encoding="utf-8"?>
 <p:sld xmlns:a="http://schemas.openxmlformats.org/drawingml/2006/main" xmlns:r="http://schemas.openxmlformats.org/officeDocument/2006/relationships" xmlns:p="http://schemas.openxmlformats.org/presentationml/2006/main">
   <p:cSld>
     <p:spTree>
@@ -6341,7 +8387,7 @@
                   <a:schemeClr val="bg1"/>
                 </a:solidFill>
               </a:rPr>
-              <a:t>14</a:t>
+              <a:t>18</a:t>
             </a:fld>
             <a:endParaRPr lang="en-IN" sz="1800" b="1" dirty="0">
               <a:solidFill>
@@ -9548,7 +11594,7 @@
           <a:graphicData uri="http://schemas.openxmlformats.org/presentationml/2006/ole">
             <mc:AlternateContent xmlns:mc="http://schemas.openxmlformats.org/markup-compatibility/2006">
               <mc:Choice xmlns:v="urn:schemas-microsoft-com:vml" Requires="v">
-                <p:oleObj spid="_x0000_s1119" name="Bitmap Image" r:id="rId4" imgW="4267080" imgH="4389120" progId="Paint.Picture">
+                <p:oleObj spid="_x0000_s1165" name="Bitmap Image" r:id="rId4" imgW="4267080" imgH="4389120" progId="Paint.Picture">
                   <p:embed/>
                 </p:oleObj>
               </mc:Choice>
@@ -9764,6 +11810,16 @@
             </a:pPr>
             <a:r>
               <a:rPr lang="en-US" dirty="0"/>
+              <a:t>AWS EKSs</a:t>
+            </a:r>
+          </a:p>
+          <a:p>
+            <a:pPr marL="514350" indent="-514350">
+              <a:buFont typeface="+mj-lt"/>
+              <a:buAutoNum type="arabicParenR"/>
+            </a:pPr>
+            <a:r>
+              <a:rPr lang="en-US" dirty="0"/>
               <a:t>Sphinx for </a:t>
             </a:r>
             <a:r>
@@ -10012,7 +12068,7 @@
           <a:graphicData uri="http://schemas.openxmlformats.org/presentationml/2006/ole">
             <mc:AlternateContent xmlns:mc="http://schemas.openxmlformats.org/markup-compatibility/2006">
               <mc:Choice xmlns:v="urn:schemas-microsoft-com:vml" Requires="v">
-                <p:oleObj spid="_x0000_s2116" name="Bitmap Image" r:id="rId3" imgW="2209680" imgH="3916800" progId="Paint.Picture">
+                <p:oleObj spid="_x0000_s2162" name="Bitmap Image" r:id="rId3" imgW="2209680" imgH="3916800" progId="Paint.Picture">
                   <p:embed/>
                 </p:oleObj>
               </mc:Choice>
@@ -10087,7 +12143,7 @@
           <p:cNvPr id="2" name="Title 1">
             <a:extLst>
               <a:ext uri="{FF2B5EF4-FFF2-40B4-BE49-F238E27FC236}">
-                <a16:creationId xmlns:a16="http://schemas.microsoft.com/office/drawing/2014/main" id="{FED447EA-CAB5-4B9D-8BA6-B4AFD140C0A9}"/>
+                <a16:creationId xmlns:a16="http://schemas.microsoft.com/office/drawing/2014/main" id="{C0666519-3484-48F3-927E-47679DE94711}"/>
               </a:ext>
             </a:extLst>
           </p:cNvPr>
@@ -10098,199 +12154,7 @@
             <p:ph type="title"/>
           </p:nvPr>
         </p:nvSpPr>
-        <p:spPr/>
-        <p:txBody>
-          <a:bodyPr/>
-          <a:lstStyle/>
-          <a:p>
-            <a:r>
-              <a:rPr lang="en-IN" b="1" dirty="0" err="1">
-                <a:solidFill>
-                  <a:schemeClr val="lt1"/>
-                </a:solidFill>
-                <a:latin typeface="+mn-lt"/>
-                <a:ea typeface="+mn-ea"/>
-                <a:cs typeface="+mn-cs"/>
-              </a:rPr>
-              <a:t>ytest</a:t>
-            </a:r>
-            <a:r>
-              <a:rPr lang="en-IN" b="1" dirty="0">
-                <a:solidFill>
-                  <a:schemeClr val="lt1"/>
-                </a:solidFill>
-                <a:latin typeface="+mn-lt"/>
-                <a:ea typeface="+mn-ea"/>
-                <a:cs typeface="+mn-cs"/>
-              </a:rPr>
-              <a:t> for unit </a:t>
-            </a:r>
-            <a:r>
-              <a:rPr lang="en-IN" b="1" dirty="0" err="1">
-                <a:solidFill>
-                  <a:schemeClr val="lt1"/>
-                </a:solidFill>
-                <a:latin typeface="+mn-lt"/>
-                <a:ea typeface="+mn-ea"/>
-                <a:cs typeface="+mn-cs"/>
-              </a:rPr>
-              <a:t>testingest</a:t>
-            </a:r>
-            <a:r>
-              <a:rPr lang="en-IN" b="1" dirty="0">
-                <a:solidFill>
-                  <a:schemeClr val="lt1"/>
-                </a:solidFill>
-                <a:latin typeface="+mn-lt"/>
-                <a:ea typeface="+mn-ea"/>
-                <a:cs typeface="+mn-cs"/>
-              </a:rPr>
-              <a:t> for unit </a:t>
-            </a:r>
-            <a:r>
-              <a:rPr lang="en-IN" b="1" dirty="0" err="1">
-                <a:solidFill>
-                  <a:schemeClr val="lt1"/>
-                </a:solidFill>
-                <a:latin typeface="+mn-lt"/>
-                <a:ea typeface="+mn-ea"/>
-                <a:cs typeface="+mn-cs"/>
-              </a:rPr>
-              <a:t>testingor</a:t>
-            </a:r>
-            <a:r>
-              <a:rPr lang="en-IN" b="1" dirty="0">
-                <a:solidFill>
-                  <a:schemeClr val="lt1"/>
-                </a:solidFill>
-                <a:latin typeface="+mn-lt"/>
-                <a:ea typeface="+mn-ea"/>
-                <a:cs typeface="+mn-cs"/>
-              </a:rPr>
-              <a:t> unit testing</a:t>
-            </a:r>
-            <a:endParaRPr lang="en-IE" dirty="0"/>
-          </a:p>
-        </p:txBody>
-      </p:sp>
-      <p:sp>
-        <p:nvSpPr>
-          <p:cNvPr id="3" name="Content Placeholder 2">
-            <a:extLst>
-              <a:ext uri="{FF2B5EF4-FFF2-40B4-BE49-F238E27FC236}">
-                <a16:creationId xmlns:a16="http://schemas.microsoft.com/office/drawing/2014/main" id="{B8C2C50D-E651-47FD-8B7C-D05DDE3A937A}"/>
-              </a:ext>
-            </a:extLst>
-          </p:cNvPr>
-          <p:cNvSpPr>
-            <a:spLocks noGrp="1"/>
-          </p:cNvSpPr>
-          <p:nvPr>
-            <p:ph idx="1"/>
-          </p:nvPr>
-        </p:nvSpPr>
-        <p:spPr/>
-        <p:txBody>
-          <a:bodyPr/>
-          <a:lstStyle/>
-          <a:p>
-            <a:r>
-              <a:rPr lang="en-US" dirty="0"/>
-              <a:t>PyTest is a testing framework that allows users to write test scripts in Python.</a:t>
-            </a:r>
-          </a:p>
-          <a:p>
-            <a:r>
-              <a:rPr lang="en-US" dirty="0"/>
-              <a:t>It helps with the development of tests ranging from </a:t>
-            </a:r>
-            <a:br>
-              <a:rPr lang="en-US" dirty="0"/>
-            </a:br>
-            <a:r>
-              <a:rPr lang="en-US" dirty="0"/>
-              <a:t>simple unit tests to large functional tests.</a:t>
-            </a:r>
-          </a:p>
-          <a:p>
-            <a:r>
-              <a:rPr lang="en-IE" dirty="0"/>
-              <a:t>Pytest is very easy, open source and run the test in parallel manner.</a:t>
-            </a:r>
-          </a:p>
-          <a:p>
-            <a:r>
-              <a:rPr lang="en-IE" dirty="0"/>
-              <a:t>Unit testing has been performed using PyTest.</a:t>
-            </a:r>
-          </a:p>
-          <a:p>
-            <a:r>
-              <a:rPr lang="en-IE" dirty="0"/>
-              <a:t>Integration of PyTest in GitHub action using python application.</a:t>
-            </a:r>
-          </a:p>
-          <a:p>
-            <a:r>
-              <a:rPr lang="en-IN" dirty="0">
-                <a:solidFill>
-                  <a:srgbClr val="24292F"/>
-                </a:solidFill>
-                <a:latin typeface="-apple-system"/>
-              </a:rPr>
-              <a:t>Details provided in the Git Wiki link in our repository. Click </a:t>
-            </a:r>
-            <a:r>
-              <a:rPr lang="en-IN" dirty="0">
-                <a:solidFill>
-                  <a:srgbClr val="24292F"/>
-                </a:solidFill>
-                <a:latin typeface="-apple-system"/>
-                <a:hlinkClick r:id="rId2"/>
-              </a:rPr>
-              <a:t>here</a:t>
-            </a:r>
-            <a:r>
-              <a:rPr lang="en-IN" dirty="0">
-                <a:solidFill>
-                  <a:srgbClr val="24292F"/>
-                </a:solidFill>
-                <a:latin typeface="-apple-system"/>
-              </a:rPr>
-              <a:t>.</a:t>
-            </a:r>
-          </a:p>
-          <a:p>
-            <a:pPr algn="just"/>
-            <a:endParaRPr lang="en-US" dirty="0"/>
-          </a:p>
-          <a:p>
-            <a:endParaRPr lang="en-IE" dirty="0"/>
-          </a:p>
-        </p:txBody>
-      </p:sp>
-      <p:sp>
-        <p:nvSpPr>
-          <p:cNvPr id="4" name="Title 1">
-            <a:extLst>
-              <a:ext uri="{FF2B5EF4-FFF2-40B4-BE49-F238E27FC236}">
-                <a16:creationId xmlns:a16="http://schemas.microsoft.com/office/drawing/2014/main" id="{FCE4FA1B-AECD-41C7-9705-D28E86BF5E04}"/>
-              </a:ext>
-            </a:extLst>
-          </p:cNvPr>
-          <p:cNvSpPr txBox="1">
-            <a:spLocks/>
-          </p:cNvSpPr>
-          <p:nvPr/>
-        </p:nvSpPr>
-        <p:spPr>
-          <a:xfrm>
-            <a:off x="838200" y="467925"/>
-            <a:ext cx="10515600" cy="1119961"/>
-          </a:xfrm>
-          <a:prstGeom prst="rect">
-            <a:avLst/>
-          </a:prstGeom>
+        <p:spPr>
           <a:effectLst>
             <a:outerShdw blurRad="50800" dist="38100" dir="5400000" algn="t" rotWithShape="0">
               <a:prstClr val="black">
@@ -10317,111 +12181,9 @@
           <a:bodyPr vert="horz" lIns="91440" tIns="45720" rIns="91440" bIns="45720" rtlCol="0" anchor="ctr">
             <a:normAutofit/>
           </a:bodyPr>
-          <a:lstStyle>
-            <a:lvl1pPr algn="l" defTabSz="914400" rtl="0" eaLnBrk="1" latinLnBrk="0" hangingPunct="1">
-              <a:lnSpc>
-                <a:spcPct val="90000"/>
-              </a:lnSpc>
-              <a:spcBef>
-                <a:spcPct val="0"/>
-              </a:spcBef>
-              <a:buNone/>
-              <a:defRPr sz="4400" kern="1200">
-                <a:solidFill>
-                  <a:schemeClr val="lt1"/>
-                </a:solidFill>
-                <a:latin typeface="+mn-lt"/>
-                <a:ea typeface="+mn-ea"/>
-                <a:cs typeface="+mn-cs"/>
-              </a:defRPr>
-            </a:lvl1pPr>
-            <a:lvl2pPr>
-              <a:defRPr>
-                <a:solidFill>
-                  <a:schemeClr val="lt1"/>
-                </a:solidFill>
-                <a:latin typeface="+mn-lt"/>
-                <a:ea typeface="+mn-ea"/>
-                <a:cs typeface="+mn-cs"/>
-              </a:defRPr>
-            </a:lvl2pPr>
-            <a:lvl3pPr>
-              <a:defRPr>
-                <a:solidFill>
-                  <a:schemeClr val="lt1"/>
-                </a:solidFill>
-                <a:latin typeface="+mn-lt"/>
-                <a:ea typeface="+mn-ea"/>
-                <a:cs typeface="+mn-cs"/>
-              </a:defRPr>
-            </a:lvl3pPr>
-            <a:lvl4pPr>
-              <a:defRPr>
-                <a:solidFill>
-                  <a:schemeClr val="lt1"/>
-                </a:solidFill>
-                <a:latin typeface="+mn-lt"/>
-                <a:ea typeface="+mn-ea"/>
-                <a:cs typeface="+mn-cs"/>
-              </a:defRPr>
-            </a:lvl4pPr>
-            <a:lvl5pPr>
-              <a:defRPr>
-                <a:solidFill>
-                  <a:schemeClr val="lt1"/>
-                </a:solidFill>
-                <a:latin typeface="+mn-lt"/>
-                <a:ea typeface="+mn-ea"/>
-                <a:cs typeface="+mn-cs"/>
-              </a:defRPr>
-            </a:lvl5pPr>
-            <a:lvl6pPr>
-              <a:defRPr>
-                <a:solidFill>
-                  <a:schemeClr val="lt1"/>
-                </a:solidFill>
-                <a:latin typeface="+mn-lt"/>
-                <a:ea typeface="+mn-ea"/>
-                <a:cs typeface="+mn-cs"/>
-              </a:defRPr>
-            </a:lvl6pPr>
-            <a:lvl7pPr>
-              <a:defRPr>
-                <a:solidFill>
-                  <a:schemeClr val="lt1"/>
-                </a:solidFill>
-                <a:latin typeface="+mn-lt"/>
-                <a:ea typeface="+mn-ea"/>
-                <a:cs typeface="+mn-cs"/>
-              </a:defRPr>
-            </a:lvl7pPr>
-            <a:lvl8pPr>
-              <a:defRPr>
-                <a:solidFill>
-                  <a:schemeClr val="lt1"/>
-                </a:solidFill>
-                <a:latin typeface="+mn-lt"/>
-                <a:ea typeface="+mn-ea"/>
-                <a:cs typeface="+mn-cs"/>
-              </a:defRPr>
-            </a:lvl8pPr>
-            <a:lvl9pPr>
-              <a:defRPr>
-                <a:solidFill>
-                  <a:schemeClr val="lt1"/>
-                </a:solidFill>
-                <a:latin typeface="+mn-lt"/>
-                <a:ea typeface="+mn-ea"/>
-                <a:cs typeface="+mn-cs"/>
-              </a:defRPr>
-            </a:lvl9pPr>
-          </a:lstStyle>
+          <a:lstStyle/>
           <a:p>
             <a:pPr algn="ctr"/>
-            <a:r>
-              <a:rPr lang="en-IN" b="1" dirty="0"/>
-              <a:t>2</a:t>
-            </a:r>
             <a:r>
               <a:rPr lang="en-IN" b="1" dirty="0">
                 <a:solidFill>
@@ -10431,18 +12193,125 @@
                 <a:ea typeface="+mn-ea"/>
                 <a:cs typeface="+mn-cs"/>
               </a:rPr>
-              <a:t>. PYTEST – UNIT TESTING</a:t>
-            </a:r>
-            <a:endParaRPr lang="en-IN" b="1" dirty="0"/>
-          </a:p>
-        </p:txBody>
-      </p:sp>
-      <p:sp>
-        <p:nvSpPr>
-          <p:cNvPr id="5" name="Rectangle 4">
-            <a:extLst>
-              <a:ext uri="{FF2B5EF4-FFF2-40B4-BE49-F238E27FC236}">
-                <a16:creationId xmlns:a16="http://schemas.microsoft.com/office/drawing/2014/main" id="{A5735CB3-EFF2-4294-9358-B66E9097731B}"/>
+              <a:t>Docker</a:t>
+            </a:r>
+          </a:p>
+        </p:txBody>
+      </p:sp>
+      <p:sp>
+        <p:nvSpPr>
+          <p:cNvPr id="3" name="Content Placeholder 2">
+            <a:extLst>
+              <a:ext uri="{FF2B5EF4-FFF2-40B4-BE49-F238E27FC236}">
+                <a16:creationId xmlns:a16="http://schemas.microsoft.com/office/drawing/2014/main" id="{D3F11377-6BB3-4E47-B174-861CD150A86B}"/>
+              </a:ext>
+            </a:extLst>
+          </p:cNvPr>
+          <p:cNvSpPr>
+            <a:spLocks noGrp="1"/>
+          </p:cNvSpPr>
+          <p:nvPr>
+            <p:ph idx="1"/>
+          </p:nvPr>
+        </p:nvSpPr>
+        <p:spPr>
+          <a:xfrm>
+            <a:off x="838200" y="1843881"/>
+            <a:ext cx="9444318" cy="4070350"/>
+          </a:xfrm>
+        </p:spPr>
+        <p:txBody>
+          <a:bodyPr>
+            <a:normAutofit lnSpcReduction="10000"/>
+          </a:bodyPr>
+          <a:lstStyle/>
+          <a:p>
+            <a:pPr marL="171450" indent="-171450"/>
+            <a:r>
+              <a:rPr lang="en-US" sz="2600" dirty="0"/>
+              <a:t>Docker is an open-source project that automates the deployment of applications inside software containers.</a:t>
+            </a:r>
+            <a:endParaRPr lang="en-IN" sz="2600" dirty="0"/>
+          </a:p>
+          <a:p>
+            <a:pPr marL="171450" indent="-171450"/>
+            <a:r>
+              <a:rPr lang="en-IN" sz="2600" dirty="0"/>
+              <a:t>Docker automates creation of lightweight - </a:t>
+            </a:r>
+            <a:r>
+              <a:rPr lang="en-IN" sz="2600" i="1" dirty="0"/>
+              <a:t>Application container</a:t>
+            </a:r>
+          </a:p>
+          <a:p>
+            <a:pPr marL="171450" lvl="0" indent="-171450" algn="l">
+              <a:buFont typeface="Arial" panose="020B0604020202020204" pitchFamily="34" charset="0"/>
+              <a:buChar char="•"/>
+            </a:pPr>
+            <a:r>
+              <a:rPr lang="en-IN" sz="2600" dirty="0"/>
+              <a:t>Container will virtually run anywhere.</a:t>
+            </a:r>
+          </a:p>
+          <a:p>
+            <a:pPr marL="0" lvl="0" indent="0" algn="l">
+              <a:buNone/>
+            </a:pPr>
+            <a:r>
+              <a:rPr lang="en-IN" sz="2600" dirty="0" err="1"/>
+              <a:t>Dockerfile</a:t>
+            </a:r>
+            <a:r>
+              <a:rPr lang="en-IN" sz="2600" dirty="0"/>
+              <a:t>: </a:t>
+            </a:r>
+            <a:r>
+              <a:rPr lang="en-US" sz="2600" dirty="0"/>
+              <a:t>A text document that contains all the commands to assemble an image.</a:t>
+            </a:r>
+          </a:p>
+          <a:p>
+            <a:pPr marL="0" lvl="0" indent="0" algn="l">
+              <a:buNone/>
+            </a:pPr>
+            <a:r>
+              <a:rPr lang="en-US" sz="2600" dirty="0" err="1"/>
+              <a:t>DockerImage</a:t>
+            </a:r>
+            <a:r>
+              <a:rPr lang="en-US" sz="2600" dirty="0"/>
+              <a:t>: It is used to execute code in a Docker container.</a:t>
+            </a:r>
+          </a:p>
+          <a:p>
+            <a:pPr marL="0" indent="0">
+              <a:buNone/>
+            </a:pPr>
+            <a:r>
+              <a:rPr lang="en-US" sz="2600" dirty="0"/>
+              <a:t>Container: A portable executable package which includes applications and their dependencies. It is the r</a:t>
+            </a:r>
+            <a:r>
+              <a:rPr lang="de-CH" sz="2600" dirty="0"/>
+              <a:t>unnable instance of an image.</a:t>
+            </a:r>
+            <a:endParaRPr lang="en-US" sz="2600" dirty="0"/>
+          </a:p>
+          <a:p>
+            <a:pPr marL="0" lvl="0" indent="0" algn="l">
+              <a:buNone/>
+            </a:pPr>
+            <a:endParaRPr lang="en-IN" sz="2600" dirty="0"/>
+          </a:p>
+        </p:txBody>
+      </p:sp>
+      <p:sp>
+        <p:nvSpPr>
+          <p:cNvPr id="4" name="Rectangle 3">
+            <a:extLst>
+              <a:ext uri="{FF2B5EF4-FFF2-40B4-BE49-F238E27FC236}">
+                <a16:creationId xmlns:a16="http://schemas.microsoft.com/office/drawing/2014/main" id="{8D973F9E-231E-4F4E-BF92-D9C84C7AB5A7}"/>
               </a:ext>
             </a:extLst>
           </p:cNvPr>
@@ -10495,10 +12364,10 @@
       </p:sp>
       <p:sp>
         <p:nvSpPr>
-          <p:cNvPr id="6" name="Rectangle 5">
-            <a:extLst>
-              <a:ext uri="{FF2B5EF4-FFF2-40B4-BE49-F238E27FC236}">
-                <a16:creationId xmlns:a16="http://schemas.microsoft.com/office/drawing/2014/main" id="{F14345D9-9892-4B92-9278-8A31183A7CCF}"/>
+          <p:cNvPr id="5" name="Rectangle 4">
+            <a:extLst>
+              <a:ext uri="{FF2B5EF4-FFF2-40B4-BE49-F238E27FC236}">
+                <a16:creationId xmlns:a16="http://schemas.microsoft.com/office/drawing/2014/main" id="{ADD2B0B5-489C-4527-87A1-6AE32256E8B1}"/>
               </a:ext>
             </a:extLst>
           </p:cNvPr>
@@ -10548,10 +12417,10 @@
       </p:sp>
       <p:sp>
         <p:nvSpPr>
-          <p:cNvPr id="7" name="Rectangle 6">
-            <a:extLst>
-              <a:ext uri="{FF2B5EF4-FFF2-40B4-BE49-F238E27FC236}">
-                <a16:creationId xmlns:a16="http://schemas.microsoft.com/office/drawing/2014/main" id="{8181087D-DD49-49AE-95D9-420C4E4FDA6F}"/>
+          <p:cNvPr id="6" name="Rectangle 5">
+            <a:extLst>
+              <a:ext uri="{FF2B5EF4-FFF2-40B4-BE49-F238E27FC236}">
+                <a16:creationId xmlns:a16="http://schemas.microsoft.com/office/drawing/2014/main" id="{8F298F8F-A536-48DC-9BA2-D0C59AC19A33}"/>
               </a:ext>
             </a:extLst>
           </p:cNvPr>
@@ -10607,7 +12476,7 @@
           <p:cNvPr id="8" name="Slide Number Placeholder 11">
             <a:extLst>
               <a:ext uri="{FF2B5EF4-FFF2-40B4-BE49-F238E27FC236}">
-                <a16:creationId xmlns:a16="http://schemas.microsoft.com/office/drawing/2014/main" id="{3A49B4D6-43AE-4DAB-AF72-D53FA9B65599}"/>
+                <a16:creationId xmlns:a16="http://schemas.microsoft.com/office/drawing/2014/main" id="{66E5E76B-63DE-49C5-B59F-65367A92139F}"/>
               </a:ext>
             </a:extLst>
           </p:cNvPr>
@@ -10629,14 +12498,14 @@
           <a:lstStyle/>
           <a:p>
             <a:fld id="{F37EE007-93F6-4DD3-A485-65881C8FA8D0}" type="slidenum">
-              <a:rPr lang="en-IN" sz="1800" b="1" smtClean="0">
+              <a:rPr lang="en-IN" sz="2000" b="1" smtClean="0">
                 <a:solidFill>
                   <a:schemeClr val="bg1"/>
                 </a:solidFill>
               </a:rPr>
               <a:t>9</a:t>
             </a:fld>
-            <a:endParaRPr lang="en-IN" sz="1800" b="1" dirty="0">
+            <a:endParaRPr lang="en-IN" sz="2000" b="1" dirty="0">
               <a:solidFill>
                 <a:schemeClr val="bg1"/>
               </a:solidFill>
@@ -10644,10 +12513,57 @@
           </a:p>
         </p:txBody>
       </p:sp>
+      <p:pic>
+        <p:nvPicPr>
+          <p:cNvPr id="4104" name="Picture 8" descr="Docker Logo, history, meaning, symbol, PNG">
+            <a:extLst>
+              <a:ext uri="{FF2B5EF4-FFF2-40B4-BE49-F238E27FC236}">
+                <a16:creationId xmlns:a16="http://schemas.microsoft.com/office/drawing/2014/main" id="{2688C0E8-9744-4FFF-BA7E-250BCCBE9C1C}"/>
+              </a:ext>
+            </a:extLst>
+          </p:cNvPr>
+          <p:cNvPicPr>
+            <a:picLocks noChangeAspect="1" noChangeArrowheads="1"/>
+          </p:cNvPicPr>
+          <p:nvPr/>
+        </p:nvPicPr>
+        <p:blipFill>
+          <a:blip r:embed="rId2">
+            <a:extLst>
+              <a:ext uri="{28A0092B-C50C-407E-A947-70E740481C1C}">
+                <a14:useLocalDpi xmlns:a14="http://schemas.microsoft.com/office/drawing/2010/main" val="0"/>
+              </a:ext>
+            </a:extLst>
+          </a:blip>
+          <a:srcRect/>
+          <a:stretch>
+            <a:fillRect/>
+          </a:stretch>
+        </p:blipFill>
+        <p:spPr bwMode="auto">
+          <a:xfrm>
+            <a:off x="8953779" y="2634783"/>
+            <a:ext cx="2823882" cy="1588433"/>
+          </a:xfrm>
+          <a:prstGeom prst="rect">
+            <a:avLst/>
+          </a:prstGeom>
+          <a:noFill/>
+          <a:extLst>
+            <a:ext uri="{909E8E84-426E-40DD-AFC4-6F175D3DCCD1}">
+              <a14:hiddenFill xmlns:a14="http://schemas.microsoft.com/office/drawing/2010/main">
+                <a:solidFill>
+                  <a:srgbClr val="FFFFFF"/>
+                </a:solidFill>
+              </a14:hiddenFill>
+            </a:ext>
+          </a:extLst>
+        </p:spPr>
+      </p:pic>
     </p:spTree>
     <p:extLst>
       <p:ext uri="{BB962C8B-B14F-4D97-AF65-F5344CB8AC3E}">
-        <p14:creationId xmlns:p14="http://schemas.microsoft.com/office/powerpoint/2010/main" val="1818624087"/>
+        <p14:creationId xmlns:p14="http://schemas.microsoft.com/office/powerpoint/2010/main" val="1287131835"/>
       </p:ext>
     </p:extLst>
   </p:cSld>

</xml_diff>